<commit_message>
Fixed maturity to equal LS best estimates for both time blocks then changed catch/maturity assumption so that catch is 100% mature. Did not converge (Hessian not pos def) #6
</commit_message>
<xml_diff>
--- a/technical_docs/popdy_her_ls.pptx
+++ b/technical_docs/popdy_her_ls.pptx
@@ -7,9 +7,15 @@
   <p:sldIdLst>
     <p:sldId id="258" r:id="rId2"/>
     <p:sldId id="257" r:id="rId3"/>
-    <p:sldId id="261" r:id="rId4"/>
-    <p:sldId id="262" r:id="rId5"/>
-    <p:sldId id="263" r:id="rId6"/>
+    <p:sldId id="266" r:id="rId4"/>
+    <p:sldId id="268" r:id="rId5"/>
+    <p:sldId id="269" r:id="rId6"/>
+    <p:sldId id="264" r:id="rId7"/>
+    <p:sldId id="270" r:id="rId8"/>
+    <p:sldId id="272" r:id="rId9"/>
+    <p:sldId id="271" r:id="rId10"/>
+    <p:sldId id="261" r:id="rId11"/>
+    <p:sldId id="262" r:id="rId12"/>
   </p:sldIdLst>
   <p:sldSz cx="10058400" cy="7772400"/>
   <p:notesSz cx="6858000" cy="9144000"/>
@@ -108,6 +114,11 @@
       </a:defRPr>
     </a:lvl9pPr>
   </p:defaultTextStyle>
+  <p:extLst>
+    <p:ext uri="{EFAFB233-063F-42B5-8137-9DF3F51BA10A}">
+      <p15:sldGuideLst xmlns:p15="http://schemas.microsoft.com/office/powerpoint/2012/main"/>
+    </p:ext>
+  </p:extLst>
 </p:presentation>
 </file>
 
@@ -242,7 +253,7 @@
           <a:p>
             <a:fld id="{601AD17F-A198-4D0B-923D-8F7C51F5BEB9}" type="datetimeFigureOut">
               <a:rPr lang="en-US" smtClean="0"/>
-              <a:t>6/19/2019</a:t>
+              <a:t>6/21/2019</a:t>
             </a:fld>
             <a:endParaRPr lang="en-US"/>
           </a:p>
@@ -412,7 +423,7 @@
           <a:p>
             <a:fld id="{601AD17F-A198-4D0B-923D-8F7C51F5BEB9}" type="datetimeFigureOut">
               <a:rPr lang="en-US" smtClean="0"/>
-              <a:t>6/19/2019</a:t>
+              <a:t>6/21/2019</a:t>
             </a:fld>
             <a:endParaRPr lang="en-US"/>
           </a:p>
@@ -592,7 +603,7 @@
           <a:p>
             <a:fld id="{601AD17F-A198-4D0B-923D-8F7C51F5BEB9}" type="datetimeFigureOut">
               <a:rPr lang="en-US" smtClean="0"/>
-              <a:t>6/19/2019</a:t>
+              <a:t>6/21/2019</a:t>
             </a:fld>
             <a:endParaRPr lang="en-US"/>
           </a:p>
@@ -762,7 +773,7 @@
           <a:p>
             <a:fld id="{601AD17F-A198-4D0B-923D-8F7C51F5BEB9}" type="datetimeFigureOut">
               <a:rPr lang="en-US" smtClean="0"/>
-              <a:t>6/19/2019</a:t>
+              <a:t>6/21/2019</a:t>
             </a:fld>
             <a:endParaRPr lang="en-US"/>
           </a:p>
@@ -1006,7 +1017,7 @@
           <a:p>
             <a:fld id="{601AD17F-A198-4D0B-923D-8F7C51F5BEB9}" type="datetimeFigureOut">
               <a:rPr lang="en-US" smtClean="0"/>
-              <a:t>6/19/2019</a:t>
+              <a:t>6/21/2019</a:t>
             </a:fld>
             <a:endParaRPr lang="en-US"/>
           </a:p>
@@ -1238,7 +1249,7 @@
           <a:p>
             <a:fld id="{601AD17F-A198-4D0B-923D-8F7C51F5BEB9}" type="datetimeFigureOut">
               <a:rPr lang="en-US" smtClean="0"/>
-              <a:t>6/19/2019</a:t>
+              <a:t>6/21/2019</a:t>
             </a:fld>
             <a:endParaRPr lang="en-US"/>
           </a:p>
@@ -1605,7 +1616,7 @@
           <a:p>
             <a:fld id="{601AD17F-A198-4D0B-923D-8F7C51F5BEB9}" type="datetimeFigureOut">
               <a:rPr lang="en-US" smtClean="0"/>
-              <a:t>6/19/2019</a:t>
+              <a:t>6/21/2019</a:t>
             </a:fld>
             <a:endParaRPr lang="en-US"/>
           </a:p>
@@ -1723,7 +1734,7 @@
           <a:p>
             <a:fld id="{601AD17F-A198-4D0B-923D-8F7C51F5BEB9}" type="datetimeFigureOut">
               <a:rPr lang="en-US" smtClean="0"/>
-              <a:t>6/19/2019</a:t>
+              <a:t>6/21/2019</a:t>
             </a:fld>
             <a:endParaRPr lang="en-US"/>
           </a:p>
@@ -1818,7 +1829,7 @@
           <a:p>
             <a:fld id="{601AD17F-A198-4D0B-923D-8F7C51F5BEB9}" type="datetimeFigureOut">
               <a:rPr lang="en-US" smtClean="0"/>
-              <a:t>6/19/2019</a:t>
+              <a:t>6/21/2019</a:t>
             </a:fld>
             <a:endParaRPr lang="en-US"/>
           </a:p>
@@ -2095,7 +2106,7 @@
           <a:p>
             <a:fld id="{601AD17F-A198-4D0B-923D-8F7C51F5BEB9}" type="datetimeFigureOut">
               <a:rPr lang="en-US" smtClean="0"/>
-              <a:t>6/19/2019</a:t>
+              <a:t>6/21/2019</a:t>
             </a:fld>
             <a:endParaRPr lang="en-US"/>
           </a:p>
@@ -2352,7 +2363,7 @@
           <a:p>
             <a:fld id="{601AD17F-A198-4D0B-923D-8F7C51F5BEB9}" type="datetimeFigureOut">
               <a:rPr lang="en-US" smtClean="0"/>
-              <a:t>6/19/2019</a:t>
+              <a:t>6/21/2019</a:t>
             </a:fld>
             <a:endParaRPr lang="en-US"/>
           </a:p>
@@ -2565,7 +2576,7 @@
           <a:p>
             <a:fld id="{601AD17F-A198-4D0B-923D-8F7C51F5BEB9}" type="datetimeFigureOut">
               <a:rPr lang="en-US" smtClean="0"/>
-              <a:t>6/19/2019</a:t>
+              <a:t>6/21/2019</a:t>
             </a:fld>
             <a:endParaRPr lang="en-US"/>
           </a:p>
@@ -3031,12 +3042,942 @@
               <a:t>Jane Sullivan</a:t>
             </a:r>
           </a:p>
+          <a:p>
+            <a:r>
+              <a:rPr lang="en-US" dirty="0"/>
+              <a:t>Last updated: 2019-06-25</a:t>
+            </a:r>
+          </a:p>
         </p:txBody>
       </p:sp>
     </p:spTree>
     <p:extLst>
       <p:ext uri="{BB962C8B-B14F-4D97-AF65-F5344CB8AC3E}">
         <p14:creationId xmlns:p14="http://schemas.microsoft.com/office/powerpoint/2010/main" val="1836237144"/>
+      </p:ext>
+    </p:extLst>
+  </p:cSld>
+  <p:clrMapOvr>
+    <a:masterClrMapping/>
+  </p:clrMapOvr>
+</p:sld>
+</file>
+
+<file path=ppt/slides/slide10.xml><?xml version="1.0" encoding="utf-8"?>
+<p:sld xmlns:a="http://schemas.openxmlformats.org/drawingml/2006/main" xmlns:r="http://schemas.openxmlformats.org/officeDocument/2006/relationships" xmlns:p="http://schemas.openxmlformats.org/presentationml/2006/main">
+  <p:cSld>
+    <p:spTree>
+      <p:nvGrpSpPr>
+        <p:cNvPr id="1" name=""/>
+        <p:cNvGrpSpPr/>
+        <p:nvPr/>
+      </p:nvGrpSpPr>
+      <p:grpSpPr>
+        <a:xfrm>
+          <a:off x="0" y="0"/>
+          <a:ext cx="0" cy="0"/>
+          <a:chOff x="0" y="0"/>
+          <a:chExt cx="0" cy="0"/>
+        </a:xfrm>
+      </p:grpSpPr>
+      <p:sp>
+        <p:nvSpPr>
+          <p:cNvPr id="2" name="Title 1">
+            <a:extLst>
+              <a:ext uri="{FF2B5EF4-FFF2-40B4-BE49-F238E27FC236}">
+                <a16:creationId xmlns:a16="http://schemas.microsoft.com/office/drawing/2014/main" id="{A2DCAC96-E1FD-44FF-8A96-717F504C6320}"/>
+              </a:ext>
+            </a:extLst>
+          </p:cNvPr>
+          <p:cNvSpPr>
+            <a:spLocks noGrp="1"/>
+          </p:cNvSpPr>
+          <p:nvPr>
+            <p:ph type="title"/>
+          </p:nvPr>
+        </p:nvSpPr>
+        <p:spPr>
+          <a:xfrm>
+            <a:off x="454342" y="359040"/>
+            <a:ext cx="8675370" cy="795865"/>
+          </a:xfrm>
+        </p:spPr>
+        <p:txBody>
+          <a:bodyPr/>
+          <a:lstStyle/>
+          <a:p>
+            <a:r>
+              <a:rPr lang="en-US" dirty="0"/>
+              <a:t>Maturity</a:t>
+            </a:r>
+          </a:p>
+        </p:txBody>
+      </p:sp>
+      <p:sp>
+        <p:nvSpPr>
+          <p:cNvPr id="3" name="Content Placeholder 2">
+            <a:extLst>
+              <a:ext uri="{FF2B5EF4-FFF2-40B4-BE49-F238E27FC236}">
+                <a16:creationId xmlns:a16="http://schemas.microsoft.com/office/drawing/2014/main" id="{BB5B9591-6BBC-4B0D-8085-50D5036BBADE}"/>
+              </a:ext>
+            </a:extLst>
+          </p:cNvPr>
+          <p:cNvSpPr>
+            <a:spLocks noGrp="1"/>
+          </p:cNvSpPr>
+          <p:nvPr>
+            <p:ph idx="1"/>
+          </p:nvPr>
+        </p:nvSpPr>
+        <p:spPr>
+          <a:xfrm>
+            <a:off x="454341" y="3468885"/>
+            <a:ext cx="4337685" cy="523875"/>
+          </a:xfrm>
+        </p:spPr>
+        <p:txBody>
+          <a:bodyPr/>
+          <a:lstStyle/>
+          <a:p>
+            <a:pPr marL="0" indent="0">
+              <a:buNone/>
+            </a:pPr>
+            <a:r>
+              <a:rPr lang="en-US" dirty="0"/>
+              <a:t>HER</a:t>
+            </a:r>
+          </a:p>
+        </p:txBody>
+      </p:sp>
+      <p:sp>
+        <p:nvSpPr>
+          <p:cNvPr id="4" name="Content Placeholder 2">
+            <a:extLst>
+              <a:ext uri="{FF2B5EF4-FFF2-40B4-BE49-F238E27FC236}">
+                <a16:creationId xmlns:a16="http://schemas.microsoft.com/office/drawing/2014/main" id="{7EC84657-5B91-4347-81F3-1B680908C4DF}"/>
+              </a:ext>
+            </a:extLst>
+          </p:cNvPr>
+          <p:cNvSpPr txBox="1">
+            <a:spLocks/>
+          </p:cNvSpPr>
+          <p:nvPr/>
+        </p:nvSpPr>
+        <p:spPr>
+          <a:xfrm>
+            <a:off x="454341" y="1044176"/>
+            <a:ext cx="4337685" cy="523875"/>
+          </a:xfrm>
+          <a:prstGeom prst="rect">
+            <a:avLst/>
+          </a:prstGeom>
+        </p:spPr>
+        <p:txBody>
+          <a:bodyPr vert="horz" lIns="91440" tIns="45720" rIns="91440" bIns="45720" rtlCol="0">
+            <a:normAutofit/>
+          </a:bodyPr>
+          <a:lstStyle>
+            <a:lvl1pPr marL="251460" indent="-251460" algn="l" defTabSz="1005840" rtl="0" eaLnBrk="1" latinLnBrk="0" hangingPunct="1">
+              <a:lnSpc>
+                <a:spcPct val="90000"/>
+              </a:lnSpc>
+              <a:spcBef>
+                <a:spcPts val="1100"/>
+              </a:spcBef>
+              <a:buFont typeface="Arial" panose="020B0604020202020204" pitchFamily="34" charset="0"/>
+              <a:buChar char="•"/>
+              <a:defRPr sz="3080" kern="1200">
+                <a:solidFill>
+                  <a:schemeClr val="tx1"/>
+                </a:solidFill>
+                <a:latin typeface="+mn-lt"/>
+                <a:ea typeface="+mn-ea"/>
+                <a:cs typeface="+mn-cs"/>
+              </a:defRPr>
+            </a:lvl1pPr>
+            <a:lvl2pPr marL="754380" indent="-251460" algn="l" defTabSz="1005840" rtl="0" eaLnBrk="1" latinLnBrk="0" hangingPunct="1">
+              <a:lnSpc>
+                <a:spcPct val="90000"/>
+              </a:lnSpc>
+              <a:spcBef>
+                <a:spcPts val="550"/>
+              </a:spcBef>
+              <a:buFont typeface="Arial" panose="020B0604020202020204" pitchFamily="34" charset="0"/>
+              <a:buChar char="•"/>
+              <a:defRPr sz="2640" kern="1200">
+                <a:solidFill>
+                  <a:schemeClr val="tx1"/>
+                </a:solidFill>
+                <a:latin typeface="+mn-lt"/>
+                <a:ea typeface="+mn-ea"/>
+                <a:cs typeface="+mn-cs"/>
+              </a:defRPr>
+            </a:lvl2pPr>
+            <a:lvl3pPr marL="1257300" indent="-251460" algn="l" defTabSz="1005840" rtl="0" eaLnBrk="1" latinLnBrk="0" hangingPunct="1">
+              <a:lnSpc>
+                <a:spcPct val="90000"/>
+              </a:lnSpc>
+              <a:spcBef>
+                <a:spcPts val="550"/>
+              </a:spcBef>
+              <a:buFont typeface="Arial" panose="020B0604020202020204" pitchFamily="34" charset="0"/>
+              <a:buChar char="•"/>
+              <a:defRPr sz="2200" kern="1200">
+                <a:solidFill>
+                  <a:schemeClr val="tx1"/>
+                </a:solidFill>
+                <a:latin typeface="+mn-lt"/>
+                <a:ea typeface="+mn-ea"/>
+                <a:cs typeface="+mn-cs"/>
+              </a:defRPr>
+            </a:lvl3pPr>
+            <a:lvl4pPr marL="1760220" indent="-251460" algn="l" defTabSz="1005840" rtl="0" eaLnBrk="1" latinLnBrk="0" hangingPunct="1">
+              <a:lnSpc>
+                <a:spcPct val="90000"/>
+              </a:lnSpc>
+              <a:spcBef>
+                <a:spcPts val="550"/>
+              </a:spcBef>
+              <a:buFont typeface="Arial" panose="020B0604020202020204" pitchFamily="34" charset="0"/>
+              <a:buChar char="•"/>
+              <a:defRPr sz="1980" kern="1200">
+                <a:solidFill>
+                  <a:schemeClr val="tx1"/>
+                </a:solidFill>
+                <a:latin typeface="+mn-lt"/>
+                <a:ea typeface="+mn-ea"/>
+                <a:cs typeface="+mn-cs"/>
+              </a:defRPr>
+            </a:lvl4pPr>
+            <a:lvl5pPr marL="2263140" indent="-251460" algn="l" defTabSz="1005840" rtl="0" eaLnBrk="1" latinLnBrk="0" hangingPunct="1">
+              <a:lnSpc>
+                <a:spcPct val="90000"/>
+              </a:lnSpc>
+              <a:spcBef>
+                <a:spcPts val="550"/>
+              </a:spcBef>
+              <a:buFont typeface="Arial" panose="020B0604020202020204" pitchFamily="34" charset="0"/>
+              <a:buChar char="•"/>
+              <a:defRPr sz="1980" kern="1200">
+                <a:solidFill>
+                  <a:schemeClr val="tx1"/>
+                </a:solidFill>
+                <a:latin typeface="+mn-lt"/>
+                <a:ea typeface="+mn-ea"/>
+                <a:cs typeface="+mn-cs"/>
+              </a:defRPr>
+            </a:lvl5pPr>
+            <a:lvl6pPr marL="2766060" indent="-251460" algn="l" defTabSz="1005840" rtl="0" eaLnBrk="1" latinLnBrk="0" hangingPunct="1">
+              <a:lnSpc>
+                <a:spcPct val="90000"/>
+              </a:lnSpc>
+              <a:spcBef>
+                <a:spcPts val="550"/>
+              </a:spcBef>
+              <a:buFont typeface="Arial" panose="020B0604020202020204" pitchFamily="34" charset="0"/>
+              <a:buChar char="•"/>
+              <a:defRPr sz="1980" kern="1200">
+                <a:solidFill>
+                  <a:schemeClr val="tx1"/>
+                </a:solidFill>
+                <a:latin typeface="+mn-lt"/>
+                <a:ea typeface="+mn-ea"/>
+                <a:cs typeface="+mn-cs"/>
+              </a:defRPr>
+            </a:lvl6pPr>
+            <a:lvl7pPr marL="3268980" indent="-251460" algn="l" defTabSz="1005840" rtl="0" eaLnBrk="1" latinLnBrk="0" hangingPunct="1">
+              <a:lnSpc>
+                <a:spcPct val="90000"/>
+              </a:lnSpc>
+              <a:spcBef>
+                <a:spcPts val="550"/>
+              </a:spcBef>
+              <a:buFont typeface="Arial" panose="020B0604020202020204" pitchFamily="34" charset="0"/>
+              <a:buChar char="•"/>
+              <a:defRPr sz="1980" kern="1200">
+                <a:solidFill>
+                  <a:schemeClr val="tx1"/>
+                </a:solidFill>
+                <a:latin typeface="+mn-lt"/>
+                <a:ea typeface="+mn-ea"/>
+                <a:cs typeface="+mn-cs"/>
+              </a:defRPr>
+            </a:lvl7pPr>
+            <a:lvl8pPr marL="3771900" indent="-251460" algn="l" defTabSz="1005840" rtl="0" eaLnBrk="1" latinLnBrk="0" hangingPunct="1">
+              <a:lnSpc>
+                <a:spcPct val="90000"/>
+              </a:lnSpc>
+              <a:spcBef>
+                <a:spcPts val="550"/>
+              </a:spcBef>
+              <a:buFont typeface="Arial" panose="020B0604020202020204" pitchFamily="34" charset="0"/>
+              <a:buChar char="•"/>
+              <a:defRPr sz="1980" kern="1200">
+                <a:solidFill>
+                  <a:schemeClr val="tx1"/>
+                </a:solidFill>
+                <a:latin typeface="+mn-lt"/>
+                <a:ea typeface="+mn-ea"/>
+                <a:cs typeface="+mn-cs"/>
+              </a:defRPr>
+            </a:lvl8pPr>
+            <a:lvl9pPr marL="4274820" indent="-251460" algn="l" defTabSz="1005840" rtl="0" eaLnBrk="1" latinLnBrk="0" hangingPunct="1">
+              <a:lnSpc>
+                <a:spcPct val="90000"/>
+              </a:lnSpc>
+              <a:spcBef>
+                <a:spcPts val="550"/>
+              </a:spcBef>
+              <a:buFont typeface="Arial" panose="020B0604020202020204" pitchFamily="34" charset="0"/>
+              <a:buChar char="•"/>
+              <a:defRPr sz="1980" kern="1200">
+                <a:solidFill>
+                  <a:schemeClr val="tx1"/>
+                </a:solidFill>
+                <a:latin typeface="+mn-lt"/>
+                <a:ea typeface="+mn-ea"/>
+                <a:cs typeface="+mn-cs"/>
+              </a:defRPr>
+            </a:lvl9pPr>
+          </a:lstStyle>
+          <a:p>
+            <a:pPr marL="0" indent="0">
+              <a:buFont typeface="Arial" panose="020B0604020202020204" pitchFamily="34" charset="0"/>
+              <a:buNone/>
+            </a:pPr>
+            <a:r>
+              <a:rPr lang="en-US" dirty="0"/>
+              <a:t>LS</a:t>
+            </a:r>
+          </a:p>
+        </p:txBody>
+      </p:sp>
+      <p:sp>
+        <p:nvSpPr>
+          <p:cNvPr id="7" name="TextBox 6">
+            <a:extLst>
+              <a:ext uri="{FF2B5EF4-FFF2-40B4-BE49-F238E27FC236}">
+                <a16:creationId xmlns:a16="http://schemas.microsoft.com/office/drawing/2014/main" id="{72605019-96D8-4F7B-A59A-AAD9E9523421}"/>
+              </a:ext>
+            </a:extLst>
+          </p:cNvPr>
+          <p:cNvSpPr txBox="1"/>
+          <p:nvPr/>
+        </p:nvSpPr>
+        <p:spPr>
+          <a:xfrm>
+            <a:off x="6236016" y="1568051"/>
+            <a:ext cx="2609849" cy="646331"/>
+          </a:xfrm>
+          <a:prstGeom prst="rect">
+            <a:avLst/>
+          </a:prstGeom>
+          <a:noFill/>
+        </p:spPr>
+        <p:txBody>
+          <a:bodyPr wrap="square" rtlCol="0">
+            <a:spAutoFit/>
+          </a:bodyPr>
+          <a:lstStyle/>
+          <a:p>
+            <a:r>
+              <a:rPr lang="en-US" dirty="0"/>
+              <a:t>Logistic, a50/slope parameterization</a:t>
+            </a:r>
+          </a:p>
+        </p:txBody>
+      </p:sp>
+      <p:pic>
+        <p:nvPicPr>
+          <p:cNvPr id="9" name="Picture 8">
+            <a:extLst>
+              <a:ext uri="{FF2B5EF4-FFF2-40B4-BE49-F238E27FC236}">
+                <a16:creationId xmlns:a16="http://schemas.microsoft.com/office/drawing/2014/main" id="{E5320891-1029-48BD-B517-EB0AB1BA01C7}"/>
+              </a:ext>
+            </a:extLst>
+          </p:cNvPr>
+          <p:cNvPicPr>
+            <a:picLocks noChangeAspect="1"/>
+          </p:cNvPicPr>
+          <p:nvPr/>
+        </p:nvPicPr>
+        <p:blipFill>
+          <a:blip r:embed="rId2"/>
+          <a:stretch>
+            <a:fillRect/>
+          </a:stretch>
+        </p:blipFill>
+        <p:spPr>
+          <a:xfrm>
+            <a:off x="448624" y="6689460"/>
+            <a:ext cx="5429250" cy="723900"/>
+          </a:xfrm>
+          <a:prstGeom prst="rect">
+            <a:avLst/>
+          </a:prstGeom>
+        </p:spPr>
+      </p:pic>
+      <p:pic>
+        <p:nvPicPr>
+          <p:cNvPr id="10" name="Picture 9">
+            <a:extLst>
+              <a:ext uri="{FF2B5EF4-FFF2-40B4-BE49-F238E27FC236}">
+                <a16:creationId xmlns:a16="http://schemas.microsoft.com/office/drawing/2014/main" id="{FEFB2D3E-809E-46C9-91ED-2B386A1D33CD}"/>
+              </a:ext>
+            </a:extLst>
+          </p:cNvPr>
+          <p:cNvPicPr>
+            <a:picLocks noChangeAspect="1"/>
+          </p:cNvPicPr>
+          <p:nvPr/>
+        </p:nvPicPr>
+        <p:blipFill>
+          <a:blip r:embed="rId3"/>
+          <a:stretch>
+            <a:fillRect/>
+          </a:stretch>
+        </p:blipFill>
+        <p:spPr>
+          <a:xfrm>
+            <a:off x="448624" y="3981382"/>
+            <a:ext cx="6667500" cy="2581275"/>
+          </a:xfrm>
+          <a:prstGeom prst="rect">
+            <a:avLst/>
+          </a:prstGeom>
+        </p:spPr>
+      </p:pic>
+      <p:pic>
+        <p:nvPicPr>
+          <p:cNvPr id="11" name="Picture 10">
+            <a:extLst>
+              <a:ext uri="{FF2B5EF4-FFF2-40B4-BE49-F238E27FC236}">
+                <a16:creationId xmlns:a16="http://schemas.microsoft.com/office/drawing/2014/main" id="{1B0E5101-AEAD-46A2-957C-90C5D4BEAA02}"/>
+              </a:ext>
+            </a:extLst>
+          </p:cNvPr>
+          <p:cNvPicPr>
+            <a:picLocks noChangeAspect="1"/>
+          </p:cNvPicPr>
+          <p:nvPr/>
+        </p:nvPicPr>
+        <p:blipFill>
+          <a:blip r:embed="rId4"/>
+          <a:stretch>
+            <a:fillRect/>
+          </a:stretch>
+        </p:blipFill>
+        <p:spPr>
+          <a:xfrm>
+            <a:off x="454341" y="1557039"/>
+            <a:ext cx="5572125" cy="1771650"/>
+          </a:xfrm>
+          <a:prstGeom prst="rect">
+            <a:avLst/>
+          </a:prstGeom>
+        </p:spPr>
+      </p:pic>
+      <p:sp>
+        <p:nvSpPr>
+          <p:cNvPr id="12" name="TextBox 11">
+            <a:extLst>
+              <a:ext uri="{FF2B5EF4-FFF2-40B4-BE49-F238E27FC236}">
+                <a16:creationId xmlns:a16="http://schemas.microsoft.com/office/drawing/2014/main" id="{9924E527-9378-4361-8CAF-8015587F2EFA}"/>
+              </a:ext>
+            </a:extLst>
+          </p:cNvPr>
+          <p:cNvSpPr txBox="1"/>
+          <p:nvPr/>
+        </p:nvSpPr>
+        <p:spPr>
+          <a:xfrm>
+            <a:off x="7241860" y="3981382"/>
+            <a:ext cx="2609849" cy="646331"/>
+          </a:xfrm>
+          <a:prstGeom prst="rect">
+            <a:avLst/>
+          </a:prstGeom>
+          <a:noFill/>
+        </p:spPr>
+        <p:txBody>
+          <a:bodyPr wrap="square" rtlCol="0">
+            <a:spAutoFit/>
+          </a:bodyPr>
+          <a:lstStyle/>
+          <a:p>
+            <a:r>
+              <a:rPr lang="en-US" dirty="0"/>
+              <a:t>Logistic, a50/a95 parameterization</a:t>
+            </a:r>
+          </a:p>
+        </p:txBody>
+      </p:sp>
+    </p:spTree>
+    <p:extLst>
+      <p:ext uri="{BB962C8B-B14F-4D97-AF65-F5344CB8AC3E}">
+        <p14:creationId xmlns:p14="http://schemas.microsoft.com/office/powerpoint/2010/main" val="2422755107"/>
+      </p:ext>
+    </p:extLst>
+  </p:cSld>
+  <p:clrMapOvr>
+    <a:masterClrMapping/>
+  </p:clrMapOvr>
+</p:sld>
+</file>
+
+<file path=ppt/slides/slide11.xml><?xml version="1.0" encoding="utf-8"?>
+<p:sld xmlns:a="http://schemas.openxmlformats.org/drawingml/2006/main" xmlns:r="http://schemas.openxmlformats.org/officeDocument/2006/relationships" xmlns:p="http://schemas.openxmlformats.org/presentationml/2006/main">
+  <p:cSld>
+    <p:spTree>
+      <p:nvGrpSpPr>
+        <p:cNvPr id="1" name=""/>
+        <p:cNvGrpSpPr/>
+        <p:nvPr/>
+      </p:nvGrpSpPr>
+      <p:grpSpPr>
+        <a:xfrm>
+          <a:off x="0" y="0"/>
+          <a:ext cx="0" cy="0"/>
+          <a:chOff x="0" y="0"/>
+          <a:chExt cx="0" cy="0"/>
+        </a:xfrm>
+      </p:grpSpPr>
+      <p:sp>
+        <p:nvSpPr>
+          <p:cNvPr id="2" name="Title 1">
+            <a:extLst>
+              <a:ext uri="{FF2B5EF4-FFF2-40B4-BE49-F238E27FC236}">
+                <a16:creationId xmlns:a16="http://schemas.microsoft.com/office/drawing/2014/main" id="{A2DCAC96-E1FD-44FF-8A96-717F504C6320}"/>
+              </a:ext>
+            </a:extLst>
+          </p:cNvPr>
+          <p:cNvSpPr>
+            <a:spLocks noGrp="1"/>
+          </p:cNvSpPr>
+          <p:nvPr>
+            <p:ph type="title"/>
+          </p:nvPr>
+        </p:nvSpPr>
+        <p:spPr>
+          <a:xfrm>
+            <a:off x="454342" y="194330"/>
+            <a:ext cx="8675370" cy="795865"/>
+          </a:xfrm>
+        </p:spPr>
+        <p:txBody>
+          <a:bodyPr/>
+          <a:lstStyle/>
+          <a:p>
+            <a:r>
+              <a:rPr lang="en-US" dirty="0"/>
+              <a:t>Selectivity</a:t>
+            </a:r>
+          </a:p>
+        </p:txBody>
+      </p:sp>
+      <p:sp>
+        <p:nvSpPr>
+          <p:cNvPr id="3" name="Content Placeholder 2">
+            <a:extLst>
+              <a:ext uri="{FF2B5EF4-FFF2-40B4-BE49-F238E27FC236}">
+                <a16:creationId xmlns:a16="http://schemas.microsoft.com/office/drawing/2014/main" id="{BB5B9591-6BBC-4B0D-8085-50D5036BBADE}"/>
+              </a:ext>
+            </a:extLst>
+          </p:cNvPr>
+          <p:cNvSpPr>
+            <a:spLocks noGrp="1"/>
+          </p:cNvSpPr>
+          <p:nvPr>
+            <p:ph idx="1"/>
+          </p:nvPr>
+        </p:nvSpPr>
+        <p:spPr>
+          <a:xfrm>
+            <a:off x="454341" y="4419240"/>
+            <a:ext cx="4337685" cy="523875"/>
+          </a:xfrm>
+        </p:spPr>
+        <p:txBody>
+          <a:bodyPr/>
+          <a:lstStyle/>
+          <a:p>
+            <a:pPr marL="0" indent="0">
+              <a:buNone/>
+            </a:pPr>
+            <a:r>
+              <a:rPr lang="en-US" dirty="0"/>
+              <a:t>HER</a:t>
+            </a:r>
+          </a:p>
+        </p:txBody>
+      </p:sp>
+      <p:sp>
+        <p:nvSpPr>
+          <p:cNvPr id="4" name="Content Placeholder 2">
+            <a:extLst>
+              <a:ext uri="{FF2B5EF4-FFF2-40B4-BE49-F238E27FC236}">
+                <a16:creationId xmlns:a16="http://schemas.microsoft.com/office/drawing/2014/main" id="{7EC84657-5B91-4347-81F3-1B680908C4DF}"/>
+              </a:ext>
+            </a:extLst>
+          </p:cNvPr>
+          <p:cNvSpPr txBox="1">
+            <a:spLocks/>
+          </p:cNvSpPr>
+          <p:nvPr/>
+        </p:nvSpPr>
+        <p:spPr>
+          <a:xfrm>
+            <a:off x="454342" y="990195"/>
+            <a:ext cx="4337685" cy="523875"/>
+          </a:xfrm>
+          <a:prstGeom prst="rect">
+            <a:avLst/>
+          </a:prstGeom>
+        </p:spPr>
+        <p:txBody>
+          <a:bodyPr vert="horz" lIns="91440" tIns="45720" rIns="91440" bIns="45720" rtlCol="0">
+            <a:normAutofit/>
+          </a:bodyPr>
+          <a:lstStyle>
+            <a:lvl1pPr marL="251460" indent="-251460" algn="l" defTabSz="1005840" rtl="0" eaLnBrk="1" latinLnBrk="0" hangingPunct="1">
+              <a:lnSpc>
+                <a:spcPct val="90000"/>
+              </a:lnSpc>
+              <a:spcBef>
+                <a:spcPts val="1100"/>
+              </a:spcBef>
+              <a:buFont typeface="Arial" panose="020B0604020202020204" pitchFamily="34" charset="0"/>
+              <a:buChar char="•"/>
+              <a:defRPr sz="3080" kern="1200">
+                <a:solidFill>
+                  <a:schemeClr val="tx1"/>
+                </a:solidFill>
+                <a:latin typeface="+mn-lt"/>
+                <a:ea typeface="+mn-ea"/>
+                <a:cs typeface="+mn-cs"/>
+              </a:defRPr>
+            </a:lvl1pPr>
+            <a:lvl2pPr marL="754380" indent="-251460" algn="l" defTabSz="1005840" rtl="0" eaLnBrk="1" latinLnBrk="0" hangingPunct="1">
+              <a:lnSpc>
+                <a:spcPct val="90000"/>
+              </a:lnSpc>
+              <a:spcBef>
+                <a:spcPts val="550"/>
+              </a:spcBef>
+              <a:buFont typeface="Arial" panose="020B0604020202020204" pitchFamily="34" charset="0"/>
+              <a:buChar char="•"/>
+              <a:defRPr sz="2640" kern="1200">
+                <a:solidFill>
+                  <a:schemeClr val="tx1"/>
+                </a:solidFill>
+                <a:latin typeface="+mn-lt"/>
+                <a:ea typeface="+mn-ea"/>
+                <a:cs typeface="+mn-cs"/>
+              </a:defRPr>
+            </a:lvl2pPr>
+            <a:lvl3pPr marL="1257300" indent="-251460" algn="l" defTabSz="1005840" rtl="0" eaLnBrk="1" latinLnBrk="0" hangingPunct="1">
+              <a:lnSpc>
+                <a:spcPct val="90000"/>
+              </a:lnSpc>
+              <a:spcBef>
+                <a:spcPts val="550"/>
+              </a:spcBef>
+              <a:buFont typeface="Arial" panose="020B0604020202020204" pitchFamily="34" charset="0"/>
+              <a:buChar char="•"/>
+              <a:defRPr sz="2200" kern="1200">
+                <a:solidFill>
+                  <a:schemeClr val="tx1"/>
+                </a:solidFill>
+                <a:latin typeface="+mn-lt"/>
+                <a:ea typeface="+mn-ea"/>
+                <a:cs typeface="+mn-cs"/>
+              </a:defRPr>
+            </a:lvl3pPr>
+            <a:lvl4pPr marL="1760220" indent="-251460" algn="l" defTabSz="1005840" rtl="0" eaLnBrk="1" latinLnBrk="0" hangingPunct="1">
+              <a:lnSpc>
+                <a:spcPct val="90000"/>
+              </a:lnSpc>
+              <a:spcBef>
+                <a:spcPts val="550"/>
+              </a:spcBef>
+              <a:buFont typeface="Arial" panose="020B0604020202020204" pitchFamily="34" charset="0"/>
+              <a:buChar char="•"/>
+              <a:defRPr sz="1980" kern="1200">
+                <a:solidFill>
+                  <a:schemeClr val="tx1"/>
+                </a:solidFill>
+                <a:latin typeface="+mn-lt"/>
+                <a:ea typeface="+mn-ea"/>
+                <a:cs typeface="+mn-cs"/>
+              </a:defRPr>
+            </a:lvl4pPr>
+            <a:lvl5pPr marL="2263140" indent="-251460" algn="l" defTabSz="1005840" rtl="0" eaLnBrk="1" latinLnBrk="0" hangingPunct="1">
+              <a:lnSpc>
+                <a:spcPct val="90000"/>
+              </a:lnSpc>
+              <a:spcBef>
+                <a:spcPts val="550"/>
+              </a:spcBef>
+              <a:buFont typeface="Arial" panose="020B0604020202020204" pitchFamily="34" charset="0"/>
+              <a:buChar char="•"/>
+              <a:defRPr sz="1980" kern="1200">
+                <a:solidFill>
+                  <a:schemeClr val="tx1"/>
+                </a:solidFill>
+                <a:latin typeface="+mn-lt"/>
+                <a:ea typeface="+mn-ea"/>
+                <a:cs typeface="+mn-cs"/>
+              </a:defRPr>
+            </a:lvl5pPr>
+            <a:lvl6pPr marL="2766060" indent="-251460" algn="l" defTabSz="1005840" rtl="0" eaLnBrk="1" latinLnBrk="0" hangingPunct="1">
+              <a:lnSpc>
+                <a:spcPct val="90000"/>
+              </a:lnSpc>
+              <a:spcBef>
+                <a:spcPts val="550"/>
+              </a:spcBef>
+              <a:buFont typeface="Arial" panose="020B0604020202020204" pitchFamily="34" charset="0"/>
+              <a:buChar char="•"/>
+              <a:defRPr sz="1980" kern="1200">
+                <a:solidFill>
+                  <a:schemeClr val="tx1"/>
+                </a:solidFill>
+                <a:latin typeface="+mn-lt"/>
+                <a:ea typeface="+mn-ea"/>
+                <a:cs typeface="+mn-cs"/>
+              </a:defRPr>
+            </a:lvl6pPr>
+            <a:lvl7pPr marL="3268980" indent="-251460" algn="l" defTabSz="1005840" rtl="0" eaLnBrk="1" latinLnBrk="0" hangingPunct="1">
+              <a:lnSpc>
+                <a:spcPct val="90000"/>
+              </a:lnSpc>
+              <a:spcBef>
+                <a:spcPts val="550"/>
+              </a:spcBef>
+              <a:buFont typeface="Arial" panose="020B0604020202020204" pitchFamily="34" charset="0"/>
+              <a:buChar char="•"/>
+              <a:defRPr sz="1980" kern="1200">
+                <a:solidFill>
+                  <a:schemeClr val="tx1"/>
+                </a:solidFill>
+                <a:latin typeface="+mn-lt"/>
+                <a:ea typeface="+mn-ea"/>
+                <a:cs typeface="+mn-cs"/>
+              </a:defRPr>
+            </a:lvl7pPr>
+            <a:lvl8pPr marL="3771900" indent="-251460" algn="l" defTabSz="1005840" rtl="0" eaLnBrk="1" latinLnBrk="0" hangingPunct="1">
+              <a:lnSpc>
+                <a:spcPct val="90000"/>
+              </a:lnSpc>
+              <a:spcBef>
+                <a:spcPts val="550"/>
+              </a:spcBef>
+              <a:buFont typeface="Arial" panose="020B0604020202020204" pitchFamily="34" charset="0"/>
+              <a:buChar char="•"/>
+              <a:defRPr sz="1980" kern="1200">
+                <a:solidFill>
+                  <a:schemeClr val="tx1"/>
+                </a:solidFill>
+                <a:latin typeface="+mn-lt"/>
+                <a:ea typeface="+mn-ea"/>
+                <a:cs typeface="+mn-cs"/>
+              </a:defRPr>
+            </a:lvl8pPr>
+            <a:lvl9pPr marL="4274820" indent="-251460" algn="l" defTabSz="1005840" rtl="0" eaLnBrk="1" latinLnBrk="0" hangingPunct="1">
+              <a:lnSpc>
+                <a:spcPct val="90000"/>
+              </a:lnSpc>
+              <a:spcBef>
+                <a:spcPts val="550"/>
+              </a:spcBef>
+              <a:buFont typeface="Arial" panose="020B0604020202020204" pitchFamily="34" charset="0"/>
+              <a:buChar char="•"/>
+              <a:defRPr sz="1980" kern="1200">
+                <a:solidFill>
+                  <a:schemeClr val="tx1"/>
+                </a:solidFill>
+                <a:latin typeface="+mn-lt"/>
+                <a:ea typeface="+mn-ea"/>
+                <a:cs typeface="+mn-cs"/>
+              </a:defRPr>
+            </a:lvl9pPr>
+          </a:lstStyle>
+          <a:p>
+            <a:pPr marL="0" indent="0">
+              <a:buFont typeface="Arial" panose="020B0604020202020204" pitchFamily="34" charset="0"/>
+              <a:buNone/>
+            </a:pPr>
+            <a:r>
+              <a:rPr lang="en-US" dirty="0"/>
+              <a:t>LS</a:t>
+            </a:r>
+          </a:p>
+        </p:txBody>
+      </p:sp>
+      <p:sp>
+        <p:nvSpPr>
+          <p:cNvPr id="7" name="TextBox 6">
+            <a:extLst>
+              <a:ext uri="{FF2B5EF4-FFF2-40B4-BE49-F238E27FC236}">
+                <a16:creationId xmlns:a16="http://schemas.microsoft.com/office/drawing/2014/main" id="{251AE748-36B3-4087-B46E-6DAB79A5117A}"/>
+              </a:ext>
+            </a:extLst>
+          </p:cNvPr>
+          <p:cNvSpPr txBox="1"/>
+          <p:nvPr/>
+        </p:nvSpPr>
+        <p:spPr>
+          <a:xfrm>
+            <a:off x="5266375" y="1438827"/>
+            <a:ext cx="2609849" cy="1200329"/>
+          </a:xfrm>
+          <a:prstGeom prst="rect">
+            <a:avLst/>
+          </a:prstGeom>
+          <a:noFill/>
+        </p:spPr>
+        <p:txBody>
+          <a:bodyPr wrap="square" rtlCol="0">
+            <a:spAutoFit/>
+          </a:bodyPr>
+          <a:lstStyle/>
+          <a:p>
+            <a:r>
+              <a:rPr lang="en-US" dirty="0"/>
+              <a:t>Logistic, a50/slope parameterization. Scale to 1 by dividing by max (not differentiable)</a:t>
+            </a:r>
+          </a:p>
+        </p:txBody>
+      </p:sp>
+      <p:pic>
+        <p:nvPicPr>
+          <p:cNvPr id="10" name="Picture 9">
+            <a:extLst>
+              <a:ext uri="{FF2B5EF4-FFF2-40B4-BE49-F238E27FC236}">
+                <a16:creationId xmlns:a16="http://schemas.microsoft.com/office/drawing/2014/main" id="{16A67F07-95E7-4A1F-B717-E78DCB58CF95}"/>
+              </a:ext>
+            </a:extLst>
+          </p:cNvPr>
+          <p:cNvPicPr>
+            <a:picLocks noChangeAspect="1"/>
+          </p:cNvPicPr>
+          <p:nvPr/>
+        </p:nvPicPr>
+        <p:blipFill>
+          <a:blip r:embed="rId2"/>
+          <a:stretch>
+            <a:fillRect/>
+          </a:stretch>
+        </p:blipFill>
+        <p:spPr>
+          <a:xfrm>
+            <a:off x="454342" y="1444034"/>
+            <a:ext cx="4574858" cy="2783305"/>
+          </a:xfrm>
+          <a:prstGeom prst="rect">
+            <a:avLst/>
+          </a:prstGeom>
+        </p:spPr>
+      </p:pic>
+      <p:pic>
+        <p:nvPicPr>
+          <p:cNvPr id="12" name="Picture 11">
+            <a:extLst>
+              <a:ext uri="{FF2B5EF4-FFF2-40B4-BE49-F238E27FC236}">
+                <a16:creationId xmlns:a16="http://schemas.microsoft.com/office/drawing/2014/main" id="{A2376DB9-5582-47F3-AA77-54C1BF54982C}"/>
+              </a:ext>
+            </a:extLst>
+          </p:cNvPr>
+          <p:cNvPicPr>
+            <a:picLocks noChangeAspect="1"/>
+          </p:cNvPicPr>
+          <p:nvPr/>
+        </p:nvPicPr>
+        <p:blipFill>
+          <a:blip r:embed="rId3"/>
+          <a:stretch>
+            <a:fillRect/>
+          </a:stretch>
+        </p:blipFill>
+        <p:spPr>
+          <a:xfrm>
+            <a:off x="454342" y="4867872"/>
+            <a:ext cx="4812035" cy="1510239"/>
+          </a:xfrm>
+          <a:prstGeom prst="rect">
+            <a:avLst/>
+          </a:prstGeom>
+        </p:spPr>
+      </p:pic>
+      <p:pic>
+        <p:nvPicPr>
+          <p:cNvPr id="13" name="Picture 12">
+            <a:extLst>
+              <a:ext uri="{FF2B5EF4-FFF2-40B4-BE49-F238E27FC236}">
+                <a16:creationId xmlns:a16="http://schemas.microsoft.com/office/drawing/2014/main" id="{CFE50F56-8B7B-4C60-B13F-3C235793E2DD}"/>
+              </a:ext>
+            </a:extLst>
+          </p:cNvPr>
+          <p:cNvPicPr>
+            <a:picLocks noChangeAspect="1"/>
+          </p:cNvPicPr>
+          <p:nvPr/>
+        </p:nvPicPr>
+        <p:blipFill>
+          <a:blip r:embed="rId4"/>
+          <a:stretch>
+            <a:fillRect/>
+          </a:stretch>
+        </p:blipFill>
+        <p:spPr>
+          <a:xfrm>
+            <a:off x="454341" y="6513005"/>
+            <a:ext cx="4574858" cy="845518"/>
+          </a:xfrm>
+          <a:prstGeom prst="rect">
+            <a:avLst/>
+          </a:prstGeom>
+        </p:spPr>
+      </p:pic>
+      <p:sp>
+        <p:nvSpPr>
+          <p:cNvPr id="14" name="TextBox 13">
+            <a:extLst>
+              <a:ext uri="{FF2B5EF4-FFF2-40B4-BE49-F238E27FC236}">
+                <a16:creationId xmlns:a16="http://schemas.microsoft.com/office/drawing/2014/main" id="{303F9EF6-35EB-4524-85A2-7E0729B26AD2}"/>
+              </a:ext>
+            </a:extLst>
+          </p:cNvPr>
+          <p:cNvSpPr txBox="1"/>
+          <p:nvPr/>
+        </p:nvSpPr>
+        <p:spPr>
+          <a:xfrm>
+            <a:off x="5553074" y="4867872"/>
+            <a:ext cx="2609849" cy="2308324"/>
+          </a:xfrm>
+          <a:prstGeom prst="rect">
+            <a:avLst/>
+          </a:prstGeom>
+          <a:noFill/>
+        </p:spPr>
+        <p:txBody>
+          <a:bodyPr wrap="square" rtlCol="0">
+            <a:spAutoFit/>
+          </a:bodyPr>
+          <a:lstStyle/>
+          <a:p>
+            <a:r>
+              <a:rPr lang="en-US" dirty="0"/>
+              <a:t>Logistic, a50/slope parameterization. Scale by taking difference of log selectivity and log mean selectivity (differentiable). Estimate in log space to keep values positive.</a:t>
+            </a:r>
+          </a:p>
+        </p:txBody>
+      </p:sp>
+    </p:spTree>
+    <p:extLst>
+      <p:ext uri="{BB962C8B-B14F-4D97-AF65-F5344CB8AC3E}">
+        <p14:creationId xmlns:p14="http://schemas.microsoft.com/office/powerpoint/2010/main" val="52294102"/>
       </p:ext>
     </p:extLst>
   </p:cSld>
@@ -3091,7 +4032,7 @@
           <a:p>
             <a:r>
               <a:rPr lang="en-US" dirty="0"/>
-              <a:t>Natural mortality/survival</a:t>
+              <a:t>Initializing N matrix</a:t>
             </a:r>
           </a:p>
         </p:txBody>
@@ -3335,12 +4276,82 @@
           </a:p>
         </p:txBody>
       </p:sp>
+      <p:sp>
+        <p:nvSpPr>
+          <p:cNvPr id="7" name="TextBox 6">
+            <a:extLst>
+              <a:ext uri="{FF2B5EF4-FFF2-40B4-BE49-F238E27FC236}">
+                <a16:creationId xmlns:a16="http://schemas.microsoft.com/office/drawing/2014/main" id="{251AE748-36B3-4087-B46E-6DAB79A5117A}"/>
+              </a:ext>
+            </a:extLst>
+          </p:cNvPr>
+          <p:cNvSpPr txBox="1"/>
+          <p:nvPr/>
+        </p:nvSpPr>
+        <p:spPr>
+          <a:xfrm>
+            <a:off x="6236970" y="1392761"/>
+            <a:ext cx="2339342" cy="1754326"/>
+          </a:xfrm>
+          <a:prstGeom prst="rect">
+            <a:avLst/>
+          </a:prstGeom>
+          <a:noFill/>
+        </p:spPr>
+        <p:txBody>
+          <a:bodyPr wrap="square" rtlCol="0">
+            <a:spAutoFit/>
+          </a:bodyPr>
+          <a:lstStyle/>
+          <a:p>
+            <a:r>
+              <a:rPr lang="en-US" dirty="0"/>
+              <a:t>One parameter for each age 4-8+ in initial year and one for parameter for age-3 in each year, Estimated on natural scale.</a:t>
+            </a:r>
+          </a:p>
+        </p:txBody>
+      </p:sp>
+      <p:sp>
+        <p:nvSpPr>
+          <p:cNvPr id="8" name="TextBox 7">
+            <a:extLst>
+              <a:ext uri="{FF2B5EF4-FFF2-40B4-BE49-F238E27FC236}">
+                <a16:creationId xmlns:a16="http://schemas.microsoft.com/office/drawing/2014/main" id="{25CA6CB8-B61E-4F39-B9A1-93B57448F711}"/>
+              </a:ext>
+            </a:extLst>
+          </p:cNvPr>
+          <p:cNvSpPr txBox="1"/>
+          <p:nvPr/>
+        </p:nvSpPr>
+        <p:spPr>
+          <a:xfrm>
+            <a:off x="454343" y="4561353"/>
+            <a:ext cx="5782628" cy="646331"/>
+          </a:xfrm>
+          <a:prstGeom prst="rect">
+            <a:avLst/>
+          </a:prstGeom>
+          <a:noFill/>
+        </p:spPr>
+        <p:txBody>
+          <a:bodyPr wrap="square" rtlCol="0">
+            <a:spAutoFit/>
+          </a:bodyPr>
+          <a:lstStyle/>
+          <a:p>
+            <a:r>
+              <a:rPr lang="en-US" dirty="0"/>
+              <a:t>One mean initial numbers at age and recruitment parameter plus deviations. Estimated on log-scale.</a:t>
+            </a:r>
+          </a:p>
+        </p:txBody>
+      </p:sp>
       <p:pic>
         <p:nvPicPr>
-          <p:cNvPr id="5" name="Picture 4">
+          <p:cNvPr id="10" name="Picture 9">
             <a:extLst>
               <a:ext uri="{FF2B5EF4-FFF2-40B4-BE49-F238E27FC236}">
-                <a16:creationId xmlns:a16="http://schemas.microsoft.com/office/drawing/2014/main" id="{E9777265-3084-408B-9FBD-025984825E3A}"/>
+                <a16:creationId xmlns:a16="http://schemas.microsoft.com/office/drawing/2014/main" id="{66B4BBFC-3BB9-4775-8CFF-D7D22B0EC81A}"/>
               </a:ext>
             </a:extLst>
           </p:cNvPr>
@@ -3357,8 +4368,8 @@
         </p:blipFill>
         <p:spPr>
           <a:xfrm>
-            <a:off x="454342" y="1866899"/>
-            <a:ext cx="4572000" cy="2257425"/>
+            <a:off x="454342" y="1821479"/>
+            <a:ext cx="5457825" cy="1866900"/>
           </a:xfrm>
           <a:prstGeom prst="rect">
             <a:avLst/>
@@ -3367,10 +4378,10 @@
       </p:pic>
       <p:pic>
         <p:nvPicPr>
-          <p:cNvPr id="6" name="Picture 5">
+          <p:cNvPr id="11" name="Picture 10">
             <a:extLst>
               <a:ext uri="{FF2B5EF4-FFF2-40B4-BE49-F238E27FC236}">
-                <a16:creationId xmlns:a16="http://schemas.microsoft.com/office/drawing/2014/main" id="{BA21ADE4-5D06-4095-8B9C-8947985EB5DD}"/>
+                <a16:creationId xmlns:a16="http://schemas.microsoft.com/office/drawing/2014/main" id="{3659720A-29FA-4F68-ADD2-7E28D275B662}"/>
               </a:ext>
             </a:extLst>
           </p:cNvPr>
@@ -3387,108 +4398,8 @@
         </p:blipFill>
         <p:spPr>
           <a:xfrm>
-            <a:off x="454342" y="4585274"/>
-            <a:ext cx="6743700" cy="2066925"/>
-          </a:xfrm>
-          <a:prstGeom prst="rect">
-            <a:avLst/>
-          </a:prstGeom>
-        </p:spPr>
-      </p:pic>
-      <p:sp>
-        <p:nvSpPr>
-          <p:cNvPr id="7" name="TextBox 6">
-            <a:extLst>
-              <a:ext uri="{FF2B5EF4-FFF2-40B4-BE49-F238E27FC236}">
-                <a16:creationId xmlns:a16="http://schemas.microsoft.com/office/drawing/2014/main" id="{251AE748-36B3-4087-B46E-6DAB79A5117A}"/>
-              </a:ext>
-            </a:extLst>
-          </p:cNvPr>
-          <p:cNvSpPr txBox="1"/>
-          <p:nvPr/>
-        </p:nvSpPr>
-        <p:spPr>
-          <a:xfrm>
-            <a:off x="5266375" y="1981199"/>
-            <a:ext cx="2609849" cy="646331"/>
-          </a:xfrm>
-          <a:prstGeom prst="rect">
-            <a:avLst/>
-          </a:prstGeom>
-          <a:noFill/>
-        </p:spPr>
-        <p:txBody>
-          <a:bodyPr wrap="square" rtlCol="0">
-            <a:spAutoFit/>
-          </a:bodyPr>
-          <a:lstStyle/>
-          <a:p>
-            <a:r>
-              <a:rPr lang="en-US" dirty="0"/>
-              <a:t>Separate/independent M estimated for each block</a:t>
-            </a:r>
-          </a:p>
-        </p:txBody>
-      </p:sp>
-      <p:sp>
-        <p:nvSpPr>
-          <p:cNvPr id="8" name="TextBox 7">
-            <a:extLst>
-              <a:ext uri="{FF2B5EF4-FFF2-40B4-BE49-F238E27FC236}">
-                <a16:creationId xmlns:a16="http://schemas.microsoft.com/office/drawing/2014/main" id="{25CA6CB8-B61E-4F39-B9A1-93B57448F711}"/>
-              </a:ext>
-            </a:extLst>
-          </p:cNvPr>
-          <p:cNvSpPr txBox="1"/>
-          <p:nvPr/>
-        </p:nvSpPr>
-        <p:spPr>
-          <a:xfrm>
-            <a:off x="7406642" y="5253037"/>
-            <a:ext cx="2339341" cy="1754326"/>
-          </a:xfrm>
-          <a:prstGeom prst="rect">
-            <a:avLst/>
-          </a:prstGeom>
-          <a:noFill/>
-        </p:spPr>
-        <p:txBody>
-          <a:bodyPr wrap="square" rtlCol="0">
-            <a:spAutoFit/>
-          </a:bodyPr>
-          <a:lstStyle/>
-          <a:p>
-            <a:r>
-              <a:rPr lang="en-US" dirty="0"/>
-              <a:t>Mean M with deviations for each time block. Deviations are assumed lognormally distributed</a:t>
-            </a:r>
-          </a:p>
-        </p:txBody>
-      </p:sp>
-      <p:pic>
-        <p:nvPicPr>
-          <p:cNvPr id="9" name="Picture 8">
-            <a:extLst>
-              <a:ext uri="{FF2B5EF4-FFF2-40B4-BE49-F238E27FC236}">
-                <a16:creationId xmlns:a16="http://schemas.microsoft.com/office/drawing/2014/main" id="{DF40C3C3-40CF-4BE2-AB16-1B981B0001E6}"/>
-              </a:ext>
-            </a:extLst>
-          </p:cNvPr>
-          <p:cNvPicPr>
-            <a:picLocks noChangeAspect="1"/>
-          </p:cNvPicPr>
-          <p:nvPr/>
-        </p:nvPicPr>
-        <p:blipFill>
-          <a:blip r:embed="rId4"/>
-          <a:stretch>
-            <a:fillRect/>
-          </a:stretch>
-        </p:blipFill>
-        <p:spPr>
-          <a:xfrm>
-            <a:off x="454342" y="6736911"/>
-            <a:ext cx="6505575" cy="752475"/>
+            <a:off x="454342" y="5273347"/>
+            <a:ext cx="9331915" cy="1788346"/>
           </a:xfrm>
           <a:prstGeom prst="rect">
             <a:avLst/>
@@ -3553,43 +4464,7 @@
           <a:p>
             <a:r>
               <a:rPr lang="en-US" dirty="0"/>
-              <a:t>Maturity</a:t>
-            </a:r>
-          </a:p>
-        </p:txBody>
-      </p:sp>
-      <p:sp>
-        <p:nvSpPr>
-          <p:cNvPr id="3" name="Content Placeholder 2">
-            <a:extLst>
-              <a:ext uri="{FF2B5EF4-FFF2-40B4-BE49-F238E27FC236}">
-                <a16:creationId xmlns:a16="http://schemas.microsoft.com/office/drawing/2014/main" id="{BB5B9591-6BBC-4B0D-8085-50D5036BBADE}"/>
-              </a:ext>
-            </a:extLst>
-          </p:cNvPr>
-          <p:cNvSpPr>
-            <a:spLocks noGrp="1"/>
-          </p:cNvSpPr>
-          <p:nvPr>
-            <p:ph idx="1"/>
-          </p:nvPr>
-        </p:nvSpPr>
-        <p:spPr>
-          <a:xfrm>
-            <a:off x="454341" y="3468885"/>
-            <a:ext cx="4337685" cy="523875"/>
-          </a:xfrm>
-        </p:spPr>
-        <p:txBody>
-          <a:bodyPr/>
-          <a:lstStyle/>
-          <a:p>
-            <a:pPr marL="0" indent="0">
-              <a:buNone/>
-            </a:pPr>
-            <a:r>
-              <a:rPr lang="en-US" dirty="0"/>
-              <a:t>HER</a:t>
+              <a:t>Catch in numbers-at-age </a:t>
             </a:r>
           </a:p>
         </p:txBody>
@@ -3610,7 +4485,7 @@
         </p:nvSpPr>
         <p:spPr>
           <a:xfrm>
-            <a:off x="454341" y="1044176"/>
+            <a:off x="454342" y="1343024"/>
             <a:ext cx="4337685" cy="523875"/>
           </a:xfrm>
           <a:prstGeom prst="rect">
@@ -3792,52 +4667,17 @@
             </a:pPr>
             <a:r>
               <a:rPr lang="en-US" dirty="0"/>
-              <a:t>LS</a:t>
-            </a:r>
-          </a:p>
-        </p:txBody>
-      </p:sp>
-      <p:sp>
-        <p:nvSpPr>
-          <p:cNvPr id="7" name="TextBox 6">
+              <a:t>LS (conditioned on catch)</a:t>
+            </a:r>
+          </a:p>
+        </p:txBody>
+      </p:sp>
+      <p:pic>
+        <p:nvPicPr>
+          <p:cNvPr id="5" name="Picture 4">
             <a:extLst>
               <a:ext uri="{FF2B5EF4-FFF2-40B4-BE49-F238E27FC236}">
-                <a16:creationId xmlns:a16="http://schemas.microsoft.com/office/drawing/2014/main" id="{72605019-96D8-4F7B-A59A-AAD9E9523421}"/>
-              </a:ext>
-            </a:extLst>
-          </p:cNvPr>
-          <p:cNvSpPr txBox="1"/>
-          <p:nvPr/>
-        </p:nvSpPr>
-        <p:spPr>
-          <a:xfrm>
-            <a:off x="6236016" y="1568051"/>
-            <a:ext cx="2609849" cy="646331"/>
-          </a:xfrm>
-          <a:prstGeom prst="rect">
-            <a:avLst/>
-          </a:prstGeom>
-          <a:noFill/>
-        </p:spPr>
-        <p:txBody>
-          <a:bodyPr wrap="square" rtlCol="0">
-            <a:spAutoFit/>
-          </a:bodyPr>
-          <a:lstStyle/>
-          <a:p>
-            <a:r>
-              <a:rPr lang="en-US" dirty="0"/>
-              <a:t>Logistic, a50/slope parameterization</a:t>
-            </a:r>
-          </a:p>
-        </p:txBody>
-      </p:sp>
-      <p:pic>
-        <p:nvPicPr>
-          <p:cNvPr id="9" name="Picture 8">
-            <a:extLst>
-              <a:ext uri="{FF2B5EF4-FFF2-40B4-BE49-F238E27FC236}">
-                <a16:creationId xmlns:a16="http://schemas.microsoft.com/office/drawing/2014/main" id="{E5320891-1029-48BD-B517-EB0AB1BA01C7}"/>
+                <a16:creationId xmlns:a16="http://schemas.microsoft.com/office/drawing/2014/main" id="{6B6AA4EB-EBAC-479A-93E2-DADA1564ECA9}"/>
               </a:ext>
             </a:extLst>
           </p:cNvPr>
@@ -3854,80 +4694,1052 @@
         </p:blipFill>
         <p:spPr>
           <a:xfrm>
-            <a:off x="448624" y="6689460"/>
-            <a:ext cx="5429250" cy="723900"/>
+            <a:off x="454343" y="1893079"/>
+            <a:ext cx="5010792" cy="4164744"/>
           </a:xfrm>
           <a:prstGeom prst="rect">
             <a:avLst/>
           </a:prstGeom>
         </p:spPr>
       </p:pic>
-      <p:pic>
-        <p:nvPicPr>
-          <p:cNvPr id="10" name="Picture 9">
+      <mc:AlternateContent xmlns:mc="http://schemas.openxmlformats.org/markup-compatibility/2006">
+        <mc:Choice xmlns:a14="http://schemas.microsoft.com/office/drawing/2010/main" Requires="a14">
+          <p:sp>
+            <p:nvSpPr>
+              <p:cNvPr id="13" name="TextBox 12">
+                <a:extLst>
+                  <a:ext uri="{FF2B5EF4-FFF2-40B4-BE49-F238E27FC236}">
+                    <a16:creationId xmlns:a16="http://schemas.microsoft.com/office/drawing/2014/main" id="{931A78A2-D9EE-4FC1-909D-B9BDD1B0BDD0}"/>
+                  </a:ext>
+                </a:extLst>
+              </p:cNvPr>
+              <p:cNvSpPr txBox="1"/>
+              <p:nvPr/>
+            </p:nvSpPr>
+            <p:spPr>
+              <a:xfrm>
+                <a:off x="5699051" y="1343024"/>
+                <a:ext cx="4120001" cy="5415521"/>
+              </a:xfrm>
+              <a:prstGeom prst="rect">
+                <a:avLst/>
+              </a:prstGeom>
+              <a:noFill/>
+            </p:spPr>
+            <p:txBody>
+              <a:bodyPr wrap="square" rtlCol="0">
+                <a:spAutoFit/>
+              </a:bodyPr>
+              <a:lstStyle/>
+              <a:p>
+                <a:r>
+                  <a:rPr lang="en-US" sz="1600" dirty="0"/>
+                  <a:t>Eqn in </a:t>
+                </a:r>
+                <a:r>
+                  <a:rPr lang="en-US" sz="1600" dirty="0" err="1"/>
+                  <a:t>Hulson</a:t>
+                </a:r>
+                <a:r>
+                  <a:rPr lang="en-US" sz="1600" dirty="0"/>
+                  <a:t> et al.</a:t>
+                </a:r>
+              </a:p>
+              <a:p>
+                <a:endParaRPr lang="en-US" sz="1600" dirty="0"/>
+              </a:p>
+              <a:p>
+                <a14:m>
+                  <m:oMathPara xmlns:m="http://schemas.openxmlformats.org/officeDocument/2006/math">
+                    <m:oMathParaPr>
+                      <m:jc m:val="centerGroup"/>
+                    </m:oMathParaPr>
+                    <m:oMath xmlns:m="http://schemas.openxmlformats.org/officeDocument/2006/math">
+                      <m:sSub>
+                        <m:sSubPr>
+                          <m:ctrlPr>
+                            <a:rPr lang="en-US" sz="1600" i="1">
+                              <a:latin typeface="Cambria Math" panose="02040503050406030204" pitchFamily="18" charset="0"/>
+                            </a:rPr>
+                          </m:ctrlPr>
+                        </m:sSubPr>
+                        <m:e>
+                          <m:r>
+                            <a:rPr lang="en-US" sz="1600" i="1">
+                              <a:latin typeface="Cambria Math" panose="02040503050406030204" pitchFamily="18" charset="0"/>
+                            </a:rPr>
+                            <m:t>𝐶</m:t>
+                          </m:r>
+                        </m:e>
+                        <m:sub>
+                          <m:r>
+                            <a:rPr lang="en-US" sz="1600" i="1">
+                              <a:latin typeface="Cambria Math" panose="02040503050406030204" pitchFamily="18" charset="0"/>
+                            </a:rPr>
+                            <m:t>𝑖𝑗</m:t>
+                          </m:r>
+                        </m:sub>
+                      </m:sSub>
+                      <m:r>
+                        <a:rPr lang="en-US" sz="1600" i="1">
+                          <a:latin typeface="Cambria Math" panose="02040503050406030204" pitchFamily="18" charset="0"/>
+                        </a:rPr>
+                        <m:t>=</m:t>
+                      </m:r>
+                      <m:f>
+                        <m:fPr>
+                          <m:ctrlPr>
+                            <a:rPr lang="en-US" sz="1600" i="1" smtClean="0">
+                              <a:latin typeface="Cambria Math" panose="02040503050406030204" pitchFamily="18" charset="0"/>
+                            </a:rPr>
+                          </m:ctrlPr>
+                        </m:fPr>
+                        <m:num>
+                          <m:f>
+                            <m:fPr>
+                              <m:ctrlPr>
+                                <a:rPr lang="en-US" sz="1600" i="1">
+                                  <a:latin typeface="Cambria Math" panose="02040503050406030204" pitchFamily="18" charset="0"/>
+                                </a:rPr>
+                              </m:ctrlPr>
+                            </m:fPr>
+                            <m:num>
+                              <m:sSub>
+                                <m:sSubPr>
+                                  <m:ctrlPr>
+                                    <a:rPr lang="en-US" sz="1600" i="1">
+                                      <a:latin typeface="Cambria Math" panose="02040503050406030204" pitchFamily="18" charset="0"/>
+                                    </a:rPr>
+                                  </m:ctrlPr>
+                                </m:sSubPr>
+                                <m:e>
+                                  <m:r>
+                                    <a:rPr lang="en-US" sz="1600" i="1">
+                                      <a:latin typeface="Cambria Math" panose="02040503050406030204" pitchFamily="18" charset="0"/>
+                                    </a:rPr>
+                                    <m:t>𝑁</m:t>
+                                  </m:r>
+                                </m:e>
+                                <m:sub>
+                                  <m:r>
+                                    <a:rPr lang="en-US" sz="1600" i="1">
+                                      <a:latin typeface="Cambria Math" panose="02040503050406030204" pitchFamily="18" charset="0"/>
+                                    </a:rPr>
+                                    <m:t>𝑖𝑗</m:t>
+                                  </m:r>
+                                </m:sub>
+                              </m:sSub>
+                              <m:sSub>
+                                <m:sSubPr>
+                                  <m:ctrlPr>
+                                    <a:rPr lang="en-US" sz="1600" i="1">
+                                      <a:latin typeface="Cambria Math" panose="02040503050406030204" pitchFamily="18" charset="0"/>
+                                    </a:rPr>
+                                  </m:ctrlPr>
+                                </m:sSubPr>
+                                <m:e>
+                                  <m:r>
+                                    <a:rPr lang="en-US" sz="1600" i="1">
+                                      <a:latin typeface="Cambria Math" panose="02040503050406030204" pitchFamily="18" charset="0"/>
+                                    </a:rPr>
+                                    <m:t>𝑠</m:t>
+                                  </m:r>
+                                </m:e>
+                                <m:sub>
+                                  <m:r>
+                                    <a:rPr lang="en-US" sz="1600" i="1">
+                                      <a:latin typeface="Cambria Math" panose="02040503050406030204" pitchFamily="18" charset="0"/>
+                                    </a:rPr>
+                                    <m:t>𝑖𝑗</m:t>
+                                  </m:r>
+                                </m:sub>
+                              </m:sSub>
+                            </m:num>
+                            <m:den>
+                              <m:nary>
+                                <m:naryPr>
+                                  <m:chr m:val="∑"/>
+                                  <m:ctrlPr>
+                                    <a:rPr lang="en-US" sz="1600" i="1">
+                                      <a:latin typeface="Cambria Math" panose="02040503050406030204" pitchFamily="18" charset="0"/>
+                                    </a:rPr>
+                                  </m:ctrlPr>
+                                </m:naryPr>
+                                <m:sub>
+                                  <m:r>
+                                    <m:rPr>
+                                      <m:brk m:alnAt="23"/>
+                                    </m:rPr>
+                                    <a:rPr lang="en-US" sz="1600" i="1">
+                                      <a:latin typeface="Cambria Math" panose="02040503050406030204" pitchFamily="18" charset="0"/>
+                                    </a:rPr>
+                                    <m:t>𝑗</m:t>
+                                  </m:r>
+                                  <m:r>
+                                    <a:rPr lang="en-US" sz="1600" i="1">
+                                      <a:latin typeface="Cambria Math" panose="02040503050406030204" pitchFamily="18" charset="0"/>
+                                    </a:rPr>
+                                    <m:t>=3</m:t>
+                                  </m:r>
+                                </m:sub>
+                                <m:sup>
+                                  <m:r>
+                                    <a:rPr lang="en-US" sz="1600" i="1">
+                                      <a:latin typeface="Cambria Math" panose="02040503050406030204" pitchFamily="18" charset="0"/>
+                                    </a:rPr>
+                                    <m:t>8+</m:t>
+                                  </m:r>
+                                </m:sup>
+                                <m:e>
+                                  <m:sSub>
+                                    <m:sSubPr>
+                                      <m:ctrlPr>
+                                        <a:rPr lang="en-US" sz="1600" i="1">
+                                          <a:latin typeface="Cambria Math" panose="02040503050406030204" pitchFamily="18" charset="0"/>
+                                        </a:rPr>
+                                      </m:ctrlPr>
+                                    </m:sSubPr>
+                                    <m:e>
+                                      <m:r>
+                                        <a:rPr lang="en-US" sz="1600" i="1">
+                                          <a:latin typeface="Cambria Math" panose="02040503050406030204" pitchFamily="18" charset="0"/>
+                                        </a:rPr>
+                                        <m:t>𝑁</m:t>
+                                      </m:r>
+                                    </m:e>
+                                    <m:sub>
+                                      <m:r>
+                                        <a:rPr lang="en-US" sz="1600" i="1">
+                                          <a:latin typeface="Cambria Math" panose="02040503050406030204" pitchFamily="18" charset="0"/>
+                                        </a:rPr>
+                                        <m:t>𝑖𝑗</m:t>
+                                      </m:r>
+                                    </m:sub>
+                                  </m:sSub>
+                                  <m:sSub>
+                                    <m:sSubPr>
+                                      <m:ctrlPr>
+                                        <a:rPr lang="en-US" sz="1600" i="1">
+                                          <a:latin typeface="Cambria Math" panose="02040503050406030204" pitchFamily="18" charset="0"/>
+                                        </a:rPr>
+                                      </m:ctrlPr>
+                                    </m:sSubPr>
+                                    <m:e>
+                                      <m:r>
+                                        <a:rPr lang="en-US" sz="1600" i="1">
+                                          <a:latin typeface="Cambria Math" panose="02040503050406030204" pitchFamily="18" charset="0"/>
+                                        </a:rPr>
+                                        <m:t>𝑠</m:t>
+                                      </m:r>
+                                    </m:e>
+                                    <m:sub>
+                                      <m:r>
+                                        <a:rPr lang="en-US" sz="1600" i="1">
+                                          <a:latin typeface="Cambria Math" panose="02040503050406030204" pitchFamily="18" charset="0"/>
+                                        </a:rPr>
+                                        <m:t>𝑖𝑗</m:t>
+                                      </m:r>
+                                    </m:sub>
+                                  </m:sSub>
+                                </m:e>
+                              </m:nary>
+                            </m:den>
+                          </m:f>
+                          <m:sSub>
+                            <m:sSubPr>
+                              <m:ctrlPr>
+                                <a:rPr lang="en-US" sz="1600" i="1">
+                                  <a:latin typeface="Cambria Math" panose="02040503050406030204" pitchFamily="18" charset="0"/>
+                                </a:rPr>
+                              </m:ctrlPr>
+                            </m:sSubPr>
+                            <m:e>
+                              <m:r>
+                                <a:rPr lang="en-US" sz="1600" i="1">
+                                  <a:latin typeface="Cambria Math" panose="02040503050406030204" pitchFamily="18" charset="0"/>
+                                </a:rPr>
+                                <m:t>𝑌</m:t>
+                              </m:r>
+                            </m:e>
+                            <m:sub>
+                              <m:r>
+                                <a:rPr lang="en-US" sz="1600" i="1">
+                                  <a:latin typeface="Cambria Math" panose="02040503050406030204" pitchFamily="18" charset="0"/>
+                                </a:rPr>
+                                <m:t>𝑖</m:t>
+                              </m:r>
+                            </m:sub>
+                          </m:sSub>
+                        </m:num>
+                        <m:den>
+                          <m:sSubSup>
+                            <m:sSubSupPr>
+                              <m:ctrlPr>
+                                <a:rPr lang="en-US" sz="1600" i="1">
+                                  <a:latin typeface="Cambria Math" panose="02040503050406030204" pitchFamily="18" charset="0"/>
+                                </a:rPr>
+                              </m:ctrlPr>
+                            </m:sSubSupPr>
+                            <m:e>
+                              <m:r>
+                                <a:rPr lang="en-US" sz="1600" i="1">
+                                  <a:latin typeface="Cambria Math" panose="02040503050406030204" pitchFamily="18" charset="0"/>
+                                </a:rPr>
+                                <m:t>𝑤</m:t>
+                              </m:r>
+                            </m:e>
+                            <m:sub>
+                              <m:r>
+                                <a:rPr lang="en-US" sz="1600" i="1">
+                                  <a:latin typeface="Cambria Math" panose="02040503050406030204" pitchFamily="18" charset="0"/>
+                                </a:rPr>
+                                <m:t>𝑖𝑗</m:t>
+                              </m:r>
+                            </m:sub>
+                            <m:sup>
+                              <m:r>
+                                <a:rPr lang="en-US" sz="1600" i="1">
+                                  <a:latin typeface="Cambria Math" panose="02040503050406030204" pitchFamily="18" charset="0"/>
+                                </a:rPr>
+                                <m:t>𝑓𝑠h</m:t>
+                              </m:r>
+                            </m:sup>
+                          </m:sSubSup>
+                        </m:den>
+                      </m:f>
+                    </m:oMath>
+                  </m:oMathPara>
+                </a14:m>
+                <a:endParaRPr lang="en-US" sz="1600" dirty="0"/>
+              </a:p>
+              <a:p>
+                <a:endParaRPr lang="en-US" sz="1600" dirty="0"/>
+              </a:p>
+              <a:p>
+                <a:r>
+                  <a:rPr lang="en-US" sz="1600" dirty="0"/>
+                  <a:t>Eqn in code:</a:t>
+                </a:r>
+              </a:p>
+              <a:p>
+                <a:endParaRPr lang="en-US" sz="1600" dirty="0">
+                  <a:latin typeface="Cambria Math" panose="02040503050406030204" pitchFamily="18" charset="0"/>
+                </a:endParaRPr>
+              </a:p>
+              <a:p>
+                <a:pPr/>
+                <a14:m>
+                  <m:oMathPara xmlns:m="http://schemas.openxmlformats.org/officeDocument/2006/math">
+                    <m:oMathParaPr>
+                      <m:jc m:val="centerGroup"/>
+                    </m:oMathParaPr>
+                    <m:oMath xmlns:m="http://schemas.openxmlformats.org/officeDocument/2006/math">
+                      <m:sSub>
+                        <m:sSubPr>
+                          <m:ctrlPr>
+                            <a:rPr lang="en-US" sz="1600" i="1">
+                              <a:latin typeface="Cambria Math" panose="02040503050406030204" pitchFamily="18" charset="0"/>
+                            </a:rPr>
+                          </m:ctrlPr>
+                        </m:sSubPr>
+                        <m:e>
+                          <m:r>
+                            <a:rPr lang="en-US" sz="1600" i="1">
+                              <a:latin typeface="Cambria Math" panose="02040503050406030204" pitchFamily="18" charset="0"/>
+                            </a:rPr>
+                            <m:t>𝐶</m:t>
+                          </m:r>
+                        </m:e>
+                        <m:sub>
+                          <m:r>
+                            <a:rPr lang="en-US" sz="1600" i="1">
+                              <a:latin typeface="Cambria Math" panose="02040503050406030204" pitchFamily="18" charset="0"/>
+                            </a:rPr>
+                            <m:t>𝑖𝑗</m:t>
+                          </m:r>
+                        </m:sub>
+                      </m:sSub>
+                      <m:r>
+                        <a:rPr lang="en-US" sz="1600" i="1">
+                          <a:latin typeface="Cambria Math" panose="02040503050406030204" pitchFamily="18" charset="0"/>
+                        </a:rPr>
+                        <m:t>=</m:t>
+                      </m:r>
+                      <m:f>
+                        <m:fPr>
+                          <m:ctrlPr>
+                            <a:rPr lang="en-US" sz="1600" i="1">
+                              <a:latin typeface="Cambria Math" panose="02040503050406030204" pitchFamily="18" charset="0"/>
+                            </a:rPr>
+                          </m:ctrlPr>
+                        </m:fPr>
+                        <m:num>
+                          <m:f>
+                            <m:fPr>
+                              <m:ctrlPr>
+                                <a:rPr lang="en-US" sz="1600" i="1">
+                                  <a:latin typeface="Cambria Math" panose="02040503050406030204" pitchFamily="18" charset="0"/>
+                                </a:rPr>
+                              </m:ctrlPr>
+                            </m:fPr>
+                            <m:num>
+                              <m:sSub>
+                                <m:sSubPr>
+                                  <m:ctrlPr>
+                                    <a:rPr lang="en-US" sz="1600" i="1">
+                                      <a:latin typeface="Cambria Math" panose="02040503050406030204" pitchFamily="18" charset="0"/>
+                                    </a:rPr>
+                                  </m:ctrlPr>
+                                </m:sSubPr>
+                                <m:e>
+                                  <m:r>
+                                    <a:rPr lang="en-US" sz="1600" i="1">
+                                      <a:latin typeface="Cambria Math" panose="02040503050406030204" pitchFamily="18" charset="0"/>
+                                    </a:rPr>
+                                    <m:t>𝑁</m:t>
+                                  </m:r>
+                                </m:e>
+                                <m:sub>
+                                  <m:r>
+                                    <a:rPr lang="en-US" sz="1600" i="1">
+                                      <a:latin typeface="Cambria Math" panose="02040503050406030204" pitchFamily="18" charset="0"/>
+                                    </a:rPr>
+                                    <m:t>𝑖𝑗</m:t>
+                                  </m:r>
+                                </m:sub>
+                              </m:sSub>
+                              <m:sSub>
+                                <m:sSubPr>
+                                  <m:ctrlPr>
+                                    <a:rPr lang="en-US" sz="1600" i="1">
+                                      <a:latin typeface="Cambria Math" panose="02040503050406030204" pitchFamily="18" charset="0"/>
+                                    </a:rPr>
+                                  </m:ctrlPr>
+                                </m:sSubPr>
+                                <m:e>
+                                  <m:r>
+                                    <a:rPr lang="en-US" sz="1600" i="1">
+                                      <a:latin typeface="Cambria Math" panose="02040503050406030204" pitchFamily="18" charset="0"/>
+                                    </a:rPr>
+                                    <m:t>𝑠</m:t>
+                                  </m:r>
+                                </m:e>
+                                <m:sub>
+                                  <m:r>
+                                    <a:rPr lang="en-US" sz="1600" i="1">
+                                      <a:latin typeface="Cambria Math" panose="02040503050406030204" pitchFamily="18" charset="0"/>
+                                    </a:rPr>
+                                    <m:t>𝑖𝑗</m:t>
+                                  </m:r>
+                                </m:sub>
+                              </m:sSub>
+                            </m:num>
+                            <m:den>
+                              <m:nary>
+                                <m:naryPr>
+                                  <m:chr m:val="∑"/>
+                                  <m:ctrlPr>
+                                    <a:rPr lang="en-US" sz="1600" i="1">
+                                      <a:latin typeface="Cambria Math" panose="02040503050406030204" pitchFamily="18" charset="0"/>
+                                    </a:rPr>
+                                  </m:ctrlPr>
+                                </m:naryPr>
+                                <m:sub>
+                                  <m:r>
+                                    <m:rPr>
+                                      <m:brk m:alnAt="23"/>
+                                    </m:rPr>
+                                    <a:rPr lang="en-US" sz="1600" i="1">
+                                      <a:latin typeface="Cambria Math" panose="02040503050406030204" pitchFamily="18" charset="0"/>
+                                    </a:rPr>
+                                    <m:t>𝑗</m:t>
+                                  </m:r>
+                                  <m:r>
+                                    <a:rPr lang="en-US" sz="1600" i="1">
+                                      <a:latin typeface="Cambria Math" panose="02040503050406030204" pitchFamily="18" charset="0"/>
+                                    </a:rPr>
+                                    <m:t>=3</m:t>
+                                  </m:r>
+                                </m:sub>
+                                <m:sup>
+                                  <m:r>
+                                    <a:rPr lang="en-US" sz="1600" i="1">
+                                      <a:latin typeface="Cambria Math" panose="02040503050406030204" pitchFamily="18" charset="0"/>
+                                    </a:rPr>
+                                    <m:t>8+</m:t>
+                                  </m:r>
+                                </m:sup>
+                                <m:e>
+                                  <m:sSub>
+                                    <m:sSubPr>
+                                      <m:ctrlPr>
+                                        <a:rPr lang="en-US" sz="1600" i="1">
+                                          <a:latin typeface="Cambria Math" panose="02040503050406030204" pitchFamily="18" charset="0"/>
+                                        </a:rPr>
+                                      </m:ctrlPr>
+                                    </m:sSubPr>
+                                    <m:e>
+                                      <m:r>
+                                        <a:rPr lang="en-US" sz="1600" i="1">
+                                          <a:latin typeface="Cambria Math" panose="02040503050406030204" pitchFamily="18" charset="0"/>
+                                        </a:rPr>
+                                        <m:t>𝑁</m:t>
+                                      </m:r>
+                                    </m:e>
+                                    <m:sub>
+                                      <m:r>
+                                        <a:rPr lang="en-US" sz="1600" i="1">
+                                          <a:latin typeface="Cambria Math" panose="02040503050406030204" pitchFamily="18" charset="0"/>
+                                        </a:rPr>
+                                        <m:t>𝑖𝑗</m:t>
+                                      </m:r>
+                                    </m:sub>
+                                  </m:sSub>
+                                  <m:sSub>
+                                    <m:sSubPr>
+                                      <m:ctrlPr>
+                                        <a:rPr lang="en-US" sz="1600" i="1">
+                                          <a:latin typeface="Cambria Math" panose="02040503050406030204" pitchFamily="18" charset="0"/>
+                                        </a:rPr>
+                                      </m:ctrlPr>
+                                    </m:sSubPr>
+                                    <m:e>
+                                      <m:r>
+                                        <a:rPr lang="en-US" sz="1600" i="1">
+                                          <a:latin typeface="Cambria Math" panose="02040503050406030204" pitchFamily="18" charset="0"/>
+                                        </a:rPr>
+                                        <m:t>𝑠</m:t>
+                                      </m:r>
+                                    </m:e>
+                                    <m:sub>
+                                      <m:r>
+                                        <a:rPr lang="en-US" sz="1600" i="1">
+                                          <a:latin typeface="Cambria Math" panose="02040503050406030204" pitchFamily="18" charset="0"/>
+                                        </a:rPr>
+                                        <m:t>𝑖𝑗</m:t>
+                                      </m:r>
+                                    </m:sub>
+                                  </m:sSub>
+                                </m:e>
+                              </m:nary>
+                            </m:den>
+                          </m:f>
+                          <m:sSub>
+                            <m:sSubPr>
+                              <m:ctrlPr>
+                                <a:rPr lang="en-US" sz="1600" i="1">
+                                  <a:latin typeface="Cambria Math" panose="02040503050406030204" pitchFamily="18" charset="0"/>
+                                </a:rPr>
+                              </m:ctrlPr>
+                            </m:sSubPr>
+                            <m:e>
+                              <m:r>
+                                <a:rPr lang="en-US" sz="1600" i="1">
+                                  <a:latin typeface="Cambria Math" panose="02040503050406030204" pitchFamily="18" charset="0"/>
+                                </a:rPr>
+                                <m:t>𝑌</m:t>
+                              </m:r>
+                            </m:e>
+                            <m:sub>
+                              <m:r>
+                                <a:rPr lang="en-US" sz="1600" i="1">
+                                  <a:latin typeface="Cambria Math" panose="02040503050406030204" pitchFamily="18" charset="0"/>
+                                </a:rPr>
+                                <m:t>𝑖</m:t>
+                              </m:r>
+                            </m:sub>
+                          </m:sSub>
+                        </m:num>
+                        <m:den>
+                          <m:nary>
+                            <m:naryPr>
+                              <m:chr m:val="∑"/>
+                              <m:ctrlPr>
+                                <a:rPr lang="en-US" sz="1600" i="1">
+                                  <a:latin typeface="Cambria Math" panose="02040503050406030204" pitchFamily="18" charset="0"/>
+                                </a:rPr>
+                              </m:ctrlPr>
+                            </m:naryPr>
+                            <m:sub>
+                              <m:r>
+                                <a:rPr lang="en-US" sz="1600" b="0" i="1" smtClean="0">
+                                  <a:latin typeface="Cambria Math" panose="02040503050406030204" pitchFamily="18" charset="0"/>
+                                </a:rPr>
+                                <m:t>𝑗</m:t>
+                              </m:r>
+                              <m:r>
+                                <a:rPr lang="en-US" sz="1600" b="0" i="1" smtClean="0">
+                                  <a:latin typeface="Cambria Math" panose="02040503050406030204" pitchFamily="18" charset="0"/>
+                                </a:rPr>
+                                <m:t>=</m:t>
+                              </m:r>
+                              <m:r>
+                                <m:rPr>
+                                  <m:brk m:alnAt="23"/>
+                                </m:rPr>
+                                <a:rPr lang="en-US" sz="1600" i="1">
+                                  <a:latin typeface="Cambria Math" panose="02040503050406030204" pitchFamily="18" charset="0"/>
+                                </a:rPr>
+                                <m:t>3</m:t>
+                              </m:r>
+                            </m:sub>
+                            <m:sup>
+                              <m:r>
+                                <a:rPr lang="en-US" sz="1600" i="1">
+                                  <a:latin typeface="Cambria Math" panose="02040503050406030204" pitchFamily="18" charset="0"/>
+                                </a:rPr>
+                                <m:t>8+</m:t>
+                              </m:r>
+                            </m:sup>
+                            <m:e>
+                              <m:d>
+                                <m:dPr>
+                                  <m:begChr m:val="["/>
+                                  <m:endChr m:val="]"/>
+                                  <m:ctrlPr>
+                                    <a:rPr lang="en-US" sz="1600" i="1">
+                                      <a:latin typeface="Cambria Math" panose="02040503050406030204" pitchFamily="18" charset="0"/>
+                                    </a:rPr>
+                                  </m:ctrlPr>
+                                </m:dPr>
+                                <m:e>
+                                  <m:sSubSup>
+                                    <m:sSubSupPr>
+                                      <m:ctrlPr>
+                                        <a:rPr lang="en-US" sz="1600" i="1">
+                                          <a:latin typeface="Cambria Math" panose="02040503050406030204" pitchFamily="18" charset="0"/>
+                                        </a:rPr>
+                                      </m:ctrlPr>
+                                    </m:sSubSupPr>
+                                    <m:e>
+                                      <m:r>
+                                        <a:rPr lang="en-US" sz="1600" i="1">
+                                          <a:latin typeface="Cambria Math" panose="02040503050406030204" pitchFamily="18" charset="0"/>
+                                        </a:rPr>
+                                        <m:t>𝑤</m:t>
+                                      </m:r>
+                                    </m:e>
+                                    <m:sub>
+                                      <m:r>
+                                        <a:rPr lang="en-US" sz="1600" i="1">
+                                          <a:latin typeface="Cambria Math" panose="02040503050406030204" pitchFamily="18" charset="0"/>
+                                        </a:rPr>
+                                        <m:t>𝑖𝑗</m:t>
+                                      </m:r>
+                                    </m:sub>
+                                    <m:sup>
+                                      <m:r>
+                                        <a:rPr lang="en-US" sz="1600" i="1">
+                                          <a:latin typeface="Cambria Math" panose="02040503050406030204" pitchFamily="18" charset="0"/>
+                                        </a:rPr>
+                                        <m:t>𝑓𝑠h</m:t>
+                                      </m:r>
+                                    </m:sup>
+                                  </m:sSubSup>
+                                  <m:f>
+                                    <m:fPr>
+                                      <m:ctrlPr>
+                                        <a:rPr lang="en-US" sz="1600" i="1">
+                                          <a:latin typeface="Cambria Math" panose="02040503050406030204" pitchFamily="18" charset="0"/>
+                                        </a:rPr>
+                                      </m:ctrlPr>
+                                    </m:fPr>
+                                    <m:num>
+                                      <m:sSub>
+                                        <m:sSubPr>
+                                          <m:ctrlPr>
+                                            <a:rPr lang="en-US" sz="1600" i="1">
+                                              <a:latin typeface="Cambria Math" panose="02040503050406030204" pitchFamily="18" charset="0"/>
+                                            </a:rPr>
+                                          </m:ctrlPr>
+                                        </m:sSubPr>
+                                        <m:e>
+                                          <m:r>
+                                            <a:rPr lang="en-US" sz="1600" i="1">
+                                              <a:latin typeface="Cambria Math" panose="02040503050406030204" pitchFamily="18" charset="0"/>
+                                            </a:rPr>
+                                            <m:t>𝑁</m:t>
+                                          </m:r>
+                                        </m:e>
+                                        <m:sub>
+                                          <m:r>
+                                            <a:rPr lang="en-US" sz="1600" i="1">
+                                              <a:latin typeface="Cambria Math" panose="02040503050406030204" pitchFamily="18" charset="0"/>
+                                            </a:rPr>
+                                            <m:t>𝑖𝑗</m:t>
+                                          </m:r>
+                                        </m:sub>
+                                      </m:sSub>
+                                      <m:sSub>
+                                        <m:sSubPr>
+                                          <m:ctrlPr>
+                                            <a:rPr lang="en-US" sz="1600" i="1">
+                                              <a:latin typeface="Cambria Math" panose="02040503050406030204" pitchFamily="18" charset="0"/>
+                                            </a:rPr>
+                                          </m:ctrlPr>
+                                        </m:sSubPr>
+                                        <m:e>
+                                          <m:r>
+                                            <a:rPr lang="en-US" sz="1600" i="1">
+                                              <a:latin typeface="Cambria Math" panose="02040503050406030204" pitchFamily="18" charset="0"/>
+                                            </a:rPr>
+                                            <m:t>𝑠</m:t>
+                                          </m:r>
+                                        </m:e>
+                                        <m:sub>
+                                          <m:r>
+                                            <a:rPr lang="en-US" sz="1600" i="1">
+                                              <a:latin typeface="Cambria Math" panose="02040503050406030204" pitchFamily="18" charset="0"/>
+                                            </a:rPr>
+                                            <m:t>𝑖𝑗</m:t>
+                                          </m:r>
+                                        </m:sub>
+                                      </m:sSub>
+                                    </m:num>
+                                    <m:den>
+                                      <m:nary>
+                                        <m:naryPr>
+                                          <m:chr m:val="∑"/>
+                                          <m:ctrlPr>
+                                            <a:rPr lang="en-US" sz="1600" i="1">
+                                              <a:latin typeface="Cambria Math" panose="02040503050406030204" pitchFamily="18" charset="0"/>
+                                            </a:rPr>
+                                          </m:ctrlPr>
+                                        </m:naryPr>
+                                        <m:sub>
+                                          <m:r>
+                                            <m:rPr>
+                                              <m:brk m:alnAt="23"/>
+                                            </m:rPr>
+                                            <a:rPr lang="en-US" sz="1600" i="1">
+                                              <a:latin typeface="Cambria Math" panose="02040503050406030204" pitchFamily="18" charset="0"/>
+                                            </a:rPr>
+                                            <m:t>𝑗</m:t>
+                                          </m:r>
+                                          <m:r>
+                                            <a:rPr lang="en-US" sz="1600" i="1">
+                                              <a:latin typeface="Cambria Math" panose="02040503050406030204" pitchFamily="18" charset="0"/>
+                                            </a:rPr>
+                                            <m:t>=3</m:t>
+                                          </m:r>
+                                        </m:sub>
+                                        <m:sup>
+                                          <m:r>
+                                            <a:rPr lang="en-US" sz="1600" i="1">
+                                              <a:latin typeface="Cambria Math" panose="02040503050406030204" pitchFamily="18" charset="0"/>
+                                            </a:rPr>
+                                            <m:t>8+</m:t>
+                                          </m:r>
+                                        </m:sup>
+                                        <m:e>
+                                          <m:sSub>
+                                            <m:sSubPr>
+                                              <m:ctrlPr>
+                                                <a:rPr lang="en-US" sz="1600" i="1">
+                                                  <a:latin typeface="Cambria Math" panose="02040503050406030204" pitchFamily="18" charset="0"/>
+                                                </a:rPr>
+                                              </m:ctrlPr>
+                                            </m:sSubPr>
+                                            <m:e>
+                                              <m:r>
+                                                <a:rPr lang="en-US" sz="1600" i="1">
+                                                  <a:latin typeface="Cambria Math" panose="02040503050406030204" pitchFamily="18" charset="0"/>
+                                                </a:rPr>
+                                                <m:t>𝑁</m:t>
+                                              </m:r>
+                                            </m:e>
+                                            <m:sub>
+                                              <m:r>
+                                                <a:rPr lang="en-US" sz="1600" i="1">
+                                                  <a:latin typeface="Cambria Math" panose="02040503050406030204" pitchFamily="18" charset="0"/>
+                                                </a:rPr>
+                                                <m:t>𝑖𝑗</m:t>
+                                              </m:r>
+                                            </m:sub>
+                                          </m:sSub>
+                                          <m:sSub>
+                                            <m:sSubPr>
+                                              <m:ctrlPr>
+                                                <a:rPr lang="en-US" sz="1600" i="1">
+                                                  <a:latin typeface="Cambria Math" panose="02040503050406030204" pitchFamily="18" charset="0"/>
+                                                </a:rPr>
+                                              </m:ctrlPr>
+                                            </m:sSubPr>
+                                            <m:e>
+                                              <m:r>
+                                                <a:rPr lang="en-US" sz="1600" i="1">
+                                                  <a:latin typeface="Cambria Math" panose="02040503050406030204" pitchFamily="18" charset="0"/>
+                                                </a:rPr>
+                                                <m:t>𝑠</m:t>
+                                              </m:r>
+                                            </m:e>
+                                            <m:sub>
+                                              <m:r>
+                                                <a:rPr lang="en-US" sz="1600" i="1">
+                                                  <a:latin typeface="Cambria Math" panose="02040503050406030204" pitchFamily="18" charset="0"/>
+                                                </a:rPr>
+                                                <m:t>𝑖𝑗</m:t>
+                                              </m:r>
+                                            </m:sub>
+                                          </m:sSub>
+                                        </m:e>
+                                      </m:nary>
+                                    </m:den>
+                                  </m:f>
+                                </m:e>
+                              </m:d>
+                            </m:e>
+                          </m:nary>
+                        </m:den>
+                      </m:f>
+                    </m:oMath>
+                  </m:oMathPara>
+                </a14:m>
+                <a:endParaRPr lang="en-US" sz="1600" dirty="0"/>
+              </a:p>
+              <a:p>
+                <a:endParaRPr lang="en-US" sz="1600" dirty="0"/>
+              </a:p>
+              <a:p>
+                <a14:m>
+                  <m:oMath xmlns:m="http://schemas.openxmlformats.org/officeDocument/2006/math">
+                    <m:sSub>
+                      <m:sSubPr>
+                        <m:ctrlPr>
+                          <a:rPr lang="en-US" sz="1600" i="1">
+                            <a:latin typeface="Cambria Math" panose="02040503050406030204" pitchFamily="18" charset="0"/>
+                          </a:rPr>
+                        </m:ctrlPr>
+                      </m:sSubPr>
+                      <m:e>
+                        <m:r>
+                          <a:rPr lang="en-US" sz="1600" i="1">
+                            <a:latin typeface="Cambria Math" panose="02040503050406030204" pitchFamily="18" charset="0"/>
+                          </a:rPr>
+                          <m:t>𝐶</m:t>
+                        </m:r>
+                      </m:e>
+                      <m:sub>
+                        <m:r>
+                          <a:rPr lang="en-US" sz="1600" i="1">
+                            <a:latin typeface="Cambria Math" panose="02040503050406030204" pitchFamily="18" charset="0"/>
+                          </a:rPr>
+                          <m:t>𝑖𝑗</m:t>
+                        </m:r>
+                      </m:sub>
+                    </m:sSub>
+                  </m:oMath>
+                </a14:m>
+                <a:r>
+                  <a:rPr lang="en-US" sz="1600" dirty="0"/>
+                  <a:t> = catch in numbers-at-age</a:t>
+                </a:r>
+              </a:p>
+              <a:p>
+                <a14:m>
+                  <m:oMath xmlns:m="http://schemas.openxmlformats.org/officeDocument/2006/math">
+                    <m:sSub>
+                      <m:sSubPr>
+                        <m:ctrlPr>
+                          <a:rPr lang="en-US" sz="1600" i="1">
+                            <a:latin typeface="Cambria Math" panose="02040503050406030204" pitchFamily="18" charset="0"/>
+                          </a:rPr>
+                        </m:ctrlPr>
+                      </m:sSubPr>
+                      <m:e>
+                        <m:r>
+                          <a:rPr lang="en-US" sz="1600" i="1">
+                            <a:latin typeface="Cambria Math" panose="02040503050406030204" pitchFamily="18" charset="0"/>
+                          </a:rPr>
+                          <m:t>𝑁</m:t>
+                        </m:r>
+                      </m:e>
+                      <m:sub>
+                        <m:r>
+                          <a:rPr lang="en-US" sz="1600" i="1">
+                            <a:latin typeface="Cambria Math" panose="02040503050406030204" pitchFamily="18" charset="0"/>
+                          </a:rPr>
+                          <m:t>𝑖𝑗</m:t>
+                        </m:r>
+                      </m:sub>
+                    </m:sSub>
+                  </m:oMath>
+                </a14:m>
+                <a:r>
+                  <a:rPr lang="en-US" sz="1600" dirty="0"/>
+                  <a:t> = total numbers-at-age</a:t>
+                </a:r>
+              </a:p>
+              <a:p>
+                <a14:m>
+                  <m:oMath xmlns:m="http://schemas.openxmlformats.org/officeDocument/2006/math">
+                    <m:sSub>
+                      <m:sSubPr>
+                        <m:ctrlPr>
+                          <a:rPr lang="en-US" sz="1600" i="1">
+                            <a:latin typeface="Cambria Math" panose="02040503050406030204" pitchFamily="18" charset="0"/>
+                          </a:rPr>
+                        </m:ctrlPr>
+                      </m:sSubPr>
+                      <m:e>
+                        <m:r>
+                          <a:rPr lang="en-US" sz="1600" i="1">
+                            <a:latin typeface="Cambria Math" panose="02040503050406030204" pitchFamily="18" charset="0"/>
+                          </a:rPr>
+                          <m:t>𝑠</m:t>
+                        </m:r>
+                      </m:e>
+                      <m:sub>
+                        <m:r>
+                          <a:rPr lang="en-US" sz="1600" i="1">
+                            <a:latin typeface="Cambria Math" panose="02040503050406030204" pitchFamily="18" charset="0"/>
+                          </a:rPr>
+                          <m:t>𝑖𝑗</m:t>
+                        </m:r>
+                      </m:sub>
+                    </m:sSub>
+                  </m:oMath>
+                </a14:m>
+                <a:r>
+                  <a:rPr lang="en-US" sz="1600" dirty="0"/>
+                  <a:t> = fishery selectivity-at-age</a:t>
+                </a:r>
+              </a:p>
+              <a:p>
+                <a14:m>
+                  <m:oMath xmlns:m="http://schemas.openxmlformats.org/officeDocument/2006/math">
+                    <m:sSub>
+                      <m:sSubPr>
+                        <m:ctrlPr>
+                          <a:rPr lang="en-US" sz="1600" i="1">
+                            <a:latin typeface="Cambria Math" panose="02040503050406030204" pitchFamily="18" charset="0"/>
+                          </a:rPr>
+                        </m:ctrlPr>
+                      </m:sSubPr>
+                      <m:e>
+                        <m:r>
+                          <a:rPr lang="en-US" sz="1600" i="1">
+                            <a:latin typeface="Cambria Math" panose="02040503050406030204" pitchFamily="18" charset="0"/>
+                          </a:rPr>
+                          <m:t>𝑌</m:t>
+                        </m:r>
+                      </m:e>
+                      <m:sub>
+                        <m:r>
+                          <a:rPr lang="en-US" sz="1600" i="1">
+                            <a:latin typeface="Cambria Math" panose="02040503050406030204" pitchFamily="18" charset="0"/>
+                          </a:rPr>
+                          <m:t>𝑖</m:t>
+                        </m:r>
+                      </m:sub>
+                    </m:sSub>
+                  </m:oMath>
+                </a14:m>
+                <a:r>
+                  <a:rPr lang="en-US" sz="1600" dirty="0"/>
+                  <a:t>= fishery yield (catch biomass) by year</a:t>
+                </a:r>
+              </a:p>
+              <a:p>
+                <a14:m>
+                  <m:oMath xmlns:m="http://schemas.openxmlformats.org/officeDocument/2006/math">
+                    <m:sSubSup>
+                      <m:sSubSupPr>
+                        <m:ctrlPr>
+                          <a:rPr lang="en-US" sz="1600" i="1">
+                            <a:latin typeface="Cambria Math" panose="02040503050406030204" pitchFamily="18" charset="0"/>
+                          </a:rPr>
+                        </m:ctrlPr>
+                      </m:sSubSupPr>
+                      <m:e>
+                        <m:r>
+                          <a:rPr lang="en-US" sz="1600" i="1">
+                            <a:latin typeface="Cambria Math" panose="02040503050406030204" pitchFamily="18" charset="0"/>
+                          </a:rPr>
+                          <m:t>𝑤</m:t>
+                        </m:r>
+                      </m:e>
+                      <m:sub>
+                        <m:r>
+                          <a:rPr lang="en-US" sz="1600" i="1">
+                            <a:latin typeface="Cambria Math" panose="02040503050406030204" pitchFamily="18" charset="0"/>
+                          </a:rPr>
+                          <m:t>𝑖𝑗</m:t>
+                        </m:r>
+                      </m:sub>
+                      <m:sup>
+                        <m:r>
+                          <a:rPr lang="en-US" sz="1600" i="1">
+                            <a:latin typeface="Cambria Math" panose="02040503050406030204" pitchFamily="18" charset="0"/>
+                          </a:rPr>
+                          <m:t>𝑓𝑠h</m:t>
+                        </m:r>
+                      </m:sup>
+                    </m:sSubSup>
+                  </m:oMath>
+                </a14:m>
+                <a:r>
+                  <a:rPr lang="en-US" sz="1600" dirty="0"/>
+                  <a:t>= fishery weight-at-age</a:t>
+                </a:r>
+              </a:p>
+              <a:p>
+                <a:endParaRPr lang="en-US" sz="1600" dirty="0"/>
+              </a:p>
+            </p:txBody>
+          </p:sp>
+        </mc:Choice>
+        <mc:Fallback>
+          <p:sp>
+            <p:nvSpPr>
+              <p:cNvPr id="13" name="TextBox 12">
+                <a:extLst>
+                  <a:ext uri="{FF2B5EF4-FFF2-40B4-BE49-F238E27FC236}">
+                    <a16:creationId xmlns:a16="http://schemas.microsoft.com/office/drawing/2014/main" id="{931A78A2-D9EE-4FC1-909D-B9BDD1B0BDD0}"/>
+                  </a:ext>
+                </a:extLst>
+              </p:cNvPr>
+              <p:cNvSpPr txBox="1">
+                <a:spLocks noRot="1" noChangeAspect="1" noMove="1" noResize="1" noEditPoints="1" noAdjustHandles="1" noChangeArrowheads="1" noChangeShapeType="1" noTextEdit="1"/>
+              </p:cNvSpPr>
+              <p:nvPr/>
+            </p:nvSpPr>
+            <p:spPr>
+              <a:xfrm>
+                <a:off x="5699051" y="1343024"/>
+                <a:ext cx="4120001" cy="5415521"/>
+              </a:xfrm>
+              <a:prstGeom prst="rect">
+                <a:avLst/>
+              </a:prstGeom>
+              <a:blipFill>
+                <a:blip r:embed="rId3"/>
+                <a:stretch>
+                  <a:fillRect l="-888" t="-337"/>
+                </a:stretch>
+              </a:blipFill>
+            </p:spPr>
+            <p:txBody>
+              <a:bodyPr/>
+              <a:lstStyle/>
+              <a:p>
+                <a:r>
+                  <a:rPr lang="en-US">
+                    <a:noFill/>
+                  </a:rPr>
+                  <a:t> </a:t>
+                </a:r>
+              </a:p>
+            </p:txBody>
+          </p:sp>
+        </mc:Fallback>
+      </mc:AlternateContent>
+      <p:sp>
+        <p:nvSpPr>
+          <p:cNvPr id="14" name="TextBox 13">
             <a:extLst>
               <a:ext uri="{FF2B5EF4-FFF2-40B4-BE49-F238E27FC236}">
-                <a16:creationId xmlns:a16="http://schemas.microsoft.com/office/drawing/2014/main" id="{FEFB2D3E-809E-46C9-91ED-2B386A1D33CD}"/>
-              </a:ext>
-            </a:extLst>
-          </p:cNvPr>
-          <p:cNvPicPr>
-            <a:picLocks noChangeAspect="1"/>
-          </p:cNvPicPr>
-          <p:nvPr/>
-        </p:nvPicPr>
-        <p:blipFill>
-          <a:blip r:embed="rId3"/>
-          <a:stretch>
-            <a:fillRect/>
-          </a:stretch>
-        </p:blipFill>
-        <p:spPr>
-          <a:xfrm>
-            <a:off x="448624" y="3981382"/>
-            <a:ext cx="6667500" cy="2581275"/>
-          </a:xfrm>
-          <a:prstGeom prst="rect">
-            <a:avLst/>
-          </a:prstGeom>
-        </p:spPr>
-      </p:pic>
-      <p:pic>
-        <p:nvPicPr>
-          <p:cNvPr id="11" name="Picture 10">
-            <a:extLst>
-              <a:ext uri="{FF2B5EF4-FFF2-40B4-BE49-F238E27FC236}">
-                <a16:creationId xmlns:a16="http://schemas.microsoft.com/office/drawing/2014/main" id="{1B0E5101-AEAD-46A2-957C-90C5D4BEAA02}"/>
-              </a:ext>
-            </a:extLst>
-          </p:cNvPr>
-          <p:cNvPicPr>
-            <a:picLocks noChangeAspect="1"/>
-          </p:cNvPicPr>
-          <p:nvPr/>
-        </p:nvPicPr>
-        <p:blipFill>
-          <a:blip r:embed="rId4"/>
-          <a:stretch>
-            <a:fillRect/>
-          </a:stretch>
-        </p:blipFill>
-        <p:spPr>
-          <a:xfrm>
-            <a:off x="454341" y="1557039"/>
-            <a:ext cx="5572125" cy="1771650"/>
-          </a:xfrm>
-          <a:prstGeom prst="rect">
-            <a:avLst/>
-          </a:prstGeom>
-        </p:spPr>
-      </p:pic>
-      <p:sp>
-        <p:nvSpPr>
-          <p:cNvPr id="12" name="TextBox 11">
-            <a:extLst>
-              <a:ext uri="{FF2B5EF4-FFF2-40B4-BE49-F238E27FC236}">
-                <a16:creationId xmlns:a16="http://schemas.microsoft.com/office/drawing/2014/main" id="{9924E527-9378-4361-8CAF-8015587F2EFA}"/>
+                <a16:creationId xmlns:a16="http://schemas.microsoft.com/office/drawing/2014/main" id="{C1C6787E-5CE3-46EA-BFB5-3D4294277C37}"/>
               </a:ext>
             </a:extLst>
           </p:cNvPr>
@@ -3936,8 +5748,8 @@
         </p:nvSpPr>
         <p:spPr>
           <a:xfrm>
-            <a:off x="7241860" y="3981382"/>
-            <a:ext cx="2609849" cy="646331"/>
+            <a:off x="795814" y="6573389"/>
+            <a:ext cx="8899451" cy="923330"/>
           </a:xfrm>
           <a:prstGeom prst="rect">
             <a:avLst/>
@@ -3952,15 +5764,18 @@
           <a:p>
             <a:r>
               <a:rPr lang="en-US" dirty="0"/>
-              <a:t>Logistic, a50/a95 parameterization</a:t>
-            </a:r>
+              <a:t>These equations are not equivalent. Variable int3 is the average weight of catch conditional on vulnerable proportions-at-age.</a:t>
+            </a:r>
+          </a:p>
+          <a:p>
+            <a:endParaRPr lang="en-US" dirty="0"/>
           </a:p>
         </p:txBody>
       </p:sp>
     </p:spTree>
     <p:extLst>
       <p:ext uri="{BB962C8B-B14F-4D97-AF65-F5344CB8AC3E}">
-        <p14:creationId xmlns:p14="http://schemas.microsoft.com/office/powerpoint/2010/main" val="2422755107"/>
+        <p14:creationId xmlns:p14="http://schemas.microsoft.com/office/powerpoint/2010/main" val="3309042303"/>
       </p:ext>
     </p:extLst>
   </p:cSld>
@@ -4005,7 +5820,7 @@
         </p:nvSpPr>
         <p:spPr>
           <a:xfrm>
-            <a:off x="454342" y="194330"/>
+            <a:off x="454342" y="359040"/>
             <a:ext cx="8675370" cy="795865"/>
           </a:xfrm>
         </p:spPr>
@@ -4015,43 +5830,7 @@
           <a:p>
             <a:r>
               <a:rPr lang="en-US" dirty="0"/>
-              <a:t>Selectivity</a:t>
-            </a:r>
-          </a:p>
-        </p:txBody>
-      </p:sp>
-      <p:sp>
-        <p:nvSpPr>
-          <p:cNvPr id="3" name="Content Placeholder 2">
-            <a:extLst>
-              <a:ext uri="{FF2B5EF4-FFF2-40B4-BE49-F238E27FC236}">
-                <a16:creationId xmlns:a16="http://schemas.microsoft.com/office/drawing/2014/main" id="{BB5B9591-6BBC-4B0D-8085-50D5036BBADE}"/>
-              </a:ext>
-            </a:extLst>
-          </p:cNvPr>
-          <p:cNvSpPr>
-            <a:spLocks noGrp="1"/>
-          </p:cNvSpPr>
-          <p:nvPr>
-            <p:ph idx="1"/>
-          </p:nvPr>
-        </p:nvSpPr>
-        <p:spPr>
-          <a:xfrm>
-            <a:off x="454341" y="4419240"/>
-            <a:ext cx="4337685" cy="523875"/>
-          </a:xfrm>
-        </p:spPr>
-        <p:txBody>
-          <a:bodyPr/>
-          <a:lstStyle/>
-          <a:p>
-            <a:pPr marL="0" indent="0">
-              <a:buNone/>
-            </a:pPr>
-            <a:r>
-              <a:rPr lang="en-US" dirty="0"/>
-              <a:t>HER</a:t>
+              <a:t>Catch in numbers-at-age </a:t>
             </a:r>
           </a:p>
         </p:txBody>
@@ -4072,7 +5851,7 @@
         </p:nvSpPr>
         <p:spPr>
           <a:xfrm>
-            <a:off x="454342" y="990195"/>
+            <a:off x="454342" y="1343024"/>
             <a:ext cx="4337685" cy="523875"/>
           </a:xfrm>
           <a:prstGeom prst="rect">
@@ -4081,7 +5860,7 @@
         </p:spPr>
         <p:txBody>
           <a:bodyPr vert="horz" lIns="91440" tIns="45720" rIns="91440" bIns="45720" rtlCol="0">
-            <a:normAutofit/>
+            <a:normAutofit fontScale="92500"/>
           </a:bodyPr>
           <a:lstStyle>
             <a:lvl1pPr marL="251460" indent="-251460" algn="l" defTabSz="1005840" rtl="0" eaLnBrk="1" latinLnBrk="0" hangingPunct="1">
@@ -4254,17 +6033,17 @@
             </a:pPr>
             <a:r>
               <a:rPr lang="en-US" dirty="0"/>
-              <a:t>LS</a:t>
-            </a:r>
-          </a:p>
-        </p:txBody>
-      </p:sp>
-      <p:sp>
-        <p:nvSpPr>
-          <p:cNvPr id="7" name="TextBox 6">
+              <a:t>HER (conditioned on catch)</a:t>
+            </a:r>
+          </a:p>
+        </p:txBody>
+      </p:sp>
+      <p:sp>
+        <p:nvSpPr>
+          <p:cNvPr id="12" name="TextBox 11">
             <a:extLst>
               <a:ext uri="{FF2B5EF4-FFF2-40B4-BE49-F238E27FC236}">
-                <a16:creationId xmlns:a16="http://schemas.microsoft.com/office/drawing/2014/main" id="{251AE748-36B3-4087-B46E-6DAB79A5117A}"/>
+                <a16:creationId xmlns:a16="http://schemas.microsoft.com/office/drawing/2014/main" id="{91FC76D7-C9CE-467C-BE36-D4A716E0ABC8}"/>
               </a:ext>
             </a:extLst>
           </p:cNvPr>
@@ -4273,8 +6052,8 @@
         </p:nvSpPr>
         <p:spPr>
           <a:xfrm>
-            <a:off x="5266375" y="1438827"/>
-            <a:ext cx="2609849" cy="1200329"/>
+            <a:off x="454342" y="1866899"/>
+            <a:ext cx="3785191" cy="369332"/>
           </a:xfrm>
           <a:prstGeom prst="rect">
             <a:avLst/>
@@ -4289,17 +6068,17 @@
           <a:p>
             <a:r>
               <a:rPr lang="en-US" dirty="0"/>
-              <a:t>Logistic, a50/slope parameterization. Scale to 1 by dividing by max (not differentiable)</a:t>
+              <a:t>Same equation as what’s in LS code.</a:t>
             </a:r>
           </a:p>
         </p:txBody>
       </p:sp>
       <p:pic>
         <p:nvPicPr>
-          <p:cNvPr id="10" name="Picture 9">
+          <p:cNvPr id="3" name="Picture 2">
             <a:extLst>
               <a:ext uri="{FF2B5EF4-FFF2-40B4-BE49-F238E27FC236}">
-                <a16:creationId xmlns:a16="http://schemas.microsoft.com/office/drawing/2014/main" id="{16A67F07-95E7-4A1F-B717-E78DCB58CF95}"/>
+                <a16:creationId xmlns:a16="http://schemas.microsoft.com/office/drawing/2014/main" id="{4AB5BB6C-DBC4-45D1-A47D-2162DD12999F}"/>
               </a:ext>
             </a:extLst>
           </p:cNvPr>
@@ -4316,113 +6095,18 @@
         </p:blipFill>
         <p:spPr>
           <a:xfrm>
-            <a:off x="454342" y="1444034"/>
-            <a:ext cx="4574858" cy="2783305"/>
+            <a:off x="454343" y="2448423"/>
+            <a:ext cx="7775258" cy="4789951"/>
           </a:xfrm>
           <a:prstGeom prst="rect">
             <a:avLst/>
           </a:prstGeom>
         </p:spPr>
       </p:pic>
-      <p:pic>
-        <p:nvPicPr>
-          <p:cNvPr id="12" name="Picture 11">
-            <a:extLst>
-              <a:ext uri="{FF2B5EF4-FFF2-40B4-BE49-F238E27FC236}">
-                <a16:creationId xmlns:a16="http://schemas.microsoft.com/office/drawing/2014/main" id="{A2376DB9-5582-47F3-AA77-54C1BF54982C}"/>
-              </a:ext>
-            </a:extLst>
-          </p:cNvPr>
-          <p:cNvPicPr>
-            <a:picLocks noChangeAspect="1"/>
-          </p:cNvPicPr>
-          <p:nvPr/>
-        </p:nvPicPr>
-        <p:blipFill>
-          <a:blip r:embed="rId3"/>
-          <a:stretch>
-            <a:fillRect/>
-          </a:stretch>
-        </p:blipFill>
-        <p:spPr>
-          <a:xfrm>
-            <a:off x="454342" y="4867872"/>
-            <a:ext cx="4812035" cy="1510239"/>
-          </a:xfrm>
-          <a:prstGeom prst="rect">
-            <a:avLst/>
-          </a:prstGeom>
-        </p:spPr>
-      </p:pic>
-      <p:pic>
-        <p:nvPicPr>
-          <p:cNvPr id="13" name="Picture 12">
-            <a:extLst>
-              <a:ext uri="{FF2B5EF4-FFF2-40B4-BE49-F238E27FC236}">
-                <a16:creationId xmlns:a16="http://schemas.microsoft.com/office/drawing/2014/main" id="{CFE50F56-8B7B-4C60-B13F-3C235793E2DD}"/>
-              </a:ext>
-            </a:extLst>
-          </p:cNvPr>
-          <p:cNvPicPr>
-            <a:picLocks noChangeAspect="1"/>
-          </p:cNvPicPr>
-          <p:nvPr/>
-        </p:nvPicPr>
-        <p:blipFill>
-          <a:blip r:embed="rId4"/>
-          <a:stretch>
-            <a:fillRect/>
-          </a:stretch>
-        </p:blipFill>
-        <p:spPr>
-          <a:xfrm>
-            <a:off x="454341" y="6513005"/>
-            <a:ext cx="4574858" cy="845518"/>
-          </a:xfrm>
-          <a:prstGeom prst="rect">
-            <a:avLst/>
-          </a:prstGeom>
-        </p:spPr>
-      </p:pic>
-      <p:sp>
-        <p:nvSpPr>
-          <p:cNvPr id="14" name="TextBox 13">
-            <a:extLst>
-              <a:ext uri="{FF2B5EF4-FFF2-40B4-BE49-F238E27FC236}">
-                <a16:creationId xmlns:a16="http://schemas.microsoft.com/office/drawing/2014/main" id="{303F9EF6-35EB-4524-85A2-7E0729B26AD2}"/>
-              </a:ext>
-            </a:extLst>
-          </p:cNvPr>
-          <p:cNvSpPr txBox="1"/>
-          <p:nvPr/>
-        </p:nvSpPr>
-        <p:spPr>
-          <a:xfrm>
-            <a:off x="5553074" y="4867872"/>
-            <a:ext cx="2609849" cy="2308324"/>
-          </a:xfrm>
-          <a:prstGeom prst="rect">
-            <a:avLst/>
-          </a:prstGeom>
-          <a:noFill/>
-        </p:spPr>
-        <p:txBody>
-          <a:bodyPr wrap="square" rtlCol="0">
-            <a:spAutoFit/>
-          </a:bodyPr>
-          <a:lstStyle/>
-          <a:p>
-            <a:r>
-              <a:rPr lang="en-US" dirty="0"/>
-              <a:t>Logistic, a50/slope parameterization. Scale by taking difference of log selectivity and log mean selectivity (differentiable). Estimate in log space to keep values positive.</a:t>
-            </a:r>
-          </a:p>
-        </p:txBody>
-      </p:sp>
     </p:spTree>
     <p:extLst>
       <p:ext uri="{BB962C8B-B14F-4D97-AF65-F5344CB8AC3E}">
-        <p14:creationId xmlns:p14="http://schemas.microsoft.com/office/powerpoint/2010/main" val="52294102"/>
+        <p14:creationId xmlns:p14="http://schemas.microsoft.com/office/powerpoint/2010/main" val="2110765001"/>
       </p:ext>
     </p:extLst>
   </p:cSld>
@@ -4467,7 +6151,7 @@
         </p:nvSpPr>
         <p:spPr>
           <a:xfrm>
-            <a:off x="454342" y="194330"/>
+            <a:off x="454342" y="359040"/>
             <a:ext cx="8675370" cy="795865"/>
           </a:xfrm>
         </p:spPr>
@@ -4477,43 +6161,7 @@
           <a:p>
             <a:r>
               <a:rPr lang="en-US" dirty="0"/>
-              <a:t>Selectivity</a:t>
-            </a:r>
-          </a:p>
-        </p:txBody>
-      </p:sp>
-      <p:sp>
-        <p:nvSpPr>
-          <p:cNvPr id="3" name="Content Placeholder 2">
-            <a:extLst>
-              <a:ext uri="{FF2B5EF4-FFF2-40B4-BE49-F238E27FC236}">
-                <a16:creationId xmlns:a16="http://schemas.microsoft.com/office/drawing/2014/main" id="{BB5B9591-6BBC-4B0D-8085-50D5036BBADE}"/>
-              </a:ext>
-            </a:extLst>
-          </p:cNvPr>
-          <p:cNvSpPr>
-            <a:spLocks noGrp="1"/>
-          </p:cNvSpPr>
-          <p:nvPr>
-            <p:ph idx="1"/>
-          </p:nvPr>
-        </p:nvSpPr>
-        <p:spPr>
-          <a:xfrm>
-            <a:off x="454341" y="4419240"/>
-            <a:ext cx="4337685" cy="523875"/>
-          </a:xfrm>
-        </p:spPr>
-        <p:txBody>
-          <a:bodyPr/>
-          <a:lstStyle/>
-          <a:p>
-            <a:pPr marL="0" indent="0">
-              <a:buNone/>
-            </a:pPr>
-            <a:r>
-              <a:rPr lang="en-US" dirty="0"/>
-              <a:t>HER</a:t>
+              <a:t>Catch in numbers-at-age </a:t>
             </a:r>
           </a:p>
         </p:txBody>
@@ -4534,7 +6182,7 @@
         </p:nvSpPr>
         <p:spPr>
           <a:xfrm>
-            <a:off x="454342" y="990195"/>
+            <a:off x="454342" y="1343024"/>
             <a:ext cx="4337685" cy="523875"/>
           </a:xfrm>
           <a:prstGeom prst="rect">
@@ -4543,7 +6191,7 @@
         </p:spPr>
         <p:txBody>
           <a:bodyPr vert="horz" lIns="91440" tIns="45720" rIns="91440" bIns="45720" rtlCol="0">
-            <a:normAutofit/>
+            <a:normAutofit fontScale="92500"/>
           </a:bodyPr>
           <a:lstStyle>
             <a:lvl1pPr marL="251460" indent="-251460" algn="l" defTabSz="1005840" rtl="0" eaLnBrk="1" latinLnBrk="0" hangingPunct="1">
@@ -4716,17 +6364,17 @@
             </a:pPr>
             <a:r>
               <a:rPr lang="en-US" dirty="0"/>
-              <a:t>LS</a:t>
-            </a:r>
-          </a:p>
-        </p:txBody>
-      </p:sp>
-      <p:sp>
-        <p:nvSpPr>
-          <p:cNvPr id="7" name="TextBox 6">
+              <a:t>HER (conditioned on effort)</a:t>
+            </a:r>
+          </a:p>
+        </p:txBody>
+      </p:sp>
+      <p:sp>
+        <p:nvSpPr>
+          <p:cNvPr id="12" name="TextBox 11">
             <a:extLst>
               <a:ext uri="{FF2B5EF4-FFF2-40B4-BE49-F238E27FC236}">
-                <a16:creationId xmlns:a16="http://schemas.microsoft.com/office/drawing/2014/main" id="{251AE748-36B3-4087-B46E-6DAB79A5117A}"/>
+                <a16:creationId xmlns:a16="http://schemas.microsoft.com/office/drawing/2014/main" id="{91FC76D7-C9CE-467C-BE36-D4A716E0ABC8}"/>
               </a:ext>
             </a:extLst>
           </p:cNvPr>
@@ -4735,8 +6383,8 @@
         </p:nvSpPr>
         <p:spPr>
           <a:xfrm>
-            <a:off x="5266375" y="1438827"/>
-            <a:ext cx="2609849" cy="1200329"/>
+            <a:off x="454342" y="2055018"/>
+            <a:ext cx="7698858" cy="646331"/>
           </a:xfrm>
           <a:prstGeom prst="rect">
             <a:avLst/>
@@ -4751,17 +6399,17 @@
           <a:p>
             <a:r>
               <a:rPr lang="en-US" dirty="0"/>
-              <a:t>Logistic, a50/slope parameterization. Scale to 1 by dividing by max (not differentiable)</a:t>
+              <a:t>Baranov catch equation assuming discrete fishing mortality (pulse fishery that occurs at the beginning of the year.</a:t>
             </a:r>
           </a:p>
         </p:txBody>
       </p:sp>
       <p:pic>
         <p:nvPicPr>
-          <p:cNvPr id="10" name="Picture 9">
+          <p:cNvPr id="5" name="Picture 4">
             <a:extLst>
               <a:ext uri="{FF2B5EF4-FFF2-40B4-BE49-F238E27FC236}">
-                <a16:creationId xmlns:a16="http://schemas.microsoft.com/office/drawing/2014/main" id="{16A67F07-95E7-4A1F-B717-E78DCB58CF95}"/>
+                <a16:creationId xmlns:a16="http://schemas.microsoft.com/office/drawing/2014/main" id="{FF6AADED-401C-40D0-BCF6-18055F41316E}"/>
               </a:ext>
             </a:extLst>
           </p:cNvPr>
@@ -4778,20 +6426,466 @@
         </p:blipFill>
         <p:spPr>
           <a:xfrm>
-            <a:off x="454342" y="1444034"/>
-            <a:ext cx="4574858" cy="2783305"/>
+            <a:off x="454342" y="3055804"/>
+            <a:ext cx="7698858" cy="3091667"/>
           </a:xfrm>
           <a:prstGeom prst="rect">
             <a:avLst/>
           </a:prstGeom>
         </p:spPr>
       </p:pic>
+    </p:spTree>
+    <p:extLst>
+      <p:ext uri="{BB962C8B-B14F-4D97-AF65-F5344CB8AC3E}">
+        <p14:creationId xmlns:p14="http://schemas.microsoft.com/office/powerpoint/2010/main" val="23394652"/>
+      </p:ext>
+    </p:extLst>
+  </p:cSld>
+  <p:clrMapOvr>
+    <a:masterClrMapping/>
+  </p:clrMapOvr>
+</p:sld>
+</file>
+
+<file path=ppt/slides/slide6.xml><?xml version="1.0" encoding="utf-8"?>
+<p:sld xmlns:a="http://schemas.openxmlformats.org/drawingml/2006/main" xmlns:r="http://schemas.openxmlformats.org/officeDocument/2006/relationships" xmlns:p="http://schemas.openxmlformats.org/presentationml/2006/main">
+  <p:cSld>
+    <p:spTree>
+      <p:nvGrpSpPr>
+        <p:cNvPr id="1" name=""/>
+        <p:cNvGrpSpPr/>
+        <p:nvPr/>
+      </p:nvGrpSpPr>
+      <p:grpSpPr>
+        <a:xfrm>
+          <a:off x="0" y="0"/>
+          <a:ext cx="0" cy="0"/>
+          <a:chOff x="0" y="0"/>
+          <a:chExt cx="0" cy="0"/>
+        </a:xfrm>
+      </p:grpSpPr>
+      <p:sp>
+        <p:nvSpPr>
+          <p:cNvPr id="2" name="Title 1">
+            <a:extLst>
+              <a:ext uri="{FF2B5EF4-FFF2-40B4-BE49-F238E27FC236}">
+                <a16:creationId xmlns:a16="http://schemas.microsoft.com/office/drawing/2014/main" id="{A2DCAC96-E1FD-44FF-8A96-717F504C6320}"/>
+              </a:ext>
+            </a:extLst>
+          </p:cNvPr>
+          <p:cNvSpPr>
+            <a:spLocks noGrp="1"/>
+          </p:cNvSpPr>
+          <p:nvPr>
+            <p:ph type="title"/>
+          </p:nvPr>
+        </p:nvSpPr>
+        <p:spPr>
+          <a:xfrm>
+            <a:off x="454339" y="115130"/>
+            <a:ext cx="8675370" cy="795865"/>
+          </a:xfrm>
+        </p:spPr>
+        <p:txBody>
+          <a:bodyPr>
+            <a:noAutofit/>
+          </a:bodyPr>
+          <a:lstStyle/>
+          <a:p>
+            <a:r>
+              <a:rPr lang="en-US" sz="4000" dirty="0"/>
+              <a:t>Spawning/mature numbers and biomass</a:t>
+            </a:r>
+          </a:p>
+        </p:txBody>
+      </p:sp>
+      <p:sp>
+        <p:nvSpPr>
+          <p:cNvPr id="3" name="Content Placeholder 2">
+            <a:extLst>
+              <a:ext uri="{FF2B5EF4-FFF2-40B4-BE49-F238E27FC236}">
+                <a16:creationId xmlns:a16="http://schemas.microsoft.com/office/drawing/2014/main" id="{BB5B9591-6BBC-4B0D-8085-50D5036BBADE}"/>
+              </a:ext>
+            </a:extLst>
+          </p:cNvPr>
+          <p:cNvSpPr>
+            <a:spLocks noGrp="1"/>
+          </p:cNvSpPr>
+          <p:nvPr>
+            <p:ph idx="1"/>
+          </p:nvPr>
+        </p:nvSpPr>
+        <p:spPr>
+          <a:xfrm>
+            <a:off x="454338" y="4099129"/>
+            <a:ext cx="4337685" cy="523875"/>
+          </a:xfrm>
+        </p:spPr>
+        <p:txBody>
+          <a:bodyPr/>
+          <a:lstStyle/>
+          <a:p>
+            <a:pPr marL="0" indent="0">
+              <a:buNone/>
+            </a:pPr>
+            <a:r>
+              <a:rPr lang="en-US" dirty="0"/>
+              <a:t>HER</a:t>
+            </a:r>
+          </a:p>
+        </p:txBody>
+      </p:sp>
+      <p:sp>
+        <p:nvSpPr>
+          <p:cNvPr id="4" name="Content Placeholder 2">
+            <a:extLst>
+              <a:ext uri="{FF2B5EF4-FFF2-40B4-BE49-F238E27FC236}">
+                <a16:creationId xmlns:a16="http://schemas.microsoft.com/office/drawing/2014/main" id="{7EC84657-5B91-4347-81F3-1B680908C4DF}"/>
+              </a:ext>
+            </a:extLst>
+          </p:cNvPr>
+          <p:cNvSpPr txBox="1">
+            <a:spLocks/>
+          </p:cNvSpPr>
+          <p:nvPr/>
+        </p:nvSpPr>
+        <p:spPr>
+          <a:xfrm>
+            <a:off x="454337" y="739471"/>
+            <a:ext cx="4337685" cy="523875"/>
+          </a:xfrm>
+          <a:prstGeom prst="rect">
+            <a:avLst/>
+          </a:prstGeom>
+        </p:spPr>
+        <p:txBody>
+          <a:bodyPr vert="horz" lIns="91440" tIns="45720" rIns="91440" bIns="45720" rtlCol="0">
+            <a:normAutofit/>
+          </a:bodyPr>
+          <a:lstStyle>
+            <a:lvl1pPr marL="251460" indent="-251460" algn="l" defTabSz="1005840" rtl="0" eaLnBrk="1" latinLnBrk="0" hangingPunct="1">
+              <a:lnSpc>
+                <a:spcPct val="90000"/>
+              </a:lnSpc>
+              <a:spcBef>
+                <a:spcPts val="1100"/>
+              </a:spcBef>
+              <a:buFont typeface="Arial" panose="020B0604020202020204" pitchFamily="34" charset="0"/>
+              <a:buChar char="•"/>
+              <a:defRPr sz="3080" kern="1200">
+                <a:solidFill>
+                  <a:schemeClr val="tx1"/>
+                </a:solidFill>
+                <a:latin typeface="+mn-lt"/>
+                <a:ea typeface="+mn-ea"/>
+                <a:cs typeface="+mn-cs"/>
+              </a:defRPr>
+            </a:lvl1pPr>
+            <a:lvl2pPr marL="754380" indent="-251460" algn="l" defTabSz="1005840" rtl="0" eaLnBrk="1" latinLnBrk="0" hangingPunct="1">
+              <a:lnSpc>
+                <a:spcPct val="90000"/>
+              </a:lnSpc>
+              <a:spcBef>
+                <a:spcPts val="550"/>
+              </a:spcBef>
+              <a:buFont typeface="Arial" panose="020B0604020202020204" pitchFamily="34" charset="0"/>
+              <a:buChar char="•"/>
+              <a:defRPr sz="2640" kern="1200">
+                <a:solidFill>
+                  <a:schemeClr val="tx1"/>
+                </a:solidFill>
+                <a:latin typeface="+mn-lt"/>
+                <a:ea typeface="+mn-ea"/>
+                <a:cs typeface="+mn-cs"/>
+              </a:defRPr>
+            </a:lvl2pPr>
+            <a:lvl3pPr marL="1257300" indent="-251460" algn="l" defTabSz="1005840" rtl="0" eaLnBrk="1" latinLnBrk="0" hangingPunct="1">
+              <a:lnSpc>
+                <a:spcPct val="90000"/>
+              </a:lnSpc>
+              <a:spcBef>
+                <a:spcPts val="550"/>
+              </a:spcBef>
+              <a:buFont typeface="Arial" panose="020B0604020202020204" pitchFamily="34" charset="0"/>
+              <a:buChar char="•"/>
+              <a:defRPr sz="2200" kern="1200">
+                <a:solidFill>
+                  <a:schemeClr val="tx1"/>
+                </a:solidFill>
+                <a:latin typeface="+mn-lt"/>
+                <a:ea typeface="+mn-ea"/>
+                <a:cs typeface="+mn-cs"/>
+              </a:defRPr>
+            </a:lvl3pPr>
+            <a:lvl4pPr marL="1760220" indent="-251460" algn="l" defTabSz="1005840" rtl="0" eaLnBrk="1" latinLnBrk="0" hangingPunct="1">
+              <a:lnSpc>
+                <a:spcPct val="90000"/>
+              </a:lnSpc>
+              <a:spcBef>
+                <a:spcPts val="550"/>
+              </a:spcBef>
+              <a:buFont typeface="Arial" panose="020B0604020202020204" pitchFamily="34" charset="0"/>
+              <a:buChar char="•"/>
+              <a:defRPr sz="1980" kern="1200">
+                <a:solidFill>
+                  <a:schemeClr val="tx1"/>
+                </a:solidFill>
+                <a:latin typeface="+mn-lt"/>
+                <a:ea typeface="+mn-ea"/>
+                <a:cs typeface="+mn-cs"/>
+              </a:defRPr>
+            </a:lvl4pPr>
+            <a:lvl5pPr marL="2263140" indent="-251460" algn="l" defTabSz="1005840" rtl="0" eaLnBrk="1" latinLnBrk="0" hangingPunct="1">
+              <a:lnSpc>
+                <a:spcPct val="90000"/>
+              </a:lnSpc>
+              <a:spcBef>
+                <a:spcPts val="550"/>
+              </a:spcBef>
+              <a:buFont typeface="Arial" panose="020B0604020202020204" pitchFamily="34" charset="0"/>
+              <a:buChar char="•"/>
+              <a:defRPr sz="1980" kern="1200">
+                <a:solidFill>
+                  <a:schemeClr val="tx1"/>
+                </a:solidFill>
+                <a:latin typeface="+mn-lt"/>
+                <a:ea typeface="+mn-ea"/>
+                <a:cs typeface="+mn-cs"/>
+              </a:defRPr>
+            </a:lvl5pPr>
+            <a:lvl6pPr marL="2766060" indent="-251460" algn="l" defTabSz="1005840" rtl="0" eaLnBrk="1" latinLnBrk="0" hangingPunct="1">
+              <a:lnSpc>
+                <a:spcPct val="90000"/>
+              </a:lnSpc>
+              <a:spcBef>
+                <a:spcPts val="550"/>
+              </a:spcBef>
+              <a:buFont typeface="Arial" panose="020B0604020202020204" pitchFamily="34" charset="0"/>
+              <a:buChar char="•"/>
+              <a:defRPr sz="1980" kern="1200">
+                <a:solidFill>
+                  <a:schemeClr val="tx1"/>
+                </a:solidFill>
+                <a:latin typeface="+mn-lt"/>
+                <a:ea typeface="+mn-ea"/>
+                <a:cs typeface="+mn-cs"/>
+              </a:defRPr>
+            </a:lvl6pPr>
+            <a:lvl7pPr marL="3268980" indent="-251460" algn="l" defTabSz="1005840" rtl="0" eaLnBrk="1" latinLnBrk="0" hangingPunct="1">
+              <a:lnSpc>
+                <a:spcPct val="90000"/>
+              </a:lnSpc>
+              <a:spcBef>
+                <a:spcPts val="550"/>
+              </a:spcBef>
+              <a:buFont typeface="Arial" panose="020B0604020202020204" pitchFamily="34" charset="0"/>
+              <a:buChar char="•"/>
+              <a:defRPr sz="1980" kern="1200">
+                <a:solidFill>
+                  <a:schemeClr val="tx1"/>
+                </a:solidFill>
+                <a:latin typeface="+mn-lt"/>
+                <a:ea typeface="+mn-ea"/>
+                <a:cs typeface="+mn-cs"/>
+              </a:defRPr>
+            </a:lvl7pPr>
+            <a:lvl8pPr marL="3771900" indent="-251460" algn="l" defTabSz="1005840" rtl="0" eaLnBrk="1" latinLnBrk="0" hangingPunct="1">
+              <a:lnSpc>
+                <a:spcPct val="90000"/>
+              </a:lnSpc>
+              <a:spcBef>
+                <a:spcPts val="550"/>
+              </a:spcBef>
+              <a:buFont typeface="Arial" panose="020B0604020202020204" pitchFamily="34" charset="0"/>
+              <a:buChar char="•"/>
+              <a:defRPr sz="1980" kern="1200">
+                <a:solidFill>
+                  <a:schemeClr val="tx1"/>
+                </a:solidFill>
+                <a:latin typeface="+mn-lt"/>
+                <a:ea typeface="+mn-ea"/>
+                <a:cs typeface="+mn-cs"/>
+              </a:defRPr>
+            </a:lvl8pPr>
+            <a:lvl9pPr marL="4274820" indent="-251460" algn="l" defTabSz="1005840" rtl="0" eaLnBrk="1" latinLnBrk="0" hangingPunct="1">
+              <a:lnSpc>
+                <a:spcPct val="90000"/>
+              </a:lnSpc>
+              <a:spcBef>
+                <a:spcPts val="550"/>
+              </a:spcBef>
+              <a:buFont typeface="Arial" panose="020B0604020202020204" pitchFamily="34" charset="0"/>
+              <a:buChar char="•"/>
+              <a:defRPr sz="1980" kern="1200">
+                <a:solidFill>
+                  <a:schemeClr val="tx1"/>
+                </a:solidFill>
+                <a:latin typeface="+mn-lt"/>
+                <a:ea typeface="+mn-ea"/>
+                <a:cs typeface="+mn-cs"/>
+              </a:defRPr>
+            </a:lvl9pPr>
+          </a:lstStyle>
+          <a:p>
+            <a:pPr marL="0" indent="0">
+              <a:buFont typeface="Arial" panose="020B0604020202020204" pitchFamily="34" charset="0"/>
+              <a:buNone/>
+            </a:pPr>
+            <a:r>
+              <a:rPr lang="en-US" dirty="0"/>
+              <a:t>LS</a:t>
+            </a:r>
+          </a:p>
+        </p:txBody>
+      </p:sp>
+      <p:sp>
+        <p:nvSpPr>
+          <p:cNvPr id="7" name="TextBox 6">
+            <a:extLst>
+              <a:ext uri="{FF2B5EF4-FFF2-40B4-BE49-F238E27FC236}">
+                <a16:creationId xmlns:a16="http://schemas.microsoft.com/office/drawing/2014/main" id="{251AE748-36B3-4087-B46E-6DAB79A5117A}"/>
+              </a:ext>
+            </a:extLst>
+          </p:cNvPr>
+          <p:cNvSpPr txBox="1"/>
+          <p:nvPr/>
+        </p:nvSpPr>
+        <p:spPr>
+          <a:xfrm>
+            <a:off x="5966463" y="1398715"/>
+            <a:ext cx="2609849" cy="2031325"/>
+          </a:xfrm>
+          <a:prstGeom prst="rect">
+            <a:avLst/>
+          </a:prstGeom>
+          <a:noFill/>
+        </p:spPr>
+        <p:txBody>
+          <a:bodyPr wrap="square" rtlCol="0">
+            <a:spAutoFit/>
+          </a:bodyPr>
+          <a:lstStyle/>
+          <a:p>
+            <a:r>
+              <a:rPr lang="en-US" dirty="0"/>
+              <a:t>Assumes catch in 100% mature. Uses </a:t>
+            </a:r>
+            <a:r>
+              <a:rPr lang="en-US" dirty="0" err="1"/>
+              <a:t>spawner</a:t>
+            </a:r>
+            <a:r>
+              <a:rPr lang="en-US" dirty="0"/>
+              <a:t> weight-at-age.</a:t>
+            </a:r>
+          </a:p>
+          <a:p>
+            <a:endParaRPr lang="en-US" dirty="0"/>
+          </a:p>
+          <a:p>
+            <a:r>
+              <a:rPr lang="en-US" dirty="0"/>
+              <a:t>Total mature biomass uses both catch and </a:t>
+            </a:r>
+            <a:r>
+              <a:rPr lang="en-US" dirty="0" err="1"/>
+              <a:t>spawner</a:t>
+            </a:r>
+            <a:r>
+              <a:rPr lang="en-US" dirty="0"/>
+              <a:t> weight-at-age.</a:t>
+            </a:r>
+          </a:p>
+        </p:txBody>
+      </p:sp>
+      <p:sp>
+        <p:nvSpPr>
+          <p:cNvPr id="8" name="TextBox 7">
+            <a:extLst>
+              <a:ext uri="{FF2B5EF4-FFF2-40B4-BE49-F238E27FC236}">
+                <a16:creationId xmlns:a16="http://schemas.microsoft.com/office/drawing/2014/main" id="{25CA6CB8-B61E-4F39-B9A1-93B57448F711}"/>
+              </a:ext>
+            </a:extLst>
+          </p:cNvPr>
+          <p:cNvSpPr txBox="1"/>
+          <p:nvPr/>
+        </p:nvSpPr>
+        <p:spPr>
+          <a:xfrm>
+            <a:off x="5966463" y="4774572"/>
+            <a:ext cx="3081844" cy="2308324"/>
+          </a:xfrm>
+          <a:prstGeom prst="rect">
+            <a:avLst/>
+          </a:prstGeom>
+          <a:noFill/>
+        </p:spPr>
+        <p:txBody>
+          <a:bodyPr wrap="square" rtlCol="0">
+            <a:spAutoFit/>
+          </a:bodyPr>
+          <a:lstStyle/>
+          <a:p>
+            <a:r>
+              <a:rPr lang="en-US" dirty="0"/>
+              <a:t>Takes difference between total population and catch before applying maturity curve. Will not run when assuming catch is 100% mature.</a:t>
+            </a:r>
+          </a:p>
+          <a:p>
+            <a:endParaRPr lang="en-US" dirty="0"/>
+          </a:p>
+          <a:p>
+            <a:r>
+              <a:rPr lang="en-US" dirty="0"/>
+              <a:t>Total mature biomass uses only </a:t>
+            </a:r>
+            <a:r>
+              <a:rPr lang="en-US" dirty="0" err="1"/>
+              <a:t>spawner</a:t>
+            </a:r>
+            <a:r>
+              <a:rPr lang="en-US" dirty="0"/>
+              <a:t> weight-at-age.</a:t>
+            </a:r>
+          </a:p>
+        </p:txBody>
+      </p:sp>
       <p:pic>
         <p:nvPicPr>
-          <p:cNvPr id="12" name="Picture 11">
+          <p:cNvPr id="10" name="Picture 9">
             <a:extLst>
               <a:ext uri="{FF2B5EF4-FFF2-40B4-BE49-F238E27FC236}">
-                <a16:creationId xmlns:a16="http://schemas.microsoft.com/office/drawing/2014/main" id="{A2376DB9-5582-47F3-AA77-54C1BF54982C}"/>
+                <a16:creationId xmlns:a16="http://schemas.microsoft.com/office/drawing/2014/main" id="{3259408F-AF97-49F1-95BE-20EB8C30C56F}"/>
+              </a:ext>
+            </a:extLst>
+          </p:cNvPr>
+          <p:cNvPicPr>
+            <a:picLocks noChangeAspect="1"/>
+          </p:cNvPicPr>
+          <p:nvPr/>
+        </p:nvPicPr>
+        <p:blipFill>
+          <a:blip r:embed="rId2"/>
+          <a:stretch>
+            <a:fillRect/>
+          </a:stretch>
+        </p:blipFill>
+        <p:spPr>
+          <a:xfrm>
+            <a:off x="454337" y="1196496"/>
+            <a:ext cx="4684748" cy="2622853"/>
+          </a:xfrm>
+          <a:prstGeom prst="rect">
+            <a:avLst/>
+          </a:prstGeom>
+        </p:spPr>
+      </p:pic>
+      <p:pic>
+        <p:nvPicPr>
+          <p:cNvPr id="11" name="Picture 10">
+            <a:extLst>
+              <a:ext uri="{FF2B5EF4-FFF2-40B4-BE49-F238E27FC236}">
+                <a16:creationId xmlns:a16="http://schemas.microsoft.com/office/drawing/2014/main" id="{FE2B985E-6205-4740-A381-1F2062A95BAA}"/>
               </a:ext>
             </a:extLst>
           </p:cNvPr>
@@ -4808,8 +6902,8 @@
         </p:blipFill>
         <p:spPr>
           <a:xfrm>
-            <a:off x="454342" y="4867872"/>
-            <a:ext cx="4812035" cy="1510239"/>
+            <a:off x="454336" y="4572993"/>
+            <a:ext cx="4898242" cy="3084277"/>
           </a:xfrm>
           <a:prstGeom prst="rect">
             <a:avLst/>
@@ -4818,10 +6912,10 @@
       </p:pic>
       <p:pic>
         <p:nvPicPr>
-          <p:cNvPr id="13" name="Picture 12">
+          <p:cNvPr id="12" name="Picture 11">
             <a:extLst>
               <a:ext uri="{FF2B5EF4-FFF2-40B4-BE49-F238E27FC236}">
-                <a16:creationId xmlns:a16="http://schemas.microsoft.com/office/drawing/2014/main" id="{CFE50F56-8B7B-4C60-B13F-3C235793E2DD}"/>
+                <a16:creationId xmlns:a16="http://schemas.microsoft.com/office/drawing/2014/main" id="{449A5CF8-9A4E-4A54-AC37-483ADA0A5FAF}"/>
               </a:ext>
             </a:extLst>
           </p:cNvPr>
@@ -4838,20 +6932,322 @@
         </p:blipFill>
         <p:spPr>
           <a:xfrm>
-            <a:off x="454341" y="6513005"/>
-            <a:ext cx="4574858" cy="845518"/>
+            <a:off x="454337" y="3886200"/>
+            <a:ext cx="8675370" cy="230633"/>
           </a:xfrm>
           <a:prstGeom prst="rect">
             <a:avLst/>
           </a:prstGeom>
         </p:spPr>
       </p:pic>
-      <p:sp>
-        <p:nvSpPr>
-          <p:cNvPr id="14" name="TextBox 13">
+    </p:spTree>
+    <p:extLst>
+      <p:ext uri="{BB962C8B-B14F-4D97-AF65-F5344CB8AC3E}">
+        <p14:creationId xmlns:p14="http://schemas.microsoft.com/office/powerpoint/2010/main" val="2826126576"/>
+      </p:ext>
+    </p:extLst>
+  </p:cSld>
+  <p:clrMapOvr>
+    <a:masterClrMapping/>
+  </p:clrMapOvr>
+</p:sld>
+</file>
+
+<file path=ppt/slides/slide7.xml><?xml version="1.0" encoding="utf-8"?>
+<p:sld xmlns:a="http://schemas.openxmlformats.org/drawingml/2006/main" xmlns:r="http://schemas.openxmlformats.org/officeDocument/2006/relationships" xmlns:p="http://schemas.openxmlformats.org/presentationml/2006/main">
+  <p:cSld>
+    <p:spTree>
+      <p:nvGrpSpPr>
+        <p:cNvPr id="1" name=""/>
+        <p:cNvGrpSpPr/>
+        <p:nvPr/>
+      </p:nvGrpSpPr>
+      <p:grpSpPr>
+        <a:xfrm>
+          <a:off x="0" y="0"/>
+          <a:ext cx="0" cy="0"/>
+          <a:chOff x="0" y="0"/>
+          <a:chExt cx="0" cy="0"/>
+        </a:xfrm>
+      </p:grpSpPr>
+      <p:sp>
+        <p:nvSpPr>
+          <p:cNvPr id="2" name="Title 1">
             <a:extLst>
               <a:ext uri="{FF2B5EF4-FFF2-40B4-BE49-F238E27FC236}">
-                <a16:creationId xmlns:a16="http://schemas.microsoft.com/office/drawing/2014/main" id="{303F9EF6-35EB-4524-85A2-7E0729B26AD2}"/>
+                <a16:creationId xmlns:a16="http://schemas.microsoft.com/office/drawing/2014/main" id="{A2DCAC96-E1FD-44FF-8A96-717F504C6320}"/>
+              </a:ext>
+            </a:extLst>
+          </p:cNvPr>
+          <p:cNvSpPr>
+            <a:spLocks noGrp="1"/>
+          </p:cNvSpPr>
+          <p:nvPr>
+            <p:ph type="title"/>
+          </p:nvPr>
+        </p:nvSpPr>
+        <p:spPr>
+          <a:xfrm>
+            <a:off x="454342" y="359040"/>
+            <a:ext cx="8675370" cy="795865"/>
+          </a:xfrm>
+        </p:spPr>
+        <p:txBody>
+          <a:bodyPr/>
+          <a:lstStyle/>
+          <a:p>
+            <a:r>
+              <a:rPr lang="en-US" dirty="0"/>
+              <a:t>Egg deposition</a:t>
+            </a:r>
+          </a:p>
+        </p:txBody>
+      </p:sp>
+      <p:sp>
+        <p:nvSpPr>
+          <p:cNvPr id="3" name="Content Placeholder 2">
+            <a:extLst>
+              <a:ext uri="{FF2B5EF4-FFF2-40B4-BE49-F238E27FC236}">
+                <a16:creationId xmlns:a16="http://schemas.microsoft.com/office/drawing/2014/main" id="{BB5B9591-6BBC-4B0D-8085-50D5036BBADE}"/>
+              </a:ext>
+            </a:extLst>
+          </p:cNvPr>
+          <p:cNvSpPr>
+            <a:spLocks noGrp="1"/>
+          </p:cNvSpPr>
+          <p:nvPr>
+            <p:ph idx="1"/>
+          </p:nvPr>
+        </p:nvSpPr>
+        <p:spPr>
+          <a:xfrm>
+            <a:off x="454342" y="4124324"/>
+            <a:ext cx="4337685" cy="523875"/>
+          </a:xfrm>
+        </p:spPr>
+        <p:txBody>
+          <a:bodyPr/>
+          <a:lstStyle/>
+          <a:p>
+            <a:pPr marL="0" indent="0">
+              <a:buNone/>
+            </a:pPr>
+            <a:r>
+              <a:rPr lang="en-US" dirty="0"/>
+              <a:t>HER</a:t>
+            </a:r>
+          </a:p>
+        </p:txBody>
+      </p:sp>
+      <p:sp>
+        <p:nvSpPr>
+          <p:cNvPr id="4" name="Content Placeholder 2">
+            <a:extLst>
+              <a:ext uri="{FF2B5EF4-FFF2-40B4-BE49-F238E27FC236}">
+                <a16:creationId xmlns:a16="http://schemas.microsoft.com/office/drawing/2014/main" id="{7EC84657-5B91-4347-81F3-1B680908C4DF}"/>
+              </a:ext>
+            </a:extLst>
+          </p:cNvPr>
+          <p:cNvSpPr txBox="1">
+            <a:spLocks/>
+          </p:cNvSpPr>
+          <p:nvPr/>
+        </p:nvSpPr>
+        <p:spPr>
+          <a:xfrm>
+            <a:off x="454342" y="1343024"/>
+            <a:ext cx="4337685" cy="523875"/>
+          </a:xfrm>
+          <a:prstGeom prst="rect">
+            <a:avLst/>
+          </a:prstGeom>
+        </p:spPr>
+        <p:txBody>
+          <a:bodyPr vert="horz" lIns="91440" tIns="45720" rIns="91440" bIns="45720" rtlCol="0">
+            <a:normAutofit/>
+          </a:bodyPr>
+          <a:lstStyle>
+            <a:lvl1pPr marL="251460" indent="-251460" algn="l" defTabSz="1005840" rtl="0" eaLnBrk="1" latinLnBrk="0" hangingPunct="1">
+              <a:lnSpc>
+                <a:spcPct val="90000"/>
+              </a:lnSpc>
+              <a:spcBef>
+                <a:spcPts val="1100"/>
+              </a:spcBef>
+              <a:buFont typeface="Arial" panose="020B0604020202020204" pitchFamily="34" charset="0"/>
+              <a:buChar char="•"/>
+              <a:defRPr sz="3080" kern="1200">
+                <a:solidFill>
+                  <a:schemeClr val="tx1"/>
+                </a:solidFill>
+                <a:latin typeface="+mn-lt"/>
+                <a:ea typeface="+mn-ea"/>
+                <a:cs typeface="+mn-cs"/>
+              </a:defRPr>
+            </a:lvl1pPr>
+            <a:lvl2pPr marL="754380" indent="-251460" algn="l" defTabSz="1005840" rtl="0" eaLnBrk="1" latinLnBrk="0" hangingPunct="1">
+              <a:lnSpc>
+                <a:spcPct val="90000"/>
+              </a:lnSpc>
+              <a:spcBef>
+                <a:spcPts val="550"/>
+              </a:spcBef>
+              <a:buFont typeface="Arial" panose="020B0604020202020204" pitchFamily="34" charset="0"/>
+              <a:buChar char="•"/>
+              <a:defRPr sz="2640" kern="1200">
+                <a:solidFill>
+                  <a:schemeClr val="tx1"/>
+                </a:solidFill>
+                <a:latin typeface="+mn-lt"/>
+                <a:ea typeface="+mn-ea"/>
+                <a:cs typeface="+mn-cs"/>
+              </a:defRPr>
+            </a:lvl2pPr>
+            <a:lvl3pPr marL="1257300" indent="-251460" algn="l" defTabSz="1005840" rtl="0" eaLnBrk="1" latinLnBrk="0" hangingPunct="1">
+              <a:lnSpc>
+                <a:spcPct val="90000"/>
+              </a:lnSpc>
+              <a:spcBef>
+                <a:spcPts val="550"/>
+              </a:spcBef>
+              <a:buFont typeface="Arial" panose="020B0604020202020204" pitchFamily="34" charset="0"/>
+              <a:buChar char="•"/>
+              <a:defRPr sz="2200" kern="1200">
+                <a:solidFill>
+                  <a:schemeClr val="tx1"/>
+                </a:solidFill>
+                <a:latin typeface="+mn-lt"/>
+                <a:ea typeface="+mn-ea"/>
+                <a:cs typeface="+mn-cs"/>
+              </a:defRPr>
+            </a:lvl3pPr>
+            <a:lvl4pPr marL="1760220" indent="-251460" algn="l" defTabSz="1005840" rtl="0" eaLnBrk="1" latinLnBrk="0" hangingPunct="1">
+              <a:lnSpc>
+                <a:spcPct val="90000"/>
+              </a:lnSpc>
+              <a:spcBef>
+                <a:spcPts val="550"/>
+              </a:spcBef>
+              <a:buFont typeface="Arial" panose="020B0604020202020204" pitchFamily="34" charset="0"/>
+              <a:buChar char="•"/>
+              <a:defRPr sz="1980" kern="1200">
+                <a:solidFill>
+                  <a:schemeClr val="tx1"/>
+                </a:solidFill>
+                <a:latin typeface="+mn-lt"/>
+                <a:ea typeface="+mn-ea"/>
+                <a:cs typeface="+mn-cs"/>
+              </a:defRPr>
+            </a:lvl4pPr>
+            <a:lvl5pPr marL="2263140" indent="-251460" algn="l" defTabSz="1005840" rtl="0" eaLnBrk="1" latinLnBrk="0" hangingPunct="1">
+              <a:lnSpc>
+                <a:spcPct val="90000"/>
+              </a:lnSpc>
+              <a:spcBef>
+                <a:spcPts val="550"/>
+              </a:spcBef>
+              <a:buFont typeface="Arial" panose="020B0604020202020204" pitchFamily="34" charset="0"/>
+              <a:buChar char="•"/>
+              <a:defRPr sz="1980" kern="1200">
+                <a:solidFill>
+                  <a:schemeClr val="tx1"/>
+                </a:solidFill>
+                <a:latin typeface="+mn-lt"/>
+                <a:ea typeface="+mn-ea"/>
+                <a:cs typeface="+mn-cs"/>
+              </a:defRPr>
+            </a:lvl5pPr>
+            <a:lvl6pPr marL="2766060" indent="-251460" algn="l" defTabSz="1005840" rtl="0" eaLnBrk="1" latinLnBrk="0" hangingPunct="1">
+              <a:lnSpc>
+                <a:spcPct val="90000"/>
+              </a:lnSpc>
+              <a:spcBef>
+                <a:spcPts val="550"/>
+              </a:spcBef>
+              <a:buFont typeface="Arial" panose="020B0604020202020204" pitchFamily="34" charset="0"/>
+              <a:buChar char="•"/>
+              <a:defRPr sz="1980" kern="1200">
+                <a:solidFill>
+                  <a:schemeClr val="tx1"/>
+                </a:solidFill>
+                <a:latin typeface="+mn-lt"/>
+                <a:ea typeface="+mn-ea"/>
+                <a:cs typeface="+mn-cs"/>
+              </a:defRPr>
+            </a:lvl6pPr>
+            <a:lvl7pPr marL="3268980" indent="-251460" algn="l" defTabSz="1005840" rtl="0" eaLnBrk="1" latinLnBrk="0" hangingPunct="1">
+              <a:lnSpc>
+                <a:spcPct val="90000"/>
+              </a:lnSpc>
+              <a:spcBef>
+                <a:spcPts val="550"/>
+              </a:spcBef>
+              <a:buFont typeface="Arial" panose="020B0604020202020204" pitchFamily="34" charset="0"/>
+              <a:buChar char="•"/>
+              <a:defRPr sz="1980" kern="1200">
+                <a:solidFill>
+                  <a:schemeClr val="tx1"/>
+                </a:solidFill>
+                <a:latin typeface="+mn-lt"/>
+                <a:ea typeface="+mn-ea"/>
+                <a:cs typeface="+mn-cs"/>
+              </a:defRPr>
+            </a:lvl7pPr>
+            <a:lvl8pPr marL="3771900" indent="-251460" algn="l" defTabSz="1005840" rtl="0" eaLnBrk="1" latinLnBrk="0" hangingPunct="1">
+              <a:lnSpc>
+                <a:spcPct val="90000"/>
+              </a:lnSpc>
+              <a:spcBef>
+                <a:spcPts val="550"/>
+              </a:spcBef>
+              <a:buFont typeface="Arial" panose="020B0604020202020204" pitchFamily="34" charset="0"/>
+              <a:buChar char="•"/>
+              <a:defRPr sz="1980" kern="1200">
+                <a:solidFill>
+                  <a:schemeClr val="tx1"/>
+                </a:solidFill>
+                <a:latin typeface="+mn-lt"/>
+                <a:ea typeface="+mn-ea"/>
+                <a:cs typeface="+mn-cs"/>
+              </a:defRPr>
+            </a:lvl8pPr>
+            <a:lvl9pPr marL="4274820" indent="-251460" algn="l" defTabSz="1005840" rtl="0" eaLnBrk="1" latinLnBrk="0" hangingPunct="1">
+              <a:lnSpc>
+                <a:spcPct val="90000"/>
+              </a:lnSpc>
+              <a:spcBef>
+                <a:spcPts val="550"/>
+              </a:spcBef>
+              <a:buFont typeface="Arial" panose="020B0604020202020204" pitchFamily="34" charset="0"/>
+              <a:buChar char="•"/>
+              <a:defRPr sz="1980" kern="1200">
+                <a:solidFill>
+                  <a:schemeClr val="tx1"/>
+                </a:solidFill>
+                <a:latin typeface="+mn-lt"/>
+                <a:ea typeface="+mn-ea"/>
+                <a:cs typeface="+mn-cs"/>
+              </a:defRPr>
+            </a:lvl9pPr>
+          </a:lstStyle>
+          <a:p>
+            <a:pPr marL="0" indent="0">
+              <a:buFont typeface="Arial" panose="020B0604020202020204" pitchFamily="34" charset="0"/>
+              <a:buNone/>
+            </a:pPr>
+            <a:r>
+              <a:rPr lang="en-US" dirty="0"/>
+              <a:t>LS</a:t>
+            </a:r>
+          </a:p>
+        </p:txBody>
+      </p:sp>
+      <p:sp>
+        <p:nvSpPr>
+          <p:cNvPr id="8" name="TextBox 7">
+            <a:extLst>
+              <a:ext uri="{FF2B5EF4-FFF2-40B4-BE49-F238E27FC236}">
+                <a16:creationId xmlns:a16="http://schemas.microsoft.com/office/drawing/2014/main" id="{25CA6CB8-B61E-4F39-B9A1-93B57448F711}"/>
               </a:ext>
             </a:extLst>
           </p:cNvPr>
@@ -4860,8 +7256,8 @@
         </p:nvSpPr>
         <p:spPr>
           <a:xfrm>
-            <a:off x="5553074" y="4867872"/>
-            <a:ext cx="2609849" cy="2308324"/>
+            <a:off x="5879991" y="1154905"/>
+            <a:ext cx="3186110" cy="369332"/>
           </a:xfrm>
           <a:prstGeom prst="rect">
             <a:avLst/>
@@ -4876,15 +7272,1011 @@
           <a:p>
             <a:r>
               <a:rPr lang="en-US" dirty="0"/>
-              <a:t>Logistic, a50/slope parameterization. Scale by taking difference of log selectivity and log mean selectivity (differentiable). Estimate in log space to keep values positive.</a:t>
-            </a:r>
-          </a:p>
-        </p:txBody>
-      </p:sp>
+              <a:t>Same equation in LS and HER</a:t>
+            </a:r>
+          </a:p>
+        </p:txBody>
+      </p:sp>
+      <p:pic>
+        <p:nvPicPr>
+          <p:cNvPr id="10" name="Picture 9">
+            <a:extLst>
+              <a:ext uri="{FF2B5EF4-FFF2-40B4-BE49-F238E27FC236}">
+                <a16:creationId xmlns:a16="http://schemas.microsoft.com/office/drawing/2014/main" id="{2A9ED0F4-C2AB-4D20-9FAE-2F6D93C25465}"/>
+              </a:ext>
+            </a:extLst>
+          </p:cNvPr>
+          <p:cNvPicPr>
+            <a:picLocks noChangeAspect="1"/>
+          </p:cNvPicPr>
+          <p:nvPr/>
+        </p:nvPicPr>
+        <p:blipFill>
+          <a:blip r:embed="rId2"/>
+          <a:stretch>
+            <a:fillRect/>
+          </a:stretch>
+        </p:blipFill>
+        <p:spPr>
+          <a:xfrm>
+            <a:off x="454342" y="1909110"/>
+            <a:ext cx="9236865" cy="2074354"/>
+          </a:xfrm>
+          <a:prstGeom prst="rect">
+            <a:avLst/>
+          </a:prstGeom>
+        </p:spPr>
+      </p:pic>
+      <p:pic>
+        <p:nvPicPr>
+          <p:cNvPr id="11" name="Picture 10">
+            <a:extLst>
+              <a:ext uri="{FF2B5EF4-FFF2-40B4-BE49-F238E27FC236}">
+                <a16:creationId xmlns:a16="http://schemas.microsoft.com/office/drawing/2014/main" id="{98C9D884-6ED9-4306-B925-BD30A04A4437}"/>
+              </a:ext>
+            </a:extLst>
+          </p:cNvPr>
+          <p:cNvPicPr>
+            <a:picLocks noChangeAspect="1"/>
+          </p:cNvPicPr>
+          <p:nvPr/>
+        </p:nvPicPr>
+        <p:blipFill>
+          <a:blip r:embed="rId3"/>
+          <a:stretch>
+            <a:fillRect/>
+          </a:stretch>
+        </p:blipFill>
+        <p:spPr>
+          <a:xfrm>
+            <a:off x="312417" y="6065054"/>
+            <a:ext cx="4424055" cy="421339"/>
+          </a:xfrm>
+          <a:prstGeom prst="rect">
+            <a:avLst/>
+          </a:prstGeom>
+        </p:spPr>
+      </p:pic>
+      <p:pic>
+        <p:nvPicPr>
+          <p:cNvPr id="12" name="Picture 11">
+            <a:extLst>
+              <a:ext uri="{FF2B5EF4-FFF2-40B4-BE49-F238E27FC236}">
+                <a16:creationId xmlns:a16="http://schemas.microsoft.com/office/drawing/2014/main" id="{80909560-0227-4F9B-94A8-A9BD7CFC461B}"/>
+              </a:ext>
+            </a:extLst>
+          </p:cNvPr>
+          <p:cNvPicPr>
+            <a:picLocks noChangeAspect="1"/>
+          </p:cNvPicPr>
+          <p:nvPr/>
+        </p:nvPicPr>
+        <p:blipFill>
+          <a:blip r:embed="rId4"/>
+          <a:stretch>
+            <a:fillRect/>
+          </a:stretch>
+        </p:blipFill>
+        <p:spPr>
+          <a:xfrm>
+            <a:off x="312417" y="4640405"/>
+            <a:ext cx="6949620" cy="1329907"/>
+          </a:xfrm>
+          <a:prstGeom prst="rect">
+            <a:avLst/>
+          </a:prstGeom>
+        </p:spPr>
+      </p:pic>
     </p:spTree>
     <p:extLst>
       <p:ext uri="{BB962C8B-B14F-4D97-AF65-F5344CB8AC3E}">
-        <p14:creationId xmlns:p14="http://schemas.microsoft.com/office/powerpoint/2010/main" val="2052303814"/>
+        <p14:creationId xmlns:p14="http://schemas.microsoft.com/office/powerpoint/2010/main" val="2061888064"/>
+      </p:ext>
+    </p:extLst>
+  </p:cSld>
+  <p:clrMapOvr>
+    <a:masterClrMapping/>
+  </p:clrMapOvr>
+</p:sld>
+</file>
+
+<file path=ppt/slides/slide8.xml><?xml version="1.0" encoding="utf-8"?>
+<p:sld xmlns:a="http://schemas.openxmlformats.org/drawingml/2006/main" xmlns:r="http://schemas.openxmlformats.org/officeDocument/2006/relationships" xmlns:p="http://schemas.openxmlformats.org/presentationml/2006/main">
+  <p:cSld>
+    <p:spTree>
+      <p:nvGrpSpPr>
+        <p:cNvPr id="1" name=""/>
+        <p:cNvGrpSpPr/>
+        <p:nvPr/>
+      </p:nvGrpSpPr>
+      <p:grpSpPr>
+        <a:xfrm>
+          <a:off x="0" y="0"/>
+          <a:ext cx="0" cy="0"/>
+          <a:chOff x="0" y="0"/>
+          <a:chExt cx="0" cy="0"/>
+        </a:xfrm>
+      </p:grpSpPr>
+      <p:sp>
+        <p:nvSpPr>
+          <p:cNvPr id="2" name="Title 1">
+            <a:extLst>
+              <a:ext uri="{FF2B5EF4-FFF2-40B4-BE49-F238E27FC236}">
+                <a16:creationId xmlns:a16="http://schemas.microsoft.com/office/drawing/2014/main" id="{A2DCAC96-E1FD-44FF-8A96-717F504C6320}"/>
+              </a:ext>
+            </a:extLst>
+          </p:cNvPr>
+          <p:cNvSpPr>
+            <a:spLocks noGrp="1"/>
+          </p:cNvSpPr>
+          <p:nvPr>
+            <p:ph type="title"/>
+          </p:nvPr>
+        </p:nvSpPr>
+        <p:spPr>
+          <a:xfrm>
+            <a:off x="454342" y="359040"/>
+            <a:ext cx="8675370" cy="795865"/>
+          </a:xfrm>
+        </p:spPr>
+        <p:txBody>
+          <a:bodyPr/>
+          <a:lstStyle/>
+          <a:p>
+            <a:r>
+              <a:rPr lang="en-US" dirty="0"/>
+              <a:t>Stock recruit function</a:t>
+            </a:r>
+          </a:p>
+        </p:txBody>
+      </p:sp>
+      <p:sp>
+        <p:nvSpPr>
+          <p:cNvPr id="3" name="Content Placeholder 2">
+            <a:extLst>
+              <a:ext uri="{FF2B5EF4-FFF2-40B4-BE49-F238E27FC236}">
+                <a16:creationId xmlns:a16="http://schemas.microsoft.com/office/drawing/2014/main" id="{BB5B9591-6BBC-4B0D-8085-50D5036BBADE}"/>
+              </a:ext>
+            </a:extLst>
+          </p:cNvPr>
+          <p:cNvSpPr>
+            <a:spLocks noGrp="1"/>
+          </p:cNvSpPr>
+          <p:nvPr>
+            <p:ph idx="1"/>
+          </p:nvPr>
+        </p:nvSpPr>
+        <p:spPr>
+          <a:xfrm>
+            <a:off x="398787" y="2191400"/>
+            <a:ext cx="4337685" cy="523875"/>
+          </a:xfrm>
+        </p:spPr>
+        <p:txBody>
+          <a:bodyPr/>
+          <a:lstStyle/>
+          <a:p>
+            <a:pPr marL="0" indent="0">
+              <a:buNone/>
+            </a:pPr>
+            <a:r>
+              <a:rPr lang="en-US" dirty="0"/>
+              <a:t>HER</a:t>
+            </a:r>
+          </a:p>
+        </p:txBody>
+      </p:sp>
+      <p:sp>
+        <p:nvSpPr>
+          <p:cNvPr id="4" name="Content Placeholder 2">
+            <a:extLst>
+              <a:ext uri="{FF2B5EF4-FFF2-40B4-BE49-F238E27FC236}">
+                <a16:creationId xmlns:a16="http://schemas.microsoft.com/office/drawing/2014/main" id="{7EC84657-5B91-4347-81F3-1B680908C4DF}"/>
+              </a:ext>
+            </a:extLst>
+          </p:cNvPr>
+          <p:cNvSpPr txBox="1">
+            <a:spLocks/>
+          </p:cNvSpPr>
+          <p:nvPr/>
+        </p:nvSpPr>
+        <p:spPr>
+          <a:xfrm>
+            <a:off x="398787" y="1154905"/>
+            <a:ext cx="4337685" cy="523875"/>
+          </a:xfrm>
+          <a:prstGeom prst="rect">
+            <a:avLst/>
+          </a:prstGeom>
+        </p:spPr>
+        <p:txBody>
+          <a:bodyPr vert="horz" lIns="91440" tIns="45720" rIns="91440" bIns="45720" rtlCol="0">
+            <a:normAutofit/>
+          </a:bodyPr>
+          <a:lstStyle>
+            <a:lvl1pPr marL="251460" indent="-251460" algn="l" defTabSz="1005840" rtl="0" eaLnBrk="1" latinLnBrk="0" hangingPunct="1">
+              <a:lnSpc>
+                <a:spcPct val="90000"/>
+              </a:lnSpc>
+              <a:spcBef>
+                <a:spcPts val="1100"/>
+              </a:spcBef>
+              <a:buFont typeface="Arial" panose="020B0604020202020204" pitchFamily="34" charset="0"/>
+              <a:buChar char="•"/>
+              <a:defRPr sz="3080" kern="1200">
+                <a:solidFill>
+                  <a:schemeClr val="tx1"/>
+                </a:solidFill>
+                <a:latin typeface="+mn-lt"/>
+                <a:ea typeface="+mn-ea"/>
+                <a:cs typeface="+mn-cs"/>
+              </a:defRPr>
+            </a:lvl1pPr>
+            <a:lvl2pPr marL="754380" indent="-251460" algn="l" defTabSz="1005840" rtl="0" eaLnBrk="1" latinLnBrk="0" hangingPunct="1">
+              <a:lnSpc>
+                <a:spcPct val="90000"/>
+              </a:lnSpc>
+              <a:spcBef>
+                <a:spcPts val="550"/>
+              </a:spcBef>
+              <a:buFont typeface="Arial" panose="020B0604020202020204" pitchFamily="34" charset="0"/>
+              <a:buChar char="•"/>
+              <a:defRPr sz="2640" kern="1200">
+                <a:solidFill>
+                  <a:schemeClr val="tx1"/>
+                </a:solidFill>
+                <a:latin typeface="+mn-lt"/>
+                <a:ea typeface="+mn-ea"/>
+                <a:cs typeface="+mn-cs"/>
+              </a:defRPr>
+            </a:lvl2pPr>
+            <a:lvl3pPr marL="1257300" indent="-251460" algn="l" defTabSz="1005840" rtl="0" eaLnBrk="1" latinLnBrk="0" hangingPunct="1">
+              <a:lnSpc>
+                <a:spcPct val="90000"/>
+              </a:lnSpc>
+              <a:spcBef>
+                <a:spcPts val="550"/>
+              </a:spcBef>
+              <a:buFont typeface="Arial" panose="020B0604020202020204" pitchFamily="34" charset="0"/>
+              <a:buChar char="•"/>
+              <a:defRPr sz="2200" kern="1200">
+                <a:solidFill>
+                  <a:schemeClr val="tx1"/>
+                </a:solidFill>
+                <a:latin typeface="+mn-lt"/>
+                <a:ea typeface="+mn-ea"/>
+                <a:cs typeface="+mn-cs"/>
+              </a:defRPr>
+            </a:lvl3pPr>
+            <a:lvl4pPr marL="1760220" indent="-251460" algn="l" defTabSz="1005840" rtl="0" eaLnBrk="1" latinLnBrk="0" hangingPunct="1">
+              <a:lnSpc>
+                <a:spcPct val="90000"/>
+              </a:lnSpc>
+              <a:spcBef>
+                <a:spcPts val="550"/>
+              </a:spcBef>
+              <a:buFont typeface="Arial" panose="020B0604020202020204" pitchFamily="34" charset="0"/>
+              <a:buChar char="•"/>
+              <a:defRPr sz="1980" kern="1200">
+                <a:solidFill>
+                  <a:schemeClr val="tx1"/>
+                </a:solidFill>
+                <a:latin typeface="+mn-lt"/>
+                <a:ea typeface="+mn-ea"/>
+                <a:cs typeface="+mn-cs"/>
+              </a:defRPr>
+            </a:lvl4pPr>
+            <a:lvl5pPr marL="2263140" indent="-251460" algn="l" defTabSz="1005840" rtl="0" eaLnBrk="1" latinLnBrk="0" hangingPunct="1">
+              <a:lnSpc>
+                <a:spcPct val="90000"/>
+              </a:lnSpc>
+              <a:spcBef>
+                <a:spcPts val="550"/>
+              </a:spcBef>
+              <a:buFont typeface="Arial" panose="020B0604020202020204" pitchFamily="34" charset="0"/>
+              <a:buChar char="•"/>
+              <a:defRPr sz="1980" kern="1200">
+                <a:solidFill>
+                  <a:schemeClr val="tx1"/>
+                </a:solidFill>
+                <a:latin typeface="+mn-lt"/>
+                <a:ea typeface="+mn-ea"/>
+                <a:cs typeface="+mn-cs"/>
+              </a:defRPr>
+            </a:lvl5pPr>
+            <a:lvl6pPr marL="2766060" indent="-251460" algn="l" defTabSz="1005840" rtl="0" eaLnBrk="1" latinLnBrk="0" hangingPunct="1">
+              <a:lnSpc>
+                <a:spcPct val="90000"/>
+              </a:lnSpc>
+              <a:spcBef>
+                <a:spcPts val="550"/>
+              </a:spcBef>
+              <a:buFont typeface="Arial" panose="020B0604020202020204" pitchFamily="34" charset="0"/>
+              <a:buChar char="•"/>
+              <a:defRPr sz="1980" kern="1200">
+                <a:solidFill>
+                  <a:schemeClr val="tx1"/>
+                </a:solidFill>
+                <a:latin typeface="+mn-lt"/>
+                <a:ea typeface="+mn-ea"/>
+                <a:cs typeface="+mn-cs"/>
+              </a:defRPr>
+            </a:lvl6pPr>
+            <a:lvl7pPr marL="3268980" indent="-251460" algn="l" defTabSz="1005840" rtl="0" eaLnBrk="1" latinLnBrk="0" hangingPunct="1">
+              <a:lnSpc>
+                <a:spcPct val="90000"/>
+              </a:lnSpc>
+              <a:spcBef>
+                <a:spcPts val="550"/>
+              </a:spcBef>
+              <a:buFont typeface="Arial" panose="020B0604020202020204" pitchFamily="34" charset="0"/>
+              <a:buChar char="•"/>
+              <a:defRPr sz="1980" kern="1200">
+                <a:solidFill>
+                  <a:schemeClr val="tx1"/>
+                </a:solidFill>
+                <a:latin typeface="+mn-lt"/>
+                <a:ea typeface="+mn-ea"/>
+                <a:cs typeface="+mn-cs"/>
+              </a:defRPr>
+            </a:lvl7pPr>
+            <a:lvl8pPr marL="3771900" indent="-251460" algn="l" defTabSz="1005840" rtl="0" eaLnBrk="1" latinLnBrk="0" hangingPunct="1">
+              <a:lnSpc>
+                <a:spcPct val="90000"/>
+              </a:lnSpc>
+              <a:spcBef>
+                <a:spcPts val="550"/>
+              </a:spcBef>
+              <a:buFont typeface="Arial" panose="020B0604020202020204" pitchFamily="34" charset="0"/>
+              <a:buChar char="•"/>
+              <a:defRPr sz="1980" kern="1200">
+                <a:solidFill>
+                  <a:schemeClr val="tx1"/>
+                </a:solidFill>
+                <a:latin typeface="+mn-lt"/>
+                <a:ea typeface="+mn-ea"/>
+                <a:cs typeface="+mn-cs"/>
+              </a:defRPr>
+            </a:lvl8pPr>
+            <a:lvl9pPr marL="4274820" indent="-251460" algn="l" defTabSz="1005840" rtl="0" eaLnBrk="1" latinLnBrk="0" hangingPunct="1">
+              <a:lnSpc>
+                <a:spcPct val="90000"/>
+              </a:lnSpc>
+              <a:spcBef>
+                <a:spcPts val="550"/>
+              </a:spcBef>
+              <a:buFont typeface="Arial" panose="020B0604020202020204" pitchFamily="34" charset="0"/>
+              <a:buChar char="•"/>
+              <a:defRPr sz="1980" kern="1200">
+                <a:solidFill>
+                  <a:schemeClr val="tx1"/>
+                </a:solidFill>
+                <a:latin typeface="+mn-lt"/>
+                <a:ea typeface="+mn-ea"/>
+                <a:cs typeface="+mn-cs"/>
+              </a:defRPr>
+            </a:lvl9pPr>
+          </a:lstStyle>
+          <a:p>
+            <a:pPr marL="0" indent="0">
+              <a:buFont typeface="Arial" panose="020B0604020202020204" pitchFamily="34" charset="0"/>
+              <a:buNone/>
+            </a:pPr>
+            <a:r>
+              <a:rPr lang="en-US" dirty="0"/>
+              <a:t>LS</a:t>
+            </a:r>
+          </a:p>
+        </p:txBody>
+      </p:sp>
+      <p:sp>
+        <p:nvSpPr>
+          <p:cNvPr id="8" name="TextBox 7">
+            <a:extLst>
+              <a:ext uri="{FF2B5EF4-FFF2-40B4-BE49-F238E27FC236}">
+                <a16:creationId xmlns:a16="http://schemas.microsoft.com/office/drawing/2014/main" id="{25CA6CB8-B61E-4F39-B9A1-93B57448F711}"/>
+              </a:ext>
+            </a:extLst>
+          </p:cNvPr>
+          <p:cNvSpPr txBox="1"/>
+          <p:nvPr/>
+        </p:nvSpPr>
+        <p:spPr>
+          <a:xfrm>
+            <a:off x="5673257" y="2651879"/>
+            <a:ext cx="3186110" cy="3693319"/>
+          </a:xfrm>
+          <a:prstGeom prst="rect">
+            <a:avLst/>
+          </a:prstGeom>
+          <a:noFill/>
+        </p:spPr>
+        <p:txBody>
+          <a:bodyPr wrap="square" rtlCol="0">
+            <a:spAutoFit/>
+          </a:bodyPr>
+          <a:lstStyle/>
+          <a:p>
+            <a:r>
+              <a:rPr lang="en-US" dirty="0"/>
+              <a:t>Different parameterization of the Ricker model.</a:t>
+            </a:r>
+          </a:p>
+          <a:p>
+            <a:endParaRPr lang="en-US" dirty="0"/>
+          </a:p>
+          <a:p>
+            <a:r>
+              <a:rPr lang="en-US" dirty="0"/>
+              <a:t>Good reference for these equations: Martell, Steven JD, William E. Pine, and Carl J. Walters. "Parameterizing age-structured models from a fisheries management perspective." </a:t>
+            </a:r>
+            <a:r>
+              <a:rPr lang="en-US" i="1" dirty="0"/>
+              <a:t>Canadian Journal of Fisheries and Aquatic Sciences</a:t>
+            </a:r>
+            <a:r>
+              <a:rPr lang="en-US" dirty="0"/>
+              <a:t> 65.8 (2008): 1586-1600.</a:t>
+            </a:r>
+          </a:p>
+        </p:txBody>
+      </p:sp>
+      <p:pic>
+        <p:nvPicPr>
+          <p:cNvPr id="5" name="Picture 4">
+            <a:extLst>
+              <a:ext uri="{FF2B5EF4-FFF2-40B4-BE49-F238E27FC236}">
+                <a16:creationId xmlns:a16="http://schemas.microsoft.com/office/drawing/2014/main" id="{63727914-B411-4326-8723-4CE49123D8F9}"/>
+              </a:ext>
+            </a:extLst>
+          </p:cNvPr>
+          <p:cNvPicPr>
+            <a:picLocks noChangeAspect="1"/>
+          </p:cNvPicPr>
+          <p:nvPr/>
+        </p:nvPicPr>
+        <p:blipFill>
+          <a:blip r:embed="rId2"/>
+          <a:stretch>
+            <a:fillRect/>
+          </a:stretch>
+        </p:blipFill>
+        <p:spPr>
+          <a:xfrm>
+            <a:off x="398787" y="1719689"/>
+            <a:ext cx="7677150" cy="323850"/>
+          </a:xfrm>
+          <a:prstGeom prst="rect">
+            <a:avLst/>
+          </a:prstGeom>
+        </p:spPr>
+      </p:pic>
+      <p:pic>
+        <p:nvPicPr>
+          <p:cNvPr id="6" name="Picture 5">
+            <a:extLst>
+              <a:ext uri="{FF2B5EF4-FFF2-40B4-BE49-F238E27FC236}">
+                <a16:creationId xmlns:a16="http://schemas.microsoft.com/office/drawing/2014/main" id="{76CCC497-8FD5-46EF-B041-C67104DE0F24}"/>
+              </a:ext>
+            </a:extLst>
+          </p:cNvPr>
+          <p:cNvPicPr>
+            <a:picLocks noChangeAspect="1"/>
+          </p:cNvPicPr>
+          <p:nvPr/>
+        </p:nvPicPr>
+        <p:blipFill>
+          <a:blip r:embed="rId3"/>
+          <a:stretch>
+            <a:fillRect/>
+          </a:stretch>
+        </p:blipFill>
+        <p:spPr>
+          <a:xfrm>
+            <a:off x="312416" y="2715275"/>
+            <a:ext cx="5004599" cy="3308654"/>
+          </a:xfrm>
+          <a:prstGeom prst="rect">
+            <a:avLst/>
+          </a:prstGeom>
+        </p:spPr>
+      </p:pic>
+      <p:pic>
+        <p:nvPicPr>
+          <p:cNvPr id="7" name="Picture 6">
+            <a:extLst>
+              <a:ext uri="{FF2B5EF4-FFF2-40B4-BE49-F238E27FC236}">
+                <a16:creationId xmlns:a16="http://schemas.microsoft.com/office/drawing/2014/main" id="{578F5DFB-CD1C-4A78-A60C-A3E3F8B574B3}"/>
+              </a:ext>
+            </a:extLst>
+          </p:cNvPr>
+          <p:cNvPicPr>
+            <a:picLocks noChangeAspect="1"/>
+          </p:cNvPicPr>
+          <p:nvPr/>
+        </p:nvPicPr>
+        <p:blipFill>
+          <a:blip r:embed="rId4"/>
+          <a:stretch>
+            <a:fillRect/>
+          </a:stretch>
+        </p:blipFill>
+        <p:spPr>
+          <a:xfrm>
+            <a:off x="312417" y="6052711"/>
+            <a:ext cx="4985593" cy="1485695"/>
+          </a:xfrm>
+          <a:prstGeom prst="rect">
+            <a:avLst/>
+          </a:prstGeom>
+        </p:spPr>
+      </p:pic>
+    </p:spTree>
+    <p:extLst>
+      <p:ext uri="{BB962C8B-B14F-4D97-AF65-F5344CB8AC3E}">
+        <p14:creationId xmlns:p14="http://schemas.microsoft.com/office/powerpoint/2010/main" val="439217343"/>
+      </p:ext>
+    </p:extLst>
+  </p:cSld>
+  <p:clrMapOvr>
+    <a:masterClrMapping/>
+  </p:clrMapOvr>
+</p:sld>
+</file>
+
+<file path=ppt/slides/slide9.xml><?xml version="1.0" encoding="utf-8"?>
+<p:sld xmlns:a="http://schemas.openxmlformats.org/drawingml/2006/main" xmlns:r="http://schemas.openxmlformats.org/officeDocument/2006/relationships" xmlns:p="http://schemas.openxmlformats.org/presentationml/2006/main">
+  <p:cSld>
+    <p:spTree>
+      <p:nvGrpSpPr>
+        <p:cNvPr id="1" name=""/>
+        <p:cNvGrpSpPr/>
+        <p:nvPr/>
+      </p:nvGrpSpPr>
+      <p:grpSpPr>
+        <a:xfrm>
+          <a:off x="0" y="0"/>
+          <a:ext cx="0" cy="0"/>
+          <a:chOff x="0" y="0"/>
+          <a:chExt cx="0" cy="0"/>
+        </a:xfrm>
+      </p:grpSpPr>
+      <p:sp>
+        <p:nvSpPr>
+          <p:cNvPr id="2" name="Title 1">
+            <a:extLst>
+              <a:ext uri="{FF2B5EF4-FFF2-40B4-BE49-F238E27FC236}">
+                <a16:creationId xmlns:a16="http://schemas.microsoft.com/office/drawing/2014/main" id="{A2DCAC96-E1FD-44FF-8A96-717F504C6320}"/>
+              </a:ext>
+            </a:extLst>
+          </p:cNvPr>
+          <p:cNvSpPr>
+            <a:spLocks noGrp="1"/>
+          </p:cNvSpPr>
+          <p:nvPr>
+            <p:ph type="title"/>
+          </p:nvPr>
+        </p:nvSpPr>
+        <p:spPr>
+          <a:xfrm>
+            <a:off x="454342" y="359040"/>
+            <a:ext cx="8675370" cy="795865"/>
+          </a:xfrm>
+        </p:spPr>
+        <p:txBody>
+          <a:bodyPr/>
+          <a:lstStyle/>
+          <a:p>
+            <a:r>
+              <a:rPr lang="en-US" dirty="0"/>
+              <a:t>Natural mortality/survival</a:t>
+            </a:r>
+          </a:p>
+        </p:txBody>
+      </p:sp>
+      <p:sp>
+        <p:nvSpPr>
+          <p:cNvPr id="3" name="Content Placeholder 2">
+            <a:extLst>
+              <a:ext uri="{FF2B5EF4-FFF2-40B4-BE49-F238E27FC236}">
+                <a16:creationId xmlns:a16="http://schemas.microsoft.com/office/drawing/2014/main" id="{BB5B9591-6BBC-4B0D-8085-50D5036BBADE}"/>
+              </a:ext>
+            </a:extLst>
+          </p:cNvPr>
+          <p:cNvSpPr>
+            <a:spLocks noGrp="1"/>
+          </p:cNvSpPr>
+          <p:nvPr>
+            <p:ph idx="1"/>
+          </p:nvPr>
+        </p:nvSpPr>
+        <p:spPr>
+          <a:xfrm>
+            <a:off x="454342" y="4124324"/>
+            <a:ext cx="4337685" cy="523875"/>
+          </a:xfrm>
+        </p:spPr>
+        <p:txBody>
+          <a:bodyPr/>
+          <a:lstStyle/>
+          <a:p>
+            <a:pPr marL="0" indent="0">
+              <a:buNone/>
+            </a:pPr>
+            <a:r>
+              <a:rPr lang="en-US" dirty="0"/>
+              <a:t>HER</a:t>
+            </a:r>
+          </a:p>
+        </p:txBody>
+      </p:sp>
+      <p:sp>
+        <p:nvSpPr>
+          <p:cNvPr id="4" name="Content Placeholder 2">
+            <a:extLst>
+              <a:ext uri="{FF2B5EF4-FFF2-40B4-BE49-F238E27FC236}">
+                <a16:creationId xmlns:a16="http://schemas.microsoft.com/office/drawing/2014/main" id="{7EC84657-5B91-4347-81F3-1B680908C4DF}"/>
+              </a:ext>
+            </a:extLst>
+          </p:cNvPr>
+          <p:cNvSpPr txBox="1">
+            <a:spLocks/>
+          </p:cNvSpPr>
+          <p:nvPr/>
+        </p:nvSpPr>
+        <p:spPr>
+          <a:xfrm>
+            <a:off x="454342" y="1343024"/>
+            <a:ext cx="4337685" cy="523875"/>
+          </a:xfrm>
+          <a:prstGeom prst="rect">
+            <a:avLst/>
+          </a:prstGeom>
+        </p:spPr>
+        <p:txBody>
+          <a:bodyPr vert="horz" lIns="91440" tIns="45720" rIns="91440" bIns="45720" rtlCol="0">
+            <a:normAutofit/>
+          </a:bodyPr>
+          <a:lstStyle>
+            <a:lvl1pPr marL="251460" indent="-251460" algn="l" defTabSz="1005840" rtl="0" eaLnBrk="1" latinLnBrk="0" hangingPunct="1">
+              <a:lnSpc>
+                <a:spcPct val="90000"/>
+              </a:lnSpc>
+              <a:spcBef>
+                <a:spcPts val="1100"/>
+              </a:spcBef>
+              <a:buFont typeface="Arial" panose="020B0604020202020204" pitchFamily="34" charset="0"/>
+              <a:buChar char="•"/>
+              <a:defRPr sz="3080" kern="1200">
+                <a:solidFill>
+                  <a:schemeClr val="tx1"/>
+                </a:solidFill>
+                <a:latin typeface="+mn-lt"/>
+                <a:ea typeface="+mn-ea"/>
+                <a:cs typeface="+mn-cs"/>
+              </a:defRPr>
+            </a:lvl1pPr>
+            <a:lvl2pPr marL="754380" indent="-251460" algn="l" defTabSz="1005840" rtl="0" eaLnBrk="1" latinLnBrk="0" hangingPunct="1">
+              <a:lnSpc>
+                <a:spcPct val="90000"/>
+              </a:lnSpc>
+              <a:spcBef>
+                <a:spcPts val="550"/>
+              </a:spcBef>
+              <a:buFont typeface="Arial" panose="020B0604020202020204" pitchFamily="34" charset="0"/>
+              <a:buChar char="•"/>
+              <a:defRPr sz="2640" kern="1200">
+                <a:solidFill>
+                  <a:schemeClr val="tx1"/>
+                </a:solidFill>
+                <a:latin typeface="+mn-lt"/>
+                <a:ea typeface="+mn-ea"/>
+                <a:cs typeface="+mn-cs"/>
+              </a:defRPr>
+            </a:lvl2pPr>
+            <a:lvl3pPr marL="1257300" indent="-251460" algn="l" defTabSz="1005840" rtl="0" eaLnBrk="1" latinLnBrk="0" hangingPunct="1">
+              <a:lnSpc>
+                <a:spcPct val="90000"/>
+              </a:lnSpc>
+              <a:spcBef>
+                <a:spcPts val="550"/>
+              </a:spcBef>
+              <a:buFont typeface="Arial" panose="020B0604020202020204" pitchFamily="34" charset="0"/>
+              <a:buChar char="•"/>
+              <a:defRPr sz="2200" kern="1200">
+                <a:solidFill>
+                  <a:schemeClr val="tx1"/>
+                </a:solidFill>
+                <a:latin typeface="+mn-lt"/>
+                <a:ea typeface="+mn-ea"/>
+                <a:cs typeface="+mn-cs"/>
+              </a:defRPr>
+            </a:lvl3pPr>
+            <a:lvl4pPr marL="1760220" indent="-251460" algn="l" defTabSz="1005840" rtl="0" eaLnBrk="1" latinLnBrk="0" hangingPunct="1">
+              <a:lnSpc>
+                <a:spcPct val="90000"/>
+              </a:lnSpc>
+              <a:spcBef>
+                <a:spcPts val="550"/>
+              </a:spcBef>
+              <a:buFont typeface="Arial" panose="020B0604020202020204" pitchFamily="34" charset="0"/>
+              <a:buChar char="•"/>
+              <a:defRPr sz="1980" kern="1200">
+                <a:solidFill>
+                  <a:schemeClr val="tx1"/>
+                </a:solidFill>
+                <a:latin typeface="+mn-lt"/>
+                <a:ea typeface="+mn-ea"/>
+                <a:cs typeface="+mn-cs"/>
+              </a:defRPr>
+            </a:lvl4pPr>
+            <a:lvl5pPr marL="2263140" indent="-251460" algn="l" defTabSz="1005840" rtl="0" eaLnBrk="1" latinLnBrk="0" hangingPunct="1">
+              <a:lnSpc>
+                <a:spcPct val="90000"/>
+              </a:lnSpc>
+              <a:spcBef>
+                <a:spcPts val="550"/>
+              </a:spcBef>
+              <a:buFont typeface="Arial" panose="020B0604020202020204" pitchFamily="34" charset="0"/>
+              <a:buChar char="•"/>
+              <a:defRPr sz="1980" kern="1200">
+                <a:solidFill>
+                  <a:schemeClr val="tx1"/>
+                </a:solidFill>
+                <a:latin typeface="+mn-lt"/>
+                <a:ea typeface="+mn-ea"/>
+                <a:cs typeface="+mn-cs"/>
+              </a:defRPr>
+            </a:lvl5pPr>
+            <a:lvl6pPr marL="2766060" indent="-251460" algn="l" defTabSz="1005840" rtl="0" eaLnBrk="1" latinLnBrk="0" hangingPunct="1">
+              <a:lnSpc>
+                <a:spcPct val="90000"/>
+              </a:lnSpc>
+              <a:spcBef>
+                <a:spcPts val="550"/>
+              </a:spcBef>
+              <a:buFont typeface="Arial" panose="020B0604020202020204" pitchFamily="34" charset="0"/>
+              <a:buChar char="•"/>
+              <a:defRPr sz="1980" kern="1200">
+                <a:solidFill>
+                  <a:schemeClr val="tx1"/>
+                </a:solidFill>
+                <a:latin typeface="+mn-lt"/>
+                <a:ea typeface="+mn-ea"/>
+                <a:cs typeface="+mn-cs"/>
+              </a:defRPr>
+            </a:lvl6pPr>
+            <a:lvl7pPr marL="3268980" indent="-251460" algn="l" defTabSz="1005840" rtl="0" eaLnBrk="1" latinLnBrk="0" hangingPunct="1">
+              <a:lnSpc>
+                <a:spcPct val="90000"/>
+              </a:lnSpc>
+              <a:spcBef>
+                <a:spcPts val="550"/>
+              </a:spcBef>
+              <a:buFont typeface="Arial" panose="020B0604020202020204" pitchFamily="34" charset="0"/>
+              <a:buChar char="•"/>
+              <a:defRPr sz="1980" kern="1200">
+                <a:solidFill>
+                  <a:schemeClr val="tx1"/>
+                </a:solidFill>
+                <a:latin typeface="+mn-lt"/>
+                <a:ea typeface="+mn-ea"/>
+                <a:cs typeface="+mn-cs"/>
+              </a:defRPr>
+            </a:lvl7pPr>
+            <a:lvl8pPr marL="3771900" indent="-251460" algn="l" defTabSz="1005840" rtl="0" eaLnBrk="1" latinLnBrk="0" hangingPunct="1">
+              <a:lnSpc>
+                <a:spcPct val="90000"/>
+              </a:lnSpc>
+              <a:spcBef>
+                <a:spcPts val="550"/>
+              </a:spcBef>
+              <a:buFont typeface="Arial" panose="020B0604020202020204" pitchFamily="34" charset="0"/>
+              <a:buChar char="•"/>
+              <a:defRPr sz="1980" kern="1200">
+                <a:solidFill>
+                  <a:schemeClr val="tx1"/>
+                </a:solidFill>
+                <a:latin typeface="+mn-lt"/>
+                <a:ea typeface="+mn-ea"/>
+                <a:cs typeface="+mn-cs"/>
+              </a:defRPr>
+            </a:lvl8pPr>
+            <a:lvl9pPr marL="4274820" indent="-251460" algn="l" defTabSz="1005840" rtl="0" eaLnBrk="1" latinLnBrk="0" hangingPunct="1">
+              <a:lnSpc>
+                <a:spcPct val="90000"/>
+              </a:lnSpc>
+              <a:spcBef>
+                <a:spcPts val="550"/>
+              </a:spcBef>
+              <a:buFont typeface="Arial" panose="020B0604020202020204" pitchFamily="34" charset="0"/>
+              <a:buChar char="•"/>
+              <a:defRPr sz="1980" kern="1200">
+                <a:solidFill>
+                  <a:schemeClr val="tx1"/>
+                </a:solidFill>
+                <a:latin typeface="+mn-lt"/>
+                <a:ea typeface="+mn-ea"/>
+                <a:cs typeface="+mn-cs"/>
+              </a:defRPr>
+            </a:lvl9pPr>
+          </a:lstStyle>
+          <a:p>
+            <a:pPr marL="0" indent="0">
+              <a:buFont typeface="Arial" panose="020B0604020202020204" pitchFamily="34" charset="0"/>
+              <a:buNone/>
+            </a:pPr>
+            <a:r>
+              <a:rPr lang="en-US" dirty="0"/>
+              <a:t>LS</a:t>
+            </a:r>
+          </a:p>
+        </p:txBody>
+      </p:sp>
+      <p:pic>
+        <p:nvPicPr>
+          <p:cNvPr id="5" name="Picture 4">
+            <a:extLst>
+              <a:ext uri="{FF2B5EF4-FFF2-40B4-BE49-F238E27FC236}">
+                <a16:creationId xmlns:a16="http://schemas.microsoft.com/office/drawing/2014/main" id="{E9777265-3084-408B-9FBD-025984825E3A}"/>
+              </a:ext>
+            </a:extLst>
+          </p:cNvPr>
+          <p:cNvPicPr>
+            <a:picLocks noChangeAspect="1"/>
+          </p:cNvPicPr>
+          <p:nvPr/>
+        </p:nvPicPr>
+        <p:blipFill>
+          <a:blip r:embed="rId2"/>
+          <a:stretch>
+            <a:fillRect/>
+          </a:stretch>
+        </p:blipFill>
+        <p:spPr>
+          <a:xfrm>
+            <a:off x="454342" y="1866899"/>
+            <a:ext cx="4572000" cy="2257425"/>
+          </a:xfrm>
+          <a:prstGeom prst="rect">
+            <a:avLst/>
+          </a:prstGeom>
+        </p:spPr>
+      </p:pic>
+      <p:pic>
+        <p:nvPicPr>
+          <p:cNvPr id="6" name="Picture 5">
+            <a:extLst>
+              <a:ext uri="{FF2B5EF4-FFF2-40B4-BE49-F238E27FC236}">
+                <a16:creationId xmlns:a16="http://schemas.microsoft.com/office/drawing/2014/main" id="{BA21ADE4-5D06-4095-8B9C-8947985EB5DD}"/>
+              </a:ext>
+            </a:extLst>
+          </p:cNvPr>
+          <p:cNvPicPr>
+            <a:picLocks noChangeAspect="1"/>
+          </p:cNvPicPr>
+          <p:nvPr/>
+        </p:nvPicPr>
+        <p:blipFill>
+          <a:blip r:embed="rId3"/>
+          <a:stretch>
+            <a:fillRect/>
+          </a:stretch>
+        </p:blipFill>
+        <p:spPr>
+          <a:xfrm>
+            <a:off x="454342" y="4585274"/>
+            <a:ext cx="6743700" cy="2066925"/>
+          </a:xfrm>
+          <a:prstGeom prst="rect">
+            <a:avLst/>
+          </a:prstGeom>
+        </p:spPr>
+      </p:pic>
+      <p:sp>
+        <p:nvSpPr>
+          <p:cNvPr id="7" name="TextBox 6">
+            <a:extLst>
+              <a:ext uri="{FF2B5EF4-FFF2-40B4-BE49-F238E27FC236}">
+                <a16:creationId xmlns:a16="http://schemas.microsoft.com/office/drawing/2014/main" id="{251AE748-36B3-4087-B46E-6DAB79A5117A}"/>
+              </a:ext>
+            </a:extLst>
+          </p:cNvPr>
+          <p:cNvSpPr txBox="1"/>
+          <p:nvPr/>
+        </p:nvSpPr>
+        <p:spPr>
+          <a:xfrm>
+            <a:off x="5266375" y="1981199"/>
+            <a:ext cx="2609849" cy="646331"/>
+          </a:xfrm>
+          <a:prstGeom prst="rect">
+            <a:avLst/>
+          </a:prstGeom>
+          <a:noFill/>
+        </p:spPr>
+        <p:txBody>
+          <a:bodyPr wrap="square" rtlCol="0">
+            <a:spAutoFit/>
+          </a:bodyPr>
+          <a:lstStyle/>
+          <a:p>
+            <a:r>
+              <a:rPr lang="en-US" dirty="0"/>
+              <a:t>Separate/independent M estimated for each block</a:t>
+            </a:r>
+          </a:p>
+        </p:txBody>
+      </p:sp>
+      <p:sp>
+        <p:nvSpPr>
+          <p:cNvPr id="8" name="TextBox 7">
+            <a:extLst>
+              <a:ext uri="{FF2B5EF4-FFF2-40B4-BE49-F238E27FC236}">
+                <a16:creationId xmlns:a16="http://schemas.microsoft.com/office/drawing/2014/main" id="{25CA6CB8-B61E-4F39-B9A1-93B57448F711}"/>
+              </a:ext>
+            </a:extLst>
+          </p:cNvPr>
+          <p:cNvSpPr txBox="1"/>
+          <p:nvPr/>
+        </p:nvSpPr>
+        <p:spPr>
+          <a:xfrm>
+            <a:off x="7406642" y="5253037"/>
+            <a:ext cx="2339341" cy="1754326"/>
+          </a:xfrm>
+          <a:prstGeom prst="rect">
+            <a:avLst/>
+          </a:prstGeom>
+          <a:noFill/>
+        </p:spPr>
+        <p:txBody>
+          <a:bodyPr wrap="square" rtlCol="0">
+            <a:spAutoFit/>
+          </a:bodyPr>
+          <a:lstStyle/>
+          <a:p>
+            <a:r>
+              <a:rPr lang="en-US" dirty="0"/>
+              <a:t>Mean M with deviations for each time block. Deviations are assumed lognormally distributed</a:t>
+            </a:r>
+          </a:p>
+        </p:txBody>
+      </p:sp>
+      <p:pic>
+        <p:nvPicPr>
+          <p:cNvPr id="9" name="Picture 8">
+            <a:extLst>
+              <a:ext uri="{FF2B5EF4-FFF2-40B4-BE49-F238E27FC236}">
+                <a16:creationId xmlns:a16="http://schemas.microsoft.com/office/drawing/2014/main" id="{DF40C3C3-40CF-4BE2-AB16-1B981B0001E6}"/>
+              </a:ext>
+            </a:extLst>
+          </p:cNvPr>
+          <p:cNvPicPr>
+            <a:picLocks noChangeAspect="1"/>
+          </p:cNvPicPr>
+          <p:nvPr/>
+        </p:nvPicPr>
+        <p:blipFill>
+          <a:blip r:embed="rId4"/>
+          <a:stretch>
+            <a:fillRect/>
+          </a:stretch>
+        </p:blipFill>
+        <p:spPr>
+          <a:xfrm>
+            <a:off x="454342" y="6736911"/>
+            <a:ext cx="6505575" cy="752475"/>
+          </a:xfrm>
+          <a:prstGeom prst="rect">
+            <a:avLst/>
+          </a:prstGeom>
+        </p:spPr>
+      </p:pic>
+    </p:spTree>
+    <p:extLst>
+      <p:ext uri="{BB962C8B-B14F-4D97-AF65-F5344CB8AC3E}">
+        <p14:creationId xmlns:p14="http://schemas.microsoft.com/office/powerpoint/2010/main" val="503525378"/>
       </p:ext>
     </p:extLst>
   </p:cSld>

</xml_diff>

<commit_message>
Fixed maturity to equal LS best estimates for both time blocks then changed catch/maturity assumption so that catch is 100% mature. Did not converge (Hessian not pos def)
</commit_message>
<xml_diff>
--- a/technical_docs/popdy_her_ls.pptx
+++ b/technical_docs/popdy_her_ls.pptx
@@ -7,9 +7,15 @@
   <p:sldIdLst>
     <p:sldId id="258" r:id="rId2"/>
     <p:sldId id="257" r:id="rId3"/>
-    <p:sldId id="261" r:id="rId4"/>
-    <p:sldId id="262" r:id="rId5"/>
-    <p:sldId id="263" r:id="rId6"/>
+    <p:sldId id="266" r:id="rId4"/>
+    <p:sldId id="268" r:id="rId5"/>
+    <p:sldId id="269" r:id="rId6"/>
+    <p:sldId id="264" r:id="rId7"/>
+    <p:sldId id="270" r:id="rId8"/>
+    <p:sldId id="272" r:id="rId9"/>
+    <p:sldId id="271" r:id="rId10"/>
+    <p:sldId id="261" r:id="rId11"/>
+    <p:sldId id="262" r:id="rId12"/>
   </p:sldIdLst>
   <p:sldSz cx="10058400" cy="7772400"/>
   <p:notesSz cx="6858000" cy="9144000"/>
@@ -108,6 +114,11 @@
       </a:defRPr>
     </a:lvl9pPr>
   </p:defaultTextStyle>
+  <p:extLst>
+    <p:ext uri="{EFAFB233-063F-42B5-8137-9DF3F51BA10A}">
+      <p15:sldGuideLst xmlns:p15="http://schemas.microsoft.com/office/powerpoint/2012/main"/>
+    </p:ext>
+  </p:extLst>
 </p:presentation>
 </file>
 
@@ -242,7 +253,7 @@
           <a:p>
             <a:fld id="{601AD17F-A198-4D0B-923D-8F7C51F5BEB9}" type="datetimeFigureOut">
               <a:rPr lang="en-US" smtClean="0"/>
-              <a:t>6/19/2019</a:t>
+              <a:t>6/21/2019</a:t>
             </a:fld>
             <a:endParaRPr lang="en-US"/>
           </a:p>
@@ -412,7 +423,7 @@
           <a:p>
             <a:fld id="{601AD17F-A198-4D0B-923D-8F7C51F5BEB9}" type="datetimeFigureOut">
               <a:rPr lang="en-US" smtClean="0"/>
-              <a:t>6/19/2019</a:t>
+              <a:t>6/21/2019</a:t>
             </a:fld>
             <a:endParaRPr lang="en-US"/>
           </a:p>
@@ -592,7 +603,7 @@
           <a:p>
             <a:fld id="{601AD17F-A198-4D0B-923D-8F7C51F5BEB9}" type="datetimeFigureOut">
               <a:rPr lang="en-US" smtClean="0"/>
-              <a:t>6/19/2019</a:t>
+              <a:t>6/21/2019</a:t>
             </a:fld>
             <a:endParaRPr lang="en-US"/>
           </a:p>
@@ -762,7 +773,7 @@
           <a:p>
             <a:fld id="{601AD17F-A198-4D0B-923D-8F7C51F5BEB9}" type="datetimeFigureOut">
               <a:rPr lang="en-US" smtClean="0"/>
-              <a:t>6/19/2019</a:t>
+              <a:t>6/21/2019</a:t>
             </a:fld>
             <a:endParaRPr lang="en-US"/>
           </a:p>
@@ -1006,7 +1017,7 @@
           <a:p>
             <a:fld id="{601AD17F-A198-4D0B-923D-8F7C51F5BEB9}" type="datetimeFigureOut">
               <a:rPr lang="en-US" smtClean="0"/>
-              <a:t>6/19/2019</a:t>
+              <a:t>6/21/2019</a:t>
             </a:fld>
             <a:endParaRPr lang="en-US"/>
           </a:p>
@@ -1238,7 +1249,7 @@
           <a:p>
             <a:fld id="{601AD17F-A198-4D0B-923D-8F7C51F5BEB9}" type="datetimeFigureOut">
               <a:rPr lang="en-US" smtClean="0"/>
-              <a:t>6/19/2019</a:t>
+              <a:t>6/21/2019</a:t>
             </a:fld>
             <a:endParaRPr lang="en-US"/>
           </a:p>
@@ -1605,7 +1616,7 @@
           <a:p>
             <a:fld id="{601AD17F-A198-4D0B-923D-8F7C51F5BEB9}" type="datetimeFigureOut">
               <a:rPr lang="en-US" smtClean="0"/>
-              <a:t>6/19/2019</a:t>
+              <a:t>6/21/2019</a:t>
             </a:fld>
             <a:endParaRPr lang="en-US"/>
           </a:p>
@@ -1723,7 +1734,7 @@
           <a:p>
             <a:fld id="{601AD17F-A198-4D0B-923D-8F7C51F5BEB9}" type="datetimeFigureOut">
               <a:rPr lang="en-US" smtClean="0"/>
-              <a:t>6/19/2019</a:t>
+              <a:t>6/21/2019</a:t>
             </a:fld>
             <a:endParaRPr lang="en-US"/>
           </a:p>
@@ -1818,7 +1829,7 @@
           <a:p>
             <a:fld id="{601AD17F-A198-4D0B-923D-8F7C51F5BEB9}" type="datetimeFigureOut">
               <a:rPr lang="en-US" smtClean="0"/>
-              <a:t>6/19/2019</a:t>
+              <a:t>6/21/2019</a:t>
             </a:fld>
             <a:endParaRPr lang="en-US"/>
           </a:p>
@@ -2095,7 +2106,7 @@
           <a:p>
             <a:fld id="{601AD17F-A198-4D0B-923D-8F7C51F5BEB9}" type="datetimeFigureOut">
               <a:rPr lang="en-US" smtClean="0"/>
-              <a:t>6/19/2019</a:t>
+              <a:t>6/21/2019</a:t>
             </a:fld>
             <a:endParaRPr lang="en-US"/>
           </a:p>
@@ -2352,7 +2363,7 @@
           <a:p>
             <a:fld id="{601AD17F-A198-4D0B-923D-8F7C51F5BEB9}" type="datetimeFigureOut">
               <a:rPr lang="en-US" smtClean="0"/>
-              <a:t>6/19/2019</a:t>
+              <a:t>6/21/2019</a:t>
             </a:fld>
             <a:endParaRPr lang="en-US"/>
           </a:p>
@@ -2565,7 +2576,7 @@
           <a:p>
             <a:fld id="{601AD17F-A198-4D0B-923D-8F7C51F5BEB9}" type="datetimeFigureOut">
               <a:rPr lang="en-US" smtClean="0"/>
-              <a:t>6/19/2019</a:t>
+              <a:t>6/21/2019</a:t>
             </a:fld>
             <a:endParaRPr lang="en-US"/>
           </a:p>
@@ -3031,12 +3042,942 @@
               <a:t>Jane Sullivan</a:t>
             </a:r>
           </a:p>
+          <a:p>
+            <a:r>
+              <a:rPr lang="en-US" dirty="0"/>
+              <a:t>Last updated: 2019-06-25</a:t>
+            </a:r>
+          </a:p>
         </p:txBody>
       </p:sp>
     </p:spTree>
     <p:extLst>
       <p:ext uri="{BB962C8B-B14F-4D97-AF65-F5344CB8AC3E}">
         <p14:creationId xmlns:p14="http://schemas.microsoft.com/office/powerpoint/2010/main" val="1836237144"/>
+      </p:ext>
+    </p:extLst>
+  </p:cSld>
+  <p:clrMapOvr>
+    <a:masterClrMapping/>
+  </p:clrMapOvr>
+</p:sld>
+</file>
+
+<file path=ppt/slides/slide10.xml><?xml version="1.0" encoding="utf-8"?>
+<p:sld xmlns:a="http://schemas.openxmlformats.org/drawingml/2006/main" xmlns:r="http://schemas.openxmlformats.org/officeDocument/2006/relationships" xmlns:p="http://schemas.openxmlformats.org/presentationml/2006/main">
+  <p:cSld>
+    <p:spTree>
+      <p:nvGrpSpPr>
+        <p:cNvPr id="1" name=""/>
+        <p:cNvGrpSpPr/>
+        <p:nvPr/>
+      </p:nvGrpSpPr>
+      <p:grpSpPr>
+        <a:xfrm>
+          <a:off x="0" y="0"/>
+          <a:ext cx="0" cy="0"/>
+          <a:chOff x="0" y="0"/>
+          <a:chExt cx="0" cy="0"/>
+        </a:xfrm>
+      </p:grpSpPr>
+      <p:sp>
+        <p:nvSpPr>
+          <p:cNvPr id="2" name="Title 1">
+            <a:extLst>
+              <a:ext uri="{FF2B5EF4-FFF2-40B4-BE49-F238E27FC236}">
+                <a16:creationId xmlns:a16="http://schemas.microsoft.com/office/drawing/2014/main" id="{A2DCAC96-E1FD-44FF-8A96-717F504C6320}"/>
+              </a:ext>
+            </a:extLst>
+          </p:cNvPr>
+          <p:cNvSpPr>
+            <a:spLocks noGrp="1"/>
+          </p:cNvSpPr>
+          <p:nvPr>
+            <p:ph type="title"/>
+          </p:nvPr>
+        </p:nvSpPr>
+        <p:spPr>
+          <a:xfrm>
+            <a:off x="454342" y="359040"/>
+            <a:ext cx="8675370" cy="795865"/>
+          </a:xfrm>
+        </p:spPr>
+        <p:txBody>
+          <a:bodyPr/>
+          <a:lstStyle/>
+          <a:p>
+            <a:r>
+              <a:rPr lang="en-US" dirty="0"/>
+              <a:t>Maturity</a:t>
+            </a:r>
+          </a:p>
+        </p:txBody>
+      </p:sp>
+      <p:sp>
+        <p:nvSpPr>
+          <p:cNvPr id="3" name="Content Placeholder 2">
+            <a:extLst>
+              <a:ext uri="{FF2B5EF4-FFF2-40B4-BE49-F238E27FC236}">
+                <a16:creationId xmlns:a16="http://schemas.microsoft.com/office/drawing/2014/main" id="{BB5B9591-6BBC-4B0D-8085-50D5036BBADE}"/>
+              </a:ext>
+            </a:extLst>
+          </p:cNvPr>
+          <p:cNvSpPr>
+            <a:spLocks noGrp="1"/>
+          </p:cNvSpPr>
+          <p:nvPr>
+            <p:ph idx="1"/>
+          </p:nvPr>
+        </p:nvSpPr>
+        <p:spPr>
+          <a:xfrm>
+            <a:off x="454341" y="3468885"/>
+            <a:ext cx="4337685" cy="523875"/>
+          </a:xfrm>
+        </p:spPr>
+        <p:txBody>
+          <a:bodyPr/>
+          <a:lstStyle/>
+          <a:p>
+            <a:pPr marL="0" indent="0">
+              <a:buNone/>
+            </a:pPr>
+            <a:r>
+              <a:rPr lang="en-US" dirty="0"/>
+              <a:t>HER</a:t>
+            </a:r>
+          </a:p>
+        </p:txBody>
+      </p:sp>
+      <p:sp>
+        <p:nvSpPr>
+          <p:cNvPr id="4" name="Content Placeholder 2">
+            <a:extLst>
+              <a:ext uri="{FF2B5EF4-FFF2-40B4-BE49-F238E27FC236}">
+                <a16:creationId xmlns:a16="http://schemas.microsoft.com/office/drawing/2014/main" id="{7EC84657-5B91-4347-81F3-1B680908C4DF}"/>
+              </a:ext>
+            </a:extLst>
+          </p:cNvPr>
+          <p:cNvSpPr txBox="1">
+            <a:spLocks/>
+          </p:cNvSpPr>
+          <p:nvPr/>
+        </p:nvSpPr>
+        <p:spPr>
+          <a:xfrm>
+            <a:off x="454341" y="1044176"/>
+            <a:ext cx="4337685" cy="523875"/>
+          </a:xfrm>
+          <a:prstGeom prst="rect">
+            <a:avLst/>
+          </a:prstGeom>
+        </p:spPr>
+        <p:txBody>
+          <a:bodyPr vert="horz" lIns="91440" tIns="45720" rIns="91440" bIns="45720" rtlCol="0">
+            <a:normAutofit/>
+          </a:bodyPr>
+          <a:lstStyle>
+            <a:lvl1pPr marL="251460" indent="-251460" algn="l" defTabSz="1005840" rtl="0" eaLnBrk="1" latinLnBrk="0" hangingPunct="1">
+              <a:lnSpc>
+                <a:spcPct val="90000"/>
+              </a:lnSpc>
+              <a:spcBef>
+                <a:spcPts val="1100"/>
+              </a:spcBef>
+              <a:buFont typeface="Arial" panose="020B0604020202020204" pitchFamily="34" charset="0"/>
+              <a:buChar char="•"/>
+              <a:defRPr sz="3080" kern="1200">
+                <a:solidFill>
+                  <a:schemeClr val="tx1"/>
+                </a:solidFill>
+                <a:latin typeface="+mn-lt"/>
+                <a:ea typeface="+mn-ea"/>
+                <a:cs typeface="+mn-cs"/>
+              </a:defRPr>
+            </a:lvl1pPr>
+            <a:lvl2pPr marL="754380" indent="-251460" algn="l" defTabSz="1005840" rtl="0" eaLnBrk="1" latinLnBrk="0" hangingPunct="1">
+              <a:lnSpc>
+                <a:spcPct val="90000"/>
+              </a:lnSpc>
+              <a:spcBef>
+                <a:spcPts val="550"/>
+              </a:spcBef>
+              <a:buFont typeface="Arial" panose="020B0604020202020204" pitchFamily="34" charset="0"/>
+              <a:buChar char="•"/>
+              <a:defRPr sz="2640" kern="1200">
+                <a:solidFill>
+                  <a:schemeClr val="tx1"/>
+                </a:solidFill>
+                <a:latin typeface="+mn-lt"/>
+                <a:ea typeface="+mn-ea"/>
+                <a:cs typeface="+mn-cs"/>
+              </a:defRPr>
+            </a:lvl2pPr>
+            <a:lvl3pPr marL="1257300" indent="-251460" algn="l" defTabSz="1005840" rtl="0" eaLnBrk="1" latinLnBrk="0" hangingPunct="1">
+              <a:lnSpc>
+                <a:spcPct val="90000"/>
+              </a:lnSpc>
+              <a:spcBef>
+                <a:spcPts val="550"/>
+              </a:spcBef>
+              <a:buFont typeface="Arial" panose="020B0604020202020204" pitchFamily="34" charset="0"/>
+              <a:buChar char="•"/>
+              <a:defRPr sz="2200" kern="1200">
+                <a:solidFill>
+                  <a:schemeClr val="tx1"/>
+                </a:solidFill>
+                <a:latin typeface="+mn-lt"/>
+                <a:ea typeface="+mn-ea"/>
+                <a:cs typeface="+mn-cs"/>
+              </a:defRPr>
+            </a:lvl3pPr>
+            <a:lvl4pPr marL="1760220" indent="-251460" algn="l" defTabSz="1005840" rtl="0" eaLnBrk="1" latinLnBrk="0" hangingPunct="1">
+              <a:lnSpc>
+                <a:spcPct val="90000"/>
+              </a:lnSpc>
+              <a:spcBef>
+                <a:spcPts val="550"/>
+              </a:spcBef>
+              <a:buFont typeface="Arial" panose="020B0604020202020204" pitchFamily="34" charset="0"/>
+              <a:buChar char="•"/>
+              <a:defRPr sz="1980" kern="1200">
+                <a:solidFill>
+                  <a:schemeClr val="tx1"/>
+                </a:solidFill>
+                <a:latin typeface="+mn-lt"/>
+                <a:ea typeface="+mn-ea"/>
+                <a:cs typeface="+mn-cs"/>
+              </a:defRPr>
+            </a:lvl4pPr>
+            <a:lvl5pPr marL="2263140" indent="-251460" algn="l" defTabSz="1005840" rtl="0" eaLnBrk="1" latinLnBrk="0" hangingPunct="1">
+              <a:lnSpc>
+                <a:spcPct val="90000"/>
+              </a:lnSpc>
+              <a:spcBef>
+                <a:spcPts val="550"/>
+              </a:spcBef>
+              <a:buFont typeface="Arial" panose="020B0604020202020204" pitchFamily="34" charset="0"/>
+              <a:buChar char="•"/>
+              <a:defRPr sz="1980" kern="1200">
+                <a:solidFill>
+                  <a:schemeClr val="tx1"/>
+                </a:solidFill>
+                <a:latin typeface="+mn-lt"/>
+                <a:ea typeface="+mn-ea"/>
+                <a:cs typeface="+mn-cs"/>
+              </a:defRPr>
+            </a:lvl5pPr>
+            <a:lvl6pPr marL="2766060" indent="-251460" algn="l" defTabSz="1005840" rtl="0" eaLnBrk="1" latinLnBrk="0" hangingPunct="1">
+              <a:lnSpc>
+                <a:spcPct val="90000"/>
+              </a:lnSpc>
+              <a:spcBef>
+                <a:spcPts val="550"/>
+              </a:spcBef>
+              <a:buFont typeface="Arial" panose="020B0604020202020204" pitchFamily="34" charset="0"/>
+              <a:buChar char="•"/>
+              <a:defRPr sz="1980" kern="1200">
+                <a:solidFill>
+                  <a:schemeClr val="tx1"/>
+                </a:solidFill>
+                <a:latin typeface="+mn-lt"/>
+                <a:ea typeface="+mn-ea"/>
+                <a:cs typeface="+mn-cs"/>
+              </a:defRPr>
+            </a:lvl6pPr>
+            <a:lvl7pPr marL="3268980" indent="-251460" algn="l" defTabSz="1005840" rtl="0" eaLnBrk="1" latinLnBrk="0" hangingPunct="1">
+              <a:lnSpc>
+                <a:spcPct val="90000"/>
+              </a:lnSpc>
+              <a:spcBef>
+                <a:spcPts val="550"/>
+              </a:spcBef>
+              <a:buFont typeface="Arial" panose="020B0604020202020204" pitchFamily="34" charset="0"/>
+              <a:buChar char="•"/>
+              <a:defRPr sz="1980" kern="1200">
+                <a:solidFill>
+                  <a:schemeClr val="tx1"/>
+                </a:solidFill>
+                <a:latin typeface="+mn-lt"/>
+                <a:ea typeface="+mn-ea"/>
+                <a:cs typeface="+mn-cs"/>
+              </a:defRPr>
+            </a:lvl7pPr>
+            <a:lvl8pPr marL="3771900" indent="-251460" algn="l" defTabSz="1005840" rtl="0" eaLnBrk="1" latinLnBrk="0" hangingPunct="1">
+              <a:lnSpc>
+                <a:spcPct val="90000"/>
+              </a:lnSpc>
+              <a:spcBef>
+                <a:spcPts val="550"/>
+              </a:spcBef>
+              <a:buFont typeface="Arial" panose="020B0604020202020204" pitchFamily="34" charset="0"/>
+              <a:buChar char="•"/>
+              <a:defRPr sz="1980" kern="1200">
+                <a:solidFill>
+                  <a:schemeClr val="tx1"/>
+                </a:solidFill>
+                <a:latin typeface="+mn-lt"/>
+                <a:ea typeface="+mn-ea"/>
+                <a:cs typeface="+mn-cs"/>
+              </a:defRPr>
+            </a:lvl8pPr>
+            <a:lvl9pPr marL="4274820" indent="-251460" algn="l" defTabSz="1005840" rtl="0" eaLnBrk="1" latinLnBrk="0" hangingPunct="1">
+              <a:lnSpc>
+                <a:spcPct val="90000"/>
+              </a:lnSpc>
+              <a:spcBef>
+                <a:spcPts val="550"/>
+              </a:spcBef>
+              <a:buFont typeface="Arial" panose="020B0604020202020204" pitchFamily="34" charset="0"/>
+              <a:buChar char="•"/>
+              <a:defRPr sz="1980" kern="1200">
+                <a:solidFill>
+                  <a:schemeClr val="tx1"/>
+                </a:solidFill>
+                <a:latin typeface="+mn-lt"/>
+                <a:ea typeface="+mn-ea"/>
+                <a:cs typeface="+mn-cs"/>
+              </a:defRPr>
+            </a:lvl9pPr>
+          </a:lstStyle>
+          <a:p>
+            <a:pPr marL="0" indent="0">
+              <a:buFont typeface="Arial" panose="020B0604020202020204" pitchFamily="34" charset="0"/>
+              <a:buNone/>
+            </a:pPr>
+            <a:r>
+              <a:rPr lang="en-US" dirty="0"/>
+              <a:t>LS</a:t>
+            </a:r>
+          </a:p>
+        </p:txBody>
+      </p:sp>
+      <p:sp>
+        <p:nvSpPr>
+          <p:cNvPr id="7" name="TextBox 6">
+            <a:extLst>
+              <a:ext uri="{FF2B5EF4-FFF2-40B4-BE49-F238E27FC236}">
+                <a16:creationId xmlns:a16="http://schemas.microsoft.com/office/drawing/2014/main" id="{72605019-96D8-4F7B-A59A-AAD9E9523421}"/>
+              </a:ext>
+            </a:extLst>
+          </p:cNvPr>
+          <p:cNvSpPr txBox="1"/>
+          <p:nvPr/>
+        </p:nvSpPr>
+        <p:spPr>
+          <a:xfrm>
+            <a:off x="6236016" y="1568051"/>
+            <a:ext cx="2609849" cy="646331"/>
+          </a:xfrm>
+          <a:prstGeom prst="rect">
+            <a:avLst/>
+          </a:prstGeom>
+          <a:noFill/>
+        </p:spPr>
+        <p:txBody>
+          <a:bodyPr wrap="square" rtlCol="0">
+            <a:spAutoFit/>
+          </a:bodyPr>
+          <a:lstStyle/>
+          <a:p>
+            <a:r>
+              <a:rPr lang="en-US" dirty="0"/>
+              <a:t>Logistic, a50/slope parameterization</a:t>
+            </a:r>
+          </a:p>
+        </p:txBody>
+      </p:sp>
+      <p:pic>
+        <p:nvPicPr>
+          <p:cNvPr id="9" name="Picture 8">
+            <a:extLst>
+              <a:ext uri="{FF2B5EF4-FFF2-40B4-BE49-F238E27FC236}">
+                <a16:creationId xmlns:a16="http://schemas.microsoft.com/office/drawing/2014/main" id="{E5320891-1029-48BD-B517-EB0AB1BA01C7}"/>
+              </a:ext>
+            </a:extLst>
+          </p:cNvPr>
+          <p:cNvPicPr>
+            <a:picLocks noChangeAspect="1"/>
+          </p:cNvPicPr>
+          <p:nvPr/>
+        </p:nvPicPr>
+        <p:blipFill>
+          <a:blip r:embed="rId2"/>
+          <a:stretch>
+            <a:fillRect/>
+          </a:stretch>
+        </p:blipFill>
+        <p:spPr>
+          <a:xfrm>
+            <a:off x="448624" y="6689460"/>
+            <a:ext cx="5429250" cy="723900"/>
+          </a:xfrm>
+          <a:prstGeom prst="rect">
+            <a:avLst/>
+          </a:prstGeom>
+        </p:spPr>
+      </p:pic>
+      <p:pic>
+        <p:nvPicPr>
+          <p:cNvPr id="10" name="Picture 9">
+            <a:extLst>
+              <a:ext uri="{FF2B5EF4-FFF2-40B4-BE49-F238E27FC236}">
+                <a16:creationId xmlns:a16="http://schemas.microsoft.com/office/drawing/2014/main" id="{FEFB2D3E-809E-46C9-91ED-2B386A1D33CD}"/>
+              </a:ext>
+            </a:extLst>
+          </p:cNvPr>
+          <p:cNvPicPr>
+            <a:picLocks noChangeAspect="1"/>
+          </p:cNvPicPr>
+          <p:nvPr/>
+        </p:nvPicPr>
+        <p:blipFill>
+          <a:blip r:embed="rId3"/>
+          <a:stretch>
+            <a:fillRect/>
+          </a:stretch>
+        </p:blipFill>
+        <p:spPr>
+          <a:xfrm>
+            <a:off x="448624" y="3981382"/>
+            <a:ext cx="6667500" cy="2581275"/>
+          </a:xfrm>
+          <a:prstGeom prst="rect">
+            <a:avLst/>
+          </a:prstGeom>
+        </p:spPr>
+      </p:pic>
+      <p:pic>
+        <p:nvPicPr>
+          <p:cNvPr id="11" name="Picture 10">
+            <a:extLst>
+              <a:ext uri="{FF2B5EF4-FFF2-40B4-BE49-F238E27FC236}">
+                <a16:creationId xmlns:a16="http://schemas.microsoft.com/office/drawing/2014/main" id="{1B0E5101-AEAD-46A2-957C-90C5D4BEAA02}"/>
+              </a:ext>
+            </a:extLst>
+          </p:cNvPr>
+          <p:cNvPicPr>
+            <a:picLocks noChangeAspect="1"/>
+          </p:cNvPicPr>
+          <p:nvPr/>
+        </p:nvPicPr>
+        <p:blipFill>
+          <a:blip r:embed="rId4"/>
+          <a:stretch>
+            <a:fillRect/>
+          </a:stretch>
+        </p:blipFill>
+        <p:spPr>
+          <a:xfrm>
+            <a:off x="454341" y="1557039"/>
+            <a:ext cx="5572125" cy="1771650"/>
+          </a:xfrm>
+          <a:prstGeom prst="rect">
+            <a:avLst/>
+          </a:prstGeom>
+        </p:spPr>
+      </p:pic>
+      <p:sp>
+        <p:nvSpPr>
+          <p:cNvPr id="12" name="TextBox 11">
+            <a:extLst>
+              <a:ext uri="{FF2B5EF4-FFF2-40B4-BE49-F238E27FC236}">
+                <a16:creationId xmlns:a16="http://schemas.microsoft.com/office/drawing/2014/main" id="{9924E527-9378-4361-8CAF-8015587F2EFA}"/>
+              </a:ext>
+            </a:extLst>
+          </p:cNvPr>
+          <p:cNvSpPr txBox="1"/>
+          <p:nvPr/>
+        </p:nvSpPr>
+        <p:spPr>
+          <a:xfrm>
+            <a:off x="7241860" y="3981382"/>
+            <a:ext cx="2609849" cy="646331"/>
+          </a:xfrm>
+          <a:prstGeom prst="rect">
+            <a:avLst/>
+          </a:prstGeom>
+          <a:noFill/>
+        </p:spPr>
+        <p:txBody>
+          <a:bodyPr wrap="square" rtlCol="0">
+            <a:spAutoFit/>
+          </a:bodyPr>
+          <a:lstStyle/>
+          <a:p>
+            <a:r>
+              <a:rPr lang="en-US" dirty="0"/>
+              <a:t>Logistic, a50/a95 parameterization</a:t>
+            </a:r>
+          </a:p>
+        </p:txBody>
+      </p:sp>
+    </p:spTree>
+    <p:extLst>
+      <p:ext uri="{BB962C8B-B14F-4D97-AF65-F5344CB8AC3E}">
+        <p14:creationId xmlns:p14="http://schemas.microsoft.com/office/powerpoint/2010/main" val="2422755107"/>
+      </p:ext>
+    </p:extLst>
+  </p:cSld>
+  <p:clrMapOvr>
+    <a:masterClrMapping/>
+  </p:clrMapOvr>
+</p:sld>
+</file>
+
+<file path=ppt/slides/slide11.xml><?xml version="1.0" encoding="utf-8"?>
+<p:sld xmlns:a="http://schemas.openxmlformats.org/drawingml/2006/main" xmlns:r="http://schemas.openxmlformats.org/officeDocument/2006/relationships" xmlns:p="http://schemas.openxmlformats.org/presentationml/2006/main">
+  <p:cSld>
+    <p:spTree>
+      <p:nvGrpSpPr>
+        <p:cNvPr id="1" name=""/>
+        <p:cNvGrpSpPr/>
+        <p:nvPr/>
+      </p:nvGrpSpPr>
+      <p:grpSpPr>
+        <a:xfrm>
+          <a:off x="0" y="0"/>
+          <a:ext cx="0" cy="0"/>
+          <a:chOff x="0" y="0"/>
+          <a:chExt cx="0" cy="0"/>
+        </a:xfrm>
+      </p:grpSpPr>
+      <p:sp>
+        <p:nvSpPr>
+          <p:cNvPr id="2" name="Title 1">
+            <a:extLst>
+              <a:ext uri="{FF2B5EF4-FFF2-40B4-BE49-F238E27FC236}">
+                <a16:creationId xmlns:a16="http://schemas.microsoft.com/office/drawing/2014/main" id="{A2DCAC96-E1FD-44FF-8A96-717F504C6320}"/>
+              </a:ext>
+            </a:extLst>
+          </p:cNvPr>
+          <p:cNvSpPr>
+            <a:spLocks noGrp="1"/>
+          </p:cNvSpPr>
+          <p:nvPr>
+            <p:ph type="title"/>
+          </p:nvPr>
+        </p:nvSpPr>
+        <p:spPr>
+          <a:xfrm>
+            <a:off x="454342" y="194330"/>
+            <a:ext cx="8675370" cy="795865"/>
+          </a:xfrm>
+        </p:spPr>
+        <p:txBody>
+          <a:bodyPr/>
+          <a:lstStyle/>
+          <a:p>
+            <a:r>
+              <a:rPr lang="en-US" dirty="0"/>
+              <a:t>Selectivity</a:t>
+            </a:r>
+          </a:p>
+        </p:txBody>
+      </p:sp>
+      <p:sp>
+        <p:nvSpPr>
+          <p:cNvPr id="3" name="Content Placeholder 2">
+            <a:extLst>
+              <a:ext uri="{FF2B5EF4-FFF2-40B4-BE49-F238E27FC236}">
+                <a16:creationId xmlns:a16="http://schemas.microsoft.com/office/drawing/2014/main" id="{BB5B9591-6BBC-4B0D-8085-50D5036BBADE}"/>
+              </a:ext>
+            </a:extLst>
+          </p:cNvPr>
+          <p:cNvSpPr>
+            <a:spLocks noGrp="1"/>
+          </p:cNvSpPr>
+          <p:nvPr>
+            <p:ph idx="1"/>
+          </p:nvPr>
+        </p:nvSpPr>
+        <p:spPr>
+          <a:xfrm>
+            <a:off x="454341" y="4419240"/>
+            <a:ext cx="4337685" cy="523875"/>
+          </a:xfrm>
+        </p:spPr>
+        <p:txBody>
+          <a:bodyPr/>
+          <a:lstStyle/>
+          <a:p>
+            <a:pPr marL="0" indent="0">
+              <a:buNone/>
+            </a:pPr>
+            <a:r>
+              <a:rPr lang="en-US" dirty="0"/>
+              <a:t>HER</a:t>
+            </a:r>
+          </a:p>
+        </p:txBody>
+      </p:sp>
+      <p:sp>
+        <p:nvSpPr>
+          <p:cNvPr id="4" name="Content Placeholder 2">
+            <a:extLst>
+              <a:ext uri="{FF2B5EF4-FFF2-40B4-BE49-F238E27FC236}">
+                <a16:creationId xmlns:a16="http://schemas.microsoft.com/office/drawing/2014/main" id="{7EC84657-5B91-4347-81F3-1B680908C4DF}"/>
+              </a:ext>
+            </a:extLst>
+          </p:cNvPr>
+          <p:cNvSpPr txBox="1">
+            <a:spLocks/>
+          </p:cNvSpPr>
+          <p:nvPr/>
+        </p:nvSpPr>
+        <p:spPr>
+          <a:xfrm>
+            <a:off x="454342" y="990195"/>
+            <a:ext cx="4337685" cy="523875"/>
+          </a:xfrm>
+          <a:prstGeom prst="rect">
+            <a:avLst/>
+          </a:prstGeom>
+        </p:spPr>
+        <p:txBody>
+          <a:bodyPr vert="horz" lIns="91440" tIns="45720" rIns="91440" bIns="45720" rtlCol="0">
+            <a:normAutofit/>
+          </a:bodyPr>
+          <a:lstStyle>
+            <a:lvl1pPr marL="251460" indent="-251460" algn="l" defTabSz="1005840" rtl="0" eaLnBrk="1" latinLnBrk="0" hangingPunct="1">
+              <a:lnSpc>
+                <a:spcPct val="90000"/>
+              </a:lnSpc>
+              <a:spcBef>
+                <a:spcPts val="1100"/>
+              </a:spcBef>
+              <a:buFont typeface="Arial" panose="020B0604020202020204" pitchFamily="34" charset="0"/>
+              <a:buChar char="•"/>
+              <a:defRPr sz="3080" kern="1200">
+                <a:solidFill>
+                  <a:schemeClr val="tx1"/>
+                </a:solidFill>
+                <a:latin typeface="+mn-lt"/>
+                <a:ea typeface="+mn-ea"/>
+                <a:cs typeface="+mn-cs"/>
+              </a:defRPr>
+            </a:lvl1pPr>
+            <a:lvl2pPr marL="754380" indent="-251460" algn="l" defTabSz="1005840" rtl="0" eaLnBrk="1" latinLnBrk="0" hangingPunct="1">
+              <a:lnSpc>
+                <a:spcPct val="90000"/>
+              </a:lnSpc>
+              <a:spcBef>
+                <a:spcPts val="550"/>
+              </a:spcBef>
+              <a:buFont typeface="Arial" panose="020B0604020202020204" pitchFamily="34" charset="0"/>
+              <a:buChar char="•"/>
+              <a:defRPr sz="2640" kern="1200">
+                <a:solidFill>
+                  <a:schemeClr val="tx1"/>
+                </a:solidFill>
+                <a:latin typeface="+mn-lt"/>
+                <a:ea typeface="+mn-ea"/>
+                <a:cs typeface="+mn-cs"/>
+              </a:defRPr>
+            </a:lvl2pPr>
+            <a:lvl3pPr marL="1257300" indent="-251460" algn="l" defTabSz="1005840" rtl="0" eaLnBrk="1" latinLnBrk="0" hangingPunct="1">
+              <a:lnSpc>
+                <a:spcPct val="90000"/>
+              </a:lnSpc>
+              <a:spcBef>
+                <a:spcPts val="550"/>
+              </a:spcBef>
+              <a:buFont typeface="Arial" panose="020B0604020202020204" pitchFamily="34" charset="0"/>
+              <a:buChar char="•"/>
+              <a:defRPr sz="2200" kern="1200">
+                <a:solidFill>
+                  <a:schemeClr val="tx1"/>
+                </a:solidFill>
+                <a:latin typeface="+mn-lt"/>
+                <a:ea typeface="+mn-ea"/>
+                <a:cs typeface="+mn-cs"/>
+              </a:defRPr>
+            </a:lvl3pPr>
+            <a:lvl4pPr marL="1760220" indent="-251460" algn="l" defTabSz="1005840" rtl="0" eaLnBrk="1" latinLnBrk="0" hangingPunct="1">
+              <a:lnSpc>
+                <a:spcPct val="90000"/>
+              </a:lnSpc>
+              <a:spcBef>
+                <a:spcPts val="550"/>
+              </a:spcBef>
+              <a:buFont typeface="Arial" panose="020B0604020202020204" pitchFamily="34" charset="0"/>
+              <a:buChar char="•"/>
+              <a:defRPr sz="1980" kern="1200">
+                <a:solidFill>
+                  <a:schemeClr val="tx1"/>
+                </a:solidFill>
+                <a:latin typeface="+mn-lt"/>
+                <a:ea typeface="+mn-ea"/>
+                <a:cs typeface="+mn-cs"/>
+              </a:defRPr>
+            </a:lvl4pPr>
+            <a:lvl5pPr marL="2263140" indent="-251460" algn="l" defTabSz="1005840" rtl="0" eaLnBrk="1" latinLnBrk="0" hangingPunct="1">
+              <a:lnSpc>
+                <a:spcPct val="90000"/>
+              </a:lnSpc>
+              <a:spcBef>
+                <a:spcPts val="550"/>
+              </a:spcBef>
+              <a:buFont typeface="Arial" panose="020B0604020202020204" pitchFamily="34" charset="0"/>
+              <a:buChar char="•"/>
+              <a:defRPr sz="1980" kern="1200">
+                <a:solidFill>
+                  <a:schemeClr val="tx1"/>
+                </a:solidFill>
+                <a:latin typeface="+mn-lt"/>
+                <a:ea typeface="+mn-ea"/>
+                <a:cs typeface="+mn-cs"/>
+              </a:defRPr>
+            </a:lvl5pPr>
+            <a:lvl6pPr marL="2766060" indent="-251460" algn="l" defTabSz="1005840" rtl="0" eaLnBrk="1" latinLnBrk="0" hangingPunct="1">
+              <a:lnSpc>
+                <a:spcPct val="90000"/>
+              </a:lnSpc>
+              <a:spcBef>
+                <a:spcPts val="550"/>
+              </a:spcBef>
+              <a:buFont typeface="Arial" panose="020B0604020202020204" pitchFamily="34" charset="0"/>
+              <a:buChar char="•"/>
+              <a:defRPr sz="1980" kern="1200">
+                <a:solidFill>
+                  <a:schemeClr val="tx1"/>
+                </a:solidFill>
+                <a:latin typeface="+mn-lt"/>
+                <a:ea typeface="+mn-ea"/>
+                <a:cs typeface="+mn-cs"/>
+              </a:defRPr>
+            </a:lvl6pPr>
+            <a:lvl7pPr marL="3268980" indent="-251460" algn="l" defTabSz="1005840" rtl="0" eaLnBrk="1" latinLnBrk="0" hangingPunct="1">
+              <a:lnSpc>
+                <a:spcPct val="90000"/>
+              </a:lnSpc>
+              <a:spcBef>
+                <a:spcPts val="550"/>
+              </a:spcBef>
+              <a:buFont typeface="Arial" panose="020B0604020202020204" pitchFamily="34" charset="0"/>
+              <a:buChar char="•"/>
+              <a:defRPr sz="1980" kern="1200">
+                <a:solidFill>
+                  <a:schemeClr val="tx1"/>
+                </a:solidFill>
+                <a:latin typeface="+mn-lt"/>
+                <a:ea typeface="+mn-ea"/>
+                <a:cs typeface="+mn-cs"/>
+              </a:defRPr>
+            </a:lvl7pPr>
+            <a:lvl8pPr marL="3771900" indent="-251460" algn="l" defTabSz="1005840" rtl="0" eaLnBrk="1" latinLnBrk="0" hangingPunct="1">
+              <a:lnSpc>
+                <a:spcPct val="90000"/>
+              </a:lnSpc>
+              <a:spcBef>
+                <a:spcPts val="550"/>
+              </a:spcBef>
+              <a:buFont typeface="Arial" panose="020B0604020202020204" pitchFamily="34" charset="0"/>
+              <a:buChar char="•"/>
+              <a:defRPr sz="1980" kern="1200">
+                <a:solidFill>
+                  <a:schemeClr val="tx1"/>
+                </a:solidFill>
+                <a:latin typeface="+mn-lt"/>
+                <a:ea typeface="+mn-ea"/>
+                <a:cs typeface="+mn-cs"/>
+              </a:defRPr>
+            </a:lvl8pPr>
+            <a:lvl9pPr marL="4274820" indent="-251460" algn="l" defTabSz="1005840" rtl="0" eaLnBrk="1" latinLnBrk="0" hangingPunct="1">
+              <a:lnSpc>
+                <a:spcPct val="90000"/>
+              </a:lnSpc>
+              <a:spcBef>
+                <a:spcPts val="550"/>
+              </a:spcBef>
+              <a:buFont typeface="Arial" panose="020B0604020202020204" pitchFamily="34" charset="0"/>
+              <a:buChar char="•"/>
+              <a:defRPr sz="1980" kern="1200">
+                <a:solidFill>
+                  <a:schemeClr val="tx1"/>
+                </a:solidFill>
+                <a:latin typeface="+mn-lt"/>
+                <a:ea typeface="+mn-ea"/>
+                <a:cs typeface="+mn-cs"/>
+              </a:defRPr>
+            </a:lvl9pPr>
+          </a:lstStyle>
+          <a:p>
+            <a:pPr marL="0" indent="0">
+              <a:buFont typeface="Arial" panose="020B0604020202020204" pitchFamily="34" charset="0"/>
+              <a:buNone/>
+            </a:pPr>
+            <a:r>
+              <a:rPr lang="en-US" dirty="0"/>
+              <a:t>LS</a:t>
+            </a:r>
+          </a:p>
+        </p:txBody>
+      </p:sp>
+      <p:sp>
+        <p:nvSpPr>
+          <p:cNvPr id="7" name="TextBox 6">
+            <a:extLst>
+              <a:ext uri="{FF2B5EF4-FFF2-40B4-BE49-F238E27FC236}">
+                <a16:creationId xmlns:a16="http://schemas.microsoft.com/office/drawing/2014/main" id="{251AE748-36B3-4087-B46E-6DAB79A5117A}"/>
+              </a:ext>
+            </a:extLst>
+          </p:cNvPr>
+          <p:cNvSpPr txBox="1"/>
+          <p:nvPr/>
+        </p:nvSpPr>
+        <p:spPr>
+          <a:xfrm>
+            <a:off x="5266375" y="1438827"/>
+            <a:ext cx="2609849" cy="1200329"/>
+          </a:xfrm>
+          <a:prstGeom prst="rect">
+            <a:avLst/>
+          </a:prstGeom>
+          <a:noFill/>
+        </p:spPr>
+        <p:txBody>
+          <a:bodyPr wrap="square" rtlCol="0">
+            <a:spAutoFit/>
+          </a:bodyPr>
+          <a:lstStyle/>
+          <a:p>
+            <a:r>
+              <a:rPr lang="en-US" dirty="0"/>
+              <a:t>Logistic, a50/slope parameterization. Scale to 1 by dividing by max (not differentiable)</a:t>
+            </a:r>
+          </a:p>
+        </p:txBody>
+      </p:sp>
+      <p:pic>
+        <p:nvPicPr>
+          <p:cNvPr id="10" name="Picture 9">
+            <a:extLst>
+              <a:ext uri="{FF2B5EF4-FFF2-40B4-BE49-F238E27FC236}">
+                <a16:creationId xmlns:a16="http://schemas.microsoft.com/office/drawing/2014/main" id="{16A67F07-95E7-4A1F-B717-E78DCB58CF95}"/>
+              </a:ext>
+            </a:extLst>
+          </p:cNvPr>
+          <p:cNvPicPr>
+            <a:picLocks noChangeAspect="1"/>
+          </p:cNvPicPr>
+          <p:nvPr/>
+        </p:nvPicPr>
+        <p:blipFill>
+          <a:blip r:embed="rId2"/>
+          <a:stretch>
+            <a:fillRect/>
+          </a:stretch>
+        </p:blipFill>
+        <p:spPr>
+          <a:xfrm>
+            <a:off x="454342" y="1444034"/>
+            <a:ext cx="4574858" cy="2783305"/>
+          </a:xfrm>
+          <a:prstGeom prst="rect">
+            <a:avLst/>
+          </a:prstGeom>
+        </p:spPr>
+      </p:pic>
+      <p:pic>
+        <p:nvPicPr>
+          <p:cNvPr id="12" name="Picture 11">
+            <a:extLst>
+              <a:ext uri="{FF2B5EF4-FFF2-40B4-BE49-F238E27FC236}">
+                <a16:creationId xmlns:a16="http://schemas.microsoft.com/office/drawing/2014/main" id="{A2376DB9-5582-47F3-AA77-54C1BF54982C}"/>
+              </a:ext>
+            </a:extLst>
+          </p:cNvPr>
+          <p:cNvPicPr>
+            <a:picLocks noChangeAspect="1"/>
+          </p:cNvPicPr>
+          <p:nvPr/>
+        </p:nvPicPr>
+        <p:blipFill>
+          <a:blip r:embed="rId3"/>
+          <a:stretch>
+            <a:fillRect/>
+          </a:stretch>
+        </p:blipFill>
+        <p:spPr>
+          <a:xfrm>
+            <a:off x="454342" y="4867872"/>
+            <a:ext cx="4812035" cy="1510239"/>
+          </a:xfrm>
+          <a:prstGeom prst="rect">
+            <a:avLst/>
+          </a:prstGeom>
+        </p:spPr>
+      </p:pic>
+      <p:pic>
+        <p:nvPicPr>
+          <p:cNvPr id="13" name="Picture 12">
+            <a:extLst>
+              <a:ext uri="{FF2B5EF4-FFF2-40B4-BE49-F238E27FC236}">
+                <a16:creationId xmlns:a16="http://schemas.microsoft.com/office/drawing/2014/main" id="{CFE50F56-8B7B-4C60-B13F-3C235793E2DD}"/>
+              </a:ext>
+            </a:extLst>
+          </p:cNvPr>
+          <p:cNvPicPr>
+            <a:picLocks noChangeAspect="1"/>
+          </p:cNvPicPr>
+          <p:nvPr/>
+        </p:nvPicPr>
+        <p:blipFill>
+          <a:blip r:embed="rId4"/>
+          <a:stretch>
+            <a:fillRect/>
+          </a:stretch>
+        </p:blipFill>
+        <p:spPr>
+          <a:xfrm>
+            <a:off x="454341" y="6513005"/>
+            <a:ext cx="4574858" cy="845518"/>
+          </a:xfrm>
+          <a:prstGeom prst="rect">
+            <a:avLst/>
+          </a:prstGeom>
+        </p:spPr>
+      </p:pic>
+      <p:sp>
+        <p:nvSpPr>
+          <p:cNvPr id="14" name="TextBox 13">
+            <a:extLst>
+              <a:ext uri="{FF2B5EF4-FFF2-40B4-BE49-F238E27FC236}">
+                <a16:creationId xmlns:a16="http://schemas.microsoft.com/office/drawing/2014/main" id="{303F9EF6-35EB-4524-85A2-7E0729B26AD2}"/>
+              </a:ext>
+            </a:extLst>
+          </p:cNvPr>
+          <p:cNvSpPr txBox="1"/>
+          <p:nvPr/>
+        </p:nvSpPr>
+        <p:spPr>
+          <a:xfrm>
+            <a:off x="5553074" y="4867872"/>
+            <a:ext cx="2609849" cy="2308324"/>
+          </a:xfrm>
+          <a:prstGeom prst="rect">
+            <a:avLst/>
+          </a:prstGeom>
+          <a:noFill/>
+        </p:spPr>
+        <p:txBody>
+          <a:bodyPr wrap="square" rtlCol="0">
+            <a:spAutoFit/>
+          </a:bodyPr>
+          <a:lstStyle/>
+          <a:p>
+            <a:r>
+              <a:rPr lang="en-US" dirty="0"/>
+              <a:t>Logistic, a50/slope parameterization. Scale by taking difference of log selectivity and log mean selectivity (differentiable). Estimate in log space to keep values positive.</a:t>
+            </a:r>
+          </a:p>
+        </p:txBody>
+      </p:sp>
+    </p:spTree>
+    <p:extLst>
+      <p:ext uri="{BB962C8B-B14F-4D97-AF65-F5344CB8AC3E}">
+        <p14:creationId xmlns:p14="http://schemas.microsoft.com/office/powerpoint/2010/main" val="52294102"/>
       </p:ext>
     </p:extLst>
   </p:cSld>
@@ -3091,7 +4032,7 @@
           <a:p>
             <a:r>
               <a:rPr lang="en-US" dirty="0"/>
-              <a:t>Natural mortality/survival</a:t>
+              <a:t>Initializing N matrix</a:t>
             </a:r>
           </a:p>
         </p:txBody>
@@ -3335,12 +4276,82 @@
           </a:p>
         </p:txBody>
       </p:sp>
+      <p:sp>
+        <p:nvSpPr>
+          <p:cNvPr id="7" name="TextBox 6">
+            <a:extLst>
+              <a:ext uri="{FF2B5EF4-FFF2-40B4-BE49-F238E27FC236}">
+                <a16:creationId xmlns:a16="http://schemas.microsoft.com/office/drawing/2014/main" id="{251AE748-36B3-4087-B46E-6DAB79A5117A}"/>
+              </a:ext>
+            </a:extLst>
+          </p:cNvPr>
+          <p:cNvSpPr txBox="1"/>
+          <p:nvPr/>
+        </p:nvSpPr>
+        <p:spPr>
+          <a:xfrm>
+            <a:off x="6236970" y="1392761"/>
+            <a:ext cx="2339342" cy="1754326"/>
+          </a:xfrm>
+          <a:prstGeom prst="rect">
+            <a:avLst/>
+          </a:prstGeom>
+          <a:noFill/>
+        </p:spPr>
+        <p:txBody>
+          <a:bodyPr wrap="square" rtlCol="0">
+            <a:spAutoFit/>
+          </a:bodyPr>
+          <a:lstStyle/>
+          <a:p>
+            <a:r>
+              <a:rPr lang="en-US" dirty="0"/>
+              <a:t>One parameter for each age 4-8+ in initial year and one for parameter for age-3 in each year, Estimated on natural scale.</a:t>
+            </a:r>
+          </a:p>
+        </p:txBody>
+      </p:sp>
+      <p:sp>
+        <p:nvSpPr>
+          <p:cNvPr id="8" name="TextBox 7">
+            <a:extLst>
+              <a:ext uri="{FF2B5EF4-FFF2-40B4-BE49-F238E27FC236}">
+                <a16:creationId xmlns:a16="http://schemas.microsoft.com/office/drawing/2014/main" id="{25CA6CB8-B61E-4F39-B9A1-93B57448F711}"/>
+              </a:ext>
+            </a:extLst>
+          </p:cNvPr>
+          <p:cNvSpPr txBox="1"/>
+          <p:nvPr/>
+        </p:nvSpPr>
+        <p:spPr>
+          <a:xfrm>
+            <a:off x="454343" y="4561353"/>
+            <a:ext cx="5782628" cy="646331"/>
+          </a:xfrm>
+          <a:prstGeom prst="rect">
+            <a:avLst/>
+          </a:prstGeom>
+          <a:noFill/>
+        </p:spPr>
+        <p:txBody>
+          <a:bodyPr wrap="square" rtlCol="0">
+            <a:spAutoFit/>
+          </a:bodyPr>
+          <a:lstStyle/>
+          <a:p>
+            <a:r>
+              <a:rPr lang="en-US" dirty="0"/>
+              <a:t>One mean initial numbers at age and recruitment parameter plus deviations. Estimated on log-scale.</a:t>
+            </a:r>
+          </a:p>
+        </p:txBody>
+      </p:sp>
       <p:pic>
         <p:nvPicPr>
-          <p:cNvPr id="5" name="Picture 4">
+          <p:cNvPr id="10" name="Picture 9">
             <a:extLst>
               <a:ext uri="{FF2B5EF4-FFF2-40B4-BE49-F238E27FC236}">
-                <a16:creationId xmlns:a16="http://schemas.microsoft.com/office/drawing/2014/main" id="{E9777265-3084-408B-9FBD-025984825E3A}"/>
+                <a16:creationId xmlns:a16="http://schemas.microsoft.com/office/drawing/2014/main" id="{66B4BBFC-3BB9-4775-8CFF-D7D22B0EC81A}"/>
               </a:ext>
             </a:extLst>
           </p:cNvPr>
@@ -3357,8 +4368,8 @@
         </p:blipFill>
         <p:spPr>
           <a:xfrm>
-            <a:off x="454342" y="1866899"/>
-            <a:ext cx="4572000" cy="2257425"/>
+            <a:off x="454342" y="1821479"/>
+            <a:ext cx="5457825" cy="1866900"/>
           </a:xfrm>
           <a:prstGeom prst="rect">
             <a:avLst/>
@@ -3367,10 +4378,10 @@
       </p:pic>
       <p:pic>
         <p:nvPicPr>
-          <p:cNvPr id="6" name="Picture 5">
+          <p:cNvPr id="11" name="Picture 10">
             <a:extLst>
               <a:ext uri="{FF2B5EF4-FFF2-40B4-BE49-F238E27FC236}">
-                <a16:creationId xmlns:a16="http://schemas.microsoft.com/office/drawing/2014/main" id="{BA21ADE4-5D06-4095-8B9C-8947985EB5DD}"/>
+                <a16:creationId xmlns:a16="http://schemas.microsoft.com/office/drawing/2014/main" id="{3659720A-29FA-4F68-ADD2-7E28D275B662}"/>
               </a:ext>
             </a:extLst>
           </p:cNvPr>
@@ -3387,108 +4398,8 @@
         </p:blipFill>
         <p:spPr>
           <a:xfrm>
-            <a:off x="454342" y="4585274"/>
-            <a:ext cx="6743700" cy="2066925"/>
-          </a:xfrm>
-          <a:prstGeom prst="rect">
-            <a:avLst/>
-          </a:prstGeom>
-        </p:spPr>
-      </p:pic>
-      <p:sp>
-        <p:nvSpPr>
-          <p:cNvPr id="7" name="TextBox 6">
-            <a:extLst>
-              <a:ext uri="{FF2B5EF4-FFF2-40B4-BE49-F238E27FC236}">
-                <a16:creationId xmlns:a16="http://schemas.microsoft.com/office/drawing/2014/main" id="{251AE748-36B3-4087-B46E-6DAB79A5117A}"/>
-              </a:ext>
-            </a:extLst>
-          </p:cNvPr>
-          <p:cNvSpPr txBox="1"/>
-          <p:nvPr/>
-        </p:nvSpPr>
-        <p:spPr>
-          <a:xfrm>
-            <a:off x="5266375" y="1981199"/>
-            <a:ext cx="2609849" cy="646331"/>
-          </a:xfrm>
-          <a:prstGeom prst="rect">
-            <a:avLst/>
-          </a:prstGeom>
-          <a:noFill/>
-        </p:spPr>
-        <p:txBody>
-          <a:bodyPr wrap="square" rtlCol="0">
-            <a:spAutoFit/>
-          </a:bodyPr>
-          <a:lstStyle/>
-          <a:p>
-            <a:r>
-              <a:rPr lang="en-US" dirty="0"/>
-              <a:t>Separate/independent M estimated for each block</a:t>
-            </a:r>
-          </a:p>
-        </p:txBody>
-      </p:sp>
-      <p:sp>
-        <p:nvSpPr>
-          <p:cNvPr id="8" name="TextBox 7">
-            <a:extLst>
-              <a:ext uri="{FF2B5EF4-FFF2-40B4-BE49-F238E27FC236}">
-                <a16:creationId xmlns:a16="http://schemas.microsoft.com/office/drawing/2014/main" id="{25CA6CB8-B61E-4F39-B9A1-93B57448F711}"/>
-              </a:ext>
-            </a:extLst>
-          </p:cNvPr>
-          <p:cNvSpPr txBox="1"/>
-          <p:nvPr/>
-        </p:nvSpPr>
-        <p:spPr>
-          <a:xfrm>
-            <a:off x="7406642" y="5253037"/>
-            <a:ext cx="2339341" cy="1754326"/>
-          </a:xfrm>
-          <a:prstGeom prst="rect">
-            <a:avLst/>
-          </a:prstGeom>
-          <a:noFill/>
-        </p:spPr>
-        <p:txBody>
-          <a:bodyPr wrap="square" rtlCol="0">
-            <a:spAutoFit/>
-          </a:bodyPr>
-          <a:lstStyle/>
-          <a:p>
-            <a:r>
-              <a:rPr lang="en-US" dirty="0"/>
-              <a:t>Mean M with deviations for each time block. Deviations are assumed lognormally distributed</a:t>
-            </a:r>
-          </a:p>
-        </p:txBody>
-      </p:sp>
-      <p:pic>
-        <p:nvPicPr>
-          <p:cNvPr id="9" name="Picture 8">
-            <a:extLst>
-              <a:ext uri="{FF2B5EF4-FFF2-40B4-BE49-F238E27FC236}">
-                <a16:creationId xmlns:a16="http://schemas.microsoft.com/office/drawing/2014/main" id="{DF40C3C3-40CF-4BE2-AB16-1B981B0001E6}"/>
-              </a:ext>
-            </a:extLst>
-          </p:cNvPr>
-          <p:cNvPicPr>
-            <a:picLocks noChangeAspect="1"/>
-          </p:cNvPicPr>
-          <p:nvPr/>
-        </p:nvPicPr>
-        <p:blipFill>
-          <a:blip r:embed="rId4"/>
-          <a:stretch>
-            <a:fillRect/>
-          </a:stretch>
-        </p:blipFill>
-        <p:spPr>
-          <a:xfrm>
-            <a:off x="454342" y="6736911"/>
-            <a:ext cx="6505575" cy="752475"/>
+            <a:off x="454342" y="5273347"/>
+            <a:ext cx="9331915" cy="1788346"/>
           </a:xfrm>
           <a:prstGeom prst="rect">
             <a:avLst/>
@@ -3553,43 +4464,7 @@
           <a:p>
             <a:r>
               <a:rPr lang="en-US" dirty="0"/>
-              <a:t>Maturity</a:t>
-            </a:r>
-          </a:p>
-        </p:txBody>
-      </p:sp>
-      <p:sp>
-        <p:nvSpPr>
-          <p:cNvPr id="3" name="Content Placeholder 2">
-            <a:extLst>
-              <a:ext uri="{FF2B5EF4-FFF2-40B4-BE49-F238E27FC236}">
-                <a16:creationId xmlns:a16="http://schemas.microsoft.com/office/drawing/2014/main" id="{BB5B9591-6BBC-4B0D-8085-50D5036BBADE}"/>
-              </a:ext>
-            </a:extLst>
-          </p:cNvPr>
-          <p:cNvSpPr>
-            <a:spLocks noGrp="1"/>
-          </p:cNvSpPr>
-          <p:nvPr>
-            <p:ph idx="1"/>
-          </p:nvPr>
-        </p:nvSpPr>
-        <p:spPr>
-          <a:xfrm>
-            <a:off x="454341" y="3468885"/>
-            <a:ext cx="4337685" cy="523875"/>
-          </a:xfrm>
-        </p:spPr>
-        <p:txBody>
-          <a:bodyPr/>
-          <a:lstStyle/>
-          <a:p>
-            <a:pPr marL="0" indent="0">
-              <a:buNone/>
-            </a:pPr>
-            <a:r>
-              <a:rPr lang="en-US" dirty="0"/>
-              <a:t>HER</a:t>
+              <a:t>Catch in numbers-at-age </a:t>
             </a:r>
           </a:p>
         </p:txBody>
@@ -3610,7 +4485,7 @@
         </p:nvSpPr>
         <p:spPr>
           <a:xfrm>
-            <a:off x="454341" y="1044176"/>
+            <a:off x="454342" y="1343024"/>
             <a:ext cx="4337685" cy="523875"/>
           </a:xfrm>
           <a:prstGeom prst="rect">
@@ -3792,52 +4667,17 @@
             </a:pPr>
             <a:r>
               <a:rPr lang="en-US" dirty="0"/>
-              <a:t>LS</a:t>
-            </a:r>
-          </a:p>
-        </p:txBody>
-      </p:sp>
-      <p:sp>
-        <p:nvSpPr>
-          <p:cNvPr id="7" name="TextBox 6">
+              <a:t>LS (conditioned on catch)</a:t>
+            </a:r>
+          </a:p>
+        </p:txBody>
+      </p:sp>
+      <p:pic>
+        <p:nvPicPr>
+          <p:cNvPr id="5" name="Picture 4">
             <a:extLst>
               <a:ext uri="{FF2B5EF4-FFF2-40B4-BE49-F238E27FC236}">
-                <a16:creationId xmlns:a16="http://schemas.microsoft.com/office/drawing/2014/main" id="{72605019-96D8-4F7B-A59A-AAD9E9523421}"/>
-              </a:ext>
-            </a:extLst>
-          </p:cNvPr>
-          <p:cNvSpPr txBox="1"/>
-          <p:nvPr/>
-        </p:nvSpPr>
-        <p:spPr>
-          <a:xfrm>
-            <a:off x="6236016" y="1568051"/>
-            <a:ext cx="2609849" cy="646331"/>
-          </a:xfrm>
-          <a:prstGeom prst="rect">
-            <a:avLst/>
-          </a:prstGeom>
-          <a:noFill/>
-        </p:spPr>
-        <p:txBody>
-          <a:bodyPr wrap="square" rtlCol="0">
-            <a:spAutoFit/>
-          </a:bodyPr>
-          <a:lstStyle/>
-          <a:p>
-            <a:r>
-              <a:rPr lang="en-US" dirty="0"/>
-              <a:t>Logistic, a50/slope parameterization</a:t>
-            </a:r>
-          </a:p>
-        </p:txBody>
-      </p:sp>
-      <p:pic>
-        <p:nvPicPr>
-          <p:cNvPr id="9" name="Picture 8">
-            <a:extLst>
-              <a:ext uri="{FF2B5EF4-FFF2-40B4-BE49-F238E27FC236}">
-                <a16:creationId xmlns:a16="http://schemas.microsoft.com/office/drawing/2014/main" id="{E5320891-1029-48BD-B517-EB0AB1BA01C7}"/>
+                <a16:creationId xmlns:a16="http://schemas.microsoft.com/office/drawing/2014/main" id="{6B6AA4EB-EBAC-479A-93E2-DADA1564ECA9}"/>
               </a:ext>
             </a:extLst>
           </p:cNvPr>
@@ -3854,80 +4694,1052 @@
         </p:blipFill>
         <p:spPr>
           <a:xfrm>
-            <a:off x="448624" y="6689460"/>
-            <a:ext cx="5429250" cy="723900"/>
+            <a:off x="454343" y="1893079"/>
+            <a:ext cx="5010792" cy="4164744"/>
           </a:xfrm>
           <a:prstGeom prst="rect">
             <a:avLst/>
           </a:prstGeom>
         </p:spPr>
       </p:pic>
-      <p:pic>
-        <p:nvPicPr>
-          <p:cNvPr id="10" name="Picture 9">
+      <mc:AlternateContent xmlns:mc="http://schemas.openxmlformats.org/markup-compatibility/2006">
+        <mc:Choice xmlns:a14="http://schemas.microsoft.com/office/drawing/2010/main" Requires="a14">
+          <p:sp>
+            <p:nvSpPr>
+              <p:cNvPr id="13" name="TextBox 12">
+                <a:extLst>
+                  <a:ext uri="{FF2B5EF4-FFF2-40B4-BE49-F238E27FC236}">
+                    <a16:creationId xmlns:a16="http://schemas.microsoft.com/office/drawing/2014/main" id="{931A78A2-D9EE-4FC1-909D-B9BDD1B0BDD0}"/>
+                  </a:ext>
+                </a:extLst>
+              </p:cNvPr>
+              <p:cNvSpPr txBox="1"/>
+              <p:nvPr/>
+            </p:nvSpPr>
+            <p:spPr>
+              <a:xfrm>
+                <a:off x="5699051" y="1343024"/>
+                <a:ext cx="4120001" cy="5415521"/>
+              </a:xfrm>
+              <a:prstGeom prst="rect">
+                <a:avLst/>
+              </a:prstGeom>
+              <a:noFill/>
+            </p:spPr>
+            <p:txBody>
+              <a:bodyPr wrap="square" rtlCol="0">
+                <a:spAutoFit/>
+              </a:bodyPr>
+              <a:lstStyle/>
+              <a:p>
+                <a:r>
+                  <a:rPr lang="en-US" sz="1600" dirty="0"/>
+                  <a:t>Eqn in </a:t>
+                </a:r>
+                <a:r>
+                  <a:rPr lang="en-US" sz="1600" dirty="0" err="1"/>
+                  <a:t>Hulson</a:t>
+                </a:r>
+                <a:r>
+                  <a:rPr lang="en-US" sz="1600" dirty="0"/>
+                  <a:t> et al.</a:t>
+                </a:r>
+              </a:p>
+              <a:p>
+                <a:endParaRPr lang="en-US" sz="1600" dirty="0"/>
+              </a:p>
+              <a:p>
+                <a14:m>
+                  <m:oMathPara xmlns:m="http://schemas.openxmlformats.org/officeDocument/2006/math">
+                    <m:oMathParaPr>
+                      <m:jc m:val="centerGroup"/>
+                    </m:oMathParaPr>
+                    <m:oMath xmlns:m="http://schemas.openxmlformats.org/officeDocument/2006/math">
+                      <m:sSub>
+                        <m:sSubPr>
+                          <m:ctrlPr>
+                            <a:rPr lang="en-US" sz="1600" i="1">
+                              <a:latin typeface="Cambria Math" panose="02040503050406030204" pitchFamily="18" charset="0"/>
+                            </a:rPr>
+                          </m:ctrlPr>
+                        </m:sSubPr>
+                        <m:e>
+                          <m:r>
+                            <a:rPr lang="en-US" sz="1600" i="1">
+                              <a:latin typeface="Cambria Math" panose="02040503050406030204" pitchFamily="18" charset="0"/>
+                            </a:rPr>
+                            <m:t>𝐶</m:t>
+                          </m:r>
+                        </m:e>
+                        <m:sub>
+                          <m:r>
+                            <a:rPr lang="en-US" sz="1600" i="1">
+                              <a:latin typeface="Cambria Math" panose="02040503050406030204" pitchFamily="18" charset="0"/>
+                            </a:rPr>
+                            <m:t>𝑖𝑗</m:t>
+                          </m:r>
+                        </m:sub>
+                      </m:sSub>
+                      <m:r>
+                        <a:rPr lang="en-US" sz="1600" i="1">
+                          <a:latin typeface="Cambria Math" panose="02040503050406030204" pitchFamily="18" charset="0"/>
+                        </a:rPr>
+                        <m:t>=</m:t>
+                      </m:r>
+                      <m:f>
+                        <m:fPr>
+                          <m:ctrlPr>
+                            <a:rPr lang="en-US" sz="1600" i="1" smtClean="0">
+                              <a:latin typeface="Cambria Math" panose="02040503050406030204" pitchFamily="18" charset="0"/>
+                            </a:rPr>
+                          </m:ctrlPr>
+                        </m:fPr>
+                        <m:num>
+                          <m:f>
+                            <m:fPr>
+                              <m:ctrlPr>
+                                <a:rPr lang="en-US" sz="1600" i="1">
+                                  <a:latin typeface="Cambria Math" panose="02040503050406030204" pitchFamily="18" charset="0"/>
+                                </a:rPr>
+                              </m:ctrlPr>
+                            </m:fPr>
+                            <m:num>
+                              <m:sSub>
+                                <m:sSubPr>
+                                  <m:ctrlPr>
+                                    <a:rPr lang="en-US" sz="1600" i="1">
+                                      <a:latin typeface="Cambria Math" panose="02040503050406030204" pitchFamily="18" charset="0"/>
+                                    </a:rPr>
+                                  </m:ctrlPr>
+                                </m:sSubPr>
+                                <m:e>
+                                  <m:r>
+                                    <a:rPr lang="en-US" sz="1600" i="1">
+                                      <a:latin typeface="Cambria Math" panose="02040503050406030204" pitchFamily="18" charset="0"/>
+                                    </a:rPr>
+                                    <m:t>𝑁</m:t>
+                                  </m:r>
+                                </m:e>
+                                <m:sub>
+                                  <m:r>
+                                    <a:rPr lang="en-US" sz="1600" i="1">
+                                      <a:latin typeface="Cambria Math" panose="02040503050406030204" pitchFamily="18" charset="0"/>
+                                    </a:rPr>
+                                    <m:t>𝑖𝑗</m:t>
+                                  </m:r>
+                                </m:sub>
+                              </m:sSub>
+                              <m:sSub>
+                                <m:sSubPr>
+                                  <m:ctrlPr>
+                                    <a:rPr lang="en-US" sz="1600" i="1">
+                                      <a:latin typeface="Cambria Math" panose="02040503050406030204" pitchFamily="18" charset="0"/>
+                                    </a:rPr>
+                                  </m:ctrlPr>
+                                </m:sSubPr>
+                                <m:e>
+                                  <m:r>
+                                    <a:rPr lang="en-US" sz="1600" i="1">
+                                      <a:latin typeface="Cambria Math" panose="02040503050406030204" pitchFamily="18" charset="0"/>
+                                    </a:rPr>
+                                    <m:t>𝑠</m:t>
+                                  </m:r>
+                                </m:e>
+                                <m:sub>
+                                  <m:r>
+                                    <a:rPr lang="en-US" sz="1600" i="1">
+                                      <a:latin typeface="Cambria Math" panose="02040503050406030204" pitchFamily="18" charset="0"/>
+                                    </a:rPr>
+                                    <m:t>𝑖𝑗</m:t>
+                                  </m:r>
+                                </m:sub>
+                              </m:sSub>
+                            </m:num>
+                            <m:den>
+                              <m:nary>
+                                <m:naryPr>
+                                  <m:chr m:val="∑"/>
+                                  <m:ctrlPr>
+                                    <a:rPr lang="en-US" sz="1600" i="1">
+                                      <a:latin typeface="Cambria Math" panose="02040503050406030204" pitchFamily="18" charset="0"/>
+                                    </a:rPr>
+                                  </m:ctrlPr>
+                                </m:naryPr>
+                                <m:sub>
+                                  <m:r>
+                                    <m:rPr>
+                                      <m:brk m:alnAt="23"/>
+                                    </m:rPr>
+                                    <a:rPr lang="en-US" sz="1600" i="1">
+                                      <a:latin typeface="Cambria Math" panose="02040503050406030204" pitchFamily="18" charset="0"/>
+                                    </a:rPr>
+                                    <m:t>𝑗</m:t>
+                                  </m:r>
+                                  <m:r>
+                                    <a:rPr lang="en-US" sz="1600" i="1">
+                                      <a:latin typeface="Cambria Math" panose="02040503050406030204" pitchFamily="18" charset="0"/>
+                                    </a:rPr>
+                                    <m:t>=3</m:t>
+                                  </m:r>
+                                </m:sub>
+                                <m:sup>
+                                  <m:r>
+                                    <a:rPr lang="en-US" sz="1600" i="1">
+                                      <a:latin typeface="Cambria Math" panose="02040503050406030204" pitchFamily="18" charset="0"/>
+                                    </a:rPr>
+                                    <m:t>8+</m:t>
+                                  </m:r>
+                                </m:sup>
+                                <m:e>
+                                  <m:sSub>
+                                    <m:sSubPr>
+                                      <m:ctrlPr>
+                                        <a:rPr lang="en-US" sz="1600" i="1">
+                                          <a:latin typeface="Cambria Math" panose="02040503050406030204" pitchFamily="18" charset="0"/>
+                                        </a:rPr>
+                                      </m:ctrlPr>
+                                    </m:sSubPr>
+                                    <m:e>
+                                      <m:r>
+                                        <a:rPr lang="en-US" sz="1600" i="1">
+                                          <a:latin typeface="Cambria Math" panose="02040503050406030204" pitchFamily="18" charset="0"/>
+                                        </a:rPr>
+                                        <m:t>𝑁</m:t>
+                                      </m:r>
+                                    </m:e>
+                                    <m:sub>
+                                      <m:r>
+                                        <a:rPr lang="en-US" sz="1600" i="1">
+                                          <a:latin typeface="Cambria Math" panose="02040503050406030204" pitchFamily="18" charset="0"/>
+                                        </a:rPr>
+                                        <m:t>𝑖𝑗</m:t>
+                                      </m:r>
+                                    </m:sub>
+                                  </m:sSub>
+                                  <m:sSub>
+                                    <m:sSubPr>
+                                      <m:ctrlPr>
+                                        <a:rPr lang="en-US" sz="1600" i="1">
+                                          <a:latin typeface="Cambria Math" panose="02040503050406030204" pitchFamily="18" charset="0"/>
+                                        </a:rPr>
+                                      </m:ctrlPr>
+                                    </m:sSubPr>
+                                    <m:e>
+                                      <m:r>
+                                        <a:rPr lang="en-US" sz="1600" i="1">
+                                          <a:latin typeface="Cambria Math" panose="02040503050406030204" pitchFamily="18" charset="0"/>
+                                        </a:rPr>
+                                        <m:t>𝑠</m:t>
+                                      </m:r>
+                                    </m:e>
+                                    <m:sub>
+                                      <m:r>
+                                        <a:rPr lang="en-US" sz="1600" i="1">
+                                          <a:latin typeface="Cambria Math" panose="02040503050406030204" pitchFamily="18" charset="0"/>
+                                        </a:rPr>
+                                        <m:t>𝑖𝑗</m:t>
+                                      </m:r>
+                                    </m:sub>
+                                  </m:sSub>
+                                </m:e>
+                              </m:nary>
+                            </m:den>
+                          </m:f>
+                          <m:sSub>
+                            <m:sSubPr>
+                              <m:ctrlPr>
+                                <a:rPr lang="en-US" sz="1600" i="1">
+                                  <a:latin typeface="Cambria Math" panose="02040503050406030204" pitchFamily="18" charset="0"/>
+                                </a:rPr>
+                              </m:ctrlPr>
+                            </m:sSubPr>
+                            <m:e>
+                              <m:r>
+                                <a:rPr lang="en-US" sz="1600" i="1">
+                                  <a:latin typeface="Cambria Math" panose="02040503050406030204" pitchFamily="18" charset="0"/>
+                                </a:rPr>
+                                <m:t>𝑌</m:t>
+                              </m:r>
+                            </m:e>
+                            <m:sub>
+                              <m:r>
+                                <a:rPr lang="en-US" sz="1600" i="1">
+                                  <a:latin typeface="Cambria Math" panose="02040503050406030204" pitchFamily="18" charset="0"/>
+                                </a:rPr>
+                                <m:t>𝑖</m:t>
+                              </m:r>
+                            </m:sub>
+                          </m:sSub>
+                        </m:num>
+                        <m:den>
+                          <m:sSubSup>
+                            <m:sSubSupPr>
+                              <m:ctrlPr>
+                                <a:rPr lang="en-US" sz="1600" i="1">
+                                  <a:latin typeface="Cambria Math" panose="02040503050406030204" pitchFamily="18" charset="0"/>
+                                </a:rPr>
+                              </m:ctrlPr>
+                            </m:sSubSupPr>
+                            <m:e>
+                              <m:r>
+                                <a:rPr lang="en-US" sz="1600" i="1">
+                                  <a:latin typeface="Cambria Math" panose="02040503050406030204" pitchFamily="18" charset="0"/>
+                                </a:rPr>
+                                <m:t>𝑤</m:t>
+                              </m:r>
+                            </m:e>
+                            <m:sub>
+                              <m:r>
+                                <a:rPr lang="en-US" sz="1600" i="1">
+                                  <a:latin typeface="Cambria Math" panose="02040503050406030204" pitchFamily="18" charset="0"/>
+                                </a:rPr>
+                                <m:t>𝑖𝑗</m:t>
+                              </m:r>
+                            </m:sub>
+                            <m:sup>
+                              <m:r>
+                                <a:rPr lang="en-US" sz="1600" i="1">
+                                  <a:latin typeface="Cambria Math" panose="02040503050406030204" pitchFamily="18" charset="0"/>
+                                </a:rPr>
+                                <m:t>𝑓𝑠h</m:t>
+                              </m:r>
+                            </m:sup>
+                          </m:sSubSup>
+                        </m:den>
+                      </m:f>
+                    </m:oMath>
+                  </m:oMathPara>
+                </a14:m>
+                <a:endParaRPr lang="en-US" sz="1600" dirty="0"/>
+              </a:p>
+              <a:p>
+                <a:endParaRPr lang="en-US" sz="1600" dirty="0"/>
+              </a:p>
+              <a:p>
+                <a:r>
+                  <a:rPr lang="en-US" sz="1600" dirty="0"/>
+                  <a:t>Eqn in code:</a:t>
+                </a:r>
+              </a:p>
+              <a:p>
+                <a:endParaRPr lang="en-US" sz="1600" dirty="0">
+                  <a:latin typeface="Cambria Math" panose="02040503050406030204" pitchFamily="18" charset="0"/>
+                </a:endParaRPr>
+              </a:p>
+              <a:p>
+                <a:pPr/>
+                <a14:m>
+                  <m:oMathPara xmlns:m="http://schemas.openxmlformats.org/officeDocument/2006/math">
+                    <m:oMathParaPr>
+                      <m:jc m:val="centerGroup"/>
+                    </m:oMathParaPr>
+                    <m:oMath xmlns:m="http://schemas.openxmlformats.org/officeDocument/2006/math">
+                      <m:sSub>
+                        <m:sSubPr>
+                          <m:ctrlPr>
+                            <a:rPr lang="en-US" sz="1600" i="1">
+                              <a:latin typeface="Cambria Math" panose="02040503050406030204" pitchFamily="18" charset="0"/>
+                            </a:rPr>
+                          </m:ctrlPr>
+                        </m:sSubPr>
+                        <m:e>
+                          <m:r>
+                            <a:rPr lang="en-US" sz="1600" i="1">
+                              <a:latin typeface="Cambria Math" panose="02040503050406030204" pitchFamily="18" charset="0"/>
+                            </a:rPr>
+                            <m:t>𝐶</m:t>
+                          </m:r>
+                        </m:e>
+                        <m:sub>
+                          <m:r>
+                            <a:rPr lang="en-US" sz="1600" i="1">
+                              <a:latin typeface="Cambria Math" panose="02040503050406030204" pitchFamily="18" charset="0"/>
+                            </a:rPr>
+                            <m:t>𝑖𝑗</m:t>
+                          </m:r>
+                        </m:sub>
+                      </m:sSub>
+                      <m:r>
+                        <a:rPr lang="en-US" sz="1600" i="1">
+                          <a:latin typeface="Cambria Math" panose="02040503050406030204" pitchFamily="18" charset="0"/>
+                        </a:rPr>
+                        <m:t>=</m:t>
+                      </m:r>
+                      <m:f>
+                        <m:fPr>
+                          <m:ctrlPr>
+                            <a:rPr lang="en-US" sz="1600" i="1">
+                              <a:latin typeface="Cambria Math" panose="02040503050406030204" pitchFamily="18" charset="0"/>
+                            </a:rPr>
+                          </m:ctrlPr>
+                        </m:fPr>
+                        <m:num>
+                          <m:f>
+                            <m:fPr>
+                              <m:ctrlPr>
+                                <a:rPr lang="en-US" sz="1600" i="1">
+                                  <a:latin typeface="Cambria Math" panose="02040503050406030204" pitchFamily="18" charset="0"/>
+                                </a:rPr>
+                              </m:ctrlPr>
+                            </m:fPr>
+                            <m:num>
+                              <m:sSub>
+                                <m:sSubPr>
+                                  <m:ctrlPr>
+                                    <a:rPr lang="en-US" sz="1600" i="1">
+                                      <a:latin typeface="Cambria Math" panose="02040503050406030204" pitchFamily="18" charset="0"/>
+                                    </a:rPr>
+                                  </m:ctrlPr>
+                                </m:sSubPr>
+                                <m:e>
+                                  <m:r>
+                                    <a:rPr lang="en-US" sz="1600" i="1">
+                                      <a:latin typeface="Cambria Math" panose="02040503050406030204" pitchFamily="18" charset="0"/>
+                                    </a:rPr>
+                                    <m:t>𝑁</m:t>
+                                  </m:r>
+                                </m:e>
+                                <m:sub>
+                                  <m:r>
+                                    <a:rPr lang="en-US" sz="1600" i="1">
+                                      <a:latin typeface="Cambria Math" panose="02040503050406030204" pitchFamily="18" charset="0"/>
+                                    </a:rPr>
+                                    <m:t>𝑖𝑗</m:t>
+                                  </m:r>
+                                </m:sub>
+                              </m:sSub>
+                              <m:sSub>
+                                <m:sSubPr>
+                                  <m:ctrlPr>
+                                    <a:rPr lang="en-US" sz="1600" i="1">
+                                      <a:latin typeface="Cambria Math" panose="02040503050406030204" pitchFamily="18" charset="0"/>
+                                    </a:rPr>
+                                  </m:ctrlPr>
+                                </m:sSubPr>
+                                <m:e>
+                                  <m:r>
+                                    <a:rPr lang="en-US" sz="1600" i="1">
+                                      <a:latin typeface="Cambria Math" panose="02040503050406030204" pitchFamily="18" charset="0"/>
+                                    </a:rPr>
+                                    <m:t>𝑠</m:t>
+                                  </m:r>
+                                </m:e>
+                                <m:sub>
+                                  <m:r>
+                                    <a:rPr lang="en-US" sz="1600" i="1">
+                                      <a:latin typeface="Cambria Math" panose="02040503050406030204" pitchFamily="18" charset="0"/>
+                                    </a:rPr>
+                                    <m:t>𝑖𝑗</m:t>
+                                  </m:r>
+                                </m:sub>
+                              </m:sSub>
+                            </m:num>
+                            <m:den>
+                              <m:nary>
+                                <m:naryPr>
+                                  <m:chr m:val="∑"/>
+                                  <m:ctrlPr>
+                                    <a:rPr lang="en-US" sz="1600" i="1">
+                                      <a:latin typeface="Cambria Math" panose="02040503050406030204" pitchFamily="18" charset="0"/>
+                                    </a:rPr>
+                                  </m:ctrlPr>
+                                </m:naryPr>
+                                <m:sub>
+                                  <m:r>
+                                    <m:rPr>
+                                      <m:brk m:alnAt="23"/>
+                                    </m:rPr>
+                                    <a:rPr lang="en-US" sz="1600" i="1">
+                                      <a:latin typeface="Cambria Math" panose="02040503050406030204" pitchFamily="18" charset="0"/>
+                                    </a:rPr>
+                                    <m:t>𝑗</m:t>
+                                  </m:r>
+                                  <m:r>
+                                    <a:rPr lang="en-US" sz="1600" i="1">
+                                      <a:latin typeface="Cambria Math" panose="02040503050406030204" pitchFamily="18" charset="0"/>
+                                    </a:rPr>
+                                    <m:t>=3</m:t>
+                                  </m:r>
+                                </m:sub>
+                                <m:sup>
+                                  <m:r>
+                                    <a:rPr lang="en-US" sz="1600" i="1">
+                                      <a:latin typeface="Cambria Math" panose="02040503050406030204" pitchFamily="18" charset="0"/>
+                                    </a:rPr>
+                                    <m:t>8+</m:t>
+                                  </m:r>
+                                </m:sup>
+                                <m:e>
+                                  <m:sSub>
+                                    <m:sSubPr>
+                                      <m:ctrlPr>
+                                        <a:rPr lang="en-US" sz="1600" i="1">
+                                          <a:latin typeface="Cambria Math" panose="02040503050406030204" pitchFamily="18" charset="0"/>
+                                        </a:rPr>
+                                      </m:ctrlPr>
+                                    </m:sSubPr>
+                                    <m:e>
+                                      <m:r>
+                                        <a:rPr lang="en-US" sz="1600" i="1">
+                                          <a:latin typeface="Cambria Math" panose="02040503050406030204" pitchFamily="18" charset="0"/>
+                                        </a:rPr>
+                                        <m:t>𝑁</m:t>
+                                      </m:r>
+                                    </m:e>
+                                    <m:sub>
+                                      <m:r>
+                                        <a:rPr lang="en-US" sz="1600" i="1">
+                                          <a:latin typeface="Cambria Math" panose="02040503050406030204" pitchFamily="18" charset="0"/>
+                                        </a:rPr>
+                                        <m:t>𝑖𝑗</m:t>
+                                      </m:r>
+                                    </m:sub>
+                                  </m:sSub>
+                                  <m:sSub>
+                                    <m:sSubPr>
+                                      <m:ctrlPr>
+                                        <a:rPr lang="en-US" sz="1600" i="1">
+                                          <a:latin typeface="Cambria Math" panose="02040503050406030204" pitchFamily="18" charset="0"/>
+                                        </a:rPr>
+                                      </m:ctrlPr>
+                                    </m:sSubPr>
+                                    <m:e>
+                                      <m:r>
+                                        <a:rPr lang="en-US" sz="1600" i="1">
+                                          <a:latin typeface="Cambria Math" panose="02040503050406030204" pitchFamily="18" charset="0"/>
+                                        </a:rPr>
+                                        <m:t>𝑠</m:t>
+                                      </m:r>
+                                    </m:e>
+                                    <m:sub>
+                                      <m:r>
+                                        <a:rPr lang="en-US" sz="1600" i="1">
+                                          <a:latin typeface="Cambria Math" panose="02040503050406030204" pitchFamily="18" charset="0"/>
+                                        </a:rPr>
+                                        <m:t>𝑖𝑗</m:t>
+                                      </m:r>
+                                    </m:sub>
+                                  </m:sSub>
+                                </m:e>
+                              </m:nary>
+                            </m:den>
+                          </m:f>
+                          <m:sSub>
+                            <m:sSubPr>
+                              <m:ctrlPr>
+                                <a:rPr lang="en-US" sz="1600" i="1">
+                                  <a:latin typeface="Cambria Math" panose="02040503050406030204" pitchFamily="18" charset="0"/>
+                                </a:rPr>
+                              </m:ctrlPr>
+                            </m:sSubPr>
+                            <m:e>
+                              <m:r>
+                                <a:rPr lang="en-US" sz="1600" i="1">
+                                  <a:latin typeface="Cambria Math" panose="02040503050406030204" pitchFamily="18" charset="0"/>
+                                </a:rPr>
+                                <m:t>𝑌</m:t>
+                              </m:r>
+                            </m:e>
+                            <m:sub>
+                              <m:r>
+                                <a:rPr lang="en-US" sz="1600" i="1">
+                                  <a:latin typeface="Cambria Math" panose="02040503050406030204" pitchFamily="18" charset="0"/>
+                                </a:rPr>
+                                <m:t>𝑖</m:t>
+                              </m:r>
+                            </m:sub>
+                          </m:sSub>
+                        </m:num>
+                        <m:den>
+                          <m:nary>
+                            <m:naryPr>
+                              <m:chr m:val="∑"/>
+                              <m:ctrlPr>
+                                <a:rPr lang="en-US" sz="1600" i="1">
+                                  <a:latin typeface="Cambria Math" panose="02040503050406030204" pitchFamily="18" charset="0"/>
+                                </a:rPr>
+                              </m:ctrlPr>
+                            </m:naryPr>
+                            <m:sub>
+                              <m:r>
+                                <a:rPr lang="en-US" sz="1600" b="0" i="1" smtClean="0">
+                                  <a:latin typeface="Cambria Math" panose="02040503050406030204" pitchFamily="18" charset="0"/>
+                                </a:rPr>
+                                <m:t>𝑗</m:t>
+                              </m:r>
+                              <m:r>
+                                <a:rPr lang="en-US" sz="1600" b="0" i="1" smtClean="0">
+                                  <a:latin typeface="Cambria Math" panose="02040503050406030204" pitchFamily="18" charset="0"/>
+                                </a:rPr>
+                                <m:t>=</m:t>
+                              </m:r>
+                              <m:r>
+                                <m:rPr>
+                                  <m:brk m:alnAt="23"/>
+                                </m:rPr>
+                                <a:rPr lang="en-US" sz="1600" i="1">
+                                  <a:latin typeface="Cambria Math" panose="02040503050406030204" pitchFamily="18" charset="0"/>
+                                </a:rPr>
+                                <m:t>3</m:t>
+                              </m:r>
+                            </m:sub>
+                            <m:sup>
+                              <m:r>
+                                <a:rPr lang="en-US" sz="1600" i="1">
+                                  <a:latin typeface="Cambria Math" panose="02040503050406030204" pitchFamily="18" charset="0"/>
+                                </a:rPr>
+                                <m:t>8+</m:t>
+                              </m:r>
+                            </m:sup>
+                            <m:e>
+                              <m:d>
+                                <m:dPr>
+                                  <m:begChr m:val="["/>
+                                  <m:endChr m:val="]"/>
+                                  <m:ctrlPr>
+                                    <a:rPr lang="en-US" sz="1600" i="1">
+                                      <a:latin typeface="Cambria Math" panose="02040503050406030204" pitchFamily="18" charset="0"/>
+                                    </a:rPr>
+                                  </m:ctrlPr>
+                                </m:dPr>
+                                <m:e>
+                                  <m:sSubSup>
+                                    <m:sSubSupPr>
+                                      <m:ctrlPr>
+                                        <a:rPr lang="en-US" sz="1600" i="1">
+                                          <a:latin typeface="Cambria Math" panose="02040503050406030204" pitchFamily="18" charset="0"/>
+                                        </a:rPr>
+                                      </m:ctrlPr>
+                                    </m:sSubSupPr>
+                                    <m:e>
+                                      <m:r>
+                                        <a:rPr lang="en-US" sz="1600" i="1">
+                                          <a:latin typeface="Cambria Math" panose="02040503050406030204" pitchFamily="18" charset="0"/>
+                                        </a:rPr>
+                                        <m:t>𝑤</m:t>
+                                      </m:r>
+                                    </m:e>
+                                    <m:sub>
+                                      <m:r>
+                                        <a:rPr lang="en-US" sz="1600" i="1">
+                                          <a:latin typeface="Cambria Math" panose="02040503050406030204" pitchFamily="18" charset="0"/>
+                                        </a:rPr>
+                                        <m:t>𝑖𝑗</m:t>
+                                      </m:r>
+                                    </m:sub>
+                                    <m:sup>
+                                      <m:r>
+                                        <a:rPr lang="en-US" sz="1600" i="1">
+                                          <a:latin typeface="Cambria Math" panose="02040503050406030204" pitchFamily="18" charset="0"/>
+                                        </a:rPr>
+                                        <m:t>𝑓𝑠h</m:t>
+                                      </m:r>
+                                    </m:sup>
+                                  </m:sSubSup>
+                                  <m:f>
+                                    <m:fPr>
+                                      <m:ctrlPr>
+                                        <a:rPr lang="en-US" sz="1600" i="1">
+                                          <a:latin typeface="Cambria Math" panose="02040503050406030204" pitchFamily="18" charset="0"/>
+                                        </a:rPr>
+                                      </m:ctrlPr>
+                                    </m:fPr>
+                                    <m:num>
+                                      <m:sSub>
+                                        <m:sSubPr>
+                                          <m:ctrlPr>
+                                            <a:rPr lang="en-US" sz="1600" i="1">
+                                              <a:latin typeface="Cambria Math" panose="02040503050406030204" pitchFamily="18" charset="0"/>
+                                            </a:rPr>
+                                          </m:ctrlPr>
+                                        </m:sSubPr>
+                                        <m:e>
+                                          <m:r>
+                                            <a:rPr lang="en-US" sz="1600" i="1">
+                                              <a:latin typeface="Cambria Math" panose="02040503050406030204" pitchFamily="18" charset="0"/>
+                                            </a:rPr>
+                                            <m:t>𝑁</m:t>
+                                          </m:r>
+                                        </m:e>
+                                        <m:sub>
+                                          <m:r>
+                                            <a:rPr lang="en-US" sz="1600" i="1">
+                                              <a:latin typeface="Cambria Math" panose="02040503050406030204" pitchFamily="18" charset="0"/>
+                                            </a:rPr>
+                                            <m:t>𝑖𝑗</m:t>
+                                          </m:r>
+                                        </m:sub>
+                                      </m:sSub>
+                                      <m:sSub>
+                                        <m:sSubPr>
+                                          <m:ctrlPr>
+                                            <a:rPr lang="en-US" sz="1600" i="1">
+                                              <a:latin typeface="Cambria Math" panose="02040503050406030204" pitchFamily="18" charset="0"/>
+                                            </a:rPr>
+                                          </m:ctrlPr>
+                                        </m:sSubPr>
+                                        <m:e>
+                                          <m:r>
+                                            <a:rPr lang="en-US" sz="1600" i="1">
+                                              <a:latin typeface="Cambria Math" panose="02040503050406030204" pitchFamily="18" charset="0"/>
+                                            </a:rPr>
+                                            <m:t>𝑠</m:t>
+                                          </m:r>
+                                        </m:e>
+                                        <m:sub>
+                                          <m:r>
+                                            <a:rPr lang="en-US" sz="1600" i="1">
+                                              <a:latin typeface="Cambria Math" panose="02040503050406030204" pitchFamily="18" charset="0"/>
+                                            </a:rPr>
+                                            <m:t>𝑖𝑗</m:t>
+                                          </m:r>
+                                        </m:sub>
+                                      </m:sSub>
+                                    </m:num>
+                                    <m:den>
+                                      <m:nary>
+                                        <m:naryPr>
+                                          <m:chr m:val="∑"/>
+                                          <m:ctrlPr>
+                                            <a:rPr lang="en-US" sz="1600" i="1">
+                                              <a:latin typeface="Cambria Math" panose="02040503050406030204" pitchFamily="18" charset="0"/>
+                                            </a:rPr>
+                                          </m:ctrlPr>
+                                        </m:naryPr>
+                                        <m:sub>
+                                          <m:r>
+                                            <m:rPr>
+                                              <m:brk m:alnAt="23"/>
+                                            </m:rPr>
+                                            <a:rPr lang="en-US" sz="1600" i="1">
+                                              <a:latin typeface="Cambria Math" panose="02040503050406030204" pitchFamily="18" charset="0"/>
+                                            </a:rPr>
+                                            <m:t>𝑗</m:t>
+                                          </m:r>
+                                          <m:r>
+                                            <a:rPr lang="en-US" sz="1600" i="1">
+                                              <a:latin typeface="Cambria Math" panose="02040503050406030204" pitchFamily="18" charset="0"/>
+                                            </a:rPr>
+                                            <m:t>=3</m:t>
+                                          </m:r>
+                                        </m:sub>
+                                        <m:sup>
+                                          <m:r>
+                                            <a:rPr lang="en-US" sz="1600" i="1">
+                                              <a:latin typeface="Cambria Math" panose="02040503050406030204" pitchFamily="18" charset="0"/>
+                                            </a:rPr>
+                                            <m:t>8+</m:t>
+                                          </m:r>
+                                        </m:sup>
+                                        <m:e>
+                                          <m:sSub>
+                                            <m:sSubPr>
+                                              <m:ctrlPr>
+                                                <a:rPr lang="en-US" sz="1600" i="1">
+                                                  <a:latin typeface="Cambria Math" panose="02040503050406030204" pitchFamily="18" charset="0"/>
+                                                </a:rPr>
+                                              </m:ctrlPr>
+                                            </m:sSubPr>
+                                            <m:e>
+                                              <m:r>
+                                                <a:rPr lang="en-US" sz="1600" i="1">
+                                                  <a:latin typeface="Cambria Math" panose="02040503050406030204" pitchFamily="18" charset="0"/>
+                                                </a:rPr>
+                                                <m:t>𝑁</m:t>
+                                              </m:r>
+                                            </m:e>
+                                            <m:sub>
+                                              <m:r>
+                                                <a:rPr lang="en-US" sz="1600" i="1">
+                                                  <a:latin typeface="Cambria Math" panose="02040503050406030204" pitchFamily="18" charset="0"/>
+                                                </a:rPr>
+                                                <m:t>𝑖𝑗</m:t>
+                                              </m:r>
+                                            </m:sub>
+                                          </m:sSub>
+                                          <m:sSub>
+                                            <m:sSubPr>
+                                              <m:ctrlPr>
+                                                <a:rPr lang="en-US" sz="1600" i="1">
+                                                  <a:latin typeface="Cambria Math" panose="02040503050406030204" pitchFamily="18" charset="0"/>
+                                                </a:rPr>
+                                              </m:ctrlPr>
+                                            </m:sSubPr>
+                                            <m:e>
+                                              <m:r>
+                                                <a:rPr lang="en-US" sz="1600" i="1">
+                                                  <a:latin typeface="Cambria Math" panose="02040503050406030204" pitchFamily="18" charset="0"/>
+                                                </a:rPr>
+                                                <m:t>𝑠</m:t>
+                                              </m:r>
+                                            </m:e>
+                                            <m:sub>
+                                              <m:r>
+                                                <a:rPr lang="en-US" sz="1600" i="1">
+                                                  <a:latin typeface="Cambria Math" panose="02040503050406030204" pitchFamily="18" charset="0"/>
+                                                </a:rPr>
+                                                <m:t>𝑖𝑗</m:t>
+                                              </m:r>
+                                            </m:sub>
+                                          </m:sSub>
+                                        </m:e>
+                                      </m:nary>
+                                    </m:den>
+                                  </m:f>
+                                </m:e>
+                              </m:d>
+                            </m:e>
+                          </m:nary>
+                        </m:den>
+                      </m:f>
+                    </m:oMath>
+                  </m:oMathPara>
+                </a14:m>
+                <a:endParaRPr lang="en-US" sz="1600" dirty="0"/>
+              </a:p>
+              <a:p>
+                <a:endParaRPr lang="en-US" sz="1600" dirty="0"/>
+              </a:p>
+              <a:p>
+                <a14:m>
+                  <m:oMath xmlns:m="http://schemas.openxmlformats.org/officeDocument/2006/math">
+                    <m:sSub>
+                      <m:sSubPr>
+                        <m:ctrlPr>
+                          <a:rPr lang="en-US" sz="1600" i="1">
+                            <a:latin typeface="Cambria Math" panose="02040503050406030204" pitchFamily="18" charset="0"/>
+                          </a:rPr>
+                        </m:ctrlPr>
+                      </m:sSubPr>
+                      <m:e>
+                        <m:r>
+                          <a:rPr lang="en-US" sz="1600" i="1">
+                            <a:latin typeface="Cambria Math" panose="02040503050406030204" pitchFamily="18" charset="0"/>
+                          </a:rPr>
+                          <m:t>𝐶</m:t>
+                        </m:r>
+                      </m:e>
+                      <m:sub>
+                        <m:r>
+                          <a:rPr lang="en-US" sz="1600" i="1">
+                            <a:latin typeface="Cambria Math" panose="02040503050406030204" pitchFamily="18" charset="0"/>
+                          </a:rPr>
+                          <m:t>𝑖𝑗</m:t>
+                        </m:r>
+                      </m:sub>
+                    </m:sSub>
+                  </m:oMath>
+                </a14:m>
+                <a:r>
+                  <a:rPr lang="en-US" sz="1600" dirty="0"/>
+                  <a:t> = catch in numbers-at-age</a:t>
+                </a:r>
+              </a:p>
+              <a:p>
+                <a14:m>
+                  <m:oMath xmlns:m="http://schemas.openxmlformats.org/officeDocument/2006/math">
+                    <m:sSub>
+                      <m:sSubPr>
+                        <m:ctrlPr>
+                          <a:rPr lang="en-US" sz="1600" i="1">
+                            <a:latin typeface="Cambria Math" panose="02040503050406030204" pitchFamily="18" charset="0"/>
+                          </a:rPr>
+                        </m:ctrlPr>
+                      </m:sSubPr>
+                      <m:e>
+                        <m:r>
+                          <a:rPr lang="en-US" sz="1600" i="1">
+                            <a:latin typeface="Cambria Math" panose="02040503050406030204" pitchFamily="18" charset="0"/>
+                          </a:rPr>
+                          <m:t>𝑁</m:t>
+                        </m:r>
+                      </m:e>
+                      <m:sub>
+                        <m:r>
+                          <a:rPr lang="en-US" sz="1600" i="1">
+                            <a:latin typeface="Cambria Math" panose="02040503050406030204" pitchFamily="18" charset="0"/>
+                          </a:rPr>
+                          <m:t>𝑖𝑗</m:t>
+                        </m:r>
+                      </m:sub>
+                    </m:sSub>
+                  </m:oMath>
+                </a14:m>
+                <a:r>
+                  <a:rPr lang="en-US" sz="1600" dirty="0"/>
+                  <a:t> = total numbers-at-age</a:t>
+                </a:r>
+              </a:p>
+              <a:p>
+                <a14:m>
+                  <m:oMath xmlns:m="http://schemas.openxmlformats.org/officeDocument/2006/math">
+                    <m:sSub>
+                      <m:sSubPr>
+                        <m:ctrlPr>
+                          <a:rPr lang="en-US" sz="1600" i="1">
+                            <a:latin typeface="Cambria Math" panose="02040503050406030204" pitchFamily="18" charset="0"/>
+                          </a:rPr>
+                        </m:ctrlPr>
+                      </m:sSubPr>
+                      <m:e>
+                        <m:r>
+                          <a:rPr lang="en-US" sz="1600" i="1">
+                            <a:latin typeface="Cambria Math" panose="02040503050406030204" pitchFamily="18" charset="0"/>
+                          </a:rPr>
+                          <m:t>𝑠</m:t>
+                        </m:r>
+                      </m:e>
+                      <m:sub>
+                        <m:r>
+                          <a:rPr lang="en-US" sz="1600" i="1">
+                            <a:latin typeface="Cambria Math" panose="02040503050406030204" pitchFamily="18" charset="0"/>
+                          </a:rPr>
+                          <m:t>𝑖𝑗</m:t>
+                        </m:r>
+                      </m:sub>
+                    </m:sSub>
+                  </m:oMath>
+                </a14:m>
+                <a:r>
+                  <a:rPr lang="en-US" sz="1600" dirty="0"/>
+                  <a:t> = fishery selectivity-at-age</a:t>
+                </a:r>
+              </a:p>
+              <a:p>
+                <a14:m>
+                  <m:oMath xmlns:m="http://schemas.openxmlformats.org/officeDocument/2006/math">
+                    <m:sSub>
+                      <m:sSubPr>
+                        <m:ctrlPr>
+                          <a:rPr lang="en-US" sz="1600" i="1">
+                            <a:latin typeface="Cambria Math" panose="02040503050406030204" pitchFamily="18" charset="0"/>
+                          </a:rPr>
+                        </m:ctrlPr>
+                      </m:sSubPr>
+                      <m:e>
+                        <m:r>
+                          <a:rPr lang="en-US" sz="1600" i="1">
+                            <a:latin typeface="Cambria Math" panose="02040503050406030204" pitchFamily="18" charset="0"/>
+                          </a:rPr>
+                          <m:t>𝑌</m:t>
+                        </m:r>
+                      </m:e>
+                      <m:sub>
+                        <m:r>
+                          <a:rPr lang="en-US" sz="1600" i="1">
+                            <a:latin typeface="Cambria Math" panose="02040503050406030204" pitchFamily="18" charset="0"/>
+                          </a:rPr>
+                          <m:t>𝑖</m:t>
+                        </m:r>
+                      </m:sub>
+                    </m:sSub>
+                  </m:oMath>
+                </a14:m>
+                <a:r>
+                  <a:rPr lang="en-US" sz="1600" dirty="0"/>
+                  <a:t>= fishery yield (catch biomass) by year</a:t>
+                </a:r>
+              </a:p>
+              <a:p>
+                <a14:m>
+                  <m:oMath xmlns:m="http://schemas.openxmlformats.org/officeDocument/2006/math">
+                    <m:sSubSup>
+                      <m:sSubSupPr>
+                        <m:ctrlPr>
+                          <a:rPr lang="en-US" sz="1600" i="1">
+                            <a:latin typeface="Cambria Math" panose="02040503050406030204" pitchFamily="18" charset="0"/>
+                          </a:rPr>
+                        </m:ctrlPr>
+                      </m:sSubSupPr>
+                      <m:e>
+                        <m:r>
+                          <a:rPr lang="en-US" sz="1600" i="1">
+                            <a:latin typeface="Cambria Math" panose="02040503050406030204" pitchFamily="18" charset="0"/>
+                          </a:rPr>
+                          <m:t>𝑤</m:t>
+                        </m:r>
+                      </m:e>
+                      <m:sub>
+                        <m:r>
+                          <a:rPr lang="en-US" sz="1600" i="1">
+                            <a:latin typeface="Cambria Math" panose="02040503050406030204" pitchFamily="18" charset="0"/>
+                          </a:rPr>
+                          <m:t>𝑖𝑗</m:t>
+                        </m:r>
+                      </m:sub>
+                      <m:sup>
+                        <m:r>
+                          <a:rPr lang="en-US" sz="1600" i="1">
+                            <a:latin typeface="Cambria Math" panose="02040503050406030204" pitchFamily="18" charset="0"/>
+                          </a:rPr>
+                          <m:t>𝑓𝑠h</m:t>
+                        </m:r>
+                      </m:sup>
+                    </m:sSubSup>
+                  </m:oMath>
+                </a14:m>
+                <a:r>
+                  <a:rPr lang="en-US" sz="1600" dirty="0"/>
+                  <a:t>= fishery weight-at-age</a:t>
+                </a:r>
+              </a:p>
+              <a:p>
+                <a:endParaRPr lang="en-US" sz="1600" dirty="0"/>
+              </a:p>
+            </p:txBody>
+          </p:sp>
+        </mc:Choice>
+        <mc:Fallback>
+          <p:sp>
+            <p:nvSpPr>
+              <p:cNvPr id="13" name="TextBox 12">
+                <a:extLst>
+                  <a:ext uri="{FF2B5EF4-FFF2-40B4-BE49-F238E27FC236}">
+                    <a16:creationId xmlns:a16="http://schemas.microsoft.com/office/drawing/2014/main" id="{931A78A2-D9EE-4FC1-909D-B9BDD1B0BDD0}"/>
+                  </a:ext>
+                </a:extLst>
+              </p:cNvPr>
+              <p:cNvSpPr txBox="1">
+                <a:spLocks noRot="1" noChangeAspect="1" noMove="1" noResize="1" noEditPoints="1" noAdjustHandles="1" noChangeArrowheads="1" noChangeShapeType="1" noTextEdit="1"/>
+              </p:cNvSpPr>
+              <p:nvPr/>
+            </p:nvSpPr>
+            <p:spPr>
+              <a:xfrm>
+                <a:off x="5699051" y="1343024"/>
+                <a:ext cx="4120001" cy="5415521"/>
+              </a:xfrm>
+              <a:prstGeom prst="rect">
+                <a:avLst/>
+              </a:prstGeom>
+              <a:blipFill>
+                <a:blip r:embed="rId3"/>
+                <a:stretch>
+                  <a:fillRect l="-888" t="-337"/>
+                </a:stretch>
+              </a:blipFill>
+            </p:spPr>
+            <p:txBody>
+              <a:bodyPr/>
+              <a:lstStyle/>
+              <a:p>
+                <a:r>
+                  <a:rPr lang="en-US">
+                    <a:noFill/>
+                  </a:rPr>
+                  <a:t> </a:t>
+                </a:r>
+              </a:p>
+            </p:txBody>
+          </p:sp>
+        </mc:Fallback>
+      </mc:AlternateContent>
+      <p:sp>
+        <p:nvSpPr>
+          <p:cNvPr id="14" name="TextBox 13">
             <a:extLst>
               <a:ext uri="{FF2B5EF4-FFF2-40B4-BE49-F238E27FC236}">
-                <a16:creationId xmlns:a16="http://schemas.microsoft.com/office/drawing/2014/main" id="{FEFB2D3E-809E-46C9-91ED-2B386A1D33CD}"/>
-              </a:ext>
-            </a:extLst>
-          </p:cNvPr>
-          <p:cNvPicPr>
-            <a:picLocks noChangeAspect="1"/>
-          </p:cNvPicPr>
-          <p:nvPr/>
-        </p:nvPicPr>
-        <p:blipFill>
-          <a:blip r:embed="rId3"/>
-          <a:stretch>
-            <a:fillRect/>
-          </a:stretch>
-        </p:blipFill>
-        <p:spPr>
-          <a:xfrm>
-            <a:off x="448624" y="3981382"/>
-            <a:ext cx="6667500" cy="2581275"/>
-          </a:xfrm>
-          <a:prstGeom prst="rect">
-            <a:avLst/>
-          </a:prstGeom>
-        </p:spPr>
-      </p:pic>
-      <p:pic>
-        <p:nvPicPr>
-          <p:cNvPr id="11" name="Picture 10">
-            <a:extLst>
-              <a:ext uri="{FF2B5EF4-FFF2-40B4-BE49-F238E27FC236}">
-                <a16:creationId xmlns:a16="http://schemas.microsoft.com/office/drawing/2014/main" id="{1B0E5101-AEAD-46A2-957C-90C5D4BEAA02}"/>
-              </a:ext>
-            </a:extLst>
-          </p:cNvPr>
-          <p:cNvPicPr>
-            <a:picLocks noChangeAspect="1"/>
-          </p:cNvPicPr>
-          <p:nvPr/>
-        </p:nvPicPr>
-        <p:blipFill>
-          <a:blip r:embed="rId4"/>
-          <a:stretch>
-            <a:fillRect/>
-          </a:stretch>
-        </p:blipFill>
-        <p:spPr>
-          <a:xfrm>
-            <a:off x="454341" y="1557039"/>
-            <a:ext cx="5572125" cy="1771650"/>
-          </a:xfrm>
-          <a:prstGeom prst="rect">
-            <a:avLst/>
-          </a:prstGeom>
-        </p:spPr>
-      </p:pic>
-      <p:sp>
-        <p:nvSpPr>
-          <p:cNvPr id="12" name="TextBox 11">
-            <a:extLst>
-              <a:ext uri="{FF2B5EF4-FFF2-40B4-BE49-F238E27FC236}">
-                <a16:creationId xmlns:a16="http://schemas.microsoft.com/office/drawing/2014/main" id="{9924E527-9378-4361-8CAF-8015587F2EFA}"/>
+                <a16:creationId xmlns:a16="http://schemas.microsoft.com/office/drawing/2014/main" id="{C1C6787E-5CE3-46EA-BFB5-3D4294277C37}"/>
               </a:ext>
             </a:extLst>
           </p:cNvPr>
@@ -3936,8 +5748,8 @@
         </p:nvSpPr>
         <p:spPr>
           <a:xfrm>
-            <a:off x="7241860" y="3981382"/>
-            <a:ext cx="2609849" cy="646331"/>
+            <a:off x="795814" y="6573389"/>
+            <a:ext cx="8899451" cy="923330"/>
           </a:xfrm>
           <a:prstGeom prst="rect">
             <a:avLst/>
@@ -3952,15 +5764,18 @@
           <a:p>
             <a:r>
               <a:rPr lang="en-US" dirty="0"/>
-              <a:t>Logistic, a50/a95 parameterization</a:t>
-            </a:r>
+              <a:t>These equations are not equivalent. Variable int3 is the average weight of catch conditional on vulnerable proportions-at-age.</a:t>
+            </a:r>
+          </a:p>
+          <a:p>
+            <a:endParaRPr lang="en-US" dirty="0"/>
           </a:p>
         </p:txBody>
       </p:sp>
     </p:spTree>
     <p:extLst>
       <p:ext uri="{BB962C8B-B14F-4D97-AF65-F5344CB8AC3E}">
-        <p14:creationId xmlns:p14="http://schemas.microsoft.com/office/powerpoint/2010/main" val="2422755107"/>
+        <p14:creationId xmlns:p14="http://schemas.microsoft.com/office/powerpoint/2010/main" val="3309042303"/>
       </p:ext>
     </p:extLst>
   </p:cSld>
@@ -4005,7 +5820,7 @@
         </p:nvSpPr>
         <p:spPr>
           <a:xfrm>
-            <a:off x="454342" y="194330"/>
+            <a:off x="454342" y="359040"/>
             <a:ext cx="8675370" cy="795865"/>
           </a:xfrm>
         </p:spPr>
@@ -4015,43 +5830,7 @@
           <a:p>
             <a:r>
               <a:rPr lang="en-US" dirty="0"/>
-              <a:t>Selectivity</a:t>
-            </a:r>
-          </a:p>
-        </p:txBody>
-      </p:sp>
-      <p:sp>
-        <p:nvSpPr>
-          <p:cNvPr id="3" name="Content Placeholder 2">
-            <a:extLst>
-              <a:ext uri="{FF2B5EF4-FFF2-40B4-BE49-F238E27FC236}">
-                <a16:creationId xmlns:a16="http://schemas.microsoft.com/office/drawing/2014/main" id="{BB5B9591-6BBC-4B0D-8085-50D5036BBADE}"/>
-              </a:ext>
-            </a:extLst>
-          </p:cNvPr>
-          <p:cNvSpPr>
-            <a:spLocks noGrp="1"/>
-          </p:cNvSpPr>
-          <p:nvPr>
-            <p:ph idx="1"/>
-          </p:nvPr>
-        </p:nvSpPr>
-        <p:spPr>
-          <a:xfrm>
-            <a:off x="454341" y="4419240"/>
-            <a:ext cx="4337685" cy="523875"/>
-          </a:xfrm>
-        </p:spPr>
-        <p:txBody>
-          <a:bodyPr/>
-          <a:lstStyle/>
-          <a:p>
-            <a:pPr marL="0" indent="0">
-              <a:buNone/>
-            </a:pPr>
-            <a:r>
-              <a:rPr lang="en-US" dirty="0"/>
-              <a:t>HER</a:t>
+              <a:t>Catch in numbers-at-age </a:t>
             </a:r>
           </a:p>
         </p:txBody>
@@ -4072,7 +5851,7 @@
         </p:nvSpPr>
         <p:spPr>
           <a:xfrm>
-            <a:off x="454342" y="990195"/>
+            <a:off x="454342" y="1343024"/>
             <a:ext cx="4337685" cy="523875"/>
           </a:xfrm>
           <a:prstGeom prst="rect">
@@ -4081,7 +5860,7 @@
         </p:spPr>
         <p:txBody>
           <a:bodyPr vert="horz" lIns="91440" tIns="45720" rIns="91440" bIns="45720" rtlCol="0">
-            <a:normAutofit/>
+            <a:normAutofit fontScale="92500"/>
           </a:bodyPr>
           <a:lstStyle>
             <a:lvl1pPr marL="251460" indent="-251460" algn="l" defTabSz="1005840" rtl="0" eaLnBrk="1" latinLnBrk="0" hangingPunct="1">
@@ -4254,17 +6033,17 @@
             </a:pPr>
             <a:r>
               <a:rPr lang="en-US" dirty="0"/>
-              <a:t>LS</a:t>
-            </a:r>
-          </a:p>
-        </p:txBody>
-      </p:sp>
-      <p:sp>
-        <p:nvSpPr>
-          <p:cNvPr id="7" name="TextBox 6">
+              <a:t>HER (conditioned on catch)</a:t>
+            </a:r>
+          </a:p>
+        </p:txBody>
+      </p:sp>
+      <p:sp>
+        <p:nvSpPr>
+          <p:cNvPr id="12" name="TextBox 11">
             <a:extLst>
               <a:ext uri="{FF2B5EF4-FFF2-40B4-BE49-F238E27FC236}">
-                <a16:creationId xmlns:a16="http://schemas.microsoft.com/office/drawing/2014/main" id="{251AE748-36B3-4087-B46E-6DAB79A5117A}"/>
+                <a16:creationId xmlns:a16="http://schemas.microsoft.com/office/drawing/2014/main" id="{91FC76D7-C9CE-467C-BE36-D4A716E0ABC8}"/>
               </a:ext>
             </a:extLst>
           </p:cNvPr>
@@ -4273,8 +6052,8 @@
         </p:nvSpPr>
         <p:spPr>
           <a:xfrm>
-            <a:off x="5266375" y="1438827"/>
-            <a:ext cx="2609849" cy="1200329"/>
+            <a:off x="454342" y="1866899"/>
+            <a:ext cx="3785191" cy="369332"/>
           </a:xfrm>
           <a:prstGeom prst="rect">
             <a:avLst/>
@@ -4289,17 +6068,17 @@
           <a:p>
             <a:r>
               <a:rPr lang="en-US" dirty="0"/>
-              <a:t>Logistic, a50/slope parameterization. Scale to 1 by dividing by max (not differentiable)</a:t>
+              <a:t>Same equation as what’s in LS code.</a:t>
             </a:r>
           </a:p>
         </p:txBody>
       </p:sp>
       <p:pic>
         <p:nvPicPr>
-          <p:cNvPr id="10" name="Picture 9">
+          <p:cNvPr id="3" name="Picture 2">
             <a:extLst>
               <a:ext uri="{FF2B5EF4-FFF2-40B4-BE49-F238E27FC236}">
-                <a16:creationId xmlns:a16="http://schemas.microsoft.com/office/drawing/2014/main" id="{16A67F07-95E7-4A1F-B717-E78DCB58CF95}"/>
+                <a16:creationId xmlns:a16="http://schemas.microsoft.com/office/drawing/2014/main" id="{4AB5BB6C-DBC4-45D1-A47D-2162DD12999F}"/>
               </a:ext>
             </a:extLst>
           </p:cNvPr>
@@ -4316,113 +6095,18 @@
         </p:blipFill>
         <p:spPr>
           <a:xfrm>
-            <a:off x="454342" y="1444034"/>
-            <a:ext cx="4574858" cy="2783305"/>
+            <a:off x="454343" y="2448423"/>
+            <a:ext cx="7775258" cy="4789951"/>
           </a:xfrm>
           <a:prstGeom prst="rect">
             <a:avLst/>
           </a:prstGeom>
         </p:spPr>
       </p:pic>
-      <p:pic>
-        <p:nvPicPr>
-          <p:cNvPr id="12" name="Picture 11">
-            <a:extLst>
-              <a:ext uri="{FF2B5EF4-FFF2-40B4-BE49-F238E27FC236}">
-                <a16:creationId xmlns:a16="http://schemas.microsoft.com/office/drawing/2014/main" id="{A2376DB9-5582-47F3-AA77-54C1BF54982C}"/>
-              </a:ext>
-            </a:extLst>
-          </p:cNvPr>
-          <p:cNvPicPr>
-            <a:picLocks noChangeAspect="1"/>
-          </p:cNvPicPr>
-          <p:nvPr/>
-        </p:nvPicPr>
-        <p:blipFill>
-          <a:blip r:embed="rId3"/>
-          <a:stretch>
-            <a:fillRect/>
-          </a:stretch>
-        </p:blipFill>
-        <p:spPr>
-          <a:xfrm>
-            <a:off x="454342" y="4867872"/>
-            <a:ext cx="4812035" cy="1510239"/>
-          </a:xfrm>
-          <a:prstGeom prst="rect">
-            <a:avLst/>
-          </a:prstGeom>
-        </p:spPr>
-      </p:pic>
-      <p:pic>
-        <p:nvPicPr>
-          <p:cNvPr id="13" name="Picture 12">
-            <a:extLst>
-              <a:ext uri="{FF2B5EF4-FFF2-40B4-BE49-F238E27FC236}">
-                <a16:creationId xmlns:a16="http://schemas.microsoft.com/office/drawing/2014/main" id="{CFE50F56-8B7B-4C60-B13F-3C235793E2DD}"/>
-              </a:ext>
-            </a:extLst>
-          </p:cNvPr>
-          <p:cNvPicPr>
-            <a:picLocks noChangeAspect="1"/>
-          </p:cNvPicPr>
-          <p:nvPr/>
-        </p:nvPicPr>
-        <p:blipFill>
-          <a:blip r:embed="rId4"/>
-          <a:stretch>
-            <a:fillRect/>
-          </a:stretch>
-        </p:blipFill>
-        <p:spPr>
-          <a:xfrm>
-            <a:off x="454341" y="6513005"/>
-            <a:ext cx="4574858" cy="845518"/>
-          </a:xfrm>
-          <a:prstGeom prst="rect">
-            <a:avLst/>
-          </a:prstGeom>
-        </p:spPr>
-      </p:pic>
-      <p:sp>
-        <p:nvSpPr>
-          <p:cNvPr id="14" name="TextBox 13">
-            <a:extLst>
-              <a:ext uri="{FF2B5EF4-FFF2-40B4-BE49-F238E27FC236}">
-                <a16:creationId xmlns:a16="http://schemas.microsoft.com/office/drawing/2014/main" id="{303F9EF6-35EB-4524-85A2-7E0729B26AD2}"/>
-              </a:ext>
-            </a:extLst>
-          </p:cNvPr>
-          <p:cNvSpPr txBox="1"/>
-          <p:nvPr/>
-        </p:nvSpPr>
-        <p:spPr>
-          <a:xfrm>
-            <a:off x="5553074" y="4867872"/>
-            <a:ext cx="2609849" cy="2308324"/>
-          </a:xfrm>
-          <a:prstGeom prst="rect">
-            <a:avLst/>
-          </a:prstGeom>
-          <a:noFill/>
-        </p:spPr>
-        <p:txBody>
-          <a:bodyPr wrap="square" rtlCol="0">
-            <a:spAutoFit/>
-          </a:bodyPr>
-          <a:lstStyle/>
-          <a:p>
-            <a:r>
-              <a:rPr lang="en-US" dirty="0"/>
-              <a:t>Logistic, a50/slope parameterization. Scale by taking difference of log selectivity and log mean selectivity (differentiable). Estimate in log space to keep values positive.</a:t>
-            </a:r>
-          </a:p>
-        </p:txBody>
-      </p:sp>
     </p:spTree>
     <p:extLst>
       <p:ext uri="{BB962C8B-B14F-4D97-AF65-F5344CB8AC3E}">
-        <p14:creationId xmlns:p14="http://schemas.microsoft.com/office/powerpoint/2010/main" val="52294102"/>
+        <p14:creationId xmlns:p14="http://schemas.microsoft.com/office/powerpoint/2010/main" val="2110765001"/>
       </p:ext>
     </p:extLst>
   </p:cSld>
@@ -4467,7 +6151,7 @@
         </p:nvSpPr>
         <p:spPr>
           <a:xfrm>
-            <a:off x="454342" y="194330"/>
+            <a:off x="454342" y="359040"/>
             <a:ext cx="8675370" cy="795865"/>
           </a:xfrm>
         </p:spPr>
@@ -4477,43 +6161,7 @@
           <a:p>
             <a:r>
               <a:rPr lang="en-US" dirty="0"/>
-              <a:t>Selectivity</a:t>
-            </a:r>
-          </a:p>
-        </p:txBody>
-      </p:sp>
-      <p:sp>
-        <p:nvSpPr>
-          <p:cNvPr id="3" name="Content Placeholder 2">
-            <a:extLst>
-              <a:ext uri="{FF2B5EF4-FFF2-40B4-BE49-F238E27FC236}">
-                <a16:creationId xmlns:a16="http://schemas.microsoft.com/office/drawing/2014/main" id="{BB5B9591-6BBC-4B0D-8085-50D5036BBADE}"/>
-              </a:ext>
-            </a:extLst>
-          </p:cNvPr>
-          <p:cNvSpPr>
-            <a:spLocks noGrp="1"/>
-          </p:cNvSpPr>
-          <p:nvPr>
-            <p:ph idx="1"/>
-          </p:nvPr>
-        </p:nvSpPr>
-        <p:spPr>
-          <a:xfrm>
-            <a:off x="454341" y="4419240"/>
-            <a:ext cx="4337685" cy="523875"/>
-          </a:xfrm>
-        </p:spPr>
-        <p:txBody>
-          <a:bodyPr/>
-          <a:lstStyle/>
-          <a:p>
-            <a:pPr marL="0" indent="0">
-              <a:buNone/>
-            </a:pPr>
-            <a:r>
-              <a:rPr lang="en-US" dirty="0"/>
-              <a:t>HER</a:t>
+              <a:t>Catch in numbers-at-age </a:t>
             </a:r>
           </a:p>
         </p:txBody>
@@ -4534,7 +6182,7 @@
         </p:nvSpPr>
         <p:spPr>
           <a:xfrm>
-            <a:off x="454342" y="990195"/>
+            <a:off x="454342" y="1343024"/>
             <a:ext cx="4337685" cy="523875"/>
           </a:xfrm>
           <a:prstGeom prst="rect">
@@ -4543,7 +6191,7 @@
         </p:spPr>
         <p:txBody>
           <a:bodyPr vert="horz" lIns="91440" tIns="45720" rIns="91440" bIns="45720" rtlCol="0">
-            <a:normAutofit/>
+            <a:normAutofit fontScale="92500"/>
           </a:bodyPr>
           <a:lstStyle>
             <a:lvl1pPr marL="251460" indent="-251460" algn="l" defTabSz="1005840" rtl="0" eaLnBrk="1" latinLnBrk="0" hangingPunct="1">
@@ -4716,17 +6364,17 @@
             </a:pPr>
             <a:r>
               <a:rPr lang="en-US" dirty="0"/>
-              <a:t>LS</a:t>
-            </a:r>
-          </a:p>
-        </p:txBody>
-      </p:sp>
-      <p:sp>
-        <p:nvSpPr>
-          <p:cNvPr id="7" name="TextBox 6">
+              <a:t>HER (conditioned on effort)</a:t>
+            </a:r>
+          </a:p>
+        </p:txBody>
+      </p:sp>
+      <p:sp>
+        <p:nvSpPr>
+          <p:cNvPr id="12" name="TextBox 11">
             <a:extLst>
               <a:ext uri="{FF2B5EF4-FFF2-40B4-BE49-F238E27FC236}">
-                <a16:creationId xmlns:a16="http://schemas.microsoft.com/office/drawing/2014/main" id="{251AE748-36B3-4087-B46E-6DAB79A5117A}"/>
+                <a16:creationId xmlns:a16="http://schemas.microsoft.com/office/drawing/2014/main" id="{91FC76D7-C9CE-467C-BE36-D4A716E0ABC8}"/>
               </a:ext>
             </a:extLst>
           </p:cNvPr>
@@ -4735,8 +6383,8 @@
         </p:nvSpPr>
         <p:spPr>
           <a:xfrm>
-            <a:off x="5266375" y="1438827"/>
-            <a:ext cx="2609849" cy="1200329"/>
+            <a:off x="454342" y="2055018"/>
+            <a:ext cx="7698858" cy="646331"/>
           </a:xfrm>
           <a:prstGeom prst="rect">
             <a:avLst/>
@@ -4751,17 +6399,17 @@
           <a:p>
             <a:r>
               <a:rPr lang="en-US" dirty="0"/>
-              <a:t>Logistic, a50/slope parameterization. Scale to 1 by dividing by max (not differentiable)</a:t>
+              <a:t>Baranov catch equation assuming discrete fishing mortality (pulse fishery that occurs at the beginning of the year.</a:t>
             </a:r>
           </a:p>
         </p:txBody>
       </p:sp>
       <p:pic>
         <p:nvPicPr>
-          <p:cNvPr id="10" name="Picture 9">
+          <p:cNvPr id="5" name="Picture 4">
             <a:extLst>
               <a:ext uri="{FF2B5EF4-FFF2-40B4-BE49-F238E27FC236}">
-                <a16:creationId xmlns:a16="http://schemas.microsoft.com/office/drawing/2014/main" id="{16A67F07-95E7-4A1F-B717-E78DCB58CF95}"/>
+                <a16:creationId xmlns:a16="http://schemas.microsoft.com/office/drawing/2014/main" id="{FF6AADED-401C-40D0-BCF6-18055F41316E}"/>
               </a:ext>
             </a:extLst>
           </p:cNvPr>
@@ -4778,20 +6426,466 @@
         </p:blipFill>
         <p:spPr>
           <a:xfrm>
-            <a:off x="454342" y="1444034"/>
-            <a:ext cx="4574858" cy="2783305"/>
+            <a:off x="454342" y="3055804"/>
+            <a:ext cx="7698858" cy="3091667"/>
           </a:xfrm>
           <a:prstGeom prst="rect">
             <a:avLst/>
           </a:prstGeom>
         </p:spPr>
       </p:pic>
+    </p:spTree>
+    <p:extLst>
+      <p:ext uri="{BB962C8B-B14F-4D97-AF65-F5344CB8AC3E}">
+        <p14:creationId xmlns:p14="http://schemas.microsoft.com/office/powerpoint/2010/main" val="23394652"/>
+      </p:ext>
+    </p:extLst>
+  </p:cSld>
+  <p:clrMapOvr>
+    <a:masterClrMapping/>
+  </p:clrMapOvr>
+</p:sld>
+</file>
+
+<file path=ppt/slides/slide6.xml><?xml version="1.0" encoding="utf-8"?>
+<p:sld xmlns:a="http://schemas.openxmlformats.org/drawingml/2006/main" xmlns:r="http://schemas.openxmlformats.org/officeDocument/2006/relationships" xmlns:p="http://schemas.openxmlformats.org/presentationml/2006/main">
+  <p:cSld>
+    <p:spTree>
+      <p:nvGrpSpPr>
+        <p:cNvPr id="1" name=""/>
+        <p:cNvGrpSpPr/>
+        <p:nvPr/>
+      </p:nvGrpSpPr>
+      <p:grpSpPr>
+        <a:xfrm>
+          <a:off x="0" y="0"/>
+          <a:ext cx="0" cy="0"/>
+          <a:chOff x="0" y="0"/>
+          <a:chExt cx="0" cy="0"/>
+        </a:xfrm>
+      </p:grpSpPr>
+      <p:sp>
+        <p:nvSpPr>
+          <p:cNvPr id="2" name="Title 1">
+            <a:extLst>
+              <a:ext uri="{FF2B5EF4-FFF2-40B4-BE49-F238E27FC236}">
+                <a16:creationId xmlns:a16="http://schemas.microsoft.com/office/drawing/2014/main" id="{A2DCAC96-E1FD-44FF-8A96-717F504C6320}"/>
+              </a:ext>
+            </a:extLst>
+          </p:cNvPr>
+          <p:cNvSpPr>
+            <a:spLocks noGrp="1"/>
+          </p:cNvSpPr>
+          <p:nvPr>
+            <p:ph type="title"/>
+          </p:nvPr>
+        </p:nvSpPr>
+        <p:spPr>
+          <a:xfrm>
+            <a:off x="454339" y="115130"/>
+            <a:ext cx="8675370" cy="795865"/>
+          </a:xfrm>
+        </p:spPr>
+        <p:txBody>
+          <a:bodyPr>
+            <a:noAutofit/>
+          </a:bodyPr>
+          <a:lstStyle/>
+          <a:p>
+            <a:r>
+              <a:rPr lang="en-US" sz="4000" dirty="0"/>
+              <a:t>Spawning/mature numbers and biomass</a:t>
+            </a:r>
+          </a:p>
+        </p:txBody>
+      </p:sp>
+      <p:sp>
+        <p:nvSpPr>
+          <p:cNvPr id="3" name="Content Placeholder 2">
+            <a:extLst>
+              <a:ext uri="{FF2B5EF4-FFF2-40B4-BE49-F238E27FC236}">
+                <a16:creationId xmlns:a16="http://schemas.microsoft.com/office/drawing/2014/main" id="{BB5B9591-6BBC-4B0D-8085-50D5036BBADE}"/>
+              </a:ext>
+            </a:extLst>
+          </p:cNvPr>
+          <p:cNvSpPr>
+            <a:spLocks noGrp="1"/>
+          </p:cNvSpPr>
+          <p:nvPr>
+            <p:ph idx="1"/>
+          </p:nvPr>
+        </p:nvSpPr>
+        <p:spPr>
+          <a:xfrm>
+            <a:off x="454338" y="4099129"/>
+            <a:ext cx="4337685" cy="523875"/>
+          </a:xfrm>
+        </p:spPr>
+        <p:txBody>
+          <a:bodyPr/>
+          <a:lstStyle/>
+          <a:p>
+            <a:pPr marL="0" indent="0">
+              <a:buNone/>
+            </a:pPr>
+            <a:r>
+              <a:rPr lang="en-US" dirty="0"/>
+              <a:t>HER</a:t>
+            </a:r>
+          </a:p>
+        </p:txBody>
+      </p:sp>
+      <p:sp>
+        <p:nvSpPr>
+          <p:cNvPr id="4" name="Content Placeholder 2">
+            <a:extLst>
+              <a:ext uri="{FF2B5EF4-FFF2-40B4-BE49-F238E27FC236}">
+                <a16:creationId xmlns:a16="http://schemas.microsoft.com/office/drawing/2014/main" id="{7EC84657-5B91-4347-81F3-1B680908C4DF}"/>
+              </a:ext>
+            </a:extLst>
+          </p:cNvPr>
+          <p:cNvSpPr txBox="1">
+            <a:spLocks/>
+          </p:cNvSpPr>
+          <p:nvPr/>
+        </p:nvSpPr>
+        <p:spPr>
+          <a:xfrm>
+            <a:off x="454337" y="739471"/>
+            <a:ext cx="4337685" cy="523875"/>
+          </a:xfrm>
+          <a:prstGeom prst="rect">
+            <a:avLst/>
+          </a:prstGeom>
+        </p:spPr>
+        <p:txBody>
+          <a:bodyPr vert="horz" lIns="91440" tIns="45720" rIns="91440" bIns="45720" rtlCol="0">
+            <a:normAutofit/>
+          </a:bodyPr>
+          <a:lstStyle>
+            <a:lvl1pPr marL="251460" indent="-251460" algn="l" defTabSz="1005840" rtl="0" eaLnBrk="1" latinLnBrk="0" hangingPunct="1">
+              <a:lnSpc>
+                <a:spcPct val="90000"/>
+              </a:lnSpc>
+              <a:spcBef>
+                <a:spcPts val="1100"/>
+              </a:spcBef>
+              <a:buFont typeface="Arial" panose="020B0604020202020204" pitchFamily="34" charset="0"/>
+              <a:buChar char="•"/>
+              <a:defRPr sz="3080" kern="1200">
+                <a:solidFill>
+                  <a:schemeClr val="tx1"/>
+                </a:solidFill>
+                <a:latin typeface="+mn-lt"/>
+                <a:ea typeface="+mn-ea"/>
+                <a:cs typeface="+mn-cs"/>
+              </a:defRPr>
+            </a:lvl1pPr>
+            <a:lvl2pPr marL="754380" indent="-251460" algn="l" defTabSz="1005840" rtl="0" eaLnBrk="1" latinLnBrk="0" hangingPunct="1">
+              <a:lnSpc>
+                <a:spcPct val="90000"/>
+              </a:lnSpc>
+              <a:spcBef>
+                <a:spcPts val="550"/>
+              </a:spcBef>
+              <a:buFont typeface="Arial" panose="020B0604020202020204" pitchFamily="34" charset="0"/>
+              <a:buChar char="•"/>
+              <a:defRPr sz="2640" kern="1200">
+                <a:solidFill>
+                  <a:schemeClr val="tx1"/>
+                </a:solidFill>
+                <a:latin typeface="+mn-lt"/>
+                <a:ea typeface="+mn-ea"/>
+                <a:cs typeface="+mn-cs"/>
+              </a:defRPr>
+            </a:lvl2pPr>
+            <a:lvl3pPr marL="1257300" indent="-251460" algn="l" defTabSz="1005840" rtl="0" eaLnBrk="1" latinLnBrk="0" hangingPunct="1">
+              <a:lnSpc>
+                <a:spcPct val="90000"/>
+              </a:lnSpc>
+              <a:spcBef>
+                <a:spcPts val="550"/>
+              </a:spcBef>
+              <a:buFont typeface="Arial" panose="020B0604020202020204" pitchFamily="34" charset="0"/>
+              <a:buChar char="•"/>
+              <a:defRPr sz="2200" kern="1200">
+                <a:solidFill>
+                  <a:schemeClr val="tx1"/>
+                </a:solidFill>
+                <a:latin typeface="+mn-lt"/>
+                <a:ea typeface="+mn-ea"/>
+                <a:cs typeface="+mn-cs"/>
+              </a:defRPr>
+            </a:lvl3pPr>
+            <a:lvl4pPr marL="1760220" indent="-251460" algn="l" defTabSz="1005840" rtl="0" eaLnBrk="1" latinLnBrk="0" hangingPunct="1">
+              <a:lnSpc>
+                <a:spcPct val="90000"/>
+              </a:lnSpc>
+              <a:spcBef>
+                <a:spcPts val="550"/>
+              </a:spcBef>
+              <a:buFont typeface="Arial" panose="020B0604020202020204" pitchFamily="34" charset="0"/>
+              <a:buChar char="•"/>
+              <a:defRPr sz="1980" kern="1200">
+                <a:solidFill>
+                  <a:schemeClr val="tx1"/>
+                </a:solidFill>
+                <a:latin typeface="+mn-lt"/>
+                <a:ea typeface="+mn-ea"/>
+                <a:cs typeface="+mn-cs"/>
+              </a:defRPr>
+            </a:lvl4pPr>
+            <a:lvl5pPr marL="2263140" indent="-251460" algn="l" defTabSz="1005840" rtl="0" eaLnBrk="1" latinLnBrk="0" hangingPunct="1">
+              <a:lnSpc>
+                <a:spcPct val="90000"/>
+              </a:lnSpc>
+              <a:spcBef>
+                <a:spcPts val="550"/>
+              </a:spcBef>
+              <a:buFont typeface="Arial" panose="020B0604020202020204" pitchFamily="34" charset="0"/>
+              <a:buChar char="•"/>
+              <a:defRPr sz="1980" kern="1200">
+                <a:solidFill>
+                  <a:schemeClr val="tx1"/>
+                </a:solidFill>
+                <a:latin typeface="+mn-lt"/>
+                <a:ea typeface="+mn-ea"/>
+                <a:cs typeface="+mn-cs"/>
+              </a:defRPr>
+            </a:lvl5pPr>
+            <a:lvl6pPr marL="2766060" indent="-251460" algn="l" defTabSz="1005840" rtl="0" eaLnBrk="1" latinLnBrk="0" hangingPunct="1">
+              <a:lnSpc>
+                <a:spcPct val="90000"/>
+              </a:lnSpc>
+              <a:spcBef>
+                <a:spcPts val="550"/>
+              </a:spcBef>
+              <a:buFont typeface="Arial" panose="020B0604020202020204" pitchFamily="34" charset="0"/>
+              <a:buChar char="•"/>
+              <a:defRPr sz="1980" kern="1200">
+                <a:solidFill>
+                  <a:schemeClr val="tx1"/>
+                </a:solidFill>
+                <a:latin typeface="+mn-lt"/>
+                <a:ea typeface="+mn-ea"/>
+                <a:cs typeface="+mn-cs"/>
+              </a:defRPr>
+            </a:lvl6pPr>
+            <a:lvl7pPr marL="3268980" indent="-251460" algn="l" defTabSz="1005840" rtl="0" eaLnBrk="1" latinLnBrk="0" hangingPunct="1">
+              <a:lnSpc>
+                <a:spcPct val="90000"/>
+              </a:lnSpc>
+              <a:spcBef>
+                <a:spcPts val="550"/>
+              </a:spcBef>
+              <a:buFont typeface="Arial" panose="020B0604020202020204" pitchFamily="34" charset="0"/>
+              <a:buChar char="•"/>
+              <a:defRPr sz="1980" kern="1200">
+                <a:solidFill>
+                  <a:schemeClr val="tx1"/>
+                </a:solidFill>
+                <a:latin typeface="+mn-lt"/>
+                <a:ea typeface="+mn-ea"/>
+                <a:cs typeface="+mn-cs"/>
+              </a:defRPr>
+            </a:lvl7pPr>
+            <a:lvl8pPr marL="3771900" indent="-251460" algn="l" defTabSz="1005840" rtl="0" eaLnBrk="1" latinLnBrk="0" hangingPunct="1">
+              <a:lnSpc>
+                <a:spcPct val="90000"/>
+              </a:lnSpc>
+              <a:spcBef>
+                <a:spcPts val="550"/>
+              </a:spcBef>
+              <a:buFont typeface="Arial" panose="020B0604020202020204" pitchFamily="34" charset="0"/>
+              <a:buChar char="•"/>
+              <a:defRPr sz="1980" kern="1200">
+                <a:solidFill>
+                  <a:schemeClr val="tx1"/>
+                </a:solidFill>
+                <a:latin typeface="+mn-lt"/>
+                <a:ea typeface="+mn-ea"/>
+                <a:cs typeface="+mn-cs"/>
+              </a:defRPr>
+            </a:lvl8pPr>
+            <a:lvl9pPr marL="4274820" indent="-251460" algn="l" defTabSz="1005840" rtl="0" eaLnBrk="1" latinLnBrk="0" hangingPunct="1">
+              <a:lnSpc>
+                <a:spcPct val="90000"/>
+              </a:lnSpc>
+              <a:spcBef>
+                <a:spcPts val="550"/>
+              </a:spcBef>
+              <a:buFont typeface="Arial" panose="020B0604020202020204" pitchFamily="34" charset="0"/>
+              <a:buChar char="•"/>
+              <a:defRPr sz="1980" kern="1200">
+                <a:solidFill>
+                  <a:schemeClr val="tx1"/>
+                </a:solidFill>
+                <a:latin typeface="+mn-lt"/>
+                <a:ea typeface="+mn-ea"/>
+                <a:cs typeface="+mn-cs"/>
+              </a:defRPr>
+            </a:lvl9pPr>
+          </a:lstStyle>
+          <a:p>
+            <a:pPr marL="0" indent="0">
+              <a:buFont typeface="Arial" panose="020B0604020202020204" pitchFamily="34" charset="0"/>
+              <a:buNone/>
+            </a:pPr>
+            <a:r>
+              <a:rPr lang="en-US" dirty="0"/>
+              <a:t>LS</a:t>
+            </a:r>
+          </a:p>
+        </p:txBody>
+      </p:sp>
+      <p:sp>
+        <p:nvSpPr>
+          <p:cNvPr id="7" name="TextBox 6">
+            <a:extLst>
+              <a:ext uri="{FF2B5EF4-FFF2-40B4-BE49-F238E27FC236}">
+                <a16:creationId xmlns:a16="http://schemas.microsoft.com/office/drawing/2014/main" id="{251AE748-36B3-4087-B46E-6DAB79A5117A}"/>
+              </a:ext>
+            </a:extLst>
+          </p:cNvPr>
+          <p:cNvSpPr txBox="1"/>
+          <p:nvPr/>
+        </p:nvSpPr>
+        <p:spPr>
+          <a:xfrm>
+            <a:off x="5966463" y="1398715"/>
+            <a:ext cx="2609849" cy="2031325"/>
+          </a:xfrm>
+          <a:prstGeom prst="rect">
+            <a:avLst/>
+          </a:prstGeom>
+          <a:noFill/>
+        </p:spPr>
+        <p:txBody>
+          <a:bodyPr wrap="square" rtlCol="0">
+            <a:spAutoFit/>
+          </a:bodyPr>
+          <a:lstStyle/>
+          <a:p>
+            <a:r>
+              <a:rPr lang="en-US" dirty="0"/>
+              <a:t>Assumes catch in 100% mature. Uses </a:t>
+            </a:r>
+            <a:r>
+              <a:rPr lang="en-US" dirty="0" err="1"/>
+              <a:t>spawner</a:t>
+            </a:r>
+            <a:r>
+              <a:rPr lang="en-US" dirty="0"/>
+              <a:t> weight-at-age.</a:t>
+            </a:r>
+          </a:p>
+          <a:p>
+            <a:endParaRPr lang="en-US" dirty="0"/>
+          </a:p>
+          <a:p>
+            <a:r>
+              <a:rPr lang="en-US" dirty="0"/>
+              <a:t>Total mature biomass uses both catch and </a:t>
+            </a:r>
+            <a:r>
+              <a:rPr lang="en-US" dirty="0" err="1"/>
+              <a:t>spawner</a:t>
+            </a:r>
+            <a:r>
+              <a:rPr lang="en-US" dirty="0"/>
+              <a:t> weight-at-age.</a:t>
+            </a:r>
+          </a:p>
+        </p:txBody>
+      </p:sp>
+      <p:sp>
+        <p:nvSpPr>
+          <p:cNvPr id="8" name="TextBox 7">
+            <a:extLst>
+              <a:ext uri="{FF2B5EF4-FFF2-40B4-BE49-F238E27FC236}">
+                <a16:creationId xmlns:a16="http://schemas.microsoft.com/office/drawing/2014/main" id="{25CA6CB8-B61E-4F39-B9A1-93B57448F711}"/>
+              </a:ext>
+            </a:extLst>
+          </p:cNvPr>
+          <p:cNvSpPr txBox="1"/>
+          <p:nvPr/>
+        </p:nvSpPr>
+        <p:spPr>
+          <a:xfrm>
+            <a:off x="5966463" y="4774572"/>
+            <a:ext cx="3081844" cy="2308324"/>
+          </a:xfrm>
+          <a:prstGeom prst="rect">
+            <a:avLst/>
+          </a:prstGeom>
+          <a:noFill/>
+        </p:spPr>
+        <p:txBody>
+          <a:bodyPr wrap="square" rtlCol="0">
+            <a:spAutoFit/>
+          </a:bodyPr>
+          <a:lstStyle/>
+          <a:p>
+            <a:r>
+              <a:rPr lang="en-US" dirty="0"/>
+              <a:t>Takes difference between total population and catch before applying maturity curve. Will not run when assuming catch is 100% mature.</a:t>
+            </a:r>
+          </a:p>
+          <a:p>
+            <a:endParaRPr lang="en-US" dirty="0"/>
+          </a:p>
+          <a:p>
+            <a:r>
+              <a:rPr lang="en-US" dirty="0"/>
+              <a:t>Total mature biomass uses only </a:t>
+            </a:r>
+            <a:r>
+              <a:rPr lang="en-US" dirty="0" err="1"/>
+              <a:t>spawner</a:t>
+            </a:r>
+            <a:r>
+              <a:rPr lang="en-US" dirty="0"/>
+              <a:t> weight-at-age.</a:t>
+            </a:r>
+          </a:p>
+        </p:txBody>
+      </p:sp>
       <p:pic>
         <p:nvPicPr>
-          <p:cNvPr id="12" name="Picture 11">
+          <p:cNvPr id="10" name="Picture 9">
             <a:extLst>
               <a:ext uri="{FF2B5EF4-FFF2-40B4-BE49-F238E27FC236}">
-                <a16:creationId xmlns:a16="http://schemas.microsoft.com/office/drawing/2014/main" id="{A2376DB9-5582-47F3-AA77-54C1BF54982C}"/>
+                <a16:creationId xmlns:a16="http://schemas.microsoft.com/office/drawing/2014/main" id="{3259408F-AF97-49F1-95BE-20EB8C30C56F}"/>
+              </a:ext>
+            </a:extLst>
+          </p:cNvPr>
+          <p:cNvPicPr>
+            <a:picLocks noChangeAspect="1"/>
+          </p:cNvPicPr>
+          <p:nvPr/>
+        </p:nvPicPr>
+        <p:blipFill>
+          <a:blip r:embed="rId2"/>
+          <a:stretch>
+            <a:fillRect/>
+          </a:stretch>
+        </p:blipFill>
+        <p:spPr>
+          <a:xfrm>
+            <a:off x="454337" y="1196496"/>
+            <a:ext cx="4684748" cy="2622853"/>
+          </a:xfrm>
+          <a:prstGeom prst="rect">
+            <a:avLst/>
+          </a:prstGeom>
+        </p:spPr>
+      </p:pic>
+      <p:pic>
+        <p:nvPicPr>
+          <p:cNvPr id="11" name="Picture 10">
+            <a:extLst>
+              <a:ext uri="{FF2B5EF4-FFF2-40B4-BE49-F238E27FC236}">
+                <a16:creationId xmlns:a16="http://schemas.microsoft.com/office/drawing/2014/main" id="{FE2B985E-6205-4740-A381-1F2062A95BAA}"/>
               </a:ext>
             </a:extLst>
           </p:cNvPr>
@@ -4808,8 +6902,8 @@
         </p:blipFill>
         <p:spPr>
           <a:xfrm>
-            <a:off x="454342" y="4867872"/>
-            <a:ext cx="4812035" cy="1510239"/>
+            <a:off x="454336" y="4572993"/>
+            <a:ext cx="4898242" cy="3084277"/>
           </a:xfrm>
           <a:prstGeom prst="rect">
             <a:avLst/>
@@ -4818,10 +6912,10 @@
       </p:pic>
       <p:pic>
         <p:nvPicPr>
-          <p:cNvPr id="13" name="Picture 12">
+          <p:cNvPr id="12" name="Picture 11">
             <a:extLst>
               <a:ext uri="{FF2B5EF4-FFF2-40B4-BE49-F238E27FC236}">
-                <a16:creationId xmlns:a16="http://schemas.microsoft.com/office/drawing/2014/main" id="{CFE50F56-8B7B-4C60-B13F-3C235793E2DD}"/>
+                <a16:creationId xmlns:a16="http://schemas.microsoft.com/office/drawing/2014/main" id="{449A5CF8-9A4E-4A54-AC37-483ADA0A5FAF}"/>
               </a:ext>
             </a:extLst>
           </p:cNvPr>
@@ -4838,20 +6932,322 @@
         </p:blipFill>
         <p:spPr>
           <a:xfrm>
-            <a:off x="454341" y="6513005"/>
-            <a:ext cx="4574858" cy="845518"/>
+            <a:off x="454337" y="3886200"/>
+            <a:ext cx="8675370" cy="230633"/>
           </a:xfrm>
           <a:prstGeom prst="rect">
             <a:avLst/>
           </a:prstGeom>
         </p:spPr>
       </p:pic>
-      <p:sp>
-        <p:nvSpPr>
-          <p:cNvPr id="14" name="TextBox 13">
+    </p:spTree>
+    <p:extLst>
+      <p:ext uri="{BB962C8B-B14F-4D97-AF65-F5344CB8AC3E}">
+        <p14:creationId xmlns:p14="http://schemas.microsoft.com/office/powerpoint/2010/main" val="2826126576"/>
+      </p:ext>
+    </p:extLst>
+  </p:cSld>
+  <p:clrMapOvr>
+    <a:masterClrMapping/>
+  </p:clrMapOvr>
+</p:sld>
+</file>
+
+<file path=ppt/slides/slide7.xml><?xml version="1.0" encoding="utf-8"?>
+<p:sld xmlns:a="http://schemas.openxmlformats.org/drawingml/2006/main" xmlns:r="http://schemas.openxmlformats.org/officeDocument/2006/relationships" xmlns:p="http://schemas.openxmlformats.org/presentationml/2006/main">
+  <p:cSld>
+    <p:spTree>
+      <p:nvGrpSpPr>
+        <p:cNvPr id="1" name=""/>
+        <p:cNvGrpSpPr/>
+        <p:nvPr/>
+      </p:nvGrpSpPr>
+      <p:grpSpPr>
+        <a:xfrm>
+          <a:off x="0" y="0"/>
+          <a:ext cx="0" cy="0"/>
+          <a:chOff x="0" y="0"/>
+          <a:chExt cx="0" cy="0"/>
+        </a:xfrm>
+      </p:grpSpPr>
+      <p:sp>
+        <p:nvSpPr>
+          <p:cNvPr id="2" name="Title 1">
             <a:extLst>
               <a:ext uri="{FF2B5EF4-FFF2-40B4-BE49-F238E27FC236}">
-                <a16:creationId xmlns:a16="http://schemas.microsoft.com/office/drawing/2014/main" id="{303F9EF6-35EB-4524-85A2-7E0729B26AD2}"/>
+                <a16:creationId xmlns:a16="http://schemas.microsoft.com/office/drawing/2014/main" id="{A2DCAC96-E1FD-44FF-8A96-717F504C6320}"/>
+              </a:ext>
+            </a:extLst>
+          </p:cNvPr>
+          <p:cNvSpPr>
+            <a:spLocks noGrp="1"/>
+          </p:cNvSpPr>
+          <p:nvPr>
+            <p:ph type="title"/>
+          </p:nvPr>
+        </p:nvSpPr>
+        <p:spPr>
+          <a:xfrm>
+            <a:off x="454342" y="359040"/>
+            <a:ext cx="8675370" cy="795865"/>
+          </a:xfrm>
+        </p:spPr>
+        <p:txBody>
+          <a:bodyPr/>
+          <a:lstStyle/>
+          <a:p>
+            <a:r>
+              <a:rPr lang="en-US" dirty="0"/>
+              <a:t>Egg deposition</a:t>
+            </a:r>
+          </a:p>
+        </p:txBody>
+      </p:sp>
+      <p:sp>
+        <p:nvSpPr>
+          <p:cNvPr id="3" name="Content Placeholder 2">
+            <a:extLst>
+              <a:ext uri="{FF2B5EF4-FFF2-40B4-BE49-F238E27FC236}">
+                <a16:creationId xmlns:a16="http://schemas.microsoft.com/office/drawing/2014/main" id="{BB5B9591-6BBC-4B0D-8085-50D5036BBADE}"/>
+              </a:ext>
+            </a:extLst>
+          </p:cNvPr>
+          <p:cNvSpPr>
+            <a:spLocks noGrp="1"/>
+          </p:cNvSpPr>
+          <p:nvPr>
+            <p:ph idx="1"/>
+          </p:nvPr>
+        </p:nvSpPr>
+        <p:spPr>
+          <a:xfrm>
+            <a:off x="454342" y="4124324"/>
+            <a:ext cx="4337685" cy="523875"/>
+          </a:xfrm>
+        </p:spPr>
+        <p:txBody>
+          <a:bodyPr/>
+          <a:lstStyle/>
+          <a:p>
+            <a:pPr marL="0" indent="0">
+              <a:buNone/>
+            </a:pPr>
+            <a:r>
+              <a:rPr lang="en-US" dirty="0"/>
+              <a:t>HER</a:t>
+            </a:r>
+          </a:p>
+        </p:txBody>
+      </p:sp>
+      <p:sp>
+        <p:nvSpPr>
+          <p:cNvPr id="4" name="Content Placeholder 2">
+            <a:extLst>
+              <a:ext uri="{FF2B5EF4-FFF2-40B4-BE49-F238E27FC236}">
+                <a16:creationId xmlns:a16="http://schemas.microsoft.com/office/drawing/2014/main" id="{7EC84657-5B91-4347-81F3-1B680908C4DF}"/>
+              </a:ext>
+            </a:extLst>
+          </p:cNvPr>
+          <p:cNvSpPr txBox="1">
+            <a:spLocks/>
+          </p:cNvSpPr>
+          <p:nvPr/>
+        </p:nvSpPr>
+        <p:spPr>
+          <a:xfrm>
+            <a:off x="454342" y="1343024"/>
+            <a:ext cx="4337685" cy="523875"/>
+          </a:xfrm>
+          <a:prstGeom prst="rect">
+            <a:avLst/>
+          </a:prstGeom>
+        </p:spPr>
+        <p:txBody>
+          <a:bodyPr vert="horz" lIns="91440" tIns="45720" rIns="91440" bIns="45720" rtlCol="0">
+            <a:normAutofit/>
+          </a:bodyPr>
+          <a:lstStyle>
+            <a:lvl1pPr marL="251460" indent="-251460" algn="l" defTabSz="1005840" rtl="0" eaLnBrk="1" latinLnBrk="0" hangingPunct="1">
+              <a:lnSpc>
+                <a:spcPct val="90000"/>
+              </a:lnSpc>
+              <a:spcBef>
+                <a:spcPts val="1100"/>
+              </a:spcBef>
+              <a:buFont typeface="Arial" panose="020B0604020202020204" pitchFamily="34" charset="0"/>
+              <a:buChar char="•"/>
+              <a:defRPr sz="3080" kern="1200">
+                <a:solidFill>
+                  <a:schemeClr val="tx1"/>
+                </a:solidFill>
+                <a:latin typeface="+mn-lt"/>
+                <a:ea typeface="+mn-ea"/>
+                <a:cs typeface="+mn-cs"/>
+              </a:defRPr>
+            </a:lvl1pPr>
+            <a:lvl2pPr marL="754380" indent="-251460" algn="l" defTabSz="1005840" rtl="0" eaLnBrk="1" latinLnBrk="0" hangingPunct="1">
+              <a:lnSpc>
+                <a:spcPct val="90000"/>
+              </a:lnSpc>
+              <a:spcBef>
+                <a:spcPts val="550"/>
+              </a:spcBef>
+              <a:buFont typeface="Arial" panose="020B0604020202020204" pitchFamily="34" charset="0"/>
+              <a:buChar char="•"/>
+              <a:defRPr sz="2640" kern="1200">
+                <a:solidFill>
+                  <a:schemeClr val="tx1"/>
+                </a:solidFill>
+                <a:latin typeface="+mn-lt"/>
+                <a:ea typeface="+mn-ea"/>
+                <a:cs typeface="+mn-cs"/>
+              </a:defRPr>
+            </a:lvl2pPr>
+            <a:lvl3pPr marL="1257300" indent="-251460" algn="l" defTabSz="1005840" rtl="0" eaLnBrk="1" latinLnBrk="0" hangingPunct="1">
+              <a:lnSpc>
+                <a:spcPct val="90000"/>
+              </a:lnSpc>
+              <a:spcBef>
+                <a:spcPts val="550"/>
+              </a:spcBef>
+              <a:buFont typeface="Arial" panose="020B0604020202020204" pitchFamily="34" charset="0"/>
+              <a:buChar char="•"/>
+              <a:defRPr sz="2200" kern="1200">
+                <a:solidFill>
+                  <a:schemeClr val="tx1"/>
+                </a:solidFill>
+                <a:latin typeface="+mn-lt"/>
+                <a:ea typeface="+mn-ea"/>
+                <a:cs typeface="+mn-cs"/>
+              </a:defRPr>
+            </a:lvl3pPr>
+            <a:lvl4pPr marL="1760220" indent="-251460" algn="l" defTabSz="1005840" rtl="0" eaLnBrk="1" latinLnBrk="0" hangingPunct="1">
+              <a:lnSpc>
+                <a:spcPct val="90000"/>
+              </a:lnSpc>
+              <a:spcBef>
+                <a:spcPts val="550"/>
+              </a:spcBef>
+              <a:buFont typeface="Arial" panose="020B0604020202020204" pitchFamily="34" charset="0"/>
+              <a:buChar char="•"/>
+              <a:defRPr sz="1980" kern="1200">
+                <a:solidFill>
+                  <a:schemeClr val="tx1"/>
+                </a:solidFill>
+                <a:latin typeface="+mn-lt"/>
+                <a:ea typeface="+mn-ea"/>
+                <a:cs typeface="+mn-cs"/>
+              </a:defRPr>
+            </a:lvl4pPr>
+            <a:lvl5pPr marL="2263140" indent="-251460" algn="l" defTabSz="1005840" rtl="0" eaLnBrk="1" latinLnBrk="0" hangingPunct="1">
+              <a:lnSpc>
+                <a:spcPct val="90000"/>
+              </a:lnSpc>
+              <a:spcBef>
+                <a:spcPts val="550"/>
+              </a:spcBef>
+              <a:buFont typeface="Arial" panose="020B0604020202020204" pitchFamily="34" charset="0"/>
+              <a:buChar char="•"/>
+              <a:defRPr sz="1980" kern="1200">
+                <a:solidFill>
+                  <a:schemeClr val="tx1"/>
+                </a:solidFill>
+                <a:latin typeface="+mn-lt"/>
+                <a:ea typeface="+mn-ea"/>
+                <a:cs typeface="+mn-cs"/>
+              </a:defRPr>
+            </a:lvl5pPr>
+            <a:lvl6pPr marL="2766060" indent="-251460" algn="l" defTabSz="1005840" rtl="0" eaLnBrk="1" latinLnBrk="0" hangingPunct="1">
+              <a:lnSpc>
+                <a:spcPct val="90000"/>
+              </a:lnSpc>
+              <a:spcBef>
+                <a:spcPts val="550"/>
+              </a:spcBef>
+              <a:buFont typeface="Arial" panose="020B0604020202020204" pitchFamily="34" charset="0"/>
+              <a:buChar char="•"/>
+              <a:defRPr sz="1980" kern="1200">
+                <a:solidFill>
+                  <a:schemeClr val="tx1"/>
+                </a:solidFill>
+                <a:latin typeface="+mn-lt"/>
+                <a:ea typeface="+mn-ea"/>
+                <a:cs typeface="+mn-cs"/>
+              </a:defRPr>
+            </a:lvl6pPr>
+            <a:lvl7pPr marL="3268980" indent="-251460" algn="l" defTabSz="1005840" rtl="0" eaLnBrk="1" latinLnBrk="0" hangingPunct="1">
+              <a:lnSpc>
+                <a:spcPct val="90000"/>
+              </a:lnSpc>
+              <a:spcBef>
+                <a:spcPts val="550"/>
+              </a:spcBef>
+              <a:buFont typeface="Arial" panose="020B0604020202020204" pitchFamily="34" charset="0"/>
+              <a:buChar char="•"/>
+              <a:defRPr sz="1980" kern="1200">
+                <a:solidFill>
+                  <a:schemeClr val="tx1"/>
+                </a:solidFill>
+                <a:latin typeface="+mn-lt"/>
+                <a:ea typeface="+mn-ea"/>
+                <a:cs typeface="+mn-cs"/>
+              </a:defRPr>
+            </a:lvl7pPr>
+            <a:lvl8pPr marL="3771900" indent="-251460" algn="l" defTabSz="1005840" rtl="0" eaLnBrk="1" latinLnBrk="0" hangingPunct="1">
+              <a:lnSpc>
+                <a:spcPct val="90000"/>
+              </a:lnSpc>
+              <a:spcBef>
+                <a:spcPts val="550"/>
+              </a:spcBef>
+              <a:buFont typeface="Arial" panose="020B0604020202020204" pitchFamily="34" charset="0"/>
+              <a:buChar char="•"/>
+              <a:defRPr sz="1980" kern="1200">
+                <a:solidFill>
+                  <a:schemeClr val="tx1"/>
+                </a:solidFill>
+                <a:latin typeface="+mn-lt"/>
+                <a:ea typeface="+mn-ea"/>
+                <a:cs typeface="+mn-cs"/>
+              </a:defRPr>
+            </a:lvl8pPr>
+            <a:lvl9pPr marL="4274820" indent="-251460" algn="l" defTabSz="1005840" rtl="0" eaLnBrk="1" latinLnBrk="0" hangingPunct="1">
+              <a:lnSpc>
+                <a:spcPct val="90000"/>
+              </a:lnSpc>
+              <a:spcBef>
+                <a:spcPts val="550"/>
+              </a:spcBef>
+              <a:buFont typeface="Arial" panose="020B0604020202020204" pitchFamily="34" charset="0"/>
+              <a:buChar char="•"/>
+              <a:defRPr sz="1980" kern="1200">
+                <a:solidFill>
+                  <a:schemeClr val="tx1"/>
+                </a:solidFill>
+                <a:latin typeface="+mn-lt"/>
+                <a:ea typeface="+mn-ea"/>
+                <a:cs typeface="+mn-cs"/>
+              </a:defRPr>
+            </a:lvl9pPr>
+          </a:lstStyle>
+          <a:p>
+            <a:pPr marL="0" indent="0">
+              <a:buFont typeface="Arial" panose="020B0604020202020204" pitchFamily="34" charset="0"/>
+              <a:buNone/>
+            </a:pPr>
+            <a:r>
+              <a:rPr lang="en-US" dirty="0"/>
+              <a:t>LS</a:t>
+            </a:r>
+          </a:p>
+        </p:txBody>
+      </p:sp>
+      <p:sp>
+        <p:nvSpPr>
+          <p:cNvPr id="8" name="TextBox 7">
+            <a:extLst>
+              <a:ext uri="{FF2B5EF4-FFF2-40B4-BE49-F238E27FC236}">
+                <a16:creationId xmlns:a16="http://schemas.microsoft.com/office/drawing/2014/main" id="{25CA6CB8-B61E-4F39-B9A1-93B57448F711}"/>
               </a:ext>
             </a:extLst>
           </p:cNvPr>
@@ -4860,8 +7256,8 @@
         </p:nvSpPr>
         <p:spPr>
           <a:xfrm>
-            <a:off x="5553074" y="4867872"/>
-            <a:ext cx="2609849" cy="2308324"/>
+            <a:off x="5879991" y="1154905"/>
+            <a:ext cx="3186110" cy="369332"/>
           </a:xfrm>
           <a:prstGeom prst="rect">
             <a:avLst/>
@@ -4876,15 +7272,1011 @@
           <a:p>
             <a:r>
               <a:rPr lang="en-US" dirty="0"/>
-              <a:t>Logistic, a50/slope parameterization. Scale by taking difference of log selectivity and log mean selectivity (differentiable). Estimate in log space to keep values positive.</a:t>
-            </a:r>
-          </a:p>
-        </p:txBody>
-      </p:sp>
+              <a:t>Same equation in LS and HER</a:t>
+            </a:r>
+          </a:p>
+        </p:txBody>
+      </p:sp>
+      <p:pic>
+        <p:nvPicPr>
+          <p:cNvPr id="10" name="Picture 9">
+            <a:extLst>
+              <a:ext uri="{FF2B5EF4-FFF2-40B4-BE49-F238E27FC236}">
+                <a16:creationId xmlns:a16="http://schemas.microsoft.com/office/drawing/2014/main" id="{2A9ED0F4-C2AB-4D20-9FAE-2F6D93C25465}"/>
+              </a:ext>
+            </a:extLst>
+          </p:cNvPr>
+          <p:cNvPicPr>
+            <a:picLocks noChangeAspect="1"/>
+          </p:cNvPicPr>
+          <p:nvPr/>
+        </p:nvPicPr>
+        <p:blipFill>
+          <a:blip r:embed="rId2"/>
+          <a:stretch>
+            <a:fillRect/>
+          </a:stretch>
+        </p:blipFill>
+        <p:spPr>
+          <a:xfrm>
+            <a:off x="454342" y="1909110"/>
+            <a:ext cx="9236865" cy="2074354"/>
+          </a:xfrm>
+          <a:prstGeom prst="rect">
+            <a:avLst/>
+          </a:prstGeom>
+        </p:spPr>
+      </p:pic>
+      <p:pic>
+        <p:nvPicPr>
+          <p:cNvPr id="11" name="Picture 10">
+            <a:extLst>
+              <a:ext uri="{FF2B5EF4-FFF2-40B4-BE49-F238E27FC236}">
+                <a16:creationId xmlns:a16="http://schemas.microsoft.com/office/drawing/2014/main" id="{98C9D884-6ED9-4306-B925-BD30A04A4437}"/>
+              </a:ext>
+            </a:extLst>
+          </p:cNvPr>
+          <p:cNvPicPr>
+            <a:picLocks noChangeAspect="1"/>
+          </p:cNvPicPr>
+          <p:nvPr/>
+        </p:nvPicPr>
+        <p:blipFill>
+          <a:blip r:embed="rId3"/>
+          <a:stretch>
+            <a:fillRect/>
+          </a:stretch>
+        </p:blipFill>
+        <p:spPr>
+          <a:xfrm>
+            <a:off x="312417" y="6065054"/>
+            <a:ext cx="4424055" cy="421339"/>
+          </a:xfrm>
+          <a:prstGeom prst="rect">
+            <a:avLst/>
+          </a:prstGeom>
+        </p:spPr>
+      </p:pic>
+      <p:pic>
+        <p:nvPicPr>
+          <p:cNvPr id="12" name="Picture 11">
+            <a:extLst>
+              <a:ext uri="{FF2B5EF4-FFF2-40B4-BE49-F238E27FC236}">
+                <a16:creationId xmlns:a16="http://schemas.microsoft.com/office/drawing/2014/main" id="{80909560-0227-4F9B-94A8-A9BD7CFC461B}"/>
+              </a:ext>
+            </a:extLst>
+          </p:cNvPr>
+          <p:cNvPicPr>
+            <a:picLocks noChangeAspect="1"/>
+          </p:cNvPicPr>
+          <p:nvPr/>
+        </p:nvPicPr>
+        <p:blipFill>
+          <a:blip r:embed="rId4"/>
+          <a:stretch>
+            <a:fillRect/>
+          </a:stretch>
+        </p:blipFill>
+        <p:spPr>
+          <a:xfrm>
+            <a:off x="312417" y="4640405"/>
+            <a:ext cx="6949620" cy="1329907"/>
+          </a:xfrm>
+          <a:prstGeom prst="rect">
+            <a:avLst/>
+          </a:prstGeom>
+        </p:spPr>
+      </p:pic>
     </p:spTree>
     <p:extLst>
       <p:ext uri="{BB962C8B-B14F-4D97-AF65-F5344CB8AC3E}">
-        <p14:creationId xmlns:p14="http://schemas.microsoft.com/office/powerpoint/2010/main" val="2052303814"/>
+        <p14:creationId xmlns:p14="http://schemas.microsoft.com/office/powerpoint/2010/main" val="2061888064"/>
+      </p:ext>
+    </p:extLst>
+  </p:cSld>
+  <p:clrMapOvr>
+    <a:masterClrMapping/>
+  </p:clrMapOvr>
+</p:sld>
+</file>
+
+<file path=ppt/slides/slide8.xml><?xml version="1.0" encoding="utf-8"?>
+<p:sld xmlns:a="http://schemas.openxmlformats.org/drawingml/2006/main" xmlns:r="http://schemas.openxmlformats.org/officeDocument/2006/relationships" xmlns:p="http://schemas.openxmlformats.org/presentationml/2006/main">
+  <p:cSld>
+    <p:spTree>
+      <p:nvGrpSpPr>
+        <p:cNvPr id="1" name=""/>
+        <p:cNvGrpSpPr/>
+        <p:nvPr/>
+      </p:nvGrpSpPr>
+      <p:grpSpPr>
+        <a:xfrm>
+          <a:off x="0" y="0"/>
+          <a:ext cx="0" cy="0"/>
+          <a:chOff x="0" y="0"/>
+          <a:chExt cx="0" cy="0"/>
+        </a:xfrm>
+      </p:grpSpPr>
+      <p:sp>
+        <p:nvSpPr>
+          <p:cNvPr id="2" name="Title 1">
+            <a:extLst>
+              <a:ext uri="{FF2B5EF4-FFF2-40B4-BE49-F238E27FC236}">
+                <a16:creationId xmlns:a16="http://schemas.microsoft.com/office/drawing/2014/main" id="{A2DCAC96-E1FD-44FF-8A96-717F504C6320}"/>
+              </a:ext>
+            </a:extLst>
+          </p:cNvPr>
+          <p:cNvSpPr>
+            <a:spLocks noGrp="1"/>
+          </p:cNvSpPr>
+          <p:nvPr>
+            <p:ph type="title"/>
+          </p:nvPr>
+        </p:nvSpPr>
+        <p:spPr>
+          <a:xfrm>
+            <a:off x="454342" y="359040"/>
+            <a:ext cx="8675370" cy="795865"/>
+          </a:xfrm>
+        </p:spPr>
+        <p:txBody>
+          <a:bodyPr/>
+          <a:lstStyle/>
+          <a:p>
+            <a:r>
+              <a:rPr lang="en-US" dirty="0"/>
+              <a:t>Stock recruit function</a:t>
+            </a:r>
+          </a:p>
+        </p:txBody>
+      </p:sp>
+      <p:sp>
+        <p:nvSpPr>
+          <p:cNvPr id="3" name="Content Placeholder 2">
+            <a:extLst>
+              <a:ext uri="{FF2B5EF4-FFF2-40B4-BE49-F238E27FC236}">
+                <a16:creationId xmlns:a16="http://schemas.microsoft.com/office/drawing/2014/main" id="{BB5B9591-6BBC-4B0D-8085-50D5036BBADE}"/>
+              </a:ext>
+            </a:extLst>
+          </p:cNvPr>
+          <p:cNvSpPr>
+            <a:spLocks noGrp="1"/>
+          </p:cNvSpPr>
+          <p:nvPr>
+            <p:ph idx="1"/>
+          </p:nvPr>
+        </p:nvSpPr>
+        <p:spPr>
+          <a:xfrm>
+            <a:off x="398787" y="2191400"/>
+            <a:ext cx="4337685" cy="523875"/>
+          </a:xfrm>
+        </p:spPr>
+        <p:txBody>
+          <a:bodyPr/>
+          <a:lstStyle/>
+          <a:p>
+            <a:pPr marL="0" indent="0">
+              <a:buNone/>
+            </a:pPr>
+            <a:r>
+              <a:rPr lang="en-US" dirty="0"/>
+              <a:t>HER</a:t>
+            </a:r>
+          </a:p>
+        </p:txBody>
+      </p:sp>
+      <p:sp>
+        <p:nvSpPr>
+          <p:cNvPr id="4" name="Content Placeholder 2">
+            <a:extLst>
+              <a:ext uri="{FF2B5EF4-FFF2-40B4-BE49-F238E27FC236}">
+                <a16:creationId xmlns:a16="http://schemas.microsoft.com/office/drawing/2014/main" id="{7EC84657-5B91-4347-81F3-1B680908C4DF}"/>
+              </a:ext>
+            </a:extLst>
+          </p:cNvPr>
+          <p:cNvSpPr txBox="1">
+            <a:spLocks/>
+          </p:cNvSpPr>
+          <p:nvPr/>
+        </p:nvSpPr>
+        <p:spPr>
+          <a:xfrm>
+            <a:off x="398787" y="1154905"/>
+            <a:ext cx="4337685" cy="523875"/>
+          </a:xfrm>
+          <a:prstGeom prst="rect">
+            <a:avLst/>
+          </a:prstGeom>
+        </p:spPr>
+        <p:txBody>
+          <a:bodyPr vert="horz" lIns="91440" tIns="45720" rIns="91440" bIns="45720" rtlCol="0">
+            <a:normAutofit/>
+          </a:bodyPr>
+          <a:lstStyle>
+            <a:lvl1pPr marL="251460" indent="-251460" algn="l" defTabSz="1005840" rtl="0" eaLnBrk="1" latinLnBrk="0" hangingPunct="1">
+              <a:lnSpc>
+                <a:spcPct val="90000"/>
+              </a:lnSpc>
+              <a:spcBef>
+                <a:spcPts val="1100"/>
+              </a:spcBef>
+              <a:buFont typeface="Arial" panose="020B0604020202020204" pitchFamily="34" charset="0"/>
+              <a:buChar char="•"/>
+              <a:defRPr sz="3080" kern="1200">
+                <a:solidFill>
+                  <a:schemeClr val="tx1"/>
+                </a:solidFill>
+                <a:latin typeface="+mn-lt"/>
+                <a:ea typeface="+mn-ea"/>
+                <a:cs typeface="+mn-cs"/>
+              </a:defRPr>
+            </a:lvl1pPr>
+            <a:lvl2pPr marL="754380" indent="-251460" algn="l" defTabSz="1005840" rtl="0" eaLnBrk="1" latinLnBrk="0" hangingPunct="1">
+              <a:lnSpc>
+                <a:spcPct val="90000"/>
+              </a:lnSpc>
+              <a:spcBef>
+                <a:spcPts val="550"/>
+              </a:spcBef>
+              <a:buFont typeface="Arial" panose="020B0604020202020204" pitchFamily="34" charset="0"/>
+              <a:buChar char="•"/>
+              <a:defRPr sz="2640" kern="1200">
+                <a:solidFill>
+                  <a:schemeClr val="tx1"/>
+                </a:solidFill>
+                <a:latin typeface="+mn-lt"/>
+                <a:ea typeface="+mn-ea"/>
+                <a:cs typeface="+mn-cs"/>
+              </a:defRPr>
+            </a:lvl2pPr>
+            <a:lvl3pPr marL="1257300" indent="-251460" algn="l" defTabSz="1005840" rtl="0" eaLnBrk="1" latinLnBrk="0" hangingPunct="1">
+              <a:lnSpc>
+                <a:spcPct val="90000"/>
+              </a:lnSpc>
+              <a:spcBef>
+                <a:spcPts val="550"/>
+              </a:spcBef>
+              <a:buFont typeface="Arial" panose="020B0604020202020204" pitchFamily="34" charset="0"/>
+              <a:buChar char="•"/>
+              <a:defRPr sz="2200" kern="1200">
+                <a:solidFill>
+                  <a:schemeClr val="tx1"/>
+                </a:solidFill>
+                <a:latin typeface="+mn-lt"/>
+                <a:ea typeface="+mn-ea"/>
+                <a:cs typeface="+mn-cs"/>
+              </a:defRPr>
+            </a:lvl3pPr>
+            <a:lvl4pPr marL="1760220" indent="-251460" algn="l" defTabSz="1005840" rtl="0" eaLnBrk="1" latinLnBrk="0" hangingPunct="1">
+              <a:lnSpc>
+                <a:spcPct val="90000"/>
+              </a:lnSpc>
+              <a:spcBef>
+                <a:spcPts val="550"/>
+              </a:spcBef>
+              <a:buFont typeface="Arial" panose="020B0604020202020204" pitchFamily="34" charset="0"/>
+              <a:buChar char="•"/>
+              <a:defRPr sz="1980" kern="1200">
+                <a:solidFill>
+                  <a:schemeClr val="tx1"/>
+                </a:solidFill>
+                <a:latin typeface="+mn-lt"/>
+                <a:ea typeface="+mn-ea"/>
+                <a:cs typeface="+mn-cs"/>
+              </a:defRPr>
+            </a:lvl4pPr>
+            <a:lvl5pPr marL="2263140" indent="-251460" algn="l" defTabSz="1005840" rtl="0" eaLnBrk="1" latinLnBrk="0" hangingPunct="1">
+              <a:lnSpc>
+                <a:spcPct val="90000"/>
+              </a:lnSpc>
+              <a:spcBef>
+                <a:spcPts val="550"/>
+              </a:spcBef>
+              <a:buFont typeface="Arial" panose="020B0604020202020204" pitchFamily="34" charset="0"/>
+              <a:buChar char="•"/>
+              <a:defRPr sz="1980" kern="1200">
+                <a:solidFill>
+                  <a:schemeClr val="tx1"/>
+                </a:solidFill>
+                <a:latin typeface="+mn-lt"/>
+                <a:ea typeface="+mn-ea"/>
+                <a:cs typeface="+mn-cs"/>
+              </a:defRPr>
+            </a:lvl5pPr>
+            <a:lvl6pPr marL="2766060" indent="-251460" algn="l" defTabSz="1005840" rtl="0" eaLnBrk="1" latinLnBrk="0" hangingPunct="1">
+              <a:lnSpc>
+                <a:spcPct val="90000"/>
+              </a:lnSpc>
+              <a:spcBef>
+                <a:spcPts val="550"/>
+              </a:spcBef>
+              <a:buFont typeface="Arial" panose="020B0604020202020204" pitchFamily="34" charset="0"/>
+              <a:buChar char="•"/>
+              <a:defRPr sz="1980" kern="1200">
+                <a:solidFill>
+                  <a:schemeClr val="tx1"/>
+                </a:solidFill>
+                <a:latin typeface="+mn-lt"/>
+                <a:ea typeface="+mn-ea"/>
+                <a:cs typeface="+mn-cs"/>
+              </a:defRPr>
+            </a:lvl6pPr>
+            <a:lvl7pPr marL="3268980" indent="-251460" algn="l" defTabSz="1005840" rtl="0" eaLnBrk="1" latinLnBrk="0" hangingPunct="1">
+              <a:lnSpc>
+                <a:spcPct val="90000"/>
+              </a:lnSpc>
+              <a:spcBef>
+                <a:spcPts val="550"/>
+              </a:spcBef>
+              <a:buFont typeface="Arial" panose="020B0604020202020204" pitchFamily="34" charset="0"/>
+              <a:buChar char="•"/>
+              <a:defRPr sz="1980" kern="1200">
+                <a:solidFill>
+                  <a:schemeClr val="tx1"/>
+                </a:solidFill>
+                <a:latin typeface="+mn-lt"/>
+                <a:ea typeface="+mn-ea"/>
+                <a:cs typeface="+mn-cs"/>
+              </a:defRPr>
+            </a:lvl7pPr>
+            <a:lvl8pPr marL="3771900" indent="-251460" algn="l" defTabSz="1005840" rtl="0" eaLnBrk="1" latinLnBrk="0" hangingPunct="1">
+              <a:lnSpc>
+                <a:spcPct val="90000"/>
+              </a:lnSpc>
+              <a:spcBef>
+                <a:spcPts val="550"/>
+              </a:spcBef>
+              <a:buFont typeface="Arial" panose="020B0604020202020204" pitchFamily="34" charset="0"/>
+              <a:buChar char="•"/>
+              <a:defRPr sz="1980" kern="1200">
+                <a:solidFill>
+                  <a:schemeClr val="tx1"/>
+                </a:solidFill>
+                <a:latin typeface="+mn-lt"/>
+                <a:ea typeface="+mn-ea"/>
+                <a:cs typeface="+mn-cs"/>
+              </a:defRPr>
+            </a:lvl8pPr>
+            <a:lvl9pPr marL="4274820" indent="-251460" algn="l" defTabSz="1005840" rtl="0" eaLnBrk="1" latinLnBrk="0" hangingPunct="1">
+              <a:lnSpc>
+                <a:spcPct val="90000"/>
+              </a:lnSpc>
+              <a:spcBef>
+                <a:spcPts val="550"/>
+              </a:spcBef>
+              <a:buFont typeface="Arial" panose="020B0604020202020204" pitchFamily="34" charset="0"/>
+              <a:buChar char="•"/>
+              <a:defRPr sz="1980" kern="1200">
+                <a:solidFill>
+                  <a:schemeClr val="tx1"/>
+                </a:solidFill>
+                <a:latin typeface="+mn-lt"/>
+                <a:ea typeface="+mn-ea"/>
+                <a:cs typeface="+mn-cs"/>
+              </a:defRPr>
+            </a:lvl9pPr>
+          </a:lstStyle>
+          <a:p>
+            <a:pPr marL="0" indent="0">
+              <a:buFont typeface="Arial" panose="020B0604020202020204" pitchFamily="34" charset="0"/>
+              <a:buNone/>
+            </a:pPr>
+            <a:r>
+              <a:rPr lang="en-US" dirty="0"/>
+              <a:t>LS</a:t>
+            </a:r>
+          </a:p>
+        </p:txBody>
+      </p:sp>
+      <p:sp>
+        <p:nvSpPr>
+          <p:cNvPr id="8" name="TextBox 7">
+            <a:extLst>
+              <a:ext uri="{FF2B5EF4-FFF2-40B4-BE49-F238E27FC236}">
+                <a16:creationId xmlns:a16="http://schemas.microsoft.com/office/drawing/2014/main" id="{25CA6CB8-B61E-4F39-B9A1-93B57448F711}"/>
+              </a:ext>
+            </a:extLst>
+          </p:cNvPr>
+          <p:cNvSpPr txBox="1"/>
+          <p:nvPr/>
+        </p:nvSpPr>
+        <p:spPr>
+          <a:xfrm>
+            <a:off x="5673257" y="2651879"/>
+            <a:ext cx="3186110" cy="3693319"/>
+          </a:xfrm>
+          <a:prstGeom prst="rect">
+            <a:avLst/>
+          </a:prstGeom>
+          <a:noFill/>
+        </p:spPr>
+        <p:txBody>
+          <a:bodyPr wrap="square" rtlCol="0">
+            <a:spAutoFit/>
+          </a:bodyPr>
+          <a:lstStyle/>
+          <a:p>
+            <a:r>
+              <a:rPr lang="en-US" dirty="0"/>
+              <a:t>Different parameterization of the Ricker model.</a:t>
+            </a:r>
+          </a:p>
+          <a:p>
+            <a:endParaRPr lang="en-US" dirty="0"/>
+          </a:p>
+          <a:p>
+            <a:r>
+              <a:rPr lang="en-US" dirty="0"/>
+              <a:t>Good reference for these equations: Martell, Steven JD, William E. Pine, and Carl J. Walters. "Parameterizing age-structured models from a fisheries management perspective." </a:t>
+            </a:r>
+            <a:r>
+              <a:rPr lang="en-US" i="1" dirty="0"/>
+              <a:t>Canadian Journal of Fisheries and Aquatic Sciences</a:t>
+            </a:r>
+            <a:r>
+              <a:rPr lang="en-US" dirty="0"/>
+              <a:t> 65.8 (2008): 1586-1600.</a:t>
+            </a:r>
+          </a:p>
+        </p:txBody>
+      </p:sp>
+      <p:pic>
+        <p:nvPicPr>
+          <p:cNvPr id="5" name="Picture 4">
+            <a:extLst>
+              <a:ext uri="{FF2B5EF4-FFF2-40B4-BE49-F238E27FC236}">
+                <a16:creationId xmlns:a16="http://schemas.microsoft.com/office/drawing/2014/main" id="{63727914-B411-4326-8723-4CE49123D8F9}"/>
+              </a:ext>
+            </a:extLst>
+          </p:cNvPr>
+          <p:cNvPicPr>
+            <a:picLocks noChangeAspect="1"/>
+          </p:cNvPicPr>
+          <p:nvPr/>
+        </p:nvPicPr>
+        <p:blipFill>
+          <a:blip r:embed="rId2"/>
+          <a:stretch>
+            <a:fillRect/>
+          </a:stretch>
+        </p:blipFill>
+        <p:spPr>
+          <a:xfrm>
+            <a:off x="398787" y="1719689"/>
+            <a:ext cx="7677150" cy="323850"/>
+          </a:xfrm>
+          <a:prstGeom prst="rect">
+            <a:avLst/>
+          </a:prstGeom>
+        </p:spPr>
+      </p:pic>
+      <p:pic>
+        <p:nvPicPr>
+          <p:cNvPr id="6" name="Picture 5">
+            <a:extLst>
+              <a:ext uri="{FF2B5EF4-FFF2-40B4-BE49-F238E27FC236}">
+                <a16:creationId xmlns:a16="http://schemas.microsoft.com/office/drawing/2014/main" id="{76CCC497-8FD5-46EF-B041-C67104DE0F24}"/>
+              </a:ext>
+            </a:extLst>
+          </p:cNvPr>
+          <p:cNvPicPr>
+            <a:picLocks noChangeAspect="1"/>
+          </p:cNvPicPr>
+          <p:nvPr/>
+        </p:nvPicPr>
+        <p:blipFill>
+          <a:blip r:embed="rId3"/>
+          <a:stretch>
+            <a:fillRect/>
+          </a:stretch>
+        </p:blipFill>
+        <p:spPr>
+          <a:xfrm>
+            <a:off x="312416" y="2715275"/>
+            <a:ext cx="5004599" cy="3308654"/>
+          </a:xfrm>
+          <a:prstGeom prst="rect">
+            <a:avLst/>
+          </a:prstGeom>
+        </p:spPr>
+      </p:pic>
+      <p:pic>
+        <p:nvPicPr>
+          <p:cNvPr id="7" name="Picture 6">
+            <a:extLst>
+              <a:ext uri="{FF2B5EF4-FFF2-40B4-BE49-F238E27FC236}">
+                <a16:creationId xmlns:a16="http://schemas.microsoft.com/office/drawing/2014/main" id="{578F5DFB-CD1C-4A78-A60C-A3E3F8B574B3}"/>
+              </a:ext>
+            </a:extLst>
+          </p:cNvPr>
+          <p:cNvPicPr>
+            <a:picLocks noChangeAspect="1"/>
+          </p:cNvPicPr>
+          <p:nvPr/>
+        </p:nvPicPr>
+        <p:blipFill>
+          <a:blip r:embed="rId4"/>
+          <a:stretch>
+            <a:fillRect/>
+          </a:stretch>
+        </p:blipFill>
+        <p:spPr>
+          <a:xfrm>
+            <a:off x="312417" y="6052711"/>
+            <a:ext cx="4985593" cy="1485695"/>
+          </a:xfrm>
+          <a:prstGeom prst="rect">
+            <a:avLst/>
+          </a:prstGeom>
+        </p:spPr>
+      </p:pic>
+    </p:spTree>
+    <p:extLst>
+      <p:ext uri="{BB962C8B-B14F-4D97-AF65-F5344CB8AC3E}">
+        <p14:creationId xmlns:p14="http://schemas.microsoft.com/office/powerpoint/2010/main" val="439217343"/>
+      </p:ext>
+    </p:extLst>
+  </p:cSld>
+  <p:clrMapOvr>
+    <a:masterClrMapping/>
+  </p:clrMapOvr>
+</p:sld>
+</file>
+
+<file path=ppt/slides/slide9.xml><?xml version="1.0" encoding="utf-8"?>
+<p:sld xmlns:a="http://schemas.openxmlformats.org/drawingml/2006/main" xmlns:r="http://schemas.openxmlformats.org/officeDocument/2006/relationships" xmlns:p="http://schemas.openxmlformats.org/presentationml/2006/main">
+  <p:cSld>
+    <p:spTree>
+      <p:nvGrpSpPr>
+        <p:cNvPr id="1" name=""/>
+        <p:cNvGrpSpPr/>
+        <p:nvPr/>
+      </p:nvGrpSpPr>
+      <p:grpSpPr>
+        <a:xfrm>
+          <a:off x="0" y="0"/>
+          <a:ext cx="0" cy="0"/>
+          <a:chOff x="0" y="0"/>
+          <a:chExt cx="0" cy="0"/>
+        </a:xfrm>
+      </p:grpSpPr>
+      <p:sp>
+        <p:nvSpPr>
+          <p:cNvPr id="2" name="Title 1">
+            <a:extLst>
+              <a:ext uri="{FF2B5EF4-FFF2-40B4-BE49-F238E27FC236}">
+                <a16:creationId xmlns:a16="http://schemas.microsoft.com/office/drawing/2014/main" id="{A2DCAC96-E1FD-44FF-8A96-717F504C6320}"/>
+              </a:ext>
+            </a:extLst>
+          </p:cNvPr>
+          <p:cNvSpPr>
+            <a:spLocks noGrp="1"/>
+          </p:cNvSpPr>
+          <p:nvPr>
+            <p:ph type="title"/>
+          </p:nvPr>
+        </p:nvSpPr>
+        <p:spPr>
+          <a:xfrm>
+            <a:off x="454342" y="359040"/>
+            <a:ext cx="8675370" cy="795865"/>
+          </a:xfrm>
+        </p:spPr>
+        <p:txBody>
+          <a:bodyPr/>
+          <a:lstStyle/>
+          <a:p>
+            <a:r>
+              <a:rPr lang="en-US" dirty="0"/>
+              <a:t>Natural mortality/survival</a:t>
+            </a:r>
+          </a:p>
+        </p:txBody>
+      </p:sp>
+      <p:sp>
+        <p:nvSpPr>
+          <p:cNvPr id="3" name="Content Placeholder 2">
+            <a:extLst>
+              <a:ext uri="{FF2B5EF4-FFF2-40B4-BE49-F238E27FC236}">
+                <a16:creationId xmlns:a16="http://schemas.microsoft.com/office/drawing/2014/main" id="{BB5B9591-6BBC-4B0D-8085-50D5036BBADE}"/>
+              </a:ext>
+            </a:extLst>
+          </p:cNvPr>
+          <p:cNvSpPr>
+            <a:spLocks noGrp="1"/>
+          </p:cNvSpPr>
+          <p:nvPr>
+            <p:ph idx="1"/>
+          </p:nvPr>
+        </p:nvSpPr>
+        <p:spPr>
+          <a:xfrm>
+            <a:off x="454342" y="4124324"/>
+            <a:ext cx="4337685" cy="523875"/>
+          </a:xfrm>
+        </p:spPr>
+        <p:txBody>
+          <a:bodyPr/>
+          <a:lstStyle/>
+          <a:p>
+            <a:pPr marL="0" indent="0">
+              <a:buNone/>
+            </a:pPr>
+            <a:r>
+              <a:rPr lang="en-US" dirty="0"/>
+              <a:t>HER</a:t>
+            </a:r>
+          </a:p>
+        </p:txBody>
+      </p:sp>
+      <p:sp>
+        <p:nvSpPr>
+          <p:cNvPr id="4" name="Content Placeholder 2">
+            <a:extLst>
+              <a:ext uri="{FF2B5EF4-FFF2-40B4-BE49-F238E27FC236}">
+                <a16:creationId xmlns:a16="http://schemas.microsoft.com/office/drawing/2014/main" id="{7EC84657-5B91-4347-81F3-1B680908C4DF}"/>
+              </a:ext>
+            </a:extLst>
+          </p:cNvPr>
+          <p:cNvSpPr txBox="1">
+            <a:spLocks/>
+          </p:cNvSpPr>
+          <p:nvPr/>
+        </p:nvSpPr>
+        <p:spPr>
+          <a:xfrm>
+            <a:off x="454342" y="1343024"/>
+            <a:ext cx="4337685" cy="523875"/>
+          </a:xfrm>
+          <a:prstGeom prst="rect">
+            <a:avLst/>
+          </a:prstGeom>
+        </p:spPr>
+        <p:txBody>
+          <a:bodyPr vert="horz" lIns="91440" tIns="45720" rIns="91440" bIns="45720" rtlCol="0">
+            <a:normAutofit/>
+          </a:bodyPr>
+          <a:lstStyle>
+            <a:lvl1pPr marL="251460" indent="-251460" algn="l" defTabSz="1005840" rtl="0" eaLnBrk="1" latinLnBrk="0" hangingPunct="1">
+              <a:lnSpc>
+                <a:spcPct val="90000"/>
+              </a:lnSpc>
+              <a:spcBef>
+                <a:spcPts val="1100"/>
+              </a:spcBef>
+              <a:buFont typeface="Arial" panose="020B0604020202020204" pitchFamily="34" charset="0"/>
+              <a:buChar char="•"/>
+              <a:defRPr sz="3080" kern="1200">
+                <a:solidFill>
+                  <a:schemeClr val="tx1"/>
+                </a:solidFill>
+                <a:latin typeface="+mn-lt"/>
+                <a:ea typeface="+mn-ea"/>
+                <a:cs typeface="+mn-cs"/>
+              </a:defRPr>
+            </a:lvl1pPr>
+            <a:lvl2pPr marL="754380" indent="-251460" algn="l" defTabSz="1005840" rtl="0" eaLnBrk="1" latinLnBrk="0" hangingPunct="1">
+              <a:lnSpc>
+                <a:spcPct val="90000"/>
+              </a:lnSpc>
+              <a:spcBef>
+                <a:spcPts val="550"/>
+              </a:spcBef>
+              <a:buFont typeface="Arial" panose="020B0604020202020204" pitchFamily="34" charset="0"/>
+              <a:buChar char="•"/>
+              <a:defRPr sz="2640" kern="1200">
+                <a:solidFill>
+                  <a:schemeClr val="tx1"/>
+                </a:solidFill>
+                <a:latin typeface="+mn-lt"/>
+                <a:ea typeface="+mn-ea"/>
+                <a:cs typeface="+mn-cs"/>
+              </a:defRPr>
+            </a:lvl2pPr>
+            <a:lvl3pPr marL="1257300" indent="-251460" algn="l" defTabSz="1005840" rtl="0" eaLnBrk="1" latinLnBrk="0" hangingPunct="1">
+              <a:lnSpc>
+                <a:spcPct val="90000"/>
+              </a:lnSpc>
+              <a:spcBef>
+                <a:spcPts val="550"/>
+              </a:spcBef>
+              <a:buFont typeface="Arial" panose="020B0604020202020204" pitchFamily="34" charset="0"/>
+              <a:buChar char="•"/>
+              <a:defRPr sz="2200" kern="1200">
+                <a:solidFill>
+                  <a:schemeClr val="tx1"/>
+                </a:solidFill>
+                <a:latin typeface="+mn-lt"/>
+                <a:ea typeface="+mn-ea"/>
+                <a:cs typeface="+mn-cs"/>
+              </a:defRPr>
+            </a:lvl3pPr>
+            <a:lvl4pPr marL="1760220" indent="-251460" algn="l" defTabSz="1005840" rtl="0" eaLnBrk="1" latinLnBrk="0" hangingPunct="1">
+              <a:lnSpc>
+                <a:spcPct val="90000"/>
+              </a:lnSpc>
+              <a:spcBef>
+                <a:spcPts val="550"/>
+              </a:spcBef>
+              <a:buFont typeface="Arial" panose="020B0604020202020204" pitchFamily="34" charset="0"/>
+              <a:buChar char="•"/>
+              <a:defRPr sz="1980" kern="1200">
+                <a:solidFill>
+                  <a:schemeClr val="tx1"/>
+                </a:solidFill>
+                <a:latin typeface="+mn-lt"/>
+                <a:ea typeface="+mn-ea"/>
+                <a:cs typeface="+mn-cs"/>
+              </a:defRPr>
+            </a:lvl4pPr>
+            <a:lvl5pPr marL="2263140" indent="-251460" algn="l" defTabSz="1005840" rtl="0" eaLnBrk="1" latinLnBrk="0" hangingPunct="1">
+              <a:lnSpc>
+                <a:spcPct val="90000"/>
+              </a:lnSpc>
+              <a:spcBef>
+                <a:spcPts val="550"/>
+              </a:spcBef>
+              <a:buFont typeface="Arial" panose="020B0604020202020204" pitchFamily="34" charset="0"/>
+              <a:buChar char="•"/>
+              <a:defRPr sz="1980" kern="1200">
+                <a:solidFill>
+                  <a:schemeClr val="tx1"/>
+                </a:solidFill>
+                <a:latin typeface="+mn-lt"/>
+                <a:ea typeface="+mn-ea"/>
+                <a:cs typeface="+mn-cs"/>
+              </a:defRPr>
+            </a:lvl5pPr>
+            <a:lvl6pPr marL="2766060" indent="-251460" algn="l" defTabSz="1005840" rtl="0" eaLnBrk="1" latinLnBrk="0" hangingPunct="1">
+              <a:lnSpc>
+                <a:spcPct val="90000"/>
+              </a:lnSpc>
+              <a:spcBef>
+                <a:spcPts val="550"/>
+              </a:spcBef>
+              <a:buFont typeface="Arial" panose="020B0604020202020204" pitchFamily="34" charset="0"/>
+              <a:buChar char="•"/>
+              <a:defRPr sz="1980" kern="1200">
+                <a:solidFill>
+                  <a:schemeClr val="tx1"/>
+                </a:solidFill>
+                <a:latin typeface="+mn-lt"/>
+                <a:ea typeface="+mn-ea"/>
+                <a:cs typeface="+mn-cs"/>
+              </a:defRPr>
+            </a:lvl6pPr>
+            <a:lvl7pPr marL="3268980" indent="-251460" algn="l" defTabSz="1005840" rtl="0" eaLnBrk="1" latinLnBrk="0" hangingPunct="1">
+              <a:lnSpc>
+                <a:spcPct val="90000"/>
+              </a:lnSpc>
+              <a:spcBef>
+                <a:spcPts val="550"/>
+              </a:spcBef>
+              <a:buFont typeface="Arial" panose="020B0604020202020204" pitchFamily="34" charset="0"/>
+              <a:buChar char="•"/>
+              <a:defRPr sz="1980" kern="1200">
+                <a:solidFill>
+                  <a:schemeClr val="tx1"/>
+                </a:solidFill>
+                <a:latin typeface="+mn-lt"/>
+                <a:ea typeface="+mn-ea"/>
+                <a:cs typeface="+mn-cs"/>
+              </a:defRPr>
+            </a:lvl7pPr>
+            <a:lvl8pPr marL="3771900" indent="-251460" algn="l" defTabSz="1005840" rtl="0" eaLnBrk="1" latinLnBrk="0" hangingPunct="1">
+              <a:lnSpc>
+                <a:spcPct val="90000"/>
+              </a:lnSpc>
+              <a:spcBef>
+                <a:spcPts val="550"/>
+              </a:spcBef>
+              <a:buFont typeface="Arial" panose="020B0604020202020204" pitchFamily="34" charset="0"/>
+              <a:buChar char="•"/>
+              <a:defRPr sz="1980" kern="1200">
+                <a:solidFill>
+                  <a:schemeClr val="tx1"/>
+                </a:solidFill>
+                <a:latin typeface="+mn-lt"/>
+                <a:ea typeface="+mn-ea"/>
+                <a:cs typeface="+mn-cs"/>
+              </a:defRPr>
+            </a:lvl8pPr>
+            <a:lvl9pPr marL="4274820" indent="-251460" algn="l" defTabSz="1005840" rtl="0" eaLnBrk="1" latinLnBrk="0" hangingPunct="1">
+              <a:lnSpc>
+                <a:spcPct val="90000"/>
+              </a:lnSpc>
+              <a:spcBef>
+                <a:spcPts val="550"/>
+              </a:spcBef>
+              <a:buFont typeface="Arial" panose="020B0604020202020204" pitchFamily="34" charset="0"/>
+              <a:buChar char="•"/>
+              <a:defRPr sz="1980" kern="1200">
+                <a:solidFill>
+                  <a:schemeClr val="tx1"/>
+                </a:solidFill>
+                <a:latin typeface="+mn-lt"/>
+                <a:ea typeface="+mn-ea"/>
+                <a:cs typeface="+mn-cs"/>
+              </a:defRPr>
+            </a:lvl9pPr>
+          </a:lstStyle>
+          <a:p>
+            <a:pPr marL="0" indent="0">
+              <a:buFont typeface="Arial" panose="020B0604020202020204" pitchFamily="34" charset="0"/>
+              <a:buNone/>
+            </a:pPr>
+            <a:r>
+              <a:rPr lang="en-US" dirty="0"/>
+              <a:t>LS</a:t>
+            </a:r>
+          </a:p>
+        </p:txBody>
+      </p:sp>
+      <p:pic>
+        <p:nvPicPr>
+          <p:cNvPr id="5" name="Picture 4">
+            <a:extLst>
+              <a:ext uri="{FF2B5EF4-FFF2-40B4-BE49-F238E27FC236}">
+                <a16:creationId xmlns:a16="http://schemas.microsoft.com/office/drawing/2014/main" id="{E9777265-3084-408B-9FBD-025984825E3A}"/>
+              </a:ext>
+            </a:extLst>
+          </p:cNvPr>
+          <p:cNvPicPr>
+            <a:picLocks noChangeAspect="1"/>
+          </p:cNvPicPr>
+          <p:nvPr/>
+        </p:nvPicPr>
+        <p:blipFill>
+          <a:blip r:embed="rId2"/>
+          <a:stretch>
+            <a:fillRect/>
+          </a:stretch>
+        </p:blipFill>
+        <p:spPr>
+          <a:xfrm>
+            <a:off x="454342" y="1866899"/>
+            <a:ext cx="4572000" cy="2257425"/>
+          </a:xfrm>
+          <a:prstGeom prst="rect">
+            <a:avLst/>
+          </a:prstGeom>
+        </p:spPr>
+      </p:pic>
+      <p:pic>
+        <p:nvPicPr>
+          <p:cNvPr id="6" name="Picture 5">
+            <a:extLst>
+              <a:ext uri="{FF2B5EF4-FFF2-40B4-BE49-F238E27FC236}">
+                <a16:creationId xmlns:a16="http://schemas.microsoft.com/office/drawing/2014/main" id="{BA21ADE4-5D06-4095-8B9C-8947985EB5DD}"/>
+              </a:ext>
+            </a:extLst>
+          </p:cNvPr>
+          <p:cNvPicPr>
+            <a:picLocks noChangeAspect="1"/>
+          </p:cNvPicPr>
+          <p:nvPr/>
+        </p:nvPicPr>
+        <p:blipFill>
+          <a:blip r:embed="rId3"/>
+          <a:stretch>
+            <a:fillRect/>
+          </a:stretch>
+        </p:blipFill>
+        <p:spPr>
+          <a:xfrm>
+            <a:off x="454342" y="4585274"/>
+            <a:ext cx="6743700" cy="2066925"/>
+          </a:xfrm>
+          <a:prstGeom prst="rect">
+            <a:avLst/>
+          </a:prstGeom>
+        </p:spPr>
+      </p:pic>
+      <p:sp>
+        <p:nvSpPr>
+          <p:cNvPr id="7" name="TextBox 6">
+            <a:extLst>
+              <a:ext uri="{FF2B5EF4-FFF2-40B4-BE49-F238E27FC236}">
+                <a16:creationId xmlns:a16="http://schemas.microsoft.com/office/drawing/2014/main" id="{251AE748-36B3-4087-B46E-6DAB79A5117A}"/>
+              </a:ext>
+            </a:extLst>
+          </p:cNvPr>
+          <p:cNvSpPr txBox="1"/>
+          <p:nvPr/>
+        </p:nvSpPr>
+        <p:spPr>
+          <a:xfrm>
+            <a:off x="5266375" y="1981199"/>
+            <a:ext cx="2609849" cy="646331"/>
+          </a:xfrm>
+          <a:prstGeom prst="rect">
+            <a:avLst/>
+          </a:prstGeom>
+          <a:noFill/>
+        </p:spPr>
+        <p:txBody>
+          <a:bodyPr wrap="square" rtlCol="0">
+            <a:spAutoFit/>
+          </a:bodyPr>
+          <a:lstStyle/>
+          <a:p>
+            <a:r>
+              <a:rPr lang="en-US" dirty="0"/>
+              <a:t>Separate/independent M estimated for each block</a:t>
+            </a:r>
+          </a:p>
+        </p:txBody>
+      </p:sp>
+      <p:sp>
+        <p:nvSpPr>
+          <p:cNvPr id="8" name="TextBox 7">
+            <a:extLst>
+              <a:ext uri="{FF2B5EF4-FFF2-40B4-BE49-F238E27FC236}">
+                <a16:creationId xmlns:a16="http://schemas.microsoft.com/office/drawing/2014/main" id="{25CA6CB8-B61E-4F39-B9A1-93B57448F711}"/>
+              </a:ext>
+            </a:extLst>
+          </p:cNvPr>
+          <p:cNvSpPr txBox="1"/>
+          <p:nvPr/>
+        </p:nvSpPr>
+        <p:spPr>
+          <a:xfrm>
+            <a:off x="7406642" y="5253037"/>
+            <a:ext cx="2339341" cy="1754326"/>
+          </a:xfrm>
+          <a:prstGeom prst="rect">
+            <a:avLst/>
+          </a:prstGeom>
+          <a:noFill/>
+        </p:spPr>
+        <p:txBody>
+          <a:bodyPr wrap="square" rtlCol="0">
+            <a:spAutoFit/>
+          </a:bodyPr>
+          <a:lstStyle/>
+          <a:p>
+            <a:r>
+              <a:rPr lang="en-US" dirty="0"/>
+              <a:t>Mean M with deviations for each time block. Deviations are assumed lognormally distributed</a:t>
+            </a:r>
+          </a:p>
+        </p:txBody>
+      </p:sp>
+      <p:pic>
+        <p:nvPicPr>
+          <p:cNvPr id="9" name="Picture 8">
+            <a:extLst>
+              <a:ext uri="{FF2B5EF4-FFF2-40B4-BE49-F238E27FC236}">
+                <a16:creationId xmlns:a16="http://schemas.microsoft.com/office/drawing/2014/main" id="{DF40C3C3-40CF-4BE2-AB16-1B981B0001E6}"/>
+              </a:ext>
+            </a:extLst>
+          </p:cNvPr>
+          <p:cNvPicPr>
+            <a:picLocks noChangeAspect="1"/>
+          </p:cNvPicPr>
+          <p:nvPr/>
+        </p:nvPicPr>
+        <p:blipFill>
+          <a:blip r:embed="rId4"/>
+          <a:stretch>
+            <a:fillRect/>
+          </a:stretch>
+        </p:blipFill>
+        <p:spPr>
+          <a:xfrm>
+            <a:off x="454342" y="6736911"/>
+            <a:ext cx="6505575" cy="752475"/>
+          </a:xfrm>
+          <a:prstGeom prst="rect">
+            <a:avLst/>
+          </a:prstGeom>
+        </p:spPr>
+      </p:pic>
+    </p:spTree>
+    <p:extLst>
+      <p:ext uri="{BB962C8B-B14F-4D97-AF65-F5344CB8AC3E}">
+        <p14:creationId xmlns:p14="http://schemas.microsoft.com/office/powerpoint/2010/main" val="503525378"/>
       </p:ext>
     </p:extLst>
   </p:cSld>

</xml_diff>

<commit_message>
documentation for folder organization
</commit_message>
<xml_diff>
--- a/technical_docs/popdy_her_ls.pptx
+++ b/technical_docs/popdy_her_ls.pptx
@@ -16,6 +16,11 @@
     <p:sldId id="271" r:id="rId10"/>
     <p:sldId id="261" r:id="rId11"/>
     <p:sldId id="262" r:id="rId12"/>
+    <p:sldId id="273" r:id="rId13"/>
+    <p:sldId id="274" r:id="rId14"/>
+    <p:sldId id="277" r:id="rId15"/>
+    <p:sldId id="275" r:id="rId16"/>
+    <p:sldId id="276" r:id="rId17"/>
   </p:sldIdLst>
   <p:sldSz cx="10058400" cy="7772400"/>
   <p:notesSz cx="6858000" cy="9144000"/>
@@ -253,7 +258,7 @@
           <a:p>
             <a:fld id="{601AD17F-A198-4D0B-923D-8F7C51F5BEB9}" type="datetimeFigureOut">
               <a:rPr lang="en-US" smtClean="0"/>
-              <a:t>6/21/2019</a:t>
+              <a:t>7/16/2019</a:t>
             </a:fld>
             <a:endParaRPr lang="en-US"/>
           </a:p>
@@ -423,7 +428,7 @@
           <a:p>
             <a:fld id="{601AD17F-A198-4D0B-923D-8F7C51F5BEB9}" type="datetimeFigureOut">
               <a:rPr lang="en-US" smtClean="0"/>
-              <a:t>6/21/2019</a:t>
+              <a:t>7/16/2019</a:t>
             </a:fld>
             <a:endParaRPr lang="en-US"/>
           </a:p>
@@ -603,7 +608,7 @@
           <a:p>
             <a:fld id="{601AD17F-A198-4D0B-923D-8F7C51F5BEB9}" type="datetimeFigureOut">
               <a:rPr lang="en-US" smtClean="0"/>
-              <a:t>6/21/2019</a:t>
+              <a:t>7/16/2019</a:t>
             </a:fld>
             <a:endParaRPr lang="en-US"/>
           </a:p>
@@ -773,7 +778,7 @@
           <a:p>
             <a:fld id="{601AD17F-A198-4D0B-923D-8F7C51F5BEB9}" type="datetimeFigureOut">
               <a:rPr lang="en-US" smtClean="0"/>
-              <a:t>6/21/2019</a:t>
+              <a:t>7/16/2019</a:t>
             </a:fld>
             <a:endParaRPr lang="en-US"/>
           </a:p>
@@ -1017,7 +1022,7 @@
           <a:p>
             <a:fld id="{601AD17F-A198-4D0B-923D-8F7C51F5BEB9}" type="datetimeFigureOut">
               <a:rPr lang="en-US" smtClean="0"/>
-              <a:t>6/21/2019</a:t>
+              <a:t>7/16/2019</a:t>
             </a:fld>
             <a:endParaRPr lang="en-US"/>
           </a:p>
@@ -1249,7 +1254,7 @@
           <a:p>
             <a:fld id="{601AD17F-A198-4D0B-923D-8F7C51F5BEB9}" type="datetimeFigureOut">
               <a:rPr lang="en-US" smtClean="0"/>
-              <a:t>6/21/2019</a:t>
+              <a:t>7/16/2019</a:t>
             </a:fld>
             <a:endParaRPr lang="en-US"/>
           </a:p>
@@ -1616,7 +1621,7 @@
           <a:p>
             <a:fld id="{601AD17F-A198-4D0B-923D-8F7C51F5BEB9}" type="datetimeFigureOut">
               <a:rPr lang="en-US" smtClean="0"/>
-              <a:t>6/21/2019</a:t>
+              <a:t>7/16/2019</a:t>
             </a:fld>
             <a:endParaRPr lang="en-US"/>
           </a:p>
@@ -1734,7 +1739,7 @@
           <a:p>
             <a:fld id="{601AD17F-A198-4D0B-923D-8F7C51F5BEB9}" type="datetimeFigureOut">
               <a:rPr lang="en-US" smtClean="0"/>
-              <a:t>6/21/2019</a:t>
+              <a:t>7/16/2019</a:t>
             </a:fld>
             <a:endParaRPr lang="en-US"/>
           </a:p>
@@ -1829,7 +1834,7 @@
           <a:p>
             <a:fld id="{601AD17F-A198-4D0B-923D-8F7C51F5BEB9}" type="datetimeFigureOut">
               <a:rPr lang="en-US" smtClean="0"/>
-              <a:t>6/21/2019</a:t>
+              <a:t>7/16/2019</a:t>
             </a:fld>
             <a:endParaRPr lang="en-US"/>
           </a:p>
@@ -2106,7 +2111,7 @@
           <a:p>
             <a:fld id="{601AD17F-A198-4D0B-923D-8F7C51F5BEB9}" type="datetimeFigureOut">
               <a:rPr lang="en-US" smtClean="0"/>
-              <a:t>6/21/2019</a:t>
+              <a:t>7/16/2019</a:t>
             </a:fld>
             <a:endParaRPr lang="en-US"/>
           </a:p>
@@ -2363,7 +2368,7 @@
           <a:p>
             <a:fld id="{601AD17F-A198-4D0B-923D-8F7C51F5BEB9}" type="datetimeFigureOut">
               <a:rPr lang="en-US" smtClean="0"/>
-              <a:t>6/21/2019</a:t>
+              <a:t>7/16/2019</a:t>
             </a:fld>
             <a:endParaRPr lang="en-US"/>
           </a:p>
@@ -2576,7 +2581,7 @@
           <a:p>
             <a:fld id="{601AD17F-A198-4D0B-923D-8F7C51F5BEB9}" type="datetimeFigureOut">
               <a:rPr lang="en-US" smtClean="0"/>
-              <a:t>6/21/2019</a:t>
+              <a:t>7/16/2019</a:t>
             </a:fld>
             <a:endParaRPr lang="en-US"/>
           </a:p>
@@ -3987,6 +3992,1921 @@
 </p:sld>
 </file>
 
+<file path=ppt/slides/slide12.xml><?xml version="1.0" encoding="utf-8"?>
+<p:sld xmlns:a="http://schemas.openxmlformats.org/drawingml/2006/main" xmlns:r="http://schemas.openxmlformats.org/officeDocument/2006/relationships" xmlns:p="http://schemas.openxmlformats.org/presentationml/2006/main">
+  <p:cSld>
+    <p:spTree>
+      <p:nvGrpSpPr>
+        <p:cNvPr id="1" name=""/>
+        <p:cNvGrpSpPr/>
+        <p:nvPr/>
+      </p:nvGrpSpPr>
+      <p:grpSpPr>
+        <a:xfrm>
+          <a:off x="0" y="0"/>
+          <a:ext cx="0" cy="0"/>
+          <a:chOff x="0" y="0"/>
+          <a:chExt cx="0" cy="0"/>
+        </a:xfrm>
+      </p:grpSpPr>
+      <p:sp>
+        <p:nvSpPr>
+          <p:cNvPr id="2" name="Title 1">
+            <a:extLst>
+              <a:ext uri="{FF2B5EF4-FFF2-40B4-BE49-F238E27FC236}">
+                <a16:creationId xmlns:a16="http://schemas.microsoft.com/office/drawing/2014/main" id="{46E5B24E-53C9-46C9-B61B-9E0208986E76}"/>
+              </a:ext>
+            </a:extLst>
+          </p:cNvPr>
+          <p:cNvSpPr>
+            <a:spLocks noGrp="1"/>
+          </p:cNvSpPr>
+          <p:nvPr>
+            <p:ph type="title"/>
+          </p:nvPr>
+        </p:nvSpPr>
+        <p:spPr/>
+        <p:txBody>
+          <a:bodyPr/>
+          <a:lstStyle/>
+          <a:p>
+            <a:endParaRPr lang="en-US"/>
+          </a:p>
+        </p:txBody>
+      </p:sp>
+      <p:sp>
+        <p:nvSpPr>
+          <p:cNvPr id="3" name="Content Placeholder 2">
+            <a:extLst>
+              <a:ext uri="{FF2B5EF4-FFF2-40B4-BE49-F238E27FC236}">
+                <a16:creationId xmlns:a16="http://schemas.microsoft.com/office/drawing/2014/main" id="{B68A0697-14DC-473E-B0E8-E1F24B7FE63C}"/>
+              </a:ext>
+            </a:extLst>
+          </p:cNvPr>
+          <p:cNvSpPr>
+            <a:spLocks noGrp="1"/>
+          </p:cNvSpPr>
+          <p:nvPr>
+            <p:ph idx="1"/>
+          </p:nvPr>
+        </p:nvSpPr>
+        <p:spPr/>
+        <p:txBody>
+          <a:bodyPr/>
+          <a:lstStyle/>
+          <a:p>
+            <a:endParaRPr lang="en-US"/>
+          </a:p>
+        </p:txBody>
+      </p:sp>
+    </p:spTree>
+    <p:extLst>
+      <p:ext uri="{BB962C8B-B14F-4D97-AF65-F5344CB8AC3E}">
+        <p14:creationId xmlns:p14="http://schemas.microsoft.com/office/powerpoint/2010/main" val="1059761068"/>
+      </p:ext>
+    </p:extLst>
+  </p:cSld>
+  <p:clrMapOvr>
+    <a:masterClrMapping/>
+  </p:clrMapOvr>
+</p:sld>
+</file>
+
+<file path=ppt/slides/slide13.xml><?xml version="1.0" encoding="utf-8"?>
+<p:sld xmlns:a="http://schemas.openxmlformats.org/drawingml/2006/main" xmlns:r="http://schemas.openxmlformats.org/officeDocument/2006/relationships" xmlns:p="http://schemas.openxmlformats.org/presentationml/2006/main">
+  <p:cSld>
+    <p:spTree>
+      <p:nvGrpSpPr>
+        <p:cNvPr id="1" name=""/>
+        <p:cNvGrpSpPr/>
+        <p:nvPr/>
+      </p:nvGrpSpPr>
+      <p:grpSpPr>
+        <a:xfrm>
+          <a:off x="0" y="0"/>
+          <a:ext cx="0" cy="0"/>
+          <a:chOff x="0" y="0"/>
+          <a:chExt cx="0" cy="0"/>
+        </a:xfrm>
+      </p:grpSpPr>
+      <p:sp>
+        <p:nvSpPr>
+          <p:cNvPr id="4" name="TextBox 3">
+            <a:extLst>
+              <a:ext uri="{FF2B5EF4-FFF2-40B4-BE49-F238E27FC236}">
+                <a16:creationId xmlns:a16="http://schemas.microsoft.com/office/drawing/2014/main" id="{E4419297-D6F3-47B8-B8DF-90EF9C748FEF}"/>
+              </a:ext>
+            </a:extLst>
+          </p:cNvPr>
+          <p:cNvSpPr txBox="1"/>
+          <p:nvPr/>
+        </p:nvSpPr>
+        <p:spPr>
+          <a:xfrm>
+            <a:off x="585116" y="605770"/>
+            <a:ext cx="8509457" cy="5078313"/>
+          </a:xfrm>
+          <a:prstGeom prst="rect">
+            <a:avLst/>
+          </a:prstGeom>
+          <a:noFill/>
+        </p:spPr>
+        <p:txBody>
+          <a:bodyPr wrap="square" rtlCol="0">
+            <a:spAutoFit/>
+          </a:bodyPr>
+          <a:lstStyle/>
+          <a:p>
+            <a:r>
+              <a:rPr lang="en-US" dirty="0"/>
+              <a:t>Model naming conventions:</a:t>
+            </a:r>
+          </a:p>
+          <a:p>
+            <a:endParaRPr lang="en-US" b="1" dirty="0"/>
+          </a:p>
+          <a:p>
+            <a:r>
+              <a:rPr lang="en-US" dirty="0"/>
+              <a:t>Time block parameterization = # survival time blocks, # maturity time blocks, # selectivity time blocks</a:t>
+            </a:r>
+          </a:p>
+          <a:p>
+            <a:r>
+              <a:rPr lang="en-US" dirty="0"/>
+              <a:t>E.g. HER_123 = 1 survival time block, 2 maturity blocks, 3 survival blocks</a:t>
+            </a:r>
+          </a:p>
+          <a:p>
+            <a:endParaRPr lang="en-US" dirty="0"/>
+          </a:p>
+          <a:p>
+            <a:r>
+              <a:rPr lang="en-US" dirty="0"/>
+              <a:t>The model number for model selection is shown before the time block parameterization.</a:t>
+            </a:r>
+          </a:p>
+          <a:p>
+            <a:r>
+              <a:rPr lang="en-US" dirty="0"/>
+              <a:t>E.g. HER 10_123 = Model 10 with 1 survival time block, 2 maturity blocks, 3 survival blocks</a:t>
+            </a:r>
+          </a:p>
+          <a:p>
+            <a:endParaRPr lang="en-US" b="1" dirty="0"/>
+          </a:p>
+          <a:p>
+            <a:r>
+              <a:rPr lang="en-US" b="1" dirty="0" err="1"/>
+              <a:t>HER_bestLS</a:t>
+            </a:r>
+            <a:r>
+              <a:rPr lang="en-US" b="1" dirty="0"/>
+              <a:t>_### = HER model with best-fitting parameterization of LS model by </a:t>
+            </a:r>
+            <a:r>
+              <a:rPr lang="en-US" b="1" dirty="0" err="1"/>
+              <a:t>AICc</a:t>
+            </a:r>
+            <a:endParaRPr lang="en-US" b="1" dirty="0"/>
+          </a:p>
+          <a:p>
+            <a:endParaRPr lang="en-US" b="1" dirty="0"/>
+          </a:p>
+          <a:p>
+            <a:r>
+              <a:rPr lang="en-US" b="1" dirty="0" err="1"/>
+              <a:t>HER_best_condCatch</a:t>
+            </a:r>
+            <a:r>
+              <a:rPr lang="en-US" b="1" dirty="0"/>
+              <a:t>.#_### = HER model with best-fitting parameterization of HER by AIC when conditioned on catch</a:t>
+            </a:r>
+          </a:p>
+          <a:p>
+            <a:endParaRPr lang="en-US" b="1" dirty="0"/>
+          </a:p>
+          <a:p>
+            <a:r>
+              <a:rPr lang="en-US" b="1" dirty="0" err="1"/>
+              <a:t>HER_best_condEffort</a:t>
+            </a:r>
+            <a:r>
+              <a:rPr lang="en-US" b="1" dirty="0"/>
+              <a:t>.#_### = HER model with best-fitting parameterization of HER by AIC when conditioned on effort</a:t>
+            </a:r>
+          </a:p>
+          <a:p>
+            <a:endParaRPr lang="en-US" b="1" dirty="0"/>
+          </a:p>
+        </p:txBody>
+      </p:sp>
+    </p:spTree>
+    <p:extLst>
+      <p:ext uri="{BB962C8B-B14F-4D97-AF65-F5344CB8AC3E}">
+        <p14:creationId xmlns:p14="http://schemas.microsoft.com/office/powerpoint/2010/main" val="350786666"/>
+      </p:ext>
+    </p:extLst>
+  </p:cSld>
+  <p:clrMapOvr>
+    <a:masterClrMapping/>
+  </p:clrMapOvr>
+</p:sld>
+</file>
+
+<file path=ppt/slides/slide14.xml><?xml version="1.0" encoding="utf-8"?>
+<p:sld xmlns:a="http://schemas.openxmlformats.org/drawingml/2006/main" xmlns:r="http://schemas.openxmlformats.org/officeDocument/2006/relationships" xmlns:p="http://schemas.openxmlformats.org/presentationml/2006/main">
+  <p:cSld>
+    <p:spTree>
+      <p:nvGrpSpPr>
+        <p:cNvPr id="1" name=""/>
+        <p:cNvGrpSpPr/>
+        <p:nvPr/>
+      </p:nvGrpSpPr>
+      <p:grpSpPr>
+        <a:xfrm>
+          <a:off x="0" y="0"/>
+          <a:ext cx="0" cy="0"/>
+          <a:chOff x="0" y="0"/>
+          <a:chExt cx="0" cy="0"/>
+        </a:xfrm>
+      </p:grpSpPr>
+      <p:sp>
+        <p:nvSpPr>
+          <p:cNvPr id="4" name="TextBox 3">
+            <a:extLst>
+              <a:ext uri="{FF2B5EF4-FFF2-40B4-BE49-F238E27FC236}">
+                <a16:creationId xmlns:a16="http://schemas.microsoft.com/office/drawing/2014/main" id="{E4419297-D6F3-47B8-B8DF-90EF9C748FEF}"/>
+              </a:ext>
+            </a:extLst>
+          </p:cNvPr>
+          <p:cNvSpPr txBox="1"/>
+          <p:nvPr/>
+        </p:nvSpPr>
+        <p:spPr>
+          <a:xfrm>
+            <a:off x="585116" y="605770"/>
+            <a:ext cx="4248407" cy="1200329"/>
+          </a:xfrm>
+          <a:prstGeom prst="rect">
+            <a:avLst/>
+          </a:prstGeom>
+          <a:noFill/>
+        </p:spPr>
+        <p:txBody>
+          <a:bodyPr wrap="none" rtlCol="0">
+            <a:spAutoFit/>
+          </a:bodyPr>
+          <a:lstStyle/>
+          <a:p>
+            <a:r>
+              <a:rPr lang="en-US" dirty="0"/>
+              <a:t>Folder directory (part 1):  General overview</a:t>
+            </a:r>
+          </a:p>
+          <a:p>
+            <a:endParaRPr lang="en-US" dirty="0"/>
+          </a:p>
+          <a:p>
+            <a:endParaRPr lang="en-US" dirty="0"/>
+          </a:p>
+          <a:p>
+            <a:r>
+              <a:rPr lang="en-US" b="1" dirty="0" err="1"/>
+              <a:t>AlaskaHerring</a:t>
+            </a:r>
+            <a:endParaRPr lang="en-US" b="1" dirty="0"/>
+          </a:p>
+        </p:txBody>
+      </p:sp>
+      <p:sp>
+        <p:nvSpPr>
+          <p:cNvPr id="5" name="TextBox 4">
+            <a:extLst>
+              <a:ext uri="{FF2B5EF4-FFF2-40B4-BE49-F238E27FC236}">
+                <a16:creationId xmlns:a16="http://schemas.microsoft.com/office/drawing/2014/main" id="{60B06435-5C9B-4D82-B347-34369DDC8C5F}"/>
+              </a:ext>
+            </a:extLst>
+          </p:cNvPr>
+          <p:cNvSpPr txBox="1"/>
+          <p:nvPr/>
+        </p:nvSpPr>
+        <p:spPr>
+          <a:xfrm>
+            <a:off x="1346234" y="2092294"/>
+            <a:ext cx="7782775" cy="3416320"/>
+          </a:xfrm>
+          <a:prstGeom prst="rect">
+            <a:avLst/>
+          </a:prstGeom>
+          <a:noFill/>
+        </p:spPr>
+        <p:txBody>
+          <a:bodyPr wrap="square" rtlCol="0">
+            <a:spAutoFit/>
+          </a:bodyPr>
+          <a:lstStyle/>
+          <a:p>
+            <a:r>
+              <a:rPr lang="en-US" b="1" dirty="0" err="1"/>
+              <a:t>YEAR_forecast</a:t>
+            </a:r>
+            <a:r>
+              <a:rPr lang="en-US" b="1" dirty="0"/>
+              <a:t> </a:t>
+            </a:r>
+            <a:r>
+              <a:rPr lang="en-US" dirty="0"/>
+              <a:t>– all data, code, and results for a given forecast year</a:t>
+            </a:r>
+          </a:p>
+          <a:p>
+            <a:endParaRPr lang="en-US" b="1" dirty="0"/>
+          </a:p>
+          <a:p>
+            <a:r>
+              <a:rPr lang="en-US" b="1" dirty="0" err="1"/>
+              <a:t>smartell_archive</a:t>
+            </a:r>
+            <a:r>
+              <a:rPr lang="en-US" b="1" dirty="0"/>
+              <a:t> </a:t>
+            </a:r>
+            <a:r>
+              <a:rPr lang="en-US" dirty="0"/>
+              <a:t>– deprecated code from Steve Martell’s contract</a:t>
+            </a:r>
+          </a:p>
+          <a:p>
+            <a:endParaRPr lang="en-US" b="1" dirty="0"/>
+          </a:p>
+          <a:p>
+            <a:r>
+              <a:rPr lang="en-US" b="1" dirty="0" err="1"/>
+              <a:t>technical_docs</a:t>
+            </a:r>
+            <a:r>
+              <a:rPr lang="en-US" b="1" dirty="0"/>
+              <a:t> </a:t>
+            </a:r>
+            <a:r>
+              <a:rPr lang="en-US" dirty="0"/>
+              <a:t>– documentation for the statistical catch-at-age model</a:t>
+            </a:r>
+          </a:p>
+          <a:p>
+            <a:endParaRPr lang="en-US" dirty="0"/>
+          </a:p>
+          <a:p>
+            <a:r>
+              <a:rPr lang="en-US" b="1" dirty="0"/>
+              <a:t>.</a:t>
+            </a:r>
+            <a:r>
+              <a:rPr lang="en-US" b="1" dirty="0" err="1"/>
+              <a:t>gitignore</a:t>
+            </a:r>
+            <a:r>
+              <a:rPr lang="en-US" b="1" dirty="0"/>
+              <a:t> </a:t>
+            </a:r>
+            <a:r>
+              <a:rPr lang="en-US" dirty="0"/>
+              <a:t>– all file types and folders not tracked by git</a:t>
+            </a:r>
+          </a:p>
+          <a:p>
+            <a:endParaRPr lang="en-US" dirty="0"/>
+          </a:p>
+          <a:p>
+            <a:r>
+              <a:rPr lang="en-US" b="1" dirty="0"/>
+              <a:t>ReadMe.md </a:t>
+            </a:r>
+            <a:r>
+              <a:rPr lang="en-US" dirty="0"/>
+              <a:t>– Summary of repository</a:t>
+            </a:r>
+          </a:p>
+          <a:p>
+            <a:endParaRPr lang="en-US" dirty="0"/>
+          </a:p>
+          <a:p>
+            <a:endParaRPr lang="en-US" dirty="0"/>
+          </a:p>
+          <a:p>
+            <a:endParaRPr lang="en-US" dirty="0"/>
+          </a:p>
+        </p:txBody>
+      </p:sp>
+      <p:grpSp>
+        <p:nvGrpSpPr>
+          <p:cNvPr id="12" name="Group 11">
+            <a:extLst>
+              <a:ext uri="{FF2B5EF4-FFF2-40B4-BE49-F238E27FC236}">
+                <a16:creationId xmlns:a16="http://schemas.microsoft.com/office/drawing/2014/main" id="{AEB784AB-2189-4314-962D-55132BC7350E}"/>
+              </a:ext>
+            </a:extLst>
+          </p:cNvPr>
+          <p:cNvGrpSpPr/>
+          <p:nvPr/>
+        </p:nvGrpSpPr>
+        <p:grpSpPr>
+          <a:xfrm>
+            <a:off x="1012371" y="1806099"/>
+            <a:ext cx="322977" cy="2624387"/>
+            <a:chOff x="1012371" y="1806099"/>
+            <a:chExt cx="322977" cy="2624387"/>
+          </a:xfrm>
+        </p:grpSpPr>
+        <p:cxnSp>
+          <p:nvCxnSpPr>
+            <p:cNvPr id="3" name="Straight Connector 2">
+              <a:extLst>
+                <a:ext uri="{FF2B5EF4-FFF2-40B4-BE49-F238E27FC236}">
+                  <a16:creationId xmlns:a16="http://schemas.microsoft.com/office/drawing/2014/main" id="{C6862F98-7DF3-4C14-AD0B-5CD8C09701D7}"/>
+                </a:ext>
+              </a:extLst>
+            </p:cNvPr>
+            <p:cNvCxnSpPr/>
+            <p:nvPr/>
+          </p:nvCxnSpPr>
+          <p:spPr>
+            <a:xfrm>
+              <a:off x="1012371" y="1806099"/>
+              <a:ext cx="0" cy="2624387"/>
+            </a:xfrm>
+            <a:prstGeom prst="line">
+              <a:avLst/>
+            </a:prstGeom>
+          </p:spPr>
+          <p:style>
+            <a:lnRef idx="1">
+              <a:schemeClr val="dk1"/>
+            </a:lnRef>
+            <a:fillRef idx="0">
+              <a:schemeClr val="dk1"/>
+            </a:fillRef>
+            <a:effectRef idx="0">
+              <a:schemeClr val="dk1"/>
+            </a:effectRef>
+            <a:fontRef idx="minor">
+              <a:schemeClr val="tx1"/>
+            </a:fontRef>
+          </p:style>
+        </p:cxnSp>
+        <p:cxnSp>
+          <p:nvCxnSpPr>
+            <p:cNvPr id="6" name="Straight Connector 5">
+              <a:extLst>
+                <a:ext uri="{FF2B5EF4-FFF2-40B4-BE49-F238E27FC236}">
+                  <a16:creationId xmlns:a16="http://schemas.microsoft.com/office/drawing/2014/main" id="{BBFBB3BB-36F9-4554-AE48-C408251986DC}"/>
+                </a:ext>
+              </a:extLst>
+            </p:cNvPr>
+            <p:cNvCxnSpPr>
+              <a:cxnSpLocks/>
+            </p:cNvCxnSpPr>
+            <p:nvPr/>
+          </p:nvCxnSpPr>
+          <p:spPr>
+            <a:xfrm>
+              <a:off x="1012371" y="2295956"/>
+              <a:ext cx="304800" cy="0"/>
+            </a:xfrm>
+            <a:prstGeom prst="line">
+              <a:avLst/>
+            </a:prstGeom>
+          </p:spPr>
+          <p:style>
+            <a:lnRef idx="1">
+              <a:schemeClr val="dk1"/>
+            </a:lnRef>
+            <a:fillRef idx="0">
+              <a:schemeClr val="dk1"/>
+            </a:fillRef>
+            <a:effectRef idx="0">
+              <a:schemeClr val="dk1"/>
+            </a:effectRef>
+            <a:fontRef idx="minor">
+              <a:schemeClr val="tx1"/>
+            </a:fontRef>
+          </p:style>
+        </p:cxnSp>
+        <p:cxnSp>
+          <p:nvCxnSpPr>
+            <p:cNvPr id="8" name="Straight Connector 7">
+              <a:extLst>
+                <a:ext uri="{FF2B5EF4-FFF2-40B4-BE49-F238E27FC236}">
+                  <a16:creationId xmlns:a16="http://schemas.microsoft.com/office/drawing/2014/main" id="{6BAA326B-BF7C-46EF-A264-2294E6239A87}"/>
+                </a:ext>
+              </a:extLst>
+            </p:cNvPr>
+            <p:cNvCxnSpPr>
+              <a:cxnSpLocks/>
+            </p:cNvCxnSpPr>
+            <p:nvPr/>
+          </p:nvCxnSpPr>
+          <p:spPr>
+            <a:xfrm>
+              <a:off x="1030548" y="2862013"/>
+              <a:ext cx="304800" cy="0"/>
+            </a:xfrm>
+            <a:prstGeom prst="line">
+              <a:avLst/>
+            </a:prstGeom>
+          </p:spPr>
+          <p:style>
+            <a:lnRef idx="1">
+              <a:schemeClr val="dk1"/>
+            </a:lnRef>
+            <a:fillRef idx="0">
+              <a:schemeClr val="dk1"/>
+            </a:fillRef>
+            <a:effectRef idx="0">
+              <a:schemeClr val="dk1"/>
+            </a:effectRef>
+            <a:fontRef idx="minor">
+              <a:schemeClr val="tx1"/>
+            </a:fontRef>
+          </p:style>
+        </p:cxnSp>
+        <p:cxnSp>
+          <p:nvCxnSpPr>
+            <p:cNvPr id="9" name="Straight Connector 8">
+              <a:extLst>
+                <a:ext uri="{FF2B5EF4-FFF2-40B4-BE49-F238E27FC236}">
+                  <a16:creationId xmlns:a16="http://schemas.microsoft.com/office/drawing/2014/main" id="{15241EA7-3D0F-4FAA-B2E6-A5887F0738B4}"/>
+                </a:ext>
+              </a:extLst>
+            </p:cNvPr>
+            <p:cNvCxnSpPr>
+              <a:cxnSpLocks/>
+            </p:cNvCxnSpPr>
+            <p:nvPr/>
+          </p:nvCxnSpPr>
+          <p:spPr>
+            <a:xfrm>
+              <a:off x="1012371" y="3362756"/>
+              <a:ext cx="304800" cy="0"/>
+            </a:xfrm>
+            <a:prstGeom prst="line">
+              <a:avLst/>
+            </a:prstGeom>
+          </p:spPr>
+          <p:style>
+            <a:lnRef idx="1">
+              <a:schemeClr val="dk1"/>
+            </a:lnRef>
+            <a:fillRef idx="0">
+              <a:schemeClr val="dk1"/>
+            </a:fillRef>
+            <a:effectRef idx="0">
+              <a:schemeClr val="dk1"/>
+            </a:effectRef>
+            <a:fontRef idx="minor">
+              <a:schemeClr val="tx1"/>
+            </a:fontRef>
+          </p:style>
+        </p:cxnSp>
+        <p:cxnSp>
+          <p:nvCxnSpPr>
+            <p:cNvPr id="10" name="Straight Connector 9">
+              <a:extLst>
+                <a:ext uri="{FF2B5EF4-FFF2-40B4-BE49-F238E27FC236}">
+                  <a16:creationId xmlns:a16="http://schemas.microsoft.com/office/drawing/2014/main" id="{75AB949C-F31C-4584-944D-36EB038CB464}"/>
+                </a:ext>
+              </a:extLst>
+            </p:cNvPr>
+            <p:cNvCxnSpPr>
+              <a:cxnSpLocks/>
+            </p:cNvCxnSpPr>
+            <p:nvPr/>
+          </p:nvCxnSpPr>
+          <p:spPr>
+            <a:xfrm>
+              <a:off x="1019662" y="3917927"/>
+              <a:ext cx="304800" cy="0"/>
+            </a:xfrm>
+            <a:prstGeom prst="line">
+              <a:avLst/>
+            </a:prstGeom>
+          </p:spPr>
+          <p:style>
+            <a:lnRef idx="1">
+              <a:schemeClr val="dk1"/>
+            </a:lnRef>
+            <a:fillRef idx="0">
+              <a:schemeClr val="dk1"/>
+            </a:fillRef>
+            <a:effectRef idx="0">
+              <a:schemeClr val="dk1"/>
+            </a:effectRef>
+            <a:fontRef idx="minor">
+              <a:schemeClr val="tx1"/>
+            </a:fontRef>
+          </p:style>
+        </p:cxnSp>
+        <p:cxnSp>
+          <p:nvCxnSpPr>
+            <p:cNvPr id="11" name="Straight Connector 10">
+              <a:extLst>
+                <a:ext uri="{FF2B5EF4-FFF2-40B4-BE49-F238E27FC236}">
+                  <a16:creationId xmlns:a16="http://schemas.microsoft.com/office/drawing/2014/main" id="{3EA8091A-79CF-42FB-AA89-0E0017C02643}"/>
+                </a:ext>
+              </a:extLst>
+            </p:cNvPr>
+            <p:cNvCxnSpPr>
+              <a:cxnSpLocks/>
+            </p:cNvCxnSpPr>
+            <p:nvPr/>
+          </p:nvCxnSpPr>
+          <p:spPr>
+            <a:xfrm>
+              <a:off x="1012371" y="4429556"/>
+              <a:ext cx="304800" cy="0"/>
+            </a:xfrm>
+            <a:prstGeom prst="line">
+              <a:avLst/>
+            </a:prstGeom>
+          </p:spPr>
+          <p:style>
+            <a:lnRef idx="1">
+              <a:schemeClr val="dk1"/>
+            </a:lnRef>
+            <a:fillRef idx="0">
+              <a:schemeClr val="dk1"/>
+            </a:fillRef>
+            <a:effectRef idx="0">
+              <a:schemeClr val="dk1"/>
+            </a:effectRef>
+            <a:fontRef idx="minor">
+              <a:schemeClr val="tx1"/>
+            </a:fontRef>
+          </p:style>
+        </p:cxnSp>
+      </p:grpSp>
+    </p:spTree>
+    <p:extLst>
+      <p:ext uri="{BB962C8B-B14F-4D97-AF65-F5344CB8AC3E}">
+        <p14:creationId xmlns:p14="http://schemas.microsoft.com/office/powerpoint/2010/main" val="1659723769"/>
+      </p:ext>
+    </p:extLst>
+  </p:cSld>
+  <p:clrMapOvr>
+    <a:masterClrMapping/>
+  </p:clrMapOvr>
+</p:sld>
+</file>
+
+<file path=ppt/slides/slide15.xml><?xml version="1.0" encoding="utf-8"?>
+<p:sld xmlns:a="http://schemas.openxmlformats.org/drawingml/2006/main" xmlns:r="http://schemas.openxmlformats.org/officeDocument/2006/relationships" xmlns:p="http://schemas.openxmlformats.org/presentationml/2006/main">
+  <p:cSld>
+    <p:spTree>
+      <p:nvGrpSpPr>
+        <p:cNvPr id="1" name=""/>
+        <p:cNvGrpSpPr/>
+        <p:nvPr/>
+      </p:nvGrpSpPr>
+      <p:grpSpPr>
+        <a:xfrm>
+          <a:off x="0" y="0"/>
+          <a:ext cx="0" cy="0"/>
+          <a:chOff x="0" y="0"/>
+          <a:chExt cx="0" cy="0"/>
+        </a:xfrm>
+      </p:grpSpPr>
+      <p:sp>
+        <p:nvSpPr>
+          <p:cNvPr id="14" name="TextBox 13">
+            <a:extLst>
+              <a:ext uri="{FF2B5EF4-FFF2-40B4-BE49-F238E27FC236}">
+                <a16:creationId xmlns:a16="http://schemas.microsoft.com/office/drawing/2014/main" id="{F5AA237F-4162-4EC6-8707-914D85F76E10}"/>
+              </a:ext>
+            </a:extLst>
+          </p:cNvPr>
+          <p:cNvSpPr txBox="1"/>
+          <p:nvPr/>
+        </p:nvSpPr>
+        <p:spPr>
+          <a:xfrm>
+            <a:off x="585116" y="605770"/>
+            <a:ext cx="4085286" cy="923330"/>
+          </a:xfrm>
+          <a:prstGeom prst="rect">
+            <a:avLst/>
+          </a:prstGeom>
+          <a:noFill/>
+        </p:spPr>
+        <p:txBody>
+          <a:bodyPr wrap="none" rtlCol="0">
+            <a:spAutoFit/>
+          </a:bodyPr>
+          <a:lstStyle/>
+          <a:p>
+            <a:r>
+              <a:rPr lang="en-US" dirty="0"/>
+              <a:t>Folder directory (part 2):  Forecast folders</a:t>
+            </a:r>
+          </a:p>
+          <a:p>
+            <a:endParaRPr lang="en-US" dirty="0"/>
+          </a:p>
+          <a:p>
+            <a:r>
+              <a:rPr lang="en-US" b="1" dirty="0" err="1"/>
+              <a:t>AlaskaHerring</a:t>
+            </a:r>
+            <a:endParaRPr lang="en-US" b="1" dirty="0"/>
+          </a:p>
+        </p:txBody>
+      </p:sp>
+      <p:sp>
+        <p:nvSpPr>
+          <p:cNvPr id="4" name="TextBox 3">
+            <a:extLst>
+              <a:ext uri="{FF2B5EF4-FFF2-40B4-BE49-F238E27FC236}">
+                <a16:creationId xmlns:a16="http://schemas.microsoft.com/office/drawing/2014/main" id="{E4419297-D6F3-47B8-B8DF-90EF9C748FEF}"/>
+              </a:ext>
+            </a:extLst>
+          </p:cNvPr>
+          <p:cNvSpPr txBox="1"/>
+          <p:nvPr/>
+        </p:nvSpPr>
+        <p:spPr>
+          <a:xfrm>
+            <a:off x="1199683" y="1673898"/>
+            <a:ext cx="1534074" cy="646331"/>
+          </a:xfrm>
+          <a:prstGeom prst="rect">
+            <a:avLst/>
+          </a:prstGeom>
+          <a:noFill/>
+        </p:spPr>
+        <p:txBody>
+          <a:bodyPr wrap="none" rtlCol="0">
+            <a:spAutoFit/>
+          </a:bodyPr>
+          <a:lstStyle/>
+          <a:p>
+            <a:endParaRPr lang="en-US" dirty="0"/>
+          </a:p>
+          <a:p>
+            <a:r>
+              <a:rPr lang="en-US" b="1" dirty="0"/>
+              <a:t>2019_forecast</a:t>
+            </a:r>
+          </a:p>
+        </p:txBody>
+      </p:sp>
+      <p:sp>
+        <p:nvSpPr>
+          <p:cNvPr id="5" name="TextBox 4">
+            <a:extLst>
+              <a:ext uri="{FF2B5EF4-FFF2-40B4-BE49-F238E27FC236}">
+                <a16:creationId xmlns:a16="http://schemas.microsoft.com/office/drawing/2014/main" id="{60B06435-5C9B-4D82-B347-34369DDC8C5F}"/>
+              </a:ext>
+            </a:extLst>
+          </p:cNvPr>
+          <p:cNvSpPr txBox="1"/>
+          <p:nvPr/>
+        </p:nvSpPr>
+        <p:spPr>
+          <a:xfrm>
+            <a:off x="1984896" y="2773115"/>
+            <a:ext cx="6730966" cy="3970318"/>
+          </a:xfrm>
+          <a:prstGeom prst="rect">
+            <a:avLst/>
+          </a:prstGeom>
+          <a:noFill/>
+        </p:spPr>
+        <p:txBody>
+          <a:bodyPr wrap="square" rtlCol="0">
+            <a:spAutoFit/>
+          </a:bodyPr>
+          <a:lstStyle/>
+          <a:p>
+            <a:r>
+              <a:rPr lang="en-US" b="1" dirty="0" err="1"/>
+              <a:t>admb</a:t>
+            </a:r>
+            <a:r>
+              <a:rPr lang="en-US" b="1" dirty="0"/>
+              <a:t> </a:t>
+            </a:r>
+            <a:r>
+              <a:rPr lang="en-US" dirty="0"/>
+              <a:t>– all relevant </a:t>
+            </a:r>
+            <a:r>
+              <a:rPr lang="en-US" dirty="0" err="1"/>
+              <a:t>admb</a:t>
+            </a:r>
+            <a:r>
+              <a:rPr lang="en-US" dirty="0"/>
+              <a:t> files for final models including </a:t>
+            </a:r>
+            <a:r>
+              <a:rPr lang="en-US" dirty="0" err="1"/>
+              <a:t>HER_bestLS</a:t>
+            </a:r>
+            <a:r>
+              <a:rPr lang="en-US" dirty="0"/>
+              <a:t>, </a:t>
+            </a:r>
+            <a:r>
+              <a:rPr lang="en-US" dirty="0" err="1"/>
+              <a:t>HER_best_conditionCatch</a:t>
+            </a:r>
+            <a:r>
+              <a:rPr lang="en-US" dirty="0"/>
+              <a:t>, </a:t>
+            </a:r>
+            <a:r>
+              <a:rPr lang="en-US" dirty="0" err="1"/>
+              <a:t>HER_best_conditionEffort</a:t>
+            </a:r>
+            <a:endParaRPr lang="en-US" dirty="0"/>
+          </a:p>
+          <a:p>
+            <a:endParaRPr lang="en-US" b="1" dirty="0"/>
+          </a:p>
+          <a:p>
+            <a:r>
+              <a:rPr lang="en-US" b="1" dirty="0"/>
+              <a:t>data </a:t>
+            </a:r>
+            <a:r>
+              <a:rPr lang="en-US" dirty="0"/>
+              <a:t>– currently only includes LS model results for comparison with HER. </a:t>
+            </a:r>
+          </a:p>
+          <a:p>
+            <a:endParaRPr lang="en-US" b="1" dirty="0"/>
+          </a:p>
+          <a:p>
+            <a:r>
+              <a:rPr lang="en-US" b="1" dirty="0"/>
+              <a:t>r </a:t>
+            </a:r>
+            <a:r>
+              <a:rPr lang="en-US" dirty="0"/>
+              <a:t>– all R scripts for running HER, generating figures, doing Bayesian analysis, running model selection, retrospective analysis, and sensitivity analysis</a:t>
+            </a:r>
+          </a:p>
+          <a:p>
+            <a:endParaRPr lang="en-US" dirty="0"/>
+          </a:p>
+          <a:p>
+            <a:r>
+              <a:rPr lang="en-US" b="1" dirty="0"/>
+              <a:t>results </a:t>
+            </a:r>
+            <a:r>
+              <a:rPr lang="en-US" dirty="0"/>
+              <a:t>– figures, csv output, and archive of all models run in model selection, retrospective, and sensitivity analyses</a:t>
+            </a:r>
+          </a:p>
+          <a:p>
+            <a:endParaRPr lang="en-US" dirty="0"/>
+          </a:p>
+          <a:p>
+            <a:endParaRPr lang="en-US" dirty="0"/>
+          </a:p>
+        </p:txBody>
+      </p:sp>
+      <p:grpSp>
+        <p:nvGrpSpPr>
+          <p:cNvPr id="7" name="Group 6">
+            <a:extLst>
+              <a:ext uri="{FF2B5EF4-FFF2-40B4-BE49-F238E27FC236}">
+                <a16:creationId xmlns:a16="http://schemas.microsoft.com/office/drawing/2014/main" id="{316C7CF8-CD7B-4EA7-A564-7FD0B8FE853B}"/>
+              </a:ext>
+            </a:extLst>
+          </p:cNvPr>
+          <p:cNvGrpSpPr/>
+          <p:nvPr/>
+        </p:nvGrpSpPr>
+        <p:grpSpPr>
+          <a:xfrm>
+            <a:off x="1643743" y="2454261"/>
+            <a:ext cx="312091" cy="3271625"/>
+            <a:chOff x="1012371" y="1806099"/>
+            <a:chExt cx="312091" cy="3271625"/>
+          </a:xfrm>
+        </p:grpSpPr>
+        <p:cxnSp>
+          <p:nvCxnSpPr>
+            <p:cNvPr id="8" name="Straight Connector 7">
+              <a:extLst>
+                <a:ext uri="{FF2B5EF4-FFF2-40B4-BE49-F238E27FC236}">
+                  <a16:creationId xmlns:a16="http://schemas.microsoft.com/office/drawing/2014/main" id="{3890EC05-03EB-43D3-90F9-85D0C7ED3B5F}"/>
+                </a:ext>
+              </a:extLst>
+            </p:cNvPr>
+            <p:cNvCxnSpPr>
+              <a:cxnSpLocks/>
+            </p:cNvCxnSpPr>
+            <p:nvPr/>
+          </p:nvCxnSpPr>
+          <p:spPr>
+            <a:xfrm>
+              <a:off x="1012371" y="1806099"/>
+              <a:ext cx="0" cy="3271625"/>
+            </a:xfrm>
+            <a:prstGeom prst="line">
+              <a:avLst/>
+            </a:prstGeom>
+          </p:spPr>
+          <p:style>
+            <a:lnRef idx="1">
+              <a:schemeClr val="dk1"/>
+            </a:lnRef>
+            <a:fillRef idx="0">
+              <a:schemeClr val="dk1"/>
+            </a:fillRef>
+            <a:effectRef idx="0">
+              <a:schemeClr val="dk1"/>
+            </a:effectRef>
+            <a:fontRef idx="minor">
+              <a:schemeClr val="tx1"/>
+            </a:fontRef>
+          </p:style>
+        </p:cxnSp>
+        <p:cxnSp>
+          <p:nvCxnSpPr>
+            <p:cNvPr id="9" name="Straight Connector 8">
+              <a:extLst>
+                <a:ext uri="{FF2B5EF4-FFF2-40B4-BE49-F238E27FC236}">
+                  <a16:creationId xmlns:a16="http://schemas.microsoft.com/office/drawing/2014/main" id="{0F515F4C-46FF-44BE-BAF3-C61731FED344}"/>
+                </a:ext>
+              </a:extLst>
+            </p:cNvPr>
+            <p:cNvCxnSpPr>
+              <a:cxnSpLocks/>
+            </p:cNvCxnSpPr>
+            <p:nvPr/>
+          </p:nvCxnSpPr>
+          <p:spPr>
+            <a:xfrm>
+              <a:off x="1012371" y="2295956"/>
+              <a:ext cx="304800" cy="0"/>
+            </a:xfrm>
+            <a:prstGeom prst="line">
+              <a:avLst/>
+            </a:prstGeom>
+          </p:spPr>
+          <p:style>
+            <a:lnRef idx="1">
+              <a:schemeClr val="dk1"/>
+            </a:lnRef>
+            <a:fillRef idx="0">
+              <a:schemeClr val="dk1"/>
+            </a:fillRef>
+            <a:effectRef idx="0">
+              <a:schemeClr val="dk1"/>
+            </a:effectRef>
+            <a:fontRef idx="minor">
+              <a:schemeClr val="tx1"/>
+            </a:fontRef>
+          </p:style>
+        </p:cxnSp>
+        <p:cxnSp>
+          <p:nvCxnSpPr>
+            <p:cNvPr id="11" name="Straight Connector 10">
+              <a:extLst>
+                <a:ext uri="{FF2B5EF4-FFF2-40B4-BE49-F238E27FC236}">
+                  <a16:creationId xmlns:a16="http://schemas.microsoft.com/office/drawing/2014/main" id="{60B6E606-DD23-4621-8D61-7F0E21C67876}"/>
+                </a:ext>
+              </a:extLst>
+            </p:cNvPr>
+            <p:cNvCxnSpPr>
+              <a:cxnSpLocks/>
+            </p:cNvCxnSpPr>
+            <p:nvPr/>
+          </p:nvCxnSpPr>
+          <p:spPr>
+            <a:xfrm>
+              <a:off x="1012371" y="3134156"/>
+              <a:ext cx="304800" cy="0"/>
+            </a:xfrm>
+            <a:prstGeom prst="line">
+              <a:avLst/>
+            </a:prstGeom>
+          </p:spPr>
+          <p:style>
+            <a:lnRef idx="1">
+              <a:schemeClr val="dk1"/>
+            </a:lnRef>
+            <a:fillRef idx="0">
+              <a:schemeClr val="dk1"/>
+            </a:fillRef>
+            <a:effectRef idx="0">
+              <a:schemeClr val="dk1"/>
+            </a:effectRef>
+            <a:fontRef idx="minor">
+              <a:schemeClr val="tx1"/>
+            </a:fontRef>
+          </p:style>
+        </p:cxnSp>
+        <p:cxnSp>
+          <p:nvCxnSpPr>
+            <p:cNvPr id="12" name="Straight Connector 11">
+              <a:extLst>
+                <a:ext uri="{FF2B5EF4-FFF2-40B4-BE49-F238E27FC236}">
+                  <a16:creationId xmlns:a16="http://schemas.microsoft.com/office/drawing/2014/main" id="{4A98BA6E-F1F1-436D-B30F-E4EB89C36373}"/>
+                </a:ext>
+              </a:extLst>
+            </p:cNvPr>
+            <p:cNvCxnSpPr>
+              <a:cxnSpLocks/>
+            </p:cNvCxnSpPr>
+            <p:nvPr/>
+          </p:nvCxnSpPr>
+          <p:spPr>
+            <a:xfrm>
+              <a:off x="1019662" y="3972357"/>
+              <a:ext cx="304800" cy="0"/>
+            </a:xfrm>
+            <a:prstGeom prst="line">
+              <a:avLst/>
+            </a:prstGeom>
+          </p:spPr>
+          <p:style>
+            <a:lnRef idx="1">
+              <a:schemeClr val="dk1"/>
+            </a:lnRef>
+            <a:fillRef idx="0">
+              <a:schemeClr val="dk1"/>
+            </a:fillRef>
+            <a:effectRef idx="0">
+              <a:schemeClr val="dk1"/>
+            </a:effectRef>
+            <a:fontRef idx="minor">
+              <a:schemeClr val="tx1"/>
+            </a:fontRef>
+          </p:style>
+        </p:cxnSp>
+        <p:cxnSp>
+          <p:nvCxnSpPr>
+            <p:cNvPr id="13" name="Straight Connector 12">
+              <a:extLst>
+                <a:ext uri="{FF2B5EF4-FFF2-40B4-BE49-F238E27FC236}">
+                  <a16:creationId xmlns:a16="http://schemas.microsoft.com/office/drawing/2014/main" id="{2BCA05C5-687B-45A8-A882-793BC3ECA8CD}"/>
+                </a:ext>
+              </a:extLst>
+            </p:cNvPr>
+            <p:cNvCxnSpPr>
+              <a:cxnSpLocks/>
+            </p:cNvCxnSpPr>
+            <p:nvPr/>
+          </p:nvCxnSpPr>
+          <p:spPr>
+            <a:xfrm>
+              <a:off x="1012371" y="5077724"/>
+              <a:ext cx="304800" cy="0"/>
+            </a:xfrm>
+            <a:prstGeom prst="line">
+              <a:avLst/>
+            </a:prstGeom>
+          </p:spPr>
+          <p:style>
+            <a:lnRef idx="1">
+              <a:schemeClr val="dk1"/>
+            </a:lnRef>
+            <a:fillRef idx="0">
+              <a:schemeClr val="dk1"/>
+            </a:fillRef>
+            <a:effectRef idx="0">
+              <a:schemeClr val="dk1"/>
+            </a:effectRef>
+            <a:fontRef idx="minor">
+              <a:schemeClr val="tx1"/>
+            </a:fontRef>
+          </p:style>
+        </p:cxnSp>
+      </p:grpSp>
+      <p:cxnSp>
+        <p:nvCxnSpPr>
+          <p:cNvPr id="15" name="Straight Connector 14">
+            <a:extLst>
+              <a:ext uri="{FF2B5EF4-FFF2-40B4-BE49-F238E27FC236}">
+                <a16:creationId xmlns:a16="http://schemas.microsoft.com/office/drawing/2014/main" id="{22D08B0D-E80E-43C7-BEF8-DD2E9D85885C}"/>
+              </a:ext>
+            </a:extLst>
+          </p:cNvPr>
+          <p:cNvCxnSpPr>
+            <a:cxnSpLocks/>
+          </p:cNvCxnSpPr>
+          <p:nvPr/>
+        </p:nvCxnSpPr>
+        <p:spPr>
+          <a:xfrm>
+            <a:off x="794657" y="1666074"/>
+            <a:ext cx="0" cy="489297"/>
+          </a:xfrm>
+          <a:prstGeom prst="line">
+            <a:avLst/>
+          </a:prstGeom>
+        </p:spPr>
+        <p:style>
+          <a:lnRef idx="1">
+            <a:schemeClr val="dk1"/>
+          </a:lnRef>
+          <a:fillRef idx="0">
+            <a:schemeClr val="dk1"/>
+          </a:fillRef>
+          <a:effectRef idx="0">
+            <a:schemeClr val="dk1"/>
+          </a:effectRef>
+          <a:fontRef idx="minor">
+            <a:schemeClr val="tx1"/>
+          </a:fontRef>
+        </p:style>
+      </p:cxnSp>
+      <p:cxnSp>
+        <p:nvCxnSpPr>
+          <p:cNvPr id="16" name="Straight Connector 15">
+            <a:extLst>
+              <a:ext uri="{FF2B5EF4-FFF2-40B4-BE49-F238E27FC236}">
+                <a16:creationId xmlns:a16="http://schemas.microsoft.com/office/drawing/2014/main" id="{6FA959D7-4FDE-4DEE-B1DC-AE23D1C05351}"/>
+              </a:ext>
+            </a:extLst>
+          </p:cNvPr>
+          <p:cNvCxnSpPr>
+            <a:cxnSpLocks/>
+          </p:cNvCxnSpPr>
+          <p:nvPr/>
+        </p:nvCxnSpPr>
+        <p:spPr>
+          <a:xfrm>
+            <a:off x="794657" y="2155931"/>
+            <a:ext cx="304800" cy="0"/>
+          </a:xfrm>
+          <a:prstGeom prst="line">
+            <a:avLst/>
+          </a:prstGeom>
+        </p:spPr>
+        <p:style>
+          <a:lnRef idx="1">
+            <a:schemeClr val="dk1"/>
+          </a:lnRef>
+          <a:fillRef idx="0">
+            <a:schemeClr val="dk1"/>
+          </a:fillRef>
+          <a:effectRef idx="0">
+            <a:schemeClr val="dk1"/>
+          </a:effectRef>
+          <a:fontRef idx="minor">
+            <a:schemeClr val="tx1"/>
+          </a:fontRef>
+        </p:style>
+      </p:cxnSp>
+    </p:spTree>
+    <p:extLst>
+      <p:ext uri="{BB962C8B-B14F-4D97-AF65-F5344CB8AC3E}">
+        <p14:creationId xmlns:p14="http://schemas.microsoft.com/office/powerpoint/2010/main" val="3781544213"/>
+      </p:ext>
+    </p:extLst>
+  </p:cSld>
+  <p:clrMapOvr>
+    <a:masterClrMapping/>
+  </p:clrMapOvr>
+</p:sld>
+</file>
+
+<file path=ppt/slides/slide16.xml><?xml version="1.0" encoding="utf-8"?>
+<p:sld xmlns:a="http://schemas.openxmlformats.org/drawingml/2006/main" xmlns:r="http://schemas.openxmlformats.org/officeDocument/2006/relationships" xmlns:p="http://schemas.openxmlformats.org/presentationml/2006/main">
+  <p:cSld>
+    <p:spTree>
+      <p:nvGrpSpPr>
+        <p:cNvPr id="1" name=""/>
+        <p:cNvGrpSpPr/>
+        <p:nvPr/>
+      </p:nvGrpSpPr>
+      <p:grpSpPr>
+        <a:xfrm>
+          <a:off x="0" y="0"/>
+          <a:ext cx="0" cy="0"/>
+          <a:chOff x="0" y="0"/>
+          <a:chExt cx="0" cy="0"/>
+        </a:xfrm>
+      </p:grpSpPr>
+      <p:sp>
+        <p:nvSpPr>
+          <p:cNvPr id="4" name="TextBox 3">
+            <a:extLst>
+              <a:ext uri="{FF2B5EF4-FFF2-40B4-BE49-F238E27FC236}">
+                <a16:creationId xmlns:a16="http://schemas.microsoft.com/office/drawing/2014/main" id="{E4419297-D6F3-47B8-B8DF-90EF9C748FEF}"/>
+              </a:ext>
+            </a:extLst>
+          </p:cNvPr>
+          <p:cNvSpPr txBox="1"/>
+          <p:nvPr/>
+        </p:nvSpPr>
+        <p:spPr>
+          <a:xfrm>
+            <a:off x="585116" y="280799"/>
+            <a:ext cx="4356577" cy="923330"/>
+          </a:xfrm>
+          <a:prstGeom prst="rect">
+            <a:avLst/>
+          </a:prstGeom>
+          <a:noFill/>
+        </p:spPr>
+        <p:txBody>
+          <a:bodyPr wrap="none" rtlCol="0">
+            <a:spAutoFit/>
+          </a:bodyPr>
+          <a:lstStyle/>
+          <a:p>
+            <a:r>
+              <a:rPr lang="en-US" dirty="0"/>
+              <a:t>Folder directory (part 3):  2019 results folder</a:t>
+            </a:r>
+          </a:p>
+          <a:p>
+            <a:endParaRPr lang="en-US" dirty="0"/>
+          </a:p>
+          <a:p>
+            <a:r>
+              <a:rPr lang="en-US" b="1" dirty="0" err="1"/>
+              <a:t>AlaskaHerring</a:t>
+            </a:r>
+            <a:endParaRPr lang="en-US" b="1" dirty="0"/>
+          </a:p>
+        </p:txBody>
+      </p:sp>
+      <p:sp>
+        <p:nvSpPr>
+          <p:cNvPr id="5" name="TextBox 4">
+            <a:extLst>
+              <a:ext uri="{FF2B5EF4-FFF2-40B4-BE49-F238E27FC236}">
+                <a16:creationId xmlns:a16="http://schemas.microsoft.com/office/drawing/2014/main" id="{60B06435-5C9B-4D82-B347-34369DDC8C5F}"/>
+              </a:ext>
+            </a:extLst>
+          </p:cNvPr>
+          <p:cNvSpPr txBox="1"/>
+          <p:nvPr/>
+        </p:nvSpPr>
+        <p:spPr>
+          <a:xfrm>
+            <a:off x="1480968" y="2114065"/>
+            <a:ext cx="7782775" cy="1200329"/>
+          </a:xfrm>
+          <a:prstGeom prst="rect">
+            <a:avLst/>
+          </a:prstGeom>
+          <a:noFill/>
+        </p:spPr>
+        <p:txBody>
+          <a:bodyPr wrap="square" rtlCol="0">
+            <a:spAutoFit/>
+          </a:bodyPr>
+          <a:lstStyle/>
+          <a:p>
+            <a:r>
+              <a:rPr lang="en-US" b="1" dirty="0"/>
+              <a:t>results </a:t>
+            </a:r>
+            <a:r>
+              <a:rPr lang="en-US" dirty="0"/>
+              <a:t>– figures, csv output, and archive of all models run in model selection, retrospective, and sensitivity analyses</a:t>
+            </a:r>
+          </a:p>
+          <a:p>
+            <a:endParaRPr lang="en-US" dirty="0"/>
+          </a:p>
+          <a:p>
+            <a:endParaRPr lang="en-US" dirty="0"/>
+          </a:p>
+        </p:txBody>
+      </p:sp>
+      <p:sp>
+        <p:nvSpPr>
+          <p:cNvPr id="6" name="TextBox 5">
+            <a:extLst>
+              <a:ext uri="{FF2B5EF4-FFF2-40B4-BE49-F238E27FC236}">
+                <a16:creationId xmlns:a16="http://schemas.microsoft.com/office/drawing/2014/main" id="{74B61F36-28A1-4FD3-BBDD-D43533D32EBD}"/>
+              </a:ext>
+            </a:extLst>
+          </p:cNvPr>
+          <p:cNvSpPr txBox="1"/>
+          <p:nvPr/>
+        </p:nvSpPr>
+        <p:spPr>
+          <a:xfrm>
+            <a:off x="2043802" y="2890482"/>
+            <a:ext cx="7074321" cy="4555093"/>
+          </a:xfrm>
+          <a:prstGeom prst="rect">
+            <a:avLst/>
+          </a:prstGeom>
+          <a:noFill/>
+        </p:spPr>
+        <p:txBody>
+          <a:bodyPr wrap="square" rtlCol="0">
+            <a:spAutoFit/>
+          </a:bodyPr>
+          <a:lstStyle/>
+          <a:p>
+            <a:r>
+              <a:rPr lang="en-US" sz="1600" b="1" dirty="0"/>
+              <a:t>HER_bestLS_321 – </a:t>
+            </a:r>
+            <a:r>
+              <a:rPr lang="en-US" sz="1600" dirty="0"/>
+              <a:t>includes comparison figures of this model’s results with LS best, HER-specific figures, diagnostics for the Bayesian analysis, and csv files of all the posterior sample summaries</a:t>
+            </a:r>
+          </a:p>
+          <a:p>
+            <a:endParaRPr lang="en-US" sz="1600" dirty="0"/>
+          </a:p>
+          <a:p>
+            <a:r>
+              <a:rPr lang="en-US" sz="1600" b="1" dirty="0"/>
+              <a:t>HER_best_condCatch.12_322 </a:t>
+            </a:r>
+            <a:r>
+              <a:rPr lang="en-US" sz="1600" dirty="0"/>
+              <a:t>– same as above</a:t>
+            </a:r>
+            <a:br>
+              <a:rPr lang="en-US" sz="1600" dirty="0"/>
+            </a:br>
+            <a:endParaRPr lang="en-US" sz="1600" dirty="0"/>
+          </a:p>
+          <a:p>
+            <a:r>
+              <a:rPr lang="en-US" sz="1600" b="1" dirty="0"/>
+              <a:t>HER_best_condEffort.12_322 </a:t>
+            </a:r>
+            <a:r>
+              <a:rPr lang="en-US" sz="1600" dirty="0"/>
+              <a:t>– same as above</a:t>
+            </a:r>
+            <a:br>
+              <a:rPr lang="en-US" sz="1600" dirty="0"/>
+            </a:br>
+            <a:endParaRPr lang="en-US" sz="1600" dirty="0"/>
+          </a:p>
+          <a:p>
+            <a:r>
+              <a:rPr lang="en-US" sz="1600" b="1" dirty="0" err="1"/>
+              <a:t>model_selection</a:t>
+            </a:r>
+            <a:r>
+              <a:rPr lang="en-US" sz="1600" b="1" dirty="0"/>
+              <a:t> </a:t>
+            </a:r>
+            <a:r>
+              <a:rPr lang="en-US" sz="1600" dirty="0"/>
+              <a:t>– includes model selection results for HER conditioned on catch and effort</a:t>
+            </a:r>
+          </a:p>
+          <a:p>
+            <a:endParaRPr lang="en-US" sz="1600" dirty="0"/>
+          </a:p>
+          <a:p>
+            <a:r>
+              <a:rPr lang="en-US" sz="1600" b="1" dirty="0"/>
+              <a:t>retrospective </a:t>
+            </a:r>
+            <a:r>
+              <a:rPr lang="en-US" sz="1600" dirty="0"/>
+              <a:t>– results for the retrospective analysis for HER_bestLS_321, HER_best_condCatch.12_322, and HER_best_condCatch.12_322</a:t>
+            </a:r>
+          </a:p>
+          <a:p>
+            <a:endParaRPr lang="en-US" sz="1600" dirty="0"/>
+          </a:p>
+          <a:p>
+            <a:r>
+              <a:rPr lang="en-US" sz="1600" b="1" dirty="0" err="1"/>
+              <a:t>sensitivity_sigmaM</a:t>
+            </a:r>
+            <a:r>
+              <a:rPr lang="en-US" sz="1600" b="1" dirty="0"/>
+              <a:t> </a:t>
+            </a:r>
+            <a:r>
+              <a:rPr lang="en-US" sz="1600" dirty="0"/>
+              <a:t>– results for sensitivity analysis examining convergence diagnostics and model output for </a:t>
+            </a:r>
+            <a:r>
+              <a:rPr lang="en-US" sz="1600" dirty="0" err="1"/>
+              <a:t>sigmaM</a:t>
+            </a:r>
+            <a:r>
+              <a:rPr lang="en-US" sz="1600" dirty="0"/>
+              <a:t> from 0.05-0.10. </a:t>
+            </a:r>
+            <a:r>
+              <a:rPr lang="en-US" sz="1600" dirty="0" err="1"/>
+              <a:t>sigmaM</a:t>
+            </a:r>
+            <a:r>
+              <a:rPr lang="en-US" sz="1600" dirty="0"/>
+              <a:t> = 0.09 had best convergence diagnostics</a:t>
+            </a:r>
+            <a:endParaRPr lang="en-US" sz="1600" b="1" dirty="0"/>
+          </a:p>
+          <a:p>
+            <a:endParaRPr lang="en-US" dirty="0"/>
+          </a:p>
+        </p:txBody>
+      </p:sp>
+      <p:cxnSp>
+        <p:nvCxnSpPr>
+          <p:cNvPr id="7" name="Straight Connector 6">
+            <a:extLst>
+              <a:ext uri="{FF2B5EF4-FFF2-40B4-BE49-F238E27FC236}">
+                <a16:creationId xmlns:a16="http://schemas.microsoft.com/office/drawing/2014/main" id="{CDB52091-97D0-40F3-AB87-570F71E26A03}"/>
+              </a:ext>
+            </a:extLst>
+          </p:cNvPr>
+          <p:cNvCxnSpPr>
+            <a:cxnSpLocks/>
+          </p:cNvCxnSpPr>
+          <p:nvPr/>
+        </p:nvCxnSpPr>
+        <p:spPr>
+          <a:xfrm>
+            <a:off x="1208314" y="1832486"/>
+            <a:ext cx="0" cy="489297"/>
+          </a:xfrm>
+          <a:prstGeom prst="line">
+            <a:avLst/>
+          </a:prstGeom>
+        </p:spPr>
+        <p:style>
+          <a:lnRef idx="1">
+            <a:schemeClr val="dk1"/>
+          </a:lnRef>
+          <a:fillRef idx="0">
+            <a:schemeClr val="dk1"/>
+          </a:fillRef>
+          <a:effectRef idx="0">
+            <a:schemeClr val="dk1"/>
+          </a:effectRef>
+          <a:fontRef idx="minor">
+            <a:schemeClr val="tx1"/>
+          </a:fontRef>
+        </p:style>
+      </p:cxnSp>
+      <p:cxnSp>
+        <p:nvCxnSpPr>
+          <p:cNvPr id="8" name="Straight Connector 7">
+            <a:extLst>
+              <a:ext uri="{FF2B5EF4-FFF2-40B4-BE49-F238E27FC236}">
+                <a16:creationId xmlns:a16="http://schemas.microsoft.com/office/drawing/2014/main" id="{43A4DD42-7602-47B7-A6D2-8C9A5C0B59C4}"/>
+              </a:ext>
+            </a:extLst>
+          </p:cNvPr>
+          <p:cNvCxnSpPr>
+            <a:cxnSpLocks/>
+          </p:cNvCxnSpPr>
+          <p:nvPr/>
+        </p:nvCxnSpPr>
+        <p:spPr>
+          <a:xfrm>
+            <a:off x="1208314" y="2322343"/>
+            <a:ext cx="304800" cy="0"/>
+          </a:xfrm>
+          <a:prstGeom prst="line">
+            <a:avLst/>
+          </a:prstGeom>
+        </p:spPr>
+        <p:style>
+          <a:lnRef idx="1">
+            <a:schemeClr val="dk1"/>
+          </a:lnRef>
+          <a:fillRef idx="0">
+            <a:schemeClr val="dk1"/>
+          </a:fillRef>
+          <a:effectRef idx="0">
+            <a:schemeClr val="dk1"/>
+          </a:effectRef>
+          <a:fontRef idx="minor">
+            <a:schemeClr val="tx1"/>
+          </a:fontRef>
+        </p:style>
+      </p:cxnSp>
+      <p:sp>
+        <p:nvSpPr>
+          <p:cNvPr id="11" name="TextBox 10">
+            <a:extLst>
+              <a:ext uri="{FF2B5EF4-FFF2-40B4-BE49-F238E27FC236}">
+                <a16:creationId xmlns:a16="http://schemas.microsoft.com/office/drawing/2014/main" id="{89BF299B-FC78-41B8-A7E7-BD6D5DF43D56}"/>
+              </a:ext>
+            </a:extLst>
+          </p:cNvPr>
+          <p:cNvSpPr txBox="1"/>
+          <p:nvPr/>
+        </p:nvSpPr>
+        <p:spPr>
+          <a:xfrm>
+            <a:off x="1042316" y="1186155"/>
+            <a:ext cx="1534074" cy="646331"/>
+          </a:xfrm>
+          <a:prstGeom prst="rect">
+            <a:avLst/>
+          </a:prstGeom>
+          <a:noFill/>
+        </p:spPr>
+        <p:txBody>
+          <a:bodyPr wrap="none" rtlCol="0">
+            <a:spAutoFit/>
+          </a:bodyPr>
+          <a:lstStyle/>
+          <a:p>
+            <a:endParaRPr lang="en-US" dirty="0"/>
+          </a:p>
+          <a:p>
+            <a:r>
+              <a:rPr lang="en-US" b="1" dirty="0"/>
+              <a:t>2019_forecast</a:t>
+            </a:r>
+          </a:p>
+        </p:txBody>
+      </p:sp>
+      <p:cxnSp>
+        <p:nvCxnSpPr>
+          <p:cNvPr id="12" name="Straight Connector 11">
+            <a:extLst>
+              <a:ext uri="{FF2B5EF4-FFF2-40B4-BE49-F238E27FC236}">
+                <a16:creationId xmlns:a16="http://schemas.microsoft.com/office/drawing/2014/main" id="{D6D7B278-FF0C-4C13-8BE0-385D148F6BF3}"/>
+              </a:ext>
+            </a:extLst>
+          </p:cNvPr>
+          <p:cNvCxnSpPr>
+            <a:cxnSpLocks/>
+          </p:cNvCxnSpPr>
+          <p:nvPr/>
+        </p:nvCxnSpPr>
+        <p:spPr>
+          <a:xfrm>
+            <a:off x="737516" y="1259356"/>
+            <a:ext cx="0" cy="489297"/>
+          </a:xfrm>
+          <a:prstGeom prst="line">
+            <a:avLst/>
+          </a:prstGeom>
+        </p:spPr>
+        <p:style>
+          <a:lnRef idx="1">
+            <a:schemeClr val="dk1"/>
+          </a:lnRef>
+          <a:fillRef idx="0">
+            <a:schemeClr val="dk1"/>
+          </a:fillRef>
+          <a:effectRef idx="0">
+            <a:schemeClr val="dk1"/>
+          </a:effectRef>
+          <a:fontRef idx="minor">
+            <a:schemeClr val="tx1"/>
+          </a:fontRef>
+        </p:style>
+      </p:cxnSp>
+      <p:cxnSp>
+        <p:nvCxnSpPr>
+          <p:cNvPr id="13" name="Straight Connector 12">
+            <a:extLst>
+              <a:ext uri="{FF2B5EF4-FFF2-40B4-BE49-F238E27FC236}">
+                <a16:creationId xmlns:a16="http://schemas.microsoft.com/office/drawing/2014/main" id="{587BFBAF-6177-41CD-8D07-042BF4F951B8}"/>
+              </a:ext>
+            </a:extLst>
+          </p:cNvPr>
+          <p:cNvCxnSpPr>
+            <a:cxnSpLocks/>
+          </p:cNvCxnSpPr>
+          <p:nvPr/>
+        </p:nvCxnSpPr>
+        <p:spPr>
+          <a:xfrm>
+            <a:off x="737516" y="1748653"/>
+            <a:ext cx="304800" cy="0"/>
+          </a:xfrm>
+          <a:prstGeom prst="line">
+            <a:avLst/>
+          </a:prstGeom>
+        </p:spPr>
+        <p:style>
+          <a:lnRef idx="1">
+            <a:schemeClr val="dk1"/>
+          </a:lnRef>
+          <a:fillRef idx="0">
+            <a:schemeClr val="dk1"/>
+          </a:fillRef>
+          <a:effectRef idx="0">
+            <a:schemeClr val="dk1"/>
+          </a:effectRef>
+          <a:fontRef idx="minor">
+            <a:schemeClr val="tx1"/>
+          </a:fontRef>
+        </p:style>
+      </p:cxnSp>
+      <p:grpSp>
+        <p:nvGrpSpPr>
+          <p:cNvPr id="14" name="Group 13">
+            <a:extLst>
+              <a:ext uri="{FF2B5EF4-FFF2-40B4-BE49-F238E27FC236}">
+                <a16:creationId xmlns:a16="http://schemas.microsoft.com/office/drawing/2014/main" id="{27F36FB8-05C0-4D55-A44C-16E3186A880A}"/>
+              </a:ext>
+            </a:extLst>
+          </p:cNvPr>
+          <p:cNvGrpSpPr/>
+          <p:nvPr/>
+        </p:nvGrpSpPr>
+        <p:grpSpPr>
+          <a:xfrm>
+            <a:off x="1617226" y="2714229"/>
+            <a:ext cx="312091" cy="3783248"/>
+            <a:chOff x="1012371" y="1806099"/>
+            <a:chExt cx="312091" cy="3783248"/>
+          </a:xfrm>
+        </p:grpSpPr>
+        <p:cxnSp>
+          <p:nvCxnSpPr>
+            <p:cNvPr id="15" name="Straight Connector 14">
+              <a:extLst>
+                <a:ext uri="{FF2B5EF4-FFF2-40B4-BE49-F238E27FC236}">
+                  <a16:creationId xmlns:a16="http://schemas.microsoft.com/office/drawing/2014/main" id="{48410155-316A-4587-8C37-80BF0DA8F89D}"/>
+                </a:ext>
+              </a:extLst>
+            </p:cNvPr>
+            <p:cNvCxnSpPr>
+              <a:cxnSpLocks/>
+            </p:cNvCxnSpPr>
+            <p:nvPr/>
+          </p:nvCxnSpPr>
+          <p:spPr>
+            <a:xfrm>
+              <a:off x="1012371" y="1806099"/>
+              <a:ext cx="0" cy="3783248"/>
+            </a:xfrm>
+            <a:prstGeom prst="line">
+              <a:avLst/>
+            </a:prstGeom>
+          </p:spPr>
+          <p:style>
+            <a:lnRef idx="1">
+              <a:schemeClr val="dk1"/>
+            </a:lnRef>
+            <a:fillRef idx="0">
+              <a:schemeClr val="dk1"/>
+            </a:fillRef>
+            <a:effectRef idx="0">
+              <a:schemeClr val="dk1"/>
+            </a:effectRef>
+            <a:fontRef idx="minor">
+              <a:schemeClr val="tx1"/>
+            </a:fontRef>
+          </p:style>
+        </p:cxnSp>
+        <p:cxnSp>
+          <p:nvCxnSpPr>
+            <p:cNvPr id="16" name="Straight Connector 15">
+              <a:extLst>
+                <a:ext uri="{FF2B5EF4-FFF2-40B4-BE49-F238E27FC236}">
+                  <a16:creationId xmlns:a16="http://schemas.microsoft.com/office/drawing/2014/main" id="{8A58D755-B80B-43BC-91FC-25D84962E50D}"/>
+                </a:ext>
+              </a:extLst>
+            </p:cNvPr>
+            <p:cNvCxnSpPr>
+              <a:cxnSpLocks/>
+            </p:cNvCxnSpPr>
+            <p:nvPr/>
+          </p:nvCxnSpPr>
+          <p:spPr>
+            <a:xfrm>
+              <a:off x="1012371" y="2143552"/>
+              <a:ext cx="304800" cy="0"/>
+            </a:xfrm>
+            <a:prstGeom prst="line">
+              <a:avLst/>
+            </a:prstGeom>
+          </p:spPr>
+          <p:style>
+            <a:lnRef idx="1">
+              <a:schemeClr val="dk1"/>
+            </a:lnRef>
+            <a:fillRef idx="0">
+              <a:schemeClr val="dk1"/>
+            </a:fillRef>
+            <a:effectRef idx="0">
+              <a:schemeClr val="dk1"/>
+            </a:effectRef>
+            <a:fontRef idx="minor">
+              <a:schemeClr val="tx1"/>
+            </a:fontRef>
+          </p:style>
+        </p:cxnSp>
+        <p:cxnSp>
+          <p:nvCxnSpPr>
+            <p:cNvPr id="17" name="Straight Connector 16">
+              <a:extLst>
+                <a:ext uri="{FF2B5EF4-FFF2-40B4-BE49-F238E27FC236}">
+                  <a16:creationId xmlns:a16="http://schemas.microsoft.com/office/drawing/2014/main" id="{5104B6B4-F478-42E2-A360-275C84B86A16}"/>
+                </a:ext>
+              </a:extLst>
+            </p:cNvPr>
+            <p:cNvCxnSpPr>
+              <a:cxnSpLocks/>
+            </p:cNvCxnSpPr>
+            <p:nvPr/>
+          </p:nvCxnSpPr>
+          <p:spPr>
+            <a:xfrm>
+              <a:off x="1012371" y="3134156"/>
+              <a:ext cx="304800" cy="0"/>
+            </a:xfrm>
+            <a:prstGeom prst="line">
+              <a:avLst/>
+            </a:prstGeom>
+          </p:spPr>
+          <p:style>
+            <a:lnRef idx="1">
+              <a:schemeClr val="dk1"/>
+            </a:lnRef>
+            <a:fillRef idx="0">
+              <a:schemeClr val="dk1"/>
+            </a:fillRef>
+            <a:effectRef idx="0">
+              <a:schemeClr val="dk1"/>
+            </a:effectRef>
+            <a:fontRef idx="minor">
+              <a:schemeClr val="tx1"/>
+            </a:fontRef>
+          </p:style>
+        </p:cxnSp>
+        <p:cxnSp>
+          <p:nvCxnSpPr>
+            <p:cNvPr id="18" name="Straight Connector 17">
+              <a:extLst>
+                <a:ext uri="{FF2B5EF4-FFF2-40B4-BE49-F238E27FC236}">
+                  <a16:creationId xmlns:a16="http://schemas.microsoft.com/office/drawing/2014/main" id="{83079195-8886-450F-8D63-1387D5E41E03}"/>
+                </a:ext>
+              </a:extLst>
+            </p:cNvPr>
+            <p:cNvCxnSpPr>
+              <a:cxnSpLocks/>
+            </p:cNvCxnSpPr>
+            <p:nvPr/>
+          </p:nvCxnSpPr>
+          <p:spPr>
+            <a:xfrm>
+              <a:off x="1019662" y="3624014"/>
+              <a:ext cx="304800" cy="0"/>
+            </a:xfrm>
+            <a:prstGeom prst="line">
+              <a:avLst/>
+            </a:prstGeom>
+          </p:spPr>
+          <p:style>
+            <a:lnRef idx="1">
+              <a:schemeClr val="dk1"/>
+            </a:lnRef>
+            <a:fillRef idx="0">
+              <a:schemeClr val="dk1"/>
+            </a:fillRef>
+            <a:effectRef idx="0">
+              <a:schemeClr val="dk1"/>
+            </a:effectRef>
+            <a:fontRef idx="minor">
+              <a:schemeClr val="tx1"/>
+            </a:fontRef>
+          </p:style>
+        </p:cxnSp>
+        <p:cxnSp>
+          <p:nvCxnSpPr>
+            <p:cNvPr id="19" name="Straight Connector 18">
+              <a:extLst>
+                <a:ext uri="{FF2B5EF4-FFF2-40B4-BE49-F238E27FC236}">
+                  <a16:creationId xmlns:a16="http://schemas.microsoft.com/office/drawing/2014/main" id="{F003E160-42A2-4119-9742-C7CB0FE9D75E}"/>
+                </a:ext>
+              </a:extLst>
+            </p:cNvPr>
+            <p:cNvCxnSpPr>
+              <a:cxnSpLocks/>
+            </p:cNvCxnSpPr>
+            <p:nvPr/>
+          </p:nvCxnSpPr>
+          <p:spPr>
+            <a:xfrm>
+              <a:off x="1012371" y="5589347"/>
+              <a:ext cx="304800" cy="0"/>
+            </a:xfrm>
+            <a:prstGeom prst="line">
+              <a:avLst/>
+            </a:prstGeom>
+          </p:spPr>
+          <p:style>
+            <a:lnRef idx="1">
+              <a:schemeClr val="dk1"/>
+            </a:lnRef>
+            <a:fillRef idx="0">
+              <a:schemeClr val="dk1"/>
+            </a:fillRef>
+            <a:effectRef idx="0">
+              <a:schemeClr val="dk1"/>
+            </a:effectRef>
+            <a:fontRef idx="minor">
+              <a:schemeClr val="tx1"/>
+            </a:fontRef>
+          </p:style>
+        </p:cxnSp>
+      </p:grpSp>
+      <p:cxnSp>
+        <p:nvCxnSpPr>
+          <p:cNvPr id="21" name="Straight Connector 20">
+            <a:extLst>
+              <a:ext uri="{FF2B5EF4-FFF2-40B4-BE49-F238E27FC236}">
+                <a16:creationId xmlns:a16="http://schemas.microsoft.com/office/drawing/2014/main" id="{9F479048-39FC-4FE6-A687-8E8351E09B52}"/>
+              </a:ext>
+            </a:extLst>
+          </p:cNvPr>
+          <p:cNvCxnSpPr>
+            <a:cxnSpLocks/>
+          </p:cNvCxnSpPr>
+          <p:nvPr/>
+        </p:nvCxnSpPr>
+        <p:spPr>
+          <a:xfrm>
+            <a:off x="1637727" y="5043773"/>
+            <a:ext cx="304800" cy="0"/>
+          </a:xfrm>
+          <a:prstGeom prst="line">
+            <a:avLst/>
+          </a:prstGeom>
+        </p:spPr>
+        <p:style>
+          <a:lnRef idx="1">
+            <a:schemeClr val="dk1"/>
+          </a:lnRef>
+          <a:fillRef idx="0">
+            <a:schemeClr val="dk1"/>
+          </a:fillRef>
+          <a:effectRef idx="0">
+            <a:schemeClr val="dk1"/>
+          </a:effectRef>
+          <a:fontRef idx="minor">
+            <a:schemeClr val="tx1"/>
+          </a:fontRef>
+        </p:style>
+      </p:cxnSp>
+      <p:cxnSp>
+        <p:nvCxnSpPr>
+          <p:cNvPr id="22" name="Straight Connector 21">
+            <a:extLst>
+              <a:ext uri="{FF2B5EF4-FFF2-40B4-BE49-F238E27FC236}">
+                <a16:creationId xmlns:a16="http://schemas.microsoft.com/office/drawing/2014/main" id="{3293EDA0-B79B-4A03-BD0F-68A4AB87F9B2}"/>
+              </a:ext>
+            </a:extLst>
+          </p:cNvPr>
+          <p:cNvCxnSpPr>
+            <a:cxnSpLocks/>
+          </p:cNvCxnSpPr>
+          <p:nvPr/>
+        </p:nvCxnSpPr>
+        <p:spPr>
+          <a:xfrm>
+            <a:off x="1624517" y="5751344"/>
+            <a:ext cx="304800" cy="0"/>
+          </a:xfrm>
+          <a:prstGeom prst="line">
+            <a:avLst/>
+          </a:prstGeom>
+        </p:spPr>
+        <p:style>
+          <a:lnRef idx="1">
+            <a:schemeClr val="dk1"/>
+          </a:lnRef>
+          <a:fillRef idx="0">
+            <a:schemeClr val="dk1"/>
+          </a:fillRef>
+          <a:effectRef idx="0">
+            <a:schemeClr val="dk1"/>
+          </a:effectRef>
+          <a:fontRef idx="minor">
+            <a:schemeClr val="tx1"/>
+          </a:fontRef>
+        </p:style>
+      </p:cxnSp>
+    </p:spTree>
+    <p:extLst>
+      <p:ext uri="{BB962C8B-B14F-4D97-AF65-F5344CB8AC3E}">
+        <p14:creationId xmlns:p14="http://schemas.microsoft.com/office/powerpoint/2010/main" val="1545412399"/>
+      </p:ext>
+    </p:extLst>
+  </p:cSld>
+  <p:clrMapOvr>
+    <a:masterClrMapping/>
+  </p:clrMapOvr>
+</p:sld>
+</file>
+
 <file path=ppt/slides/slide2.xml><?xml version="1.0" encoding="utf-8"?>
 <p:sld xmlns:a="http://schemas.openxmlformats.org/drawingml/2006/main" xmlns:r="http://schemas.openxmlformats.org/officeDocument/2006/relationships" xmlns:p="http://schemas.openxmlformats.org/presentationml/2006/main">
   <p:cSld>
@@ -4702,8 +6622,8 @@
           </a:prstGeom>
         </p:spPr>
       </p:pic>
-      <mc:AlternateContent xmlns:mc="http://schemas.openxmlformats.org/markup-compatibility/2006">
-        <mc:Choice xmlns:a14="http://schemas.microsoft.com/office/drawing/2010/main" Requires="a14">
+      <mc:AlternateContent xmlns:mc="http://schemas.openxmlformats.org/markup-compatibility/2006" xmlns:a14="http://schemas.microsoft.com/office/drawing/2010/main">
+        <mc:Choice Requires="a14">
           <p:sp>
             <p:nvSpPr>
               <p:cNvPr id="13" name="TextBox 12">
@@ -4749,6 +6669,7 @@
                 <a:endParaRPr lang="en-US" sz="1600" dirty="0"/>
               </a:p>
               <a:p>
+                <a:pPr/>
                 <a14:m>
                   <m:oMathPara xmlns:m="http://schemas.openxmlformats.org/officeDocument/2006/math">
                     <m:oMathParaPr>
@@ -5689,7 +7610,7 @@
             </p:txBody>
           </p:sp>
         </mc:Choice>
-        <mc:Fallback>
+        <mc:Fallback xmlns="">
           <p:sp>
             <p:nvSpPr>
               <p:cNvPr id="13" name="TextBox 12">

</xml_diff>

<commit_message>
Sensitivity analysis on maturity and continued work on BRPs
</commit_message>
<xml_diff>
--- a/technical_docs/popdy_her_ls.pptx
+++ b/technical_docs/popdy_her_ls.pptx
@@ -258,7 +258,7 @@
           <a:p>
             <a:fld id="{601AD17F-A198-4D0B-923D-8F7C51F5BEB9}" type="datetimeFigureOut">
               <a:rPr lang="en-US" smtClean="0"/>
-              <a:t>7/16/2019</a:t>
+              <a:t>8/23/2019</a:t>
             </a:fld>
             <a:endParaRPr lang="en-US"/>
           </a:p>
@@ -428,7 +428,7 @@
           <a:p>
             <a:fld id="{601AD17F-A198-4D0B-923D-8F7C51F5BEB9}" type="datetimeFigureOut">
               <a:rPr lang="en-US" smtClean="0"/>
-              <a:t>7/16/2019</a:t>
+              <a:t>8/23/2019</a:t>
             </a:fld>
             <a:endParaRPr lang="en-US"/>
           </a:p>
@@ -608,7 +608,7 @@
           <a:p>
             <a:fld id="{601AD17F-A198-4D0B-923D-8F7C51F5BEB9}" type="datetimeFigureOut">
               <a:rPr lang="en-US" smtClean="0"/>
-              <a:t>7/16/2019</a:t>
+              <a:t>8/23/2019</a:t>
             </a:fld>
             <a:endParaRPr lang="en-US"/>
           </a:p>
@@ -778,7 +778,7 @@
           <a:p>
             <a:fld id="{601AD17F-A198-4D0B-923D-8F7C51F5BEB9}" type="datetimeFigureOut">
               <a:rPr lang="en-US" smtClean="0"/>
-              <a:t>7/16/2019</a:t>
+              <a:t>8/23/2019</a:t>
             </a:fld>
             <a:endParaRPr lang="en-US"/>
           </a:p>
@@ -1022,7 +1022,7 @@
           <a:p>
             <a:fld id="{601AD17F-A198-4D0B-923D-8F7C51F5BEB9}" type="datetimeFigureOut">
               <a:rPr lang="en-US" smtClean="0"/>
-              <a:t>7/16/2019</a:t>
+              <a:t>8/23/2019</a:t>
             </a:fld>
             <a:endParaRPr lang="en-US"/>
           </a:p>
@@ -1254,7 +1254,7 @@
           <a:p>
             <a:fld id="{601AD17F-A198-4D0B-923D-8F7C51F5BEB9}" type="datetimeFigureOut">
               <a:rPr lang="en-US" smtClean="0"/>
-              <a:t>7/16/2019</a:t>
+              <a:t>8/23/2019</a:t>
             </a:fld>
             <a:endParaRPr lang="en-US"/>
           </a:p>
@@ -1621,7 +1621,7 @@
           <a:p>
             <a:fld id="{601AD17F-A198-4D0B-923D-8F7C51F5BEB9}" type="datetimeFigureOut">
               <a:rPr lang="en-US" smtClean="0"/>
-              <a:t>7/16/2019</a:t>
+              <a:t>8/23/2019</a:t>
             </a:fld>
             <a:endParaRPr lang="en-US"/>
           </a:p>
@@ -1739,7 +1739,7 @@
           <a:p>
             <a:fld id="{601AD17F-A198-4D0B-923D-8F7C51F5BEB9}" type="datetimeFigureOut">
               <a:rPr lang="en-US" smtClean="0"/>
-              <a:t>7/16/2019</a:t>
+              <a:t>8/23/2019</a:t>
             </a:fld>
             <a:endParaRPr lang="en-US"/>
           </a:p>
@@ -1834,7 +1834,7 @@
           <a:p>
             <a:fld id="{601AD17F-A198-4D0B-923D-8F7C51F5BEB9}" type="datetimeFigureOut">
               <a:rPr lang="en-US" smtClean="0"/>
-              <a:t>7/16/2019</a:t>
+              <a:t>8/23/2019</a:t>
             </a:fld>
             <a:endParaRPr lang="en-US"/>
           </a:p>
@@ -2111,7 +2111,7 @@
           <a:p>
             <a:fld id="{601AD17F-A198-4D0B-923D-8F7C51F5BEB9}" type="datetimeFigureOut">
               <a:rPr lang="en-US" smtClean="0"/>
-              <a:t>7/16/2019</a:t>
+              <a:t>8/23/2019</a:t>
             </a:fld>
             <a:endParaRPr lang="en-US"/>
           </a:p>
@@ -2368,7 +2368,7 @@
           <a:p>
             <a:fld id="{601AD17F-A198-4D0B-923D-8F7C51F5BEB9}" type="datetimeFigureOut">
               <a:rPr lang="en-US" smtClean="0"/>
-              <a:t>7/16/2019</a:t>
+              <a:t>8/23/2019</a:t>
             </a:fld>
             <a:endParaRPr lang="en-US"/>
           </a:p>
@@ -2581,7 +2581,7 @@
           <a:p>
             <a:fld id="{601AD17F-A198-4D0B-923D-8F7C51F5BEB9}" type="datetimeFigureOut">
               <a:rPr lang="en-US" smtClean="0"/>
-              <a:t>7/16/2019</a:t>
+              <a:t>8/23/2019</a:t>
             </a:fld>
             <a:endParaRPr lang="en-US"/>
           </a:p>
@@ -8689,7 +8689,7 @@
           <a:p>
             <a:r>
               <a:rPr lang="en-US" dirty="0"/>
-              <a:t>Assumes catch in 100% mature. Uses </a:t>
+              <a:t>Assumes catch is 100% mature. Uses </a:t>
             </a:r>
             <a:r>
               <a:rPr lang="en-US" dirty="0" err="1"/>

</xml_diff>